<commit_message>
Tweaks to final session. Mostly narrative improvements
</commit_message>
<xml_diff>
--- a/Securing Your API Endpoints.pptx
+++ b/Securing Your API Endpoints.pptx
@@ -288,7 +288,7 @@
           <a:p>
             <a:fld id="{C54A4886-B4AF-42F7-97BE-95CDF82A73E3}" type="datetimeFigureOut">
               <a:rPr lang="en-US" smtClean="0"/>
-              <a:t>12/16/2018</a:t>
+              <a:t>12/17/2018</a:t>
             </a:fld>
             <a:endParaRPr lang="en-US"/>
           </a:p>
@@ -16803,20 +16803,10 @@
                 <a:ea typeface="+mn-ea"/>
                 <a:cs typeface="+mn-cs"/>
               </a:rPr>
-              <a:t>To wrap up our list I want to briefly mention two additional technologies that are used in large enterprise</a:t>
-            </a:r>
-            <a:r>
-              <a:rPr lang="en-US" sz="1200" kern="1200" baseline="0" dirty="0" smtClean="0">
-                <a:solidFill>
-                  <a:schemeClr val="tx1"/>
-                </a:solidFill>
-                <a:effectLst/>
-                <a:latin typeface="+mn-lt"/>
-                <a:ea typeface="+mn-ea"/>
-                <a:cs typeface="+mn-cs"/>
-              </a:rPr>
-              <a:t> scenarios.</a:t>
-            </a:r>
+              <a:t>To wrap up our review of authentication options I want to touch very briefly on two additional techniques that you might want to be aware of. </a:t>
+            </a:r>
+          </a:p>
+          <a:p>
             <a:endParaRPr lang="en-US" sz="1200" kern="1200" dirty="0" smtClean="0">
               <a:solidFill>
                 <a:schemeClr val="tx1"/>
@@ -16828,6 +16818,20 @@
             </a:endParaRPr>
           </a:p>
           <a:p>
+            <a:r>
+              <a:rPr lang="en-US" sz="1200" kern="1200" dirty="0" smtClean="0">
+                <a:solidFill>
+                  <a:schemeClr val="tx1"/>
+                </a:solidFill>
+                <a:effectLst/>
+                <a:latin typeface="+mn-lt"/>
+                <a:ea typeface="+mn-ea"/>
+                <a:cs typeface="+mn-cs"/>
+              </a:rPr>
+              <a:t>The first is SAML, which stands for “Security Assertion Markup Language”. It provides similar functionality as JSON Web Tokens in that it allows for the secure exchange of authentication and authorization data between different parties, but using SOAP and XML rather than JSON over HTTP. SAML is significantly older and more complex than JWT, but it does offer some additional functionality such as additional transport protocols and different types of encryption. SAML is very commonly used for enterprise single-sign-on scenarios, although JWT is starting to see some adoption in this area.</a:t>
+            </a:r>
+          </a:p>
+          <a:p>
             <a:endParaRPr lang="en-US" sz="1200" kern="1200" dirty="0" smtClean="0">
               <a:solidFill>
                 <a:schemeClr val="tx1"/>
@@ -16849,11 +16853,9 @@
                 <a:ea typeface="+mn-ea"/>
                 <a:cs typeface="+mn-cs"/>
               </a:rPr>
-              <a:t>The first is SAML, which stands for “Security Assertion Markup Language”. It’s an “XML-based data format for exchanging authentication and authorization data between parties”. SAML is commonly used in enterprise SSO scenarios.</a:t>
-            </a:r>
-          </a:p>
-          <a:p>
-            <a:endParaRPr lang="en-US" sz="1200" kern="1200" dirty="0" smtClean="0">
+              <a:t>The second is WS-Security, and honestly I don’t know much about it. If you’re dealing with very complex, enterprise-grade authentication scenarios then you might want to hire a security expert to help. It’s probably safe to say that nobody attending my 101-level intro to authentication systems has any business implementing WS-Security in PROD without a little help.</a:t>
+            </a:r>
+            <a:endParaRPr lang="en-US" sz="1200" kern="1200" dirty="0">
               <a:solidFill>
                 <a:schemeClr val="tx1"/>
               </a:solidFill>
@@ -16862,44 +16864,6 @@
               <a:ea typeface="+mn-ea"/>
               <a:cs typeface="+mn-cs"/>
             </a:endParaRPr>
-          </a:p>
-          <a:p>
-            <a:r>
-              <a:rPr lang="en-US" sz="1200" kern="1200" dirty="0" smtClean="0">
-                <a:solidFill>
-                  <a:schemeClr val="tx1"/>
-                </a:solidFill>
-                <a:effectLst/>
-                <a:latin typeface="+mn-lt"/>
-                <a:ea typeface="+mn-ea"/>
-                <a:cs typeface="+mn-cs"/>
-              </a:rPr>
-              <a:t>The second is WS-Security. This is the king of complexity and deals with things such</a:t>
-            </a:r>
-            <a:r>
-              <a:rPr lang="en-US" sz="1200" kern="1200" baseline="0" dirty="0" smtClean="0">
-                <a:solidFill>
-                  <a:schemeClr val="tx1"/>
-                </a:solidFill>
-                <a:effectLst/>
-                <a:latin typeface="+mn-lt"/>
-                <a:ea typeface="+mn-ea"/>
-                <a:cs typeface="+mn-cs"/>
-              </a:rPr>
-              <a:t> as “messaging across trust domains”. God help you if that’s a use case your API cares about!</a:t>
-            </a:r>
-            <a:endParaRPr lang="en-US" sz="1200" kern="1200" dirty="0" smtClean="0">
-              <a:solidFill>
-                <a:schemeClr val="tx1"/>
-              </a:solidFill>
-              <a:effectLst/>
-              <a:latin typeface="+mn-lt"/>
-              <a:ea typeface="+mn-ea"/>
-              <a:cs typeface="+mn-cs"/>
-            </a:endParaRPr>
-          </a:p>
-          <a:p>
-            <a:endParaRPr lang="en-US" dirty="0"/>
           </a:p>
         </p:txBody>
       </p:sp>
@@ -16993,23 +16957,33 @@
                 <a:ea typeface="+mn-ea"/>
                 <a:cs typeface="+mn-cs"/>
               </a:rPr>
-              <a:t>So what</a:t>
-            </a:r>
-            <a:r>
-              <a:rPr lang="en-US" sz="1200" kern="1200" baseline="0" dirty="0" smtClean="0">
-                <a:solidFill>
-                  <a:schemeClr val="tx1"/>
-                </a:solidFill>
-                <a:effectLst/>
-                <a:latin typeface="+mn-lt"/>
-                <a:ea typeface="+mn-ea"/>
-                <a:cs typeface="+mn-cs"/>
-              </a:rPr>
-              <a:t> should you use?</a:t>
-            </a:r>
-          </a:p>
-          <a:p>
-            <a:endParaRPr lang="en-US" sz="1200" kern="1200" dirty="0" smtClean="0">
+              <a:t>OK, so I just threw a metric </a:t>
+            </a:r>
+            <a:r>
+              <a:rPr lang="en-US" sz="1200" kern="1200" dirty="0" err="1" smtClean="0">
+                <a:solidFill>
+                  <a:schemeClr val="tx1"/>
+                </a:solidFill>
+                <a:effectLst/>
+                <a:latin typeface="+mn-lt"/>
+                <a:ea typeface="+mn-ea"/>
+                <a:cs typeface="+mn-cs"/>
+              </a:rPr>
+              <a:t>crapton</a:t>
+            </a:r>
+            <a:r>
+              <a:rPr lang="en-US" sz="1200" kern="1200" dirty="0" smtClean="0">
+                <a:solidFill>
+                  <a:schemeClr val="tx1"/>
+                </a:solidFill>
+                <a:effectLst/>
+                <a:latin typeface="+mn-lt"/>
+                <a:ea typeface="+mn-ea"/>
+                <a:cs typeface="+mn-cs"/>
+              </a:rPr>
+              <a:t> of information at you. We talked about a lot of different authentication choices with a lot of different trade-offs. Like most things in this industry, the correct answer to this question is “it depends”.</a:t>
+            </a:r>
+            <a:endParaRPr lang="en-US" sz="1200" kern="1200" dirty="0">
               <a:solidFill>
                 <a:schemeClr val="tx1"/>
               </a:solidFill>
@@ -17018,94 +16992,6 @@
               <a:ea typeface="+mn-ea"/>
               <a:cs typeface="+mn-cs"/>
             </a:endParaRPr>
-          </a:p>
-          <a:p>
-            <a:r>
-              <a:rPr lang="en-US" sz="1200" kern="1200" dirty="0" smtClean="0">
-                <a:solidFill>
-                  <a:schemeClr val="tx1"/>
-                </a:solidFill>
-                <a:effectLst/>
-                <a:latin typeface="+mn-lt"/>
-                <a:ea typeface="+mn-ea"/>
-                <a:cs typeface="+mn-cs"/>
-              </a:rPr>
-              <a:t>I just threw a ton of choices</a:t>
-            </a:r>
-            <a:r>
-              <a:rPr lang="en-US" sz="1200" kern="1200" baseline="0" dirty="0" smtClean="0">
-                <a:solidFill>
-                  <a:schemeClr val="tx1"/>
-                </a:solidFill>
-                <a:effectLst/>
-                <a:latin typeface="+mn-lt"/>
-                <a:ea typeface="+mn-ea"/>
-                <a:cs typeface="+mn-cs"/>
-              </a:rPr>
-              <a:t> </a:t>
-            </a:r>
-            <a:r>
-              <a:rPr lang="en-US" sz="1200" kern="1200" dirty="0" smtClean="0">
-                <a:solidFill>
-                  <a:schemeClr val="tx1"/>
-                </a:solidFill>
-                <a:effectLst/>
-                <a:latin typeface="+mn-lt"/>
-                <a:ea typeface="+mn-ea"/>
-                <a:cs typeface="+mn-cs"/>
-              </a:rPr>
-              <a:t>at you, and as usual the correct answer</a:t>
-            </a:r>
-            <a:r>
-              <a:rPr lang="en-US" sz="1200" kern="1200" baseline="0" dirty="0" smtClean="0">
-                <a:solidFill>
-                  <a:schemeClr val="tx1"/>
-                </a:solidFill>
-                <a:effectLst/>
-                <a:latin typeface="+mn-lt"/>
-                <a:ea typeface="+mn-ea"/>
-                <a:cs typeface="+mn-cs"/>
-              </a:rPr>
-              <a:t> is “it depends”. </a:t>
-            </a:r>
-          </a:p>
-          <a:p>
-            <a:endParaRPr lang="en-US" sz="1200" kern="1200" baseline="0" dirty="0" smtClean="0">
-              <a:solidFill>
-                <a:schemeClr val="tx1"/>
-              </a:solidFill>
-              <a:effectLst/>
-              <a:latin typeface="+mn-lt"/>
-              <a:ea typeface="+mn-ea"/>
-              <a:cs typeface="+mn-cs"/>
-            </a:endParaRPr>
-          </a:p>
-          <a:p>
-            <a:r>
-              <a:rPr lang="en-US" sz="1200" kern="1200" baseline="0" dirty="0" smtClean="0">
-                <a:solidFill>
-                  <a:schemeClr val="tx1"/>
-                </a:solidFill>
-                <a:effectLst/>
-                <a:latin typeface="+mn-lt"/>
-                <a:ea typeface="+mn-ea"/>
-                <a:cs typeface="+mn-cs"/>
-              </a:rPr>
-              <a:t>Let’s briefly recap those options and talk about the ideal use cases for each</a:t>
-            </a:r>
-            <a:r>
-              <a:rPr lang="en-US" sz="1200" kern="1200" dirty="0" smtClean="0">
-                <a:solidFill>
-                  <a:schemeClr val="tx1"/>
-                </a:solidFill>
-                <a:effectLst/>
-                <a:latin typeface="+mn-lt"/>
-                <a:ea typeface="+mn-ea"/>
-                <a:cs typeface="+mn-cs"/>
-              </a:rPr>
-              <a:t>.</a:t>
-            </a:r>
-            <a:endParaRPr lang="en-US" dirty="0"/>
           </a:p>
         </p:txBody>
       </p:sp>
@@ -17391,23 +17277,6 @@
           <a:bodyPr/>
           <a:lstStyle/>
           <a:p>
-            <a:pPr marL="0" marR="0" indent="0" algn="l" defTabSz="914400" rtl="0" eaLnBrk="1" fontAlgn="auto" latinLnBrk="0" hangingPunct="1">
-              <a:lnSpc>
-                <a:spcPct val="100000"/>
-              </a:lnSpc>
-              <a:spcBef>
-                <a:spcPts val="0"/>
-              </a:spcBef>
-              <a:spcAft>
-                <a:spcPts val="0"/>
-              </a:spcAft>
-              <a:buClrTx/>
-              <a:buSzTx/>
-              <a:buFontTx/>
-              <a:buNone/>
-              <a:tabLst/>
-              <a:defRPr/>
-            </a:pPr>
             <a:r>
               <a:rPr lang="en-US" sz="1200" kern="1200" dirty="0" smtClean="0">
                 <a:solidFill>
@@ -17418,122 +17287,34 @@
                 <a:ea typeface="+mn-ea"/>
                 <a:cs typeface="+mn-cs"/>
               </a:rPr>
-              <a:t>Client certs are</a:t>
-            </a:r>
-            <a:r>
-              <a:rPr lang="en-US" sz="1200" kern="1200" baseline="0" dirty="0" smtClean="0">
-                <a:solidFill>
-                  <a:schemeClr val="tx1"/>
-                </a:solidFill>
-                <a:effectLst/>
-                <a:latin typeface="+mn-lt"/>
-                <a:ea typeface="+mn-ea"/>
-                <a:cs typeface="+mn-cs"/>
-              </a:rPr>
-              <a:t> useful </a:t>
-            </a:r>
-            <a:r>
-              <a:rPr lang="en-US" sz="1200" b="1" kern="1200" baseline="0" dirty="0" smtClean="0">
-                <a:solidFill>
-                  <a:schemeClr val="tx1"/>
-                </a:solidFill>
-                <a:effectLst/>
-                <a:latin typeface="+mn-lt"/>
-                <a:ea typeface="+mn-ea"/>
-                <a:cs typeface="+mn-cs"/>
-              </a:rPr>
-              <a:t>if you can get users to install them</a:t>
-            </a:r>
-          </a:p>
-          <a:p>
-            <a:pPr marL="0" marR="0" indent="0" algn="l" defTabSz="914400" rtl="0" eaLnBrk="1" fontAlgn="auto" latinLnBrk="0" hangingPunct="1">
-              <a:lnSpc>
-                <a:spcPct val="100000"/>
-              </a:lnSpc>
-              <a:spcBef>
-                <a:spcPts val="0"/>
-              </a:spcBef>
-              <a:spcAft>
-                <a:spcPts val="0"/>
-              </a:spcAft>
-              <a:buClrTx/>
-              <a:buSzTx/>
-              <a:buFontTx/>
-              <a:buNone/>
-              <a:tabLst/>
-              <a:defRPr/>
-            </a:pPr>
-            <a:endParaRPr lang="en-US" sz="1200" b="1" kern="1200" baseline="0" dirty="0" smtClean="0">
-              <a:solidFill>
-                <a:schemeClr val="tx1"/>
-              </a:solidFill>
-              <a:effectLst/>
-              <a:latin typeface="+mn-lt"/>
-              <a:ea typeface="+mn-ea"/>
-              <a:cs typeface="+mn-cs"/>
-            </a:endParaRPr>
-          </a:p>
-          <a:p>
-            <a:pPr marL="0" marR="0" indent="0" algn="l" defTabSz="914400" rtl="0" eaLnBrk="1" fontAlgn="auto" latinLnBrk="0" hangingPunct="1">
-              <a:lnSpc>
-                <a:spcPct val="100000"/>
-              </a:lnSpc>
-              <a:spcBef>
-                <a:spcPts val="0"/>
-              </a:spcBef>
-              <a:spcAft>
-                <a:spcPts val="0"/>
-              </a:spcAft>
-              <a:buClrTx/>
-              <a:buSzTx/>
-              <a:buFontTx/>
-              <a:buNone/>
-              <a:tabLst/>
-              <a:defRPr/>
-            </a:pPr>
-            <a:r>
-              <a:rPr lang="en-US" sz="1200" b="0" kern="1200" baseline="0" dirty="0" smtClean="0">
-                <a:solidFill>
-                  <a:schemeClr val="tx1"/>
-                </a:solidFill>
-                <a:effectLst/>
-                <a:latin typeface="+mn-lt"/>
-                <a:ea typeface="+mn-ea"/>
-                <a:cs typeface="+mn-cs"/>
-              </a:rPr>
-              <a:t>Bad choice for </a:t>
-            </a:r>
-            <a:r>
-              <a:rPr lang="en-US" sz="1200" b="1" kern="1200" baseline="0" dirty="0" smtClean="0">
-                <a:solidFill>
-                  <a:schemeClr val="tx1"/>
-                </a:solidFill>
-                <a:effectLst/>
-                <a:latin typeface="+mn-lt"/>
-                <a:ea typeface="+mn-ea"/>
-                <a:cs typeface="+mn-cs"/>
-              </a:rPr>
-              <a:t>public API</a:t>
-            </a:r>
-          </a:p>
-          <a:p>
-            <a:pPr marL="0" marR="0" indent="0" algn="l" defTabSz="914400" rtl="0" eaLnBrk="1" fontAlgn="auto" latinLnBrk="0" hangingPunct="1">
-              <a:lnSpc>
-                <a:spcPct val="100000"/>
-              </a:lnSpc>
-              <a:spcBef>
-                <a:spcPts val="0"/>
-              </a:spcBef>
-              <a:spcAft>
-                <a:spcPts val="0"/>
-              </a:spcAft>
-              <a:buClrTx/>
-              <a:buSzTx/>
-              <a:buFontTx/>
-              <a:buNone/>
-              <a:tabLst/>
-              <a:defRPr/>
-            </a:pPr>
+              <a:t>Client certificates are pretty easy to use, </a:t>
+            </a:r>
+            <a:r>
+              <a:rPr lang="en-US" sz="1200" b="1" kern="1200" dirty="0" smtClean="0">
+                <a:solidFill>
+                  <a:schemeClr val="tx1"/>
+                </a:solidFill>
+                <a:effectLst/>
+                <a:latin typeface="+mn-lt"/>
+                <a:ea typeface="+mn-ea"/>
+                <a:cs typeface="+mn-cs"/>
+              </a:rPr>
+              <a:t>IF you can get your users to install them</a:t>
+            </a:r>
+            <a:r>
+              <a:rPr lang="en-US" sz="1200" kern="1200" dirty="0" smtClean="0">
+                <a:solidFill>
+                  <a:schemeClr val="tx1"/>
+                </a:solidFill>
+                <a:effectLst/>
+                <a:latin typeface="+mn-lt"/>
+                <a:ea typeface="+mn-ea"/>
+                <a:cs typeface="+mn-cs"/>
+              </a:rPr>
+              <a:t>. </a:t>
+            </a:r>
+          </a:p>
+          <a:p>
             <a:endParaRPr lang="en-US" sz="1200" kern="1200" dirty="0" smtClean="0">
               <a:solidFill>
                 <a:schemeClr val="tx1"/>
@@ -17545,23 +17326,6 @@
             </a:endParaRPr>
           </a:p>
           <a:p>
-            <a:pPr marL="0" marR="0" indent="0" algn="l" defTabSz="914400" rtl="0" eaLnBrk="1" fontAlgn="auto" latinLnBrk="0" hangingPunct="1">
-              <a:lnSpc>
-                <a:spcPct val="100000"/>
-              </a:lnSpc>
-              <a:spcBef>
-                <a:spcPts val="0"/>
-              </a:spcBef>
-              <a:spcAft>
-                <a:spcPts val="0"/>
-              </a:spcAft>
-              <a:buClrTx/>
-              <a:buSzTx/>
-              <a:buFontTx/>
-              <a:buNone/>
-              <a:tabLst/>
-              <a:defRPr/>
-            </a:pPr>
             <a:r>
               <a:rPr lang="en-US" sz="1200" kern="1200" dirty="0" smtClean="0">
                 <a:solidFill>
@@ -17572,64 +17336,11 @@
                 <a:ea typeface="+mn-ea"/>
                 <a:cs typeface="+mn-cs"/>
               </a:rPr>
-              <a:t>Work best for securing </a:t>
-            </a:r>
-            <a:r>
-              <a:rPr lang="en-US" sz="1200" b="1" kern="1200" dirty="0" smtClean="0">
-                <a:solidFill>
-                  <a:schemeClr val="tx1"/>
-                </a:solidFill>
-                <a:effectLst/>
-                <a:latin typeface="+mn-lt"/>
-                <a:ea typeface="+mn-ea"/>
-                <a:cs typeface="+mn-cs"/>
-              </a:rPr>
-              <a:t>private API</a:t>
-            </a:r>
-            <a:r>
-              <a:rPr lang="en-US" sz="1200" kern="1200" dirty="0" smtClean="0">
-                <a:solidFill>
-                  <a:schemeClr val="tx1"/>
-                </a:solidFill>
-                <a:effectLst/>
-                <a:latin typeface="+mn-lt"/>
-                <a:ea typeface="+mn-ea"/>
-                <a:cs typeface="+mn-cs"/>
-              </a:rPr>
-              <a:t> on trusted</a:t>
-            </a:r>
-            <a:r>
-              <a:rPr lang="en-US" sz="1200" kern="1200" baseline="0" dirty="0" smtClean="0">
-                <a:solidFill>
-                  <a:schemeClr val="tx1"/>
-                </a:solidFill>
-                <a:effectLst/>
-                <a:latin typeface="+mn-lt"/>
-                <a:ea typeface="+mn-ea"/>
-                <a:cs typeface="+mn-cs"/>
-              </a:rPr>
-              <a:t> network.</a:t>
-            </a:r>
-          </a:p>
-          <a:p>
-            <a:pPr marL="0" marR="0" indent="0" algn="l" defTabSz="914400" rtl="0" eaLnBrk="1" fontAlgn="auto" latinLnBrk="0" hangingPunct="1">
-              <a:lnSpc>
-                <a:spcPct val="100000"/>
-              </a:lnSpc>
-              <a:spcBef>
-                <a:spcPts val="0"/>
-              </a:spcBef>
-              <a:spcAft>
-                <a:spcPts val="0"/>
-              </a:spcAft>
-              <a:buClrTx/>
-              <a:buSzTx/>
-              <a:buFontTx/>
-              <a:buNone/>
-              <a:tabLst/>
-              <a:defRPr/>
-            </a:pPr>
-            <a:endParaRPr lang="en-US" sz="1200" kern="1200" baseline="0" dirty="0" smtClean="0">
+              <a:t>If you’re securing a private API on a trusted network, and you’re authenticating against Active Directory, then this is a really nice way to avoid login prompts altogether.</a:t>
+            </a:r>
+          </a:p>
+          <a:p>
+            <a:endParaRPr lang="en-US" sz="1200" kern="1200" dirty="0" smtClean="0">
               <a:solidFill>
                 <a:schemeClr val="tx1"/>
               </a:solidFill>
@@ -17640,143 +17351,19 @@
             </a:endParaRPr>
           </a:p>
           <a:p>
-            <a:pPr marL="0" marR="0" indent="0" algn="l" defTabSz="914400" rtl="0" eaLnBrk="1" fontAlgn="auto" latinLnBrk="0" hangingPunct="1">
-              <a:lnSpc>
-                <a:spcPct val="100000"/>
-              </a:lnSpc>
-              <a:spcBef>
-                <a:spcPts val="0"/>
-              </a:spcBef>
-              <a:spcAft>
-                <a:spcPts val="0"/>
-              </a:spcAft>
-              <a:buClrTx/>
-              <a:buSzTx/>
-              <a:buFontTx/>
-              <a:buNone/>
-              <a:tabLst/>
-              <a:defRPr/>
-            </a:pPr>
-            <a:r>
-              <a:rPr lang="en-US" sz="1200" kern="1200" baseline="0" dirty="0" smtClean="0">
-                <a:solidFill>
-                  <a:schemeClr val="tx1"/>
-                </a:solidFill>
-                <a:effectLst/>
-                <a:latin typeface="+mn-lt"/>
-                <a:ea typeface="+mn-ea"/>
-                <a:cs typeface="+mn-cs"/>
-              </a:rPr>
-              <a:t>In Windows land, the sweet spot is when using IIS and Active Directory, because the tooling to link certs to identities already exists.</a:t>
-            </a:r>
-          </a:p>
-          <a:p>
-            <a:pPr marL="0" marR="0" indent="0" algn="l" defTabSz="914400" rtl="0" eaLnBrk="1" fontAlgn="auto" latinLnBrk="0" hangingPunct="1">
-              <a:lnSpc>
-                <a:spcPct val="100000"/>
-              </a:lnSpc>
-              <a:spcBef>
-                <a:spcPts val="0"/>
-              </a:spcBef>
-              <a:spcAft>
-                <a:spcPts val="0"/>
-              </a:spcAft>
-              <a:buClrTx/>
-              <a:buSzTx/>
-              <a:buFontTx/>
-              <a:buNone/>
-              <a:tabLst/>
-              <a:defRPr/>
-            </a:pPr>
-            <a:endParaRPr lang="en-US" sz="1200" kern="1200" baseline="0" dirty="0" smtClean="0">
-              <a:solidFill>
-                <a:schemeClr val="tx1"/>
-              </a:solidFill>
-              <a:effectLst/>
-              <a:latin typeface="+mn-lt"/>
-              <a:ea typeface="+mn-ea"/>
-              <a:cs typeface="+mn-cs"/>
-            </a:endParaRPr>
-          </a:p>
-          <a:p>
-            <a:pPr marL="0" marR="0" indent="0" algn="l" defTabSz="914400" rtl="0" eaLnBrk="1" fontAlgn="auto" latinLnBrk="0" hangingPunct="1">
-              <a:lnSpc>
-                <a:spcPct val="100000"/>
-              </a:lnSpc>
-              <a:spcBef>
-                <a:spcPts val="0"/>
-              </a:spcBef>
-              <a:spcAft>
-                <a:spcPts val="0"/>
-              </a:spcAft>
-              <a:buClrTx/>
-              <a:buSzTx/>
-              <a:buFontTx/>
-              <a:buNone/>
-              <a:tabLst/>
-              <a:defRPr/>
-            </a:pPr>
-            <a:r>
-              <a:rPr lang="en-US" sz="1200" kern="1200" baseline="0" dirty="0" smtClean="0">
-                <a:solidFill>
-                  <a:schemeClr val="tx1"/>
-                </a:solidFill>
-                <a:effectLst/>
-                <a:latin typeface="+mn-lt"/>
-                <a:ea typeface="+mn-ea"/>
-                <a:cs typeface="+mn-cs"/>
-              </a:rPr>
-              <a:t>Also a good fit for </a:t>
-            </a:r>
-            <a:r>
-              <a:rPr lang="en-US" sz="1200" b="1" kern="1200" baseline="0" dirty="0" smtClean="0">
-                <a:solidFill>
-                  <a:schemeClr val="tx1"/>
-                </a:solidFill>
-                <a:effectLst/>
-                <a:latin typeface="+mn-lt"/>
-                <a:ea typeface="+mn-ea"/>
-                <a:cs typeface="+mn-cs"/>
-              </a:rPr>
-              <a:t>server to server</a:t>
-            </a:r>
-            <a:r>
-              <a:rPr lang="en-US" sz="1200" b="0" kern="1200" baseline="0" dirty="0" smtClean="0">
-                <a:solidFill>
-                  <a:schemeClr val="tx1"/>
-                </a:solidFill>
-                <a:effectLst/>
-                <a:latin typeface="+mn-lt"/>
-                <a:ea typeface="+mn-ea"/>
-                <a:cs typeface="+mn-cs"/>
-              </a:rPr>
-              <a:t> </a:t>
-            </a:r>
-            <a:r>
-              <a:rPr lang="en-US" sz="1200" b="0" kern="1200" baseline="0" dirty="0" err="1" smtClean="0">
-                <a:solidFill>
-                  <a:schemeClr val="tx1"/>
-                </a:solidFill>
-                <a:effectLst/>
-                <a:latin typeface="+mn-lt"/>
-                <a:ea typeface="+mn-ea"/>
-                <a:cs typeface="+mn-cs"/>
-              </a:rPr>
-              <a:t>auth</a:t>
-            </a:r>
-            <a:r>
-              <a:rPr lang="en-US" sz="1200" b="0" kern="1200" baseline="0" dirty="0" smtClean="0">
-                <a:solidFill>
-                  <a:schemeClr val="tx1"/>
-                </a:solidFill>
-                <a:effectLst/>
-                <a:latin typeface="+mn-lt"/>
-                <a:ea typeface="+mn-ea"/>
-                <a:cs typeface="+mn-cs"/>
-              </a:rPr>
-              <a:t> because you don’t have to manage passwords</a:t>
-            </a:r>
-            <a:endParaRPr lang="en-US" sz="1200" kern="1200" dirty="0" smtClean="0">
+            <a:r>
+              <a:rPr lang="en-US" sz="1200" kern="1200" dirty="0" smtClean="0">
+                <a:solidFill>
+                  <a:schemeClr val="tx1"/>
+                </a:solidFill>
+                <a:effectLst/>
+                <a:latin typeface="+mn-lt"/>
+                <a:ea typeface="+mn-ea"/>
+                <a:cs typeface="+mn-cs"/>
+              </a:rPr>
+              <a:t>Client certificates are also a nice option for server-to-server authentication.</a:t>
+            </a:r>
+            <a:endParaRPr lang="en-US" sz="1200" kern="1200" dirty="0">
               <a:solidFill>
                 <a:schemeClr val="tx1"/>
               </a:solidFill>
@@ -17878,22 +17465,10 @@
                 <a:ea typeface="+mn-ea"/>
                 <a:cs typeface="+mn-cs"/>
               </a:rPr>
-              <a:t>Basic</a:t>
-            </a:r>
-            <a:r>
-              <a:rPr lang="en-US" sz="1200" kern="1200" baseline="0" dirty="0" smtClean="0">
-                <a:solidFill>
-                  <a:schemeClr val="tx1"/>
-                </a:solidFill>
-                <a:effectLst/>
-                <a:latin typeface="+mn-lt"/>
-                <a:ea typeface="+mn-ea"/>
-                <a:cs typeface="+mn-cs"/>
-              </a:rPr>
-              <a:t> </a:t>
-            </a:r>
-            <a:r>
-              <a:rPr lang="en-US" sz="1200" kern="1200" baseline="0" dirty="0" err="1" smtClean="0">
+              <a:t>If you’re looking for the simplest possible thing you could do, then using Basic </a:t>
+            </a:r>
+            <a:r>
+              <a:rPr lang="en-US" sz="1200" kern="1200" dirty="0" err="1" smtClean="0">
                 <a:solidFill>
                   <a:schemeClr val="tx1"/>
                 </a:solidFill>
@@ -17905,182 +17480,43 @@
               <a:t>Auth</a:t>
             </a:r>
             <a:r>
-              <a:rPr lang="en-US" sz="1200" kern="1200" baseline="0" dirty="0" smtClean="0">
-                <a:solidFill>
-                  <a:schemeClr val="tx1"/>
-                </a:solidFill>
-                <a:effectLst/>
-                <a:latin typeface="+mn-lt"/>
-                <a:ea typeface="+mn-ea"/>
-                <a:cs typeface="+mn-cs"/>
-              </a:rPr>
-              <a:t> is ideal if</a:t>
-            </a:r>
-          </a:p>
-          <a:p>
-            <a:pPr marL="171450" indent="-171450">
-              <a:buFont typeface="Arial" panose="020B0604020202020204" pitchFamily="34" charset="0"/>
-              <a:buChar char="•"/>
-            </a:pPr>
-            <a:r>
-              <a:rPr lang="en-US" sz="1200" kern="1200" baseline="0" dirty="0" smtClean="0">
-                <a:solidFill>
-                  <a:schemeClr val="tx1"/>
-                </a:solidFill>
-                <a:effectLst/>
-                <a:latin typeface="+mn-lt"/>
-                <a:ea typeface="+mn-ea"/>
-                <a:cs typeface="+mn-cs"/>
-              </a:rPr>
-              <a:t>You want to write </a:t>
-            </a:r>
-            <a:r>
-              <a:rPr lang="en-US" sz="1200" b="1" kern="1200" baseline="0" dirty="0" smtClean="0">
-                <a:solidFill>
-                  <a:schemeClr val="tx1"/>
-                </a:solidFill>
-                <a:effectLst/>
-                <a:latin typeface="+mn-lt"/>
-                <a:ea typeface="+mn-ea"/>
-                <a:cs typeface="+mn-cs"/>
-              </a:rPr>
-              <a:t>very little code</a:t>
-            </a:r>
-            <a:r>
-              <a:rPr lang="en-US" sz="1200" b="0" kern="1200" baseline="0" dirty="0" smtClean="0">
-                <a:solidFill>
-                  <a:schemeClr val="tx1"/>
-                </a:solidFill>
-                <a:effectLst/>
-                <a:latin typeface="+mn-lt"/>
-                <a:ea typeface="+mn-ea"/>
-                <a:cs typeface="+mn-cs"/>
-              </a:rPr>
-              <a:t>, and</a:t>
-            </a:r>
-          </a:p>
-          <a:p>
-            <a:pPr marL="171450" indent="-171450">
-              <a:buFont typeface="Arial" panose="020B0604020202020204" pitchFamily="34" charset="0"/>
-              <a:buChar char="•"/>
-            </a:pPr>
-            <a:r>
-              <a:rPr lang="en-US" sz="1200" b="0" kern="1200" baseline="0" dirty="0" smtClean="0">
-                <a:solidFill>
-                  <a:schemeClr val="tx1"/>
-                </a:solidFill>
-                <a:effectLst/>
-                <a:latin typeface="+mn-lt"/>
-                <a:ea typeface="+mn-ea"/>
-                <a:cs typeface="+mn-cs"/>
-              </a:rPr>
-              <a:t>You’re comfortable relying on </a:t>
-            </a:r>
-            <a:r>
-              <a:rPr lang="en-US" sz="1200" b="1" kern="1200" baseline="0" dirty="0" smtClean="0">
-                <a:solidFill>
-                  <a:schemeClr val="tx1"/>
-                </a:solidFill>
-                <a:effectLst/>
-                <a:latin typeface="+mn-lt"/>
-                <a:ea typeface="+mn-ea"/>
-                <a:cs typeface="+mn-cs"/>
-              </a:rPr>
-              <a:t>TLS </a:t>
-            </a:r>
-            <a:r>
-              <a:rPr lang="en-US" sz="1200" b="0" kern="1200" baseline="0" dirty="0" smtClean="0">
-                <a:solidFill>
-                  <a:schemeClr val="tx1"/>
-                </a:solidFill>
-                <a:effectLst/>
-                <a:latin typeface="+mn-lt"/>
-                <a:ea typeface="+mn-ea"/>
-                <a:cs typeface="+mn-cs"/>
-              </a:rPr>
-              <a:t>to keep passwords safe over the wire</a:t>
-            </a:r>
-          </a:p>
-          <a:p>
-            <a:pPr marL="171450" indent="-171450">
-              <a:buFont typeface="Arial" panose="020B0604020202020204" pitchFamily="34" charset="0"/>
-              <a:buChar char="•"/>
-            </a:pPr>
-            <a:endParaRPr lang="en-US" sz="1200" b="0" kern="1200" baseline="0" dirty="0" smtClean="0">
-              <a:solidFill>
-                <a:schemeClr val="tx1"/>
-              </a:solidFill>
-              <a:effectLst/>
-              <a:latin typeface="+mn-lt"/>
-              <a:ea typeface="+mn-ea"/>
-              <a:cs typeface="+mn-cs"/>
-            </a:endParaRPr>
-          </a:p>
-          <a:p>
-            <a:pPr marL="0" indent="0">
-              <a:buFont typeface="Arial" panose="020B0604020202020204" pitchFamily="34" charset="0"/>
-              <a:buNone/>
-            </a:pPr>
-            <a:r>
-              <a:rPr lang="en-US" sz="1200" b="0" kern="1200" baseline="0" dirty="0" smtClean="0">
-                <a:solidFill>
-                  <a:schemeClr val="tx1"/>
-                </a:solidFill>
-                <a:effectLst/>
-                <a:latin typeface="+mn-lt"/>
-                <a:ea typeface="+mn-ea"/>
-                <a:cs typeface="+mn-cs"/>
-              </a:rPr>
-              <a:t>An ideal use case is </a:t>
-            </a:r>
-            <a:r>
-              <a:rPr lang="en-US" sz="1200" b="1" kern="1200" baseline="0" dirty="0" smtClean="0">
-                <a:solidFill>
-                  <a:schemeClr val="tx1"/>
-                </a:solidFill>
-                <a:effectLst/>
-                <a:latin typeface="+mn-lt"/>
-                <a:ea typeface="+mn-ea"/>
-                <a:cs typeface="+mn-cs"/>
-              </a:rPr>
-              <a:t>server to server API calls</a:t>
-            </a:r>
-            <a:r>
-              <a:rPr lang="en-US" sz="1200" b="0" kern="1200" baseline="0" dirty="0" smtClean="0">
-                <a:solidFill>
-                  <a:schemeClr val="tx1"/>
-                </a:solidFill>
-                <a:effectLst/>
-                <a:latin typeface="+mn-lt"/>
-                <a:ea typeface="+mn-ea"/>
-                <a:cs typeface="+mn-cs"/>
-              </a:rPr>
-              <a:t> where you can’t use </a:t>
-            </a:r>
-            <a:r>
-              <a:rPr lang="en-US" sz="1200" b="1" kern="1200" baseline="0" dirty="0" smtClean="0">
-                <a:solidFill>
-                  <a:schemeClr val="tx1"/>
-                </a:solidFill>
-                <a:effectLst/>
-                <a:latin typeface="+mn-lt"/>
-                <a:ea typeface="+mn-ea"/>
-                <a:cs typeface="+mn-cs"/>
-              </a:rPr>
-              <a:t>client certs</a:t>
-            </a:r>
-            <a:r>
-              <a:rPr lang="en-US" sz="1200" b="0" kern="1200" baseline="0" dirty="0" smtClean="0">
-                <a:solidFill>
-                  <a:schemeClr val="tx1"/>
-                </a:solidFill>
-                <a:effectLst/>
-                <a:latin typeface="+mn-lt"/>
-                <a:ea typeface="+mn-ea"/>
-                <a:cs typeface="+mn-cs"/>
-              </a:rPr>
-              <a:t>. </a:t>
-            </a:r>
+              <a:rPr lang="en-US" sz="1200" kern="1200" dirty="0" smtClean="0">
+                <a:solidFill>
+                  <a:schemeClr val="tx1"/>
+                </a:solidFill>
+                <a:effectLst/>
+                <a:latin typeface="+mn-lt"/>
+                <a:ea typeface="+mn-ea"/>
+                <a:cs typeface="+mn-cs"/>
+              </a:rPr>
+              <a:t> to authenticate against a standard platform such as </a:t>
+            </a:r>
+            <a:r>
+              <a:rPr lang="en-US" sz="1200" kern="1200" dirty="0" err="1" smtClean="0">
+                <a:solidFill>
+                  <a:schemeClr val="tx1"/>
+                </a:solidFill>
+                <a:effectLst/>
+                <a:latin typeface="+mn-lt"/>
+                <a:ea typeface="+mn-ea"/>
+                <a:cs typeface="+mn-cs"/>
+              </a:rPr>
+              <a:t>ActiveDirectory</a:t>
+            </a:r>
+            <a:r>
+              <a:rPr lang="en-US" sz="1200" kern="1200" dirty="0" smtClean="0">
+                <a:solidFill>
+                  <a:schemeClr val="tx1"/>
+                </a:solidFill>
+                <a:effectLst/>
+                <a:latin typeface="+mn-lt"/>
+                <a:ea typeface="+mn-ea"/>
+                <a:cs typeface="+mn-cs"/>
+              </a:rPr>
+              <a:t> is worth a shot. You give up some flexibility, but will need to write very little code to make it work.</a:t>
+            </a:r>
+          </a:p>
+          <a:p>
             <a:endParaRPr lang="en-US" sz="1200" kern="1200" dirty="0" smtClean="0">
               <a:solidFill>
                 <a:schemeClr val="tx1"/>
@@ -18092,7 +17528,67 @@
             </a:endParaRPr>
           </a:p>
           <a:p>
-            <a:endParaRPr lang="en-US" sz="1200" kern="1200" dirty="0" smtClean="0">
+            <a:r>
+              <a:rPr lang="en-US" sz="1200" kern="1200" dirty="0" smtClean="0">
+                <a:solidFill>
+                  <a:schemeClr val="tx1"/>
+                </a:solidFill>
+                <a:effectLst/>
+                <a:latin typeface="+mn-lt"/>
+                <a:ea typeface="+mn-ea"/>
+                <a:cs typeface="+mn-cs"/>
+              </a:rPr>
+              <a:t>Basic </a:t>
+            </a:r>
+            <a:r>
+              <a:rPr lang="en-US" sz="1200" kern="1200" dirty="0" err="1" smtClean="0">
+                <a:solidFill>
+                  <a:schemeClr val="tx1"/>
+                </a:solidFill>
+                <a:effectLst/>
+                <a:latin typeface="+mn-lt"/>
+                <a:ea typeface="+mn-ea"/>
+                <a:cs typeface="+mn-cs"/>
+              </a:rPr>
+              <a:t>Auth</a:t>
+            </a:r>
+            <a:r>
+              <a:rPr lang="en-US" sz="1200" kern="1200" dirty="0" smtClean="0">
+                <a:solidFill>
+                  <a:schemeClr val="tx1"/>
+                </a:solidFill>
+                <a:effectLst/>
+                <a:latin typeface="+mn-lt"/>
+                <a:ea typeface="+mn-ea"/>
+                <a:cs typeface="+mn-cs"/>
+              </a:rPr>
+              <a:t> is </a:t>
+            </a:r>
+            <a:r>
+              <a:rPr lang="en-US" sz="1200" i="1" kern="1200" dirty="0" smtClean="0">
+                <a:solidFill>
+                  <a:schemeClr val="tx1"/>
+                </a:solidFill>
+                <a:effectLst/>
+                <a:latin typeface="+mn-lt"/>
+                <a:ea typeface="+mn-ea"/>
+                <a:cs typeface="+mn-cs"/>
+              </a:rPr>
+              <a:t>not </a:t>
+            </a:r>
+            <a:r>
+              <a:rPr lang="en-US" sz="1200" kern="1200" dirty="0" smtClean="0">
+                <a:solidFill>
+                  <a:schemeClr val="tx1"/>
+                </a:solidFill>
+                <a:effectLst/>
+                <a:latin typeface="+mn-lt"/>
+                <a:ea typeface="+mn-ea"/>
+                <a:cs typeface="+mn-cs"/>
+              </a:rPr>
+              <a:t>a good idea for a pure JS client because it requires storing the credentials somewhere in browser memory, which is generally a bad idea.</a:t>
+            </a:r>
+            <a:endParaRPr lang="en-US" sz="1200" kern="1200" dirty="0">
               <a:solidFill>
                 <a:schemeClr val="tx1"/>
               </a:solidFill>
@@ -18101,44 +17597,6 @@
               <a:ea typeface="+mn-ea"/>
               <a:cs typeface="+mn-cs"/>
             </a:endParaRPr>
-          </a:p>
-          <a:p>
-            <a:r>
-              <a:rPr lang="en-US" sz="1200" kern="1200" dirty="0" smtClean="0">
-                <a:solidFill>
-                  <a:schemeClr val="tx1"/>
-                </a:solidFill>
-                <a:effectLst/>
-                <a:latin typeface="+mn-lt"/>
-                <a:ea typeface="+mn-ea"/>
-                <a:cs typeface="+mn-cs"/>
-              </a:rPr>
-              <a:t>Not ideal for pure JS clients b/c it requires</a:t>
-            </a:r>
-            <a:r>
-              <a:rPr lang="en-US" sz="1200" kern="1200" baseline="0" dirty="0" smtClean="0">
-                <a:solidFill>
-                  <a:schemeClr val="tx1"/>
-                </a:solidFill>
-                <a:effectLst/>
-                <a:latin typeface="+mn-lt"/>
-                <a:ea typeface="+mn-ea"/>
-                <a:cs typeface="+mn-cs"/>
-              </a:rPr>
-              <a:t> storing the credentials somewhere in browser memory.</a:t>
-            </a:r>
-            <a:endParaRPr lang="en-US" sz="1200" kern="1200" dirty="0" smtClean="0">
-              <a:solidFill>
-                <a:schemeClr val="tx1"/>
-              </a:solidFill>
-              <a:effectLst/>
-              <a:latin typeface="+mn-lt"/>
-              <a:ea typeface="+mn-ea"/>
-              <a:cs typeface="+mn-cs"/>
-            </a:endParaRPr>
-          </a:p>
-          <a:p>
-            <a:endParaRPr lang="en-US" dirty="0"/>
           </a:p>
         </p:txBody>
       </p:sp>
@@ -18222,23 +17680,6 @@
           <a:bodyPr/>
           <a:lstStyle/>
           <a:p>
-            <a:pPr marL="0" marR="0" indent="0" algn="l" defTabSz="914400" rtl="0" eaLnBrk="1" fontAlgn="auto" latinLnBrk="0" hangingPunct="1">
-              <a:lnSpc>
-                <a:spcPct val="100000"/>
-              </a:lnSpc>
-              <a:spcBef>
-                <a:spcPts val="0"/>
-              </a:spcBef>
-              <a:spcAft>
-                <a:spcPts val="0"/>
-              </a:spcAft>
-              <a:buClrTx/>
-              <a:buSzTx/>
-              <a:buFontTx/>
-              <a:buNone/>
-              <a:tabLst/>
-              <a:defRPr/>
-            </a:pPr>
             <a:r>
               <a:rPr lang="en-US" sz="1200" kern="1200" dirty="0" smtClean="0">
                 <a:solidFill>
@@ -18249,28 +17690,9 @@
                 <a:ea typeface="+mn-ea"/>
                 <a:cs typeface="+mn-cs"/>
               </a:rPr>
-              <a:t>There’s no good reason to use Digest Auth. </a:t>
-            </a:r>
-          </a:p>
-          <a:p>
-            <a:pPr marL="0" marR="0" indent="0" algn="l" defTabSz="914400" rtl="0" eaLnBrk="1" fontAlgn="auto" latinLnBrk="0" hangingPunct="1">
-              <a:lnSpc>
-                <a:spcPct val="100000"/>
-              </a:lnSpc>
-              <a:spcBef>
-                <a:spcPts val="0"/>
-              </a:spcBef>
-              <a:spcAft>
-                <a:spcPts val="0"/>
-              </a:spcAft>
-              <a:buClrTx/>
-              <a:buSzTx/>
-              <a:buFontTx/>
-              <a:buNone/>
-              <a:tabLst/>
-              <a:defRPr/>
-            </a:pPr>
-            <a:endParaRPr lang="en-US" sz="1200" kern="1200" dirty="0" smtClean="0">
+              <a:t>There’s no good reason to use Digest Auth. Anyone that tells you to do this is about 15 years out of date.</a:t>
+            </a:r>
+            <a:endParaRPr lang="en-US" sz="1200" kern="1200" dirty="0">
               <a:solidFill>
                 <a:schemeClr val="tx1"/>
               </a:solidFill>
@@ -18279,50 +17701,6 @@
               <a:ea typeface="+mn-ea"/>
               <a:cs typeface="+mn-cs"/>
             </a:endParaRPr>
-          </a:p>
-          <a:p>
-            <a:pPr marL="0" marR="0" indent="0" algn="l" defTabSz="914400" rtl="0" eaLnBrk="1" fontAlgn="auto" latinLnBrk="0" hangingPunct="1">
-              <a:lnSpc>
-                <a:spcPct val="100000"/>
-              </a:lnSpc>
-              <a:spcBef>
-                <a:spcPts val="0"/>
-              </a:spcBef>
-              <a:spcAft>
-                <a:spcPts val="0"/>
-              </a:spcAft>
-              <a:buClrTx/>
-              <a:buSzTx/>
-              <a:buFontTx/>
-              <a:buNone/>
-              <a:tabLst/>
-              <a:defRPr/>
-            </a:pPr>
-            <a:r>
-              <a:rPr lang="en-US" sz="1200" kern="1200" dirty="0" smtClean="0">
-                <a:solidFill>
-                  <a:schemeClr val="tx1"/>
-                </a:solidFill>
-                <a:effectLst/>
-                <a:latin typeface="+mn-lt"/>
-                <a:ea typeface="+mn-ea"/>
-                <a:cs typeface="+mn-cs"/>
-              </a:rPr>
-              <a:t>If you can tolerate TLS on all requests then just use Basic Auth. If you can’t,</a:t>
-            </a:r>
-            <a:r>
-              <a:rPr lang="en-US" sz="1200" kern="1200" baseline="0" dirty="0" smtClean="0">
-                <a:solidFill>
-                  <a:schemeClr val="tx1"/>
-                </a:solidFill>
-                <a:effectLst/>
-                <a:latin typeface="+mn-lt"/>
-                <a:ea typeface="+mn-ea"/>
-                <a:cs typeface="+mn-cs"/>
-              </a:rPr>
-              <a:t> use signed requests or JWT.</a:t>
-            </a:r>
-            <a:endParaRPr lang="en-US" dirty="0"/>
           </a:p>
         </p:txBody>
       </p:sp>
@@ -18416,125 +17794,10 @@
                 <a:ea typeface="+mn-ea"/>
                 <a:cs typeface="+mn-cs"/>
               </a:rPr>
-              <a:t>You</a:t>
-            </a:r>
-            <a:r>
-              <a:rPr lang="en-US" sz="1200" kern="1200" baseline="0" dirty="0" smtClean="0">
-                <a:solidFill>
-                  <a:schemeClr val="tx1"/>
-                </a:solidFill>
-                <a:effectLst/>
-                <a:latin typeface="+mn-lt"/>
-                <a:ea typeface="+mn-ea"/>
-                <a:cs typeface="+mn-cs"/>
-              </a:rPr>
-              <a:t> can use API keys as “bearer tokens”, where you pass the key itself with every request, when</a:t>
-            </a:r>
-          </a:p>
-          <a:p>
-            <a:pPr marL="171450" indent="-171450">
-              <a:buFont typeface="Arial" panose="020B0604020202020204" pitchFamily="34" charset="0"/>
-              <a:buChar char="•"/>
-            </a:pPr>
-            <a:r>
-              <a:rPr lang="en-US" sz="1200" kern="1200" baseline="0" dirty="0" smtClean="0">
-                <a:solidFill>
-                  <a:schemeClr val="tx1"/>
-                </a:solidFill>
-                <a:effectLst/>
-                <a:latin typeface="+mn-lt"/>
-                <a:ea typeface="+mn-ea"/>
-                <a:cs typeface="+mn-cs"/>
-              </a:rPr>
-              <a:t>You own </a:t>
-            </a:r>
-            <a:r>
-              <a:rPr lang="en-US" sz="1200" b="1" kern="1200" baseline="0" dirty="0" smtClean="0">
-                <a:solidFill>
-                  <a:schemeClr val="tx1"/>
-                </a:solidFill>
-                <a:effectLst/>
-                <a:latin typeface="+mn-lt"/>
-                <a:ea typeface="+mn-ea"/>
-                <a:cs typeface="+mn-cs"/>
-              </a:rPr>
-              <a:t>both client and API</a:t>
-            </a:r>
-          </a:p>
-          <a:p>
-            <a:pPr marL="171450" indent="-171450">
-              <a:buFont typeface="Arial" panose="020B0604020202020204" pitchFamily="34" charset="0"/>
-              <a:buChar char="•"/>
-            </a:pPr>
-            <a:r>
-              <a:rPr lang="en-US" sz="1200" kern="1200" baseline="0" dirty="0" smtClean="0">
-                <a:solidFill>
-                  <a:schemeClr val="tx1"/>
-                </a:solidFill>
-                <a:effectLst/>
-                <a:latin typeface="+mn-lt"/>
-                <a:ea typeface="+mn-ea"/>
-                <a:cs typeface="+mn-cs"/>
-              </a:rPr>
-              <a:t>You prefer the </a:t>
-            </a:r>
-            <a:r>
-              <a:rPr lang="en-US" sz="1200" b="1" kern="1200" baseline="0" dirty="0" smtClean="0">
-                <a:solidFill>
-                  <a:schemeClr val="tx1"/>
-                </a:solidFill>
-                <a:effectLst/>
-                <a:latin typeface="+mn-lt"/>
-                <a:ea typeface="+mn-ea"/>
-                <a:cs typeface="+mn-cs"/>
-              </a:rPr>
-              <a:t>simplicity</a:t>
-            </a:r>
-            <a:r>
-              <a:rPr lang="en-US" sz="1200" b="0" kern="1200" baseline="0" dirty="0" smtClean="0">
-                <a:solidFill>
-                  <a:schemeClr val="tx1"/>
-                </a:solidFill>
-                <a:effectLst/>
-                <a:latin typeface="+mn-lt"/>
-                <a:ea typeface="+mn-ea"/>
-                <a:cs typeface="+mn-cs"/>
-              </a:rPr>
-              <a:t> of bearer tokens over signing</a:t>
-            </a:r>
-          </a:p>
-          <a:p>
-            <a:pPr marL="171450" indent="-171450">
-              <a:buFont typeface="Arial" panose="020B0604020202020204" pitchFamily="34" charset="0"/>
-              <a:buChar char="•"/>
-            </a:pPr>
-            <a:endParaRPr lang="en-US" sz="1200" b="0" kern="1200" baseline="0" dirty="0" smtClean="0">
-              <a:solidFill>
-                <a:schemeClr val="tx1"/>
-              </a:solidFill>
-              <a:effectLst/>
-              <a:latin typeface="+mn-lt"/>
-              <a:ea typeface="+mn-ea"/>
-              <a:cs typeface="+mn-cs"/>
-            </a:endParaRPr>
-          </a:p>
-          <a:p>
-            <a:pPr marL="0" indent="0">
-              <a:buFont typeface="Arial" panose="020B0604020202020204" pitchFamily="34" charset="0"/>
-              <a:buNone/>
-            </a:pPr>
-            <a:r>
-              <a:rPr lang="en-US" sz="1200" b="0" kern="1200" baseline="0" dirty="0" smtClean="0">
-                <a:solidFill>
-                  <a:schemeClr val="tx1"/>
-                </a:solidFill>
-                <a:effectLst/>
-                <a:latin typeface="+mn-lt"/>
-                <a:ea typeface="+mn-ea"/>
-                <a:cs typeface="+mn-cs"/>
-              </a:rPr>
-              <a:t>Slight risk: keys only as safe as TLS implementation. </a:t>
-            </a:r>
+              <a:t>Using API Keys as “bearer tokens”, where you pass the key itself with each request, is really easy to implement so it’s great for rapidly standing up a new API when you don’t need top-notch security.</a:t>
+            </a:r>
+          </a:p>
+          <a:p>
             <a:endParaRPr lang="en-US" sz="1200" kern="1200" dirty="0" smtClean="0">
               <a:solidFill>
                 <a:schemeClr val="tx1"/>
@@ -18546,7 +17809,27 @@
             </a:endParaRPr>
           </a:p>
           <a:p>
-            <a:endParaRPr lang="en-US" dirty="0"/>
+            <a:r>
+              <a:rPr lang="en-US" sz="1200" kern="1200" dirty="0" smtClean="0">
+                <a:solidFill>
+                  <a:schemeClr val="tx1"/>
+                </a:solidFill>
+                <a:effectLst/>
+                <a:latin typeface="+mn-lt"/>
+                <a:ea typeface="+mn-ea"/>
+                <a:cs typeface="+mn-cs"/>
+              </a:rPr>
+              <a:t>The primary drawbacks to bearer tokens are that you’re sending the credentials over the wire with every request, and there’s no way to validate the authenticity of a message that you receive. Using TLS can help by protecting credentials in transit, but that may not be enough if security is very important to your API.</a:t>
+            </a:r>
+            <a:endParaRPr lang="en-US" sz="1200" kern="1200" dirty="0">
+              <a:solidFill>
+                <a:schemeClr val="tx1"/>
+              </a:solidFill>
+              <a:effectLst/>
+              <a:latin typeface="+mn-lt"/>
+              <a:ea typeface="+mn-ea"/>
+              <a:cs typeface="+mn-cs"/>
+            </a:endParaRPr>
           </a:p>
         </p:txBody>
       </p:sp>
@@ -18640,67 +17923,7 @@
                 <a:ea typeface="+mn-ea"/>
                 <a:cs typeface="+mn-cs"/>
               </a:rPr>
-              <a:t>If</a:t>
-            </a:r>
-            <a:r>
-              <a:rPr lang="en-US" sz="1200" kern="1200" baseline="0" dirty="0" smtClean="0">
-                <a:solidFill>
-                  <a:schemeClr val="tx1"/>
-                </a:solidFill>
-                <a:effectLst/>
-                <a:latin typeface="+mn-lt"/>
-                <a:ea typeface="+mn-ea"/>
-                <a:cs typeface="+mn-cs"/>
-              </a:rPr>
-              <a:t> </a:t>
-            </a:r>
-            <a:r>
-              <a:rPr lang="en-US" sz="1200" b="1" kern="1200" baseline="0" dirty="0" smtClean="0">
-                <a:solidFill>
-                  <a:schemeClr val="tx1"/>
-                </a:solidFill>
-                <a:effectLst/>
-                <a:latin typeface="+mn-lt"/>
-                <a:ea typeface="+mn-ea"/>
-                <a:cs typeface="+mn-cs"/>
-              </a:rPr>
-              <a:t>your own client AND API </a:t>
-            </a:r>
-            <a:r>
-              <a:rPr lang="en-US" sz="1200" b="0" kern="1200" baseline="0" dirty="0" smtClean="0">
-                <a:solidFill>
-                  <a:schemeClr val="tx1"/>
-                </a:solidFill>
-                <a:effectLst/>
-                <a:latin typeface="+mn-lt"/>
-                <a:ea typeface="+mn-ea"/>
-                <a:cs typeface="+mn-cs"/>
-              </a:rPr>
-              <a:t>and you want </a:t>
-            </a:r>
-            <a:r>
-              <a:rPr lang="en-US" sz="1200" b="1" kern="1200" dirty="0" smtClean="0">
-                <a:solidFill>
-                  <a:schemeClr val="tx1"/>
-                </a:solidFill>
-                <a:effectLst/>
-                <a:latin typeface="+mn-lt"/>
-                <a:ea typeface="+mn-ea"/>
-                <a:cs typeface="+mn-cs"/>
-              </a:rPr>
-              <a:t>more security</a:t>
-            </a:r>
-            <a:r>
-              <a:rPr lang="en-US" sz="1200" kern="1200" dirty="0" smtClean="0">
-                <a:solidFill>
-                  <a:schemeClr val="tx1"/>
-                </a:solidFill>
-                <a:effectLst/>
-                <a:latin typeface="+mn-lt"/>
-                <a:ea typeface="+mn-ea"/>
-                <a:cs typeface="+mn-cs"/>
-              </a:rPr>
-              <a:t> than passing them as bearer tokens, then consider using signed requests.</a:t>
+              <a:t>If you want more security than you get with bearer tokens, then use API Keys to sign requests.</a:t>
             </a:r>
           </a:p>
           <a:p>
@@ -18715,25 +17938,6 @@
             </a:endParaRPr>
           </a:p>
           <a:p>
-            <a:pPr marL="171450" indent="-171450">
-              <a:buFont typeface="Arial" panose="020B0604020202020204" pitchFamily="34" charset="0"/>
-              <a:buChar char="•"/>
-            </a:pPr>
-            <a:endParaRPr lang="en-US" sz="1200" kern="1200" dirty="0" smtClean="0">
-              <a:solidFill>
-                <a:schemeClr val="tx1"/>
-              </a:solidFill>
-              <a:effectLst/>
-              <a:latin typeface="+mn-lt"/>
-              <a:ea typeface="+mn-ea"/>
-              <a:cs typeface="+mn-cs"/>
-            </a:endParaRPr>
-          </a:p>
-          <a:p>
-            <a:pPr marL="0" indent="0">
-              <a:buFont typeface="Arial" panose="020B0604020202020204" pitchFamily="34" charset="0"/>
-              <a:buNone/>
-            </a:pPr>
             <a:r>
               <a:rPr lang="en-US" sz="1200" kern="1200" dirty="0" smtClean="0">
                 <a:solidFill>
@@ -18744,82 +17948,10 @@
                 <a:ea typeface="+mn-ea"/>
                 <a:cs typeface="+mn-cs"/>
               </a:rPr>
-              <a:t>Remember that</a:t>
-            </a:r>
-            <a:r>
-              <a:rPr lang="en-US" sz="1200" kern="1200" baseline="0" dirty="0" smtClean="0">
-                <a:solidFill>
-                  <a:schemeClr val="tx1"/>
-                </a:solidFill>
-                <a:effectLst/>
-                <a:latin typeface="+mn-lt"/>
-                <a:ea typeface="+mn-ea"/>
-                <a:cs typeface="+mn-cs"/>
-              </a:rPr>
-              <a:t> creating the signature can be </a:t>
-            </a:r>
-            <a:r>
-              <a:rPr lang="en-US" sz="1200" b="1" kern="1200" baseline="0" dirty="0" smtClean="0">
-                <a:solidFill>
-                  <a:schemeClr val="tx1"/>
-                </a:solidFill>
-                <a:effectLst/>
-                <a:latin typeface="+mn-lt"/>
-                <a:ea typeface="+mn-ea"/>
-                <a:cs typeface="+mn-cs"/>
-              </a:rPr>
-              <a:t>complex</a:t>
-            </a:r>
-            <a:r>
-              <a:rPr lang="en-US" sz="1200" b="0" kern="1200" baseline="0" dirty="0" smtClean="0">
-                <a:solidFill>
-                  <a:schemeClr val="tx1"/>
-                </a:solidFill>
-                <a:effectLst/>
-                <a:latin typeface="+mn-lt"/>
-                <a:ea typeface="+mn-ea"/>
-                <a:cs typeface="+mn-cs"/>
-              </a:rPr>
-              <a:t> </a:t>
-            </a:r>
-          </a:p>
-          <a:p>
-            <a:pPr marL="171450" indent="-171450">
-              <a:buFont typeface="Arial" panose="020B0604020202020204" pitchFamily="34" charset="0"/>
-              <a:buChar char="•"/>
-            </a:pPr>
-            <a:r>
-              <a:rPr lang="en-US" sz="1200" b="0" kern="1200" baseline="0" dirty="0" smtClean="0">
-                <a:solidFill>
-                  <a:schemeClr val="tx1"/>
-                </a:solidFill>
-                <a:effectLst/>
-                <a:latin typeface="+mn-lt"/>
-                <a:ea typeface="+mn-ea"/>
-                <a:cs typeface="+mn-cs"/>
-              </a:rPr>
-              <a:t>client and server must do it in the same way</a:t>
-            </a:r>
-          </a:p>
-          <a:p>
-            <a:pPr marL="171450" indent="-171450">
-              <a:buFont typeface="Arial" panose="020B0604020202020204" pitchFamily="34" charset="0"/>
-              <a:buChar char="•"/>
-            </a:pPr>
-            <a:r>
-              <a:rPr lang="en-US" sz="1200" b="0" kern="1200" baseline="0" dirty="0" smtClean="0">
-                <a:solidFill>
-                  <a:schemeClr val="tx1"/>
-                </a:solidFill>
-                <a:effectLst/>
-                <a:latin typeface="+mn-lt"/>
-                <a:ea typeface="+mn-ea"/>
-                <a:cs typeface="+mn-cs"/>
-              </a:rPr>
-              <a:t>3</a:t>
-            </a:r>
-            <a:r>
-              <a:rPr lang="en-US" sz="1200" b="0" kern="1200" baseline="30000" dirty="0" smtClean="0">
+              <a:t>Remember that creating the signature can be complex and requires that the client and server create the hash in exactly the same way. If you’re dealing with 3</a:t>
+            </a:r>
+            <a:r>
+              <a:rPr lang="en-US" sz="1200" kern="1200" baseline="30000" dirty="0" smtClean="0">
                 <a:solidFill>
                   <a:schemeClr val="tx1"/>
                 </a:solidFill>
@@ -18831,55 +17963,6 @@
               <a:t>rd</a:t>
             </a:r>
             <a:r>
-              <a:rPr lang="en-US" sz="1200" b="0" kern="1200" baseline="0" dirty="0" smtClean="0">
-                <a:solidFill>
-                  <a:schemeClr val="tx1"/>
-                </a:solidFill>
-                <a:effectLst/>
-                <a:latin typeface="+mn-lt"/>
-                <a:ea typeface="+mn-ea"/>
-                <a:cs typeface="+mn-cs"/>
-              </a:rPr>
-              <a:t> party client support means you’ll need to document and support </a:t>
-            </a:r>
-            <a:r>
-              <a:rPr lang="en-US" sz="1200" b="1" kern="1200" baseline="0" dirty="0" smtClean="0">
-                <a:solidFill>
-                  <a:schemeClr val="tx1"/>
-                </a:solidFill>
-                <a:effectLst/>
-                <a:latin typeface="+mn-lt"/>
-                <a:ea typeface="+mn-ea"/>
-                <a:cs typeface="+mn-cs"/>
-              </a:rPr>
-              <a:t>canonicalization</a:t>
-            </a:r>
-            <a:r>
-              <a:rPr lang="en-US" sz="1200" b="0" kern="1200" baseline="0" dirty="0" smtClean="0">
-                <a:solidFill>
-                  <a:schemeClr val="tx1"/>
-                </a:solidFill>
-                <a:effectLst/>
-                <a:latin typeface="+mn-lt"/>
-                <a:ea typeface="+mn-ea"/>
-                <a:cs typeface="+mn-cs"/>
-              </a:rPr>
-              <a:t> process</a:t>
-            </a:r>
-          </a:p>
-          <a:p>
-            <a:endParaRPr lang="en-US" sz="1200" kern="1200" dirty="0" smtClean="0">
-              <a:solidFill>
-                <a:schemeClr val="tx1"/>
-              </a:solidFill>
-              <a:effectLst/>
-              <a:latin typeface="+mn-lt"/>
-              <a:ea typeface="+mn-ea"/>
-              <a:cs typeface="+mn-cs"/>
-            </a:endParaRPr>
-          </a:p>
-          <a:p>
-            <a:r>
               <a:rPr lang="en-US" sz="1200" kern="1200" dirty="0" smtClean="0">
                 <a:solidFill>
                   <a:schemeClr val="tx1"/>
@@ -18889,56 +17972,33 @@
                 <a:ea typeface="+mn-ea"/>
                 <a:cs typeface="+mn-cs"/>
               </a:rPr>
-              <a:t>Good </a:t>
-            </a:r>
-            <a:r>
-              <a:rPr lang="en-US" sz="1200" kern="1200" baseline="0" dirty="0" smtClean="0">
-                <a:solidFill>
-                  <a:schemeClr val="tx1"/>
-                </a:solidFill>
-                <a:effectLst/>
-                <a:latin typeface="+mn-lt"/>
-                <a:ea typeface="+mn-ea"/>
-                <a:cs typeface="+mn-cs"/>
-              </a:rPr>
-              <a:t>for </a:t>
-            </a:r>
-            <a:r>
-              <a:rPr lang="en-US" sz="1200" b="1" kern="1200" baseline="0" dirty="0" smtClean="0">
-                <a:solidFill>
-                  <a:schemeClr val="tx1"/>
-                </a:solidFill>
-                <a:effectLst/>
-                <a:latin typeface="+mn-lt"/>
-                <a:ea typeface="+mn-ea"/>
-                <a:cs typeface="+mn-cs"/>
-              </a:rPr>
-              <a:t>server to server</a:t>
-            </a:r>
-            <a:r>
-              <a:rPr lang="en-US" sz="1200" b="0" kern="1200" baseline="0" dirty="0" smtClean="0">
-                <a:solidFill>
-                  <a:schemeClr val="tx1"/>
-                </a:solidFill>
-                <a:effectLst/>
-                <a:latin typeface="+mn-lt"/>
-                <a:ea typeface="+mn-ea"/>
-                <a:cs typeface="+mn-cs"/>
-              </a:rPr>
-              <a:t> API calls where you need extra security</a:t>
-            </a:r>
-            <a:endParaRPr lang="en-US" sz="1200" kern="1200" dirty="0" smtClean="0">
-              <a:solidFill>
-                <a:schemeClr val="tx1"/>
-              </a:solidFill>
-              <a:effectLst/>
-              <a:latin typeface="+mn-lt"/>
-              <a:ea typeface="+mn-ea"/>
-              <a:cs typeface="+mn-cs"/>
-            </a:endParaRPr>
-          </a:p>
-          <a:p>
-            <a:endParaRPr lang="en-US" sz="1200" kern="1200" dirty="0" smtClean="0">
+              <a:t> party clients, you may find that documenting and supporting the canonicalization process is more trouble than its worth, so rolling your own HMAC approach might be best if you’re writing </a:t>
+            </a:r>
+            <a:r>
+              <a:rPr lang="en-US" sz="1200" i="1" kern="1200" dirty="0" smtClean="0">
+                <a:solidFill>
+                  <a:schemeClr val="tx1"/>
+                </a:solidFill>
+                <a:effectLst/>
+                <a:latin typeface="+mn-lt"/>
+                <a:ea typeface="+mn-ea"/>
+                <a:cs typeface="+mn-cs"/>
+              </a:rPr>
+              <a:t>both </a:t>
+            </a:r>
+            <a:r>
+              <a:rPr lang="en-US" sz="1200" kern="1200" dirty="0" smtClean="0">
+                <a:solidFill>
+                  <a:schemeClr val="tx1"/>
+                </a:solidFill>
+                <a:effectLst/>
+                <a:latin typeface="+mn-lt"/>
+                <a:ea typeface="+mn-ea"/>
+                <a:cs typeface="+mn-cs"/>
+              </a:rPr>
+              <a:t>the client and server yourself.</a:t>
+            </a:r>
+            <a:endParaRPr lang="en-US" sz="1200" kern="1200" dirty="0">
               <a:solidFill>
                 <a:schemeClr val="tx1"/>
               </a:solidFill>
@@ -19040,129 +18100,10 @@
                 <a:ea typeface="+mn-ea"/>
                 <a:cs typeface="+mn-cs"/>
               </a:rPr>
-              <a:t>If you’re writing a </a:t>
-            </a:r>
-            <a:r>
-              <a:rPr lang="en-US" sz="1200" b="1" kern="1200" dirty="0" smtClean="0">
-                <a:solidFill>
-                  <a:schemeClr val="tx1"/>
-                </a:solidFill>
-                <a:effectLst/>
-                <a:latin typeface="+mn-lt"/>
-                <a:ea typeface="+mn-ea"/>
-                <a:cs typeface="+mn-cs"/>
-              </a:rPr>
-              <a:t>JS client</a:t>
-            </a:r>
-            <a:r>
-              <a:rPr lang="en-US" sz="1200" b="0" kern="1200" dirty="0" smtClean="0">
-                <a:solidFill>
-                  <a:schemeClr val="tx1"/>
-                </a:solidFill>
-                <a:effectLst/>
-                <a:latin typeface="+mn-lt"/>
-                <a:ea typeface="+mn-ea"/>
-                <a:cs typeface="+mn-cs"/>
-              </a:rPr>
-              <a:t> for your </a:t>
-            </a:r>
-            <a:r>
-              <a:rPr lang="en-US" sz="1200" b="1" kern="1200" dirty="0" smtClean="0">
-                <a:solidFill>
-                  <a:schemeClr val="tx1"/>
-                </a:solidFill>
-                <a:effectLst/>
-                <a:latin typeface="+mn-lt"/>
-                <a:ea typeface="+mn-ea"/>
-                <a:cs typeface="+mn-cs"/>
-              </a:rPr>
-              <a:t>own application</a:t>
-            </a:r>
-            <a:r>
-              <a:rPr lang="en-US" sz="1200" b="0" kern="1200" dirty="0" smtClean="0">
-                <a:solidFill>
-                  <a:schemeClr val="tx1"/>
-                </a:solidFill>
-                <a:effectLst/>
-                <a:latin typeface="+mn-lt"/>
-                <a:ea typeface="+mn-ea"/>
-                <a:cs typeface="+mn-cs"/>
-              </a:rPr>
-              <a:t>,</a:t>
-            </a:r>
-            <a:r>
-              <a:rPr lang="en-US" sz="1200" b="0" kern="1200" baseline="0" dirty="0" smtClean="0">
-                <a:solidFill>
-                  <a:schemeClr val="tx1"/>
-                </a:solidFill>
-                <a:effectLst/>
-                <a:latin typeface="+mn-lt"/>
-                <a:ea typeface="+mn-ea"/>
-                <a:cs typeface="+mn-cs"/>
-              </a:rPr>
-              <a:t> such as the front-end of a SPA, then JWT might be a good fit.</a:t>
-            </a:r>
-          </a:p>
-          <a:p>
-            <a:endParaRPr lang="en-US" sz="1200" b="0" kern="1200" baseline="0" dirty="0" smtClean="0">
-              <a:solidFill>
-                <a:schemeClr val="tx1"/>
-              </a:solidFill>
-              <a:effectLst/>
-              <a:latin typeface="+mn-lt"/>
-              <a:ea typeface="+mn-ea"/>
-              <a:cs typeface="+mn-cs"/>
-            </a:endParaRPr>
-          </a:p>
-          <a:p>
-            <a:r>
-              <a:rPr lang="en-US" sz="1200" kern="1200" dirty="0" smtClean="0">
-                <a:solidFill>
-                  <a:schemeClr val="tx1"/>
-                </a:solidFill>
-                <a:effectLst/>
-                <a:latin typeface="+mn-lt"/>
-                <a:ea typeface="+mn-ea"/>
-                <a:cs typeface="+mn-cs"/>
-              </a:rPr>
-              <a:t>Remember</a:t>
-            </a:r>
-            <a:r>
-              <a:rPr lang="en-US" sz="1200" kern="1200" baseline="0" dirty="0" smtClean="0">
-                <a:solidFill>
-                  <a:schemeClr val="tx1"/>
-                </a:solidFill>
-                <a:effectLst/>
-                <a:latin typeface="+mn-lt"/>
-                <a:ea typeface="+mn-ea"/>
-                <a:cs typeface="+mn-cs"/>
-              </a:rPr>
-              <a:t> that </a:t>
-            </a:r>
-            <a:r>
-              <a:rPr lang="en-US" sz="1200" kern="1200" dirty="0" smtClean="0">
-                <a:solidFill>
-                  <a:schemeClr val="tx1"/>
-                </a:solidFill>
-                <a:effectLst/>
-                <a:latin typeface="+mn-lt"/>
-                <a:ea typeface="+mn-ea"/>
-                <a:cs typeface="+mn-cs"/>
-              </a:rPr>
-              <a:t>this does require a secure login</a:t>
-            </a:r>
-            <a:r>
-              <a:rPr lang="en-US" sz="1200" kern="1200" baseline="0" dirty="0" smtClean="0">
-                <a:solidFill>
-                  <a:schemeClr val="tx1"/>
-                </a:solidFill>
-                <a:effectLst/>
-                <a:latin typeface="+mn-lt"/>
-                <a:ea typeface="+mn-ea"/>
-                <a:cs typeface="+mn-cs"/>
-              </a:rPr>
-              <a:t> with user-entered credentials to initialize the token. If you need to support server-to-server interaction then this probably won’t work for you.</a:t>
-            </a:r>
+              <a:t>JSON Web Tokens might be a good fit if you’re writing a JS client or you want a standards-based, self-contained, stateless alternative to in-memory sessions on the application server.</a:t>
+            </a:r>
+          </a:p>
+          <a:p>
             <a:endParaRPr lang="en-US" sz="1200" kern="1200" dirty="0" smtClean="0">
               <a:solidFill>
                 <a:schemeClr val="tx1"/>
@@ -19174,7 +18115,109 @@
             </a:endParaRPr>
           </a:p>
           <a:p>
+            <a:pPr marL="0" marR="0" lvl="0" indent="0" algn="l" defTabSz="914400" rtl="0" eaLnBrk="1" fontAlgn="auto" latinLnBrk="0" hangingPunct="1">
+              <a:lnSpc>
+                <a:spcPct val="100000"/>
+              </a:lnSpc>
+              <a:spcBef>
+                <a:spcPts val="0"/>
+              </a:spcBef>
+              <a:spcAft>
+                <a:spcPts val="0"/>
+              </a:spcAft>
+              <a:buClrTx/>
+              <a:buSzTx/>
+              <a:buFontTx/>
+              <a:buNone/>
+              <a:tabLst/>
+              <a:defRPr/>
+            </a:pPr>
+            <a:r>
+              <a:rPr lang="en-US" sz="1200" kern="1200" dirty="0" smtClean="0">
+                <a:solidFill>
+                  <a:schemeClr val="tx1"/>
+                </a:solidFill>
+                <a:effectLst/>
+                <a:latin typeface="+mn-lt"/>
+                <a:ea typeface="+mn-ea"/>
+                <a:cs typeface="+mn-cs"/>
+              </a:rPr>
+              <a:t>If API performance is a mission critical concern for you then JWT may help you reduce your database lookups by storing commonly-queried data in the token itself.</a:t>
+            </a:r>
+          </a:p>
+          <a:p>
             <a:endParaRPr lang="en-US" sz="1200" kern="1200" dirty="0" smtClean="0">
+              <a:solidFill>
+                <a:schemeClr val="tx1"/>
+              </a:solidFill>
+              <a:effectLst/>
+              <a:latin typeface="+mn-lt"/>
+              <a:ea typeface="+mn-ea"/>
+              <a:cs typeface="+mn-cs"/>
+            </a:endParaRPr>
+          </a:p>
+          <a:p>
+            <a:r>
+              <a:rPr lang="en-US" sz="1200" kern="1200" dirty="0" smtClean="0">
+                <a:solidFill>
+                  <a:schemeClr val="tx1"/>
+                </a:solidFill>
+                <a:effectLst/>
+                <a:latin typeface="+mn-lt"/>
+                <a:ea typeface="+mn-ea"/>
+                <a:cs typeface="+mn-cs"/>
+              </a:rPr>
+              <a:t>Remember that this does require a secure login with user-entered credentials to initialize the token, so JWT isn’t a good fit for automated, server-to-server interaction. (Or more accurately, JWT is a fine way to handle </a:t>
+            </a:r>
+            <a:r>
+              <a:rPr lang="en-US" sz="1200" i="1" kern="1200" dirty="0" smtClean="0">
+                <a:solidFill>
+                  <a:schemeClr val="tx1"/>
+                </a:solidFill>
+                <a:effectLst/>
+                <a:latin typeface="+mn-lt"/>
+                <a:ea typeface="+mn-ea"/>
+                <a:cs typeface="+mn-cs"/>
+              </a:rPr>
+              <a:t>authorization </a:t>
+            </a:r>
+            <a:r>
+              <a:rPr lang="en-US" sz="1200" kern="1200" dirty="0" smtClean="0">
+                <a:solidFill>
+                  <a:schemeClr val="tx1"/>
+                </a:solidFill>
+                <a:effectLst/>
+                <a:latin typeface="+mn-lt"/>
+                <a:ea typeface="+mn-ea"/>
+                <a:cs typeface="+mn-cs"/>
+              </a:rPr>
+              <a:t>in a server-to-server model, but it relies on something else to handle the initial </a:t>
+            </a:r>
+            <a:r>
+              <a:rPr lang="en-US" sz="1200" i="1" kern="1200" dirty="0" smtClean="0">
+                <a:solidFill>
+                  <a:schemeClr val="tx1"/>
+                </a:solidFill>
+                <a:effectLst/>
+                <a:latin typeface="+mn-lt"/>
+                <a:ea typeface="+mn-ea"/>
+                <a:cs typeface="+mn-cs"/>
+              </a:rPr>
+              <a:t>authentication</a:t>
+            </a:r>
+            <a:r>
+              <a:rPr lang="en-US" sz="1200" kern="1200" dirty="0" smtClean="0">
+                <a:solidFill>
+                  <a:schemeClr val="tx1"/>
+                </a:solidFill>
+                <a:effectLst/>
+                <a:latin typeface="+mn-lt"/>
+                <a:ea typeface="+mn-ea"/>
+                <a:cs typeface="+mn-cs"/>
+              </a:rPr>
+              <a:t>)</a:t>
+            </a:r>
+            <a:endParaRPr lang="en-US" sz="1200" kern="1200" dirty="0">
               <a:solidFill>
                 <a:schemeClr val="tx1"/>
               </a:solidFill>
@@ -19276,67 +18319,7 @@
                 <a:ea typeface="+mn-ea"/>
                 <a:cs typeface="+mn-cs"/>
               </a:rPr>
-              <a:t>If your API will support</a:t>
-            </a:r>
-            <a:r>
-              <a:rPr lang="en-US" sz="1200" kern="1200" baseline="0" dirty="0" smtClean="0">
-                <a:solidFill>
-                  <a:schemeClr val="tx1"/>
-                </a:solidFill>
-                <a:effectLst/>
-                <a:latin typeface="+mn-lt"/>
-                <a:ea typeface="+mn-ea"/>
-                <a:cs typeface="+mn-cs"/>
-              </a:rPr>
-              <a:t> </a:t>
-            </a:r>
-            <a:r>
-              <a:rPr lang="en-US" sz="1200" b="1" kern="1200" baseline="0" dirty="0" smtClean="0">
-                <a:solidFill>
-                  <a:schemeClr val="tx1"/>
-                </a:solidFill>
-                <a:effectLst/>
-                <a:latin typeface="+mn-lt"/>
-                <a:ea typeface="+mn-ea"/>
-                <a:cs typeface="+mn-cs"/>
-              </a:rPr>
-              <a:t>3</a:t>
-            </a:r>
-            <a:r>
-              <a:rPr lang="en-US" sz="1200" b="1" kern="1200" baseline="30000" dirty="0" smtClean="0">
-                <a:solidFill>
-                  <a:schemeClr val="tx1"/>
-                </a:solidFill>
-                <a:effectLst/>
-                <a:latin typeface="+mn-lt"/>
-                <a:ea typeface="+mn-ea"/>
-                <a:cs typeface="+mn-cs"/>
-              </a:rPr>
-              <a:t>rd</a:t>
-            </a:r>
-            <a:r>
-              <a:rPr lang="en-US" sz="1200" b="1" kern="1200" baseline="0" dirty="0" smtClean="0">
-                <a:solidFill>
-                  <a:schemeClr val="tx1"/>
-                </a:solidFill>
-                <a:effectLst/>
-                <a:latin typeface="+mn-lt"/>
-                <a:ea typeface="+mn-ea"/>
-                <a:cs typeface="+mn-cs"/>
-              </a:rPr>
-              <a:t> party clients </a:t>
-            </a:r>
-            <a:r>
-              <a:rPr lang="en-US" sz="1200" kern="1200" dirty="0" smtClean="0">
-                <a:solidFill>
-                  <a:schemeClr val="tx1"/>
-                </a:solidFill>
-                <a:effectLst/>
-                <a:latin typeface="+mn-lt"/>
-                <a:ea typeface="+mn-ea"/>
-                <a:cs typeface="+mn-cs"/>
-              </a:rPr>
-              <a:t>then OAuth is worth a loo.</a:t>
+              <a:t>OAuth is a good fit if you need to support delegated access to user data.</a:t>
             </a:r>
           </a:p>
           <a:p>
@@ -19361,134 +18344,10 @@
                 <a:ea typeface="+mn-ea"/>
                 <a:cs typeface="+mn-cs"/>
               </a:rPr>
-              <a:t>Consider </a:t>
-            </a:r>
-            <a:r>
-              <a:rPr lang="en-US" sz="1200" b="1" kern="1200" dirty="0" smtClean="0">
-                <a:solidFill>
-                  <a:schemeClr val="tx1"/>
-                </a:solidFill>
-                <a:effectLst/>
-                <a:latin typeface="+mn-lt"/>
-                <a:ea typeface="+mn-ea"/>
-                <a:cs typeface="+mn-cs"/>
-              </a:rPr>
-              <a:t>version 1</a:t>
-            </a:r>
-            <a:r>
-              <a:rPr lang="en-US" sz="1200" b="0" kern="1200" dirty="0" smtClean="0">
-                <a:solidFill>
-                  <a:schemeClr val="tx1"/>
-                </a:solidFill>
-                <a:effectLst/>
-                <a:latin typeface="+mn-lt"/>
-                <a:ea typeface="+mn-ea"/>
-                <a:cs typeface="+mn-cs"/>
-              </a:rPr>
-              <a:t> if</a:t>
-            </a:r>
-          </a:p>
-          <a:p>
-            <a:pPr marL="171450" indent="-171450">
-              <a:buFont typeface="Arial" panose="020B0604020202020204" pitchFamily="34" charset="0"/>
-              <a:buChar char="•"/>
-            </a:pPr>
-            <a:r>
-              <a:rPr lang="en-US" sz="1200" b="0" kern="1200" dirty="0" smtClean="0">
-                <a:solidFill>
-                  <a:schemeClr val="tx1"/>
-                </a:solidFill>
-                <a:effectLst/>
-                <a:latin typeface="+mn-lt"/>
-                <a:ea typeface="+mn-ea"/>
-                <a:cs typeface="+mn-cs"/>
-              </a:rPr>
-              <a:t>You’re writing a </a:t>
-            </a:r>
-            <a:r>
-              <a:rPr lang="en-US" sz="1200" b="1" kern="1200" dirty="0" smtClean="0">
-                <a:solidFill>
-                  <a:schemeClr val="tx1"/>
-                </a:solidFill>
-                <a:effectLst/>
-                <a:latin typeface="+mn-lt"/>
-                <a:ea typeface="+mn-ea"/>
-                <a:cs typeface="+mn-cs"/>
-              </a:rPr>
-              <a:t>web-based</a:t>
-            </a:r>
-            <a:r>
-              <a:rPr lang="en-US" sz="1200" b="1" kern="1200" baseline="0" dirty="0" smtClean="0">
-                <a:solidFill>
-                  <a:schemeClr val="tx1"/>
-                </a:solidFill>
-                <a:effectLst/>
-                <a:latin typeface="+mn-lt"/>
-                <a:ea typeface="+mn-ea"/>
-                <a:cs typeface="+mn-cs"/>
-              </a:rPr>
-              <a:t> app</a:t>
-            </a:r>
-            <a:r>
-              <a:rPr lang="en-US" sz="1200" b="0" kern="1200" baseline="0" dirty="0" smtClean="0">
-                <a:solidFill>
-                  <a:schemeClr val="tx1"/>
-                </a:solidFill>
-                <a:effectLst/>
-                <a:latin typeface="+mn-lt"/>
-                <a:ea typeface="+mn-ea"/>
-                <a:cs typeface="+mn-cs"/>
-              </a:rPr>
-              <a:t>, and</a:t>
-            </a:r>
-          </a:p>
-          <a:p>
-            <a:pPr marL="171450" indent="-171450">
-              <a:buFont typeface="Arial" panose="020B0604020202020204" pitchFamily="34" charset="0"/>
-              <a:buChar char="•"/>
-            </a:pPr>
-            <a:r>
-              <a:rPr lang="en-US" sz="1200" b="0" kern="1200" baseline="0" dirty="0" smtClean="0">
-                <a:solidFill>
-                  <a:schemeClr val="tx1"/>
-                </a:solidFill>
-                <a:effectLst/>
-                <a:latin typeface="+mn-lt"/>
-                <a:ea typeface="+mn-ea"/>
-                <a:cs typeface="+mn-cs"/>
-              </a:rPr>
-              <a:t>You can’t or don’t want to rely on </a:t>
-            </a:r>
-            <a:r>
-              <a:rPr lang="en-US" sz="1200" b="1" kern="1200" baseline="0" dirty="0" smtClean="0">
-                <a:solidFill>
-                  <a:schemeClr val="tx1"/>
-                </a:solidFill>
-                <a:effectLst/>
-                <a:latin typeface="+mn-lt"/>
-                <a:ea typeface="+mn-ea"/>
-                <a:cs typeface="+mn-cs"/>
-              </a:rPr>
-              <a:t>TLS</a:t>
-            </a:r>
-            <a:r>
-              <a:rPr lang="en-US" sz="1200" b="0" kern="1200" baseline="0" dirty="0" smtClean="0">
-                <a:solidFill>
-                  <a:schemeClr val="tx1"/>
-                </a:solidFill>
-                <a:effectLst/>
-                <a:latin typeface="+mn-lt"/>
-                <a:ea typeface="+mn-ea"/>
-                <a:cs typeface="+mn-cs"/>
-              </a:rPr>
-              <a:t> for security</a:t>
-            </a:r>
-          </a:p>
-          <a:p>
-            <a:pPr marL="171450" indent="-171450">
-              <a:buFont typeface="Arial" panose="020B0604020202020204" pitchFamily="34" charset="0"/>
-              <a:buChar char="•"/>
-            </a:pPr>
+              <a:t>You should consider the 1.0 version if you can’t, or don’t want to, rely on TLS for security, or if you care about client/provider interoperability. For instance, if you want to support clients that can connect to multiple API providers with just a few configuration changes.</a:t>
+            </a:r>
+          </a:p>
+          <a:p>
             <a:endParaRPr lang="en-US" sz="1200" kern="1200" dirty="0" smtClean="0">
               <a:solidFill>
                 <a:schemeClr val="tx1"/>
@@ -19510,57 +18369,33 @@
                 <a:ea typeface="+mn-ea"/>
                 <a:cs typeface="+mn-cs"/>
               </a:rPr>
-              <a:t>You might also consider version 1.0a if you care about </a:t>
-            </a:r>
-            <a:r>
-              <a:rPr lang="en-US" sz="1200" b="1" kern="1200" dirty="0" smtClean="0">
-                <a:solidFill>
-                  <a:schemeClr val="tx1"/>
-                </a:solidFill>
-                <a:effectLst/>
-                <a:latin typeface="+mn-lt"/>
-                <a:ea typeface="+mn-ea"/>
-                <a:cs typeface="+mn-cs"/>
-              </a:rPr>
-              <a:t>client/provider interoperability</a:t>
-            </a:r>
-            <a:r>
-              <a:rPr lang="en-US" sz="1200" b="0" kern="1200" baseline="0" dirty="0" smtClean="0">
-                <a:solidFill>
-                  <a:schemeClr val="tx1"/>
-                </a:solidFill>
-                <a:effectLst/>
-                <a:latin typeface="+mn-lt"/>
-                <a:ea typeface="+mn-ea"/>
-                <a:cs typeface="+mn-cs"/>
-              </a:rPr>
-              <a:t> and want to support clients that can connect to multiple API providers with just a few </a:t>
-            </a:r>
-            <a:r>
-              <a:rPr lang="en-US" sz="1200" b="0" kern="1200" baseline="0" dirty="0" err="1" smtClean="0">
-                <a:solidFill>
-                  <a:schemeClr val="tx1"/>
-                </a:solidFill>
-                <a:effectLst/>
-                <a:latin typeface="+mn-lt"/>
-                <a:ea typeface="+mn-ea"/>
-                <a:cs typeface="+mn-cs"/>
-              </a:rPr>
-              <a:t>config</a:t>
-            </a:r>
-            <a:r>
-              <a:rPr lang="en-US" sz="1200" b="0" kern="1200" baseline="0" dirty="0" smtClean="0">
-                <a:solidFill>
-                  <a:schemeClr val="tx1"/>
-                </a:solidFill>
-                <a:effectLst/>
-                <a:latin typeface="+mn-lt"/>
-                <a:ea typeface="+mn-ea"/>
-                <a:cs typeface="+mn-cs"/>
-              </a:rPr>
-              <a:t> changes</a:t>
-            </a:r>
-            <a:endParaRPr lang="en-US" sz="1200" b="1" kern="1200" dirty="0" smtClean="0">
+              <a:t>The primary drawbacks with OAuth 1.0 are the complexity involved in making signed requests and limited support for non-browser clients, so make sure you’re prepared to deal with that complexity. 3</a:t>
+            </a:r>
+            <a:r>
+              <a:rPr lang="en-US" sz="1200" kern="1200" baseline="30000" dirty="0" smtClean="0">
+                <a:solidFill>
+                  <a:schemeClr val="tx1"/>
+                </a:solidFill>
+                <a:effectLst/>
+                <a:latin typeface="+mn-lt"/>
+                <a:ea typeface="+mn-ea"/>
+                <a:cs typeface="+mn-cs"/>
+              </a:rPr>
+              <a:t>rd</a:t>
+            </a:r>
+            <a:r>
+              <a:rPr lang="en-US" sz="1200" kern="1200" dirty="0" smtClean="0">
+                <a:solidFill>
+                  <a:schemeClr val="tx1"/>
+                </a:solidFill>
+                <a:effectLst/>
+                <a:latin typeface="+mn-lt"/>
+                <a:ea typeface="+mn-ea"/>
+                <a:cs typeface="+mn-cs"/>
+              </a:rPr>
+              <a:t> party libraries can help with that.</a:t>
+            </a:r>
+            <a:endParaRPr lang="en-US" sz="1200" kern="1200" dirty="0">
               <a:solidFill>
                 <a:schemeClr val="tx1"/>
               </a:solidFill>
@@ -19569,130 +18404,6 @@
               <a:ea typeface="+mn-ea"/>
               <a:cs typeface="+mn-cs"/>
             </a:endParaRPr>
-          </a:p>
-          <a:p>
-            <a:endParaRPr lang="en-US" sz="1200" kern="1200" dirty="0" smtClean="0">
-              <a:solidFill>
-                <a:schemeClr val="tx1"/>
-              </a:solidFill>
-              <a:effectLst/>
-              <a:latin typeface="+mn-lt"/>
-              <a:ea typeface="+mn-ea"/>
-              <a:cs typeface="+mn-cs"/>
-            </a:endParaRPr>
-          </a:p>
-          <a:p>
-            <a:r>
-              <a:rPr lang="en-US" sz="1200" kern="1200" dirty="0" smtClean="0">
-                <a:solidFill>
-                  <a:schemeClr val="tx1"/>
-                </a:solidFill>
-                <a:effectLst/>
-                <a:latin typeface="+mn-lt"/>
-                <a:ea typeface="+mn-ea"/>
-                <a:cs typeface="+mn-cs"/>
-              </a:rPr>
-              <a:t>The </a:t>
-            </a:r>
-            <a:r>
-              <a:rPr lang="en-US" sz="1200" b="1" kern="1200" dirty="0" smtClean="0">
-                <a:solidFill>
-                  <a:schemeClr val="tx1"/>
-                </a:solidFill>
-                <a:effectLst/>
-                <a:latin typeface="+mn-lt"/>
-                <a:ea typeface="+mn-ea"/>
-                <a:cs typeface="+mn-cs"/>
-              </a:rPr>
-              <a:t>primary drawbacks</a:t>
-            </a:r>
-            <a:r>
-              <a:rPr lang="en-US" sz="1200" kern="1200" dirty="0" smtClean="0">
-                <a:solidFill>
-                  <a:schemeClr val="tx1"/>
-                </a:solidFill>
-                <a:effectLst/>
-                <a:latin typeface="+mn-lt"/>
-                <a:ea typeface="+mn-ea"/>
-                <a:cs typeface="+mn-cs"/>
-              </a:rPr>
-              <a:t> with OAuth 1.0 are </a:t>
-            </a:r>
-          </a:p>
-          <a:p>
-            <a:pPr marL="171450" indent="-171450">
-              <a:buFont typeface="Arial" panose="020B0604020202020204" pitchFamily="34" charset="0"/>
-              <a:buChar char="•"/>
-            </a:pPr>
-            <a:r>
-              <a:rPr lang="en-US" sz="1200" b="1" kern="1200" dirty="0" smtClean="0">
-                <a:solidFill>
-                  <a:schemeClr val="tx1"/>
-                </a:solidFill>
-                <a:effectLst/>
-                <a:latin typeface="+mn-lt"/>
-                <a:ea typeface="+mn-ea"/>
-                <a:cs typeface="+mn-cs"/>
-              </a:rPr>
-              <a:t>complexity</a:t>
-            </a:r>
-            <a:r>
-              <a:rPr lang="en-US" sz="1200" kern="1200" dirty="0" smtClean="0">
-                <a:solidFill>
-                  <a:schemeClr val="tx1"/>
-                </a:solidFill>
-                <a:effectLst/>
-                <a:latin typeface="+mn-lt"/>
-                <a:ea typeface="+mn-ea"/>
-                <a:cs typeface="+mn-cs"/>
-              </a:rPr>
-              <a:t> involved in making signed requests </a:t>
-            </a:r>
-          </a:p>
-          <a:p>
-            <a:pPr marL="171450" indent="-171450">
-              <a:buFont typeface="Arial" panose="020B0604020202020204" pitchFamily="34" charset="0"/>
-              <a:buChar char="•"/>
-            </a:pPr>
-            <a:r>
-              <a:rPr lang="en-US" sz="1200" kern="1200" dirty="0" smtClean="0">
-                <a:solidFill>
-                  <a:schemeClr val="tx1"/>
-                </a:solidFill>
-                <a:effectLst/>
-                <a:latin typeface="+mn-lt"/>
-                <a:ea typeface="+mn-ea"/>
-                <a:cs typeface="+mn-cs"/>
-              </a:rPr>
-              <a:t>limited support for </a:t>
-            </a:r>
-            <a:r>
-              <a:rPr lang="en-US" sz="1200" b="1" kern="1200" dirty="0" smtClean="0">
-                <a:solidFill>
-                  <a:schemeClr val="tx1"/>
-                </a:solidFill>
-                <a:effectLst/>
-                <a:latin typeface="+mn-lt"/>
-                <a:ea typeface="+mn-ea"/>
-                <a:cs typeface="+mn-cs"/>
-              </a:rPr>
-              <a:t>non-browser</a:t>
-            </a:r>
-            <a:r>
-              <a:rPr lang="en-US" sz="1200" kern="1200" dirty="0" smtClean="0">
-                <a:solidFill>
-                  <a:schemeClr val="tx1"/>
-                </a:solidFill>
-                <a:effectLst/>
-                <a:latin typeface="+mn-lt"/>
-                <a:ea typeface="+mn-ea"/>
-                <a:cs typeface="+mn-cs"/>
-              </a:rPr>
-              <a:t> clients</a:t>
-            </a:r>
-          </a:p>
-          <a:p>
-            <a:endParaRPr lang="en-US" dirty="0"/>
           </a:p>
         </p:txBody>
       </p:sp>
@@ -19786,92 +18497,7 @@
                 <a:ea typeface="+mn-ea"/>
                 <a:cs typeface="+mn-cs"/>
               </a:rPr>
-              <a:t>If</a:t>
-            </a:r>
-            <a:r>
-              <a:rPr lang="en-US" sz="1200" kern="1200" baseline="0" dirty="0" smtClean="0">
-                <a:solidFill>
-                  <a:schemeClr val="tx1"/>
-                </a:solidFill>
-                <a:effectLst/>
-                <a:latin typeface="+mn-lt"/>
-                <a:ea typeface="+mn-ea"/>
-                <a:cs typeface="+mn-cs"/>
-              </a:rPr>
-              <a:t> you care more about </a:t>
-            </a:r>
-            <a:r>
-              <a:rPr lang="en-US" sz="1200" b="1" kern="1200" baseline="0" dirty="0" smtClean="0">
-                <a:solidFill>
-                  <a:schemeClr val="tx1"/>
-                </a:solidFill>
-                <a:effectLst/>
-                <a:latin typeface="+mn-lt"/>
-                <a:ea typeface="+mn-ea"/>
-                <a:cs typeface="+mn-cs"/>
-              </a:rPr>
-              <a:t>flexibility and simplicity</a:t>
-            </a:r>
-            <a:r>
-              <a:rPr lang="en-US" sz="1200" b="0" kern="1200" baseline="0" dirty="0" smtClean="0">
-                <a:solidFill>
-                  <a:schemeClr val="tx1"/>
-                </a:solidFill>
-                <a:effectLst/>
-                <a:latin typeface="+mn-lt"/>
-                <a:ea typeface="+mn-ea"/>
-                <a:cs typeface="+mn-cs"/>
-              </a:rPr>
-              <a:t> than interoperability and security, and you can </a:t>
-            </a:r>
-            <a:r>
-              <a:rPr lang="en-US" sz="1200" b="1" kern="1200" baseline="0" dirty="0" smtClean="0">
-                <a:solidFill>
-                  <a:schemeClr val="tx1"/>
-                </a:solidFill>
-                <a:effectLst/>
-                <a:latin typeface="+mn-lt"/>
-                <a:ea typeface="+mn-ea"/>
-                <a:cs typeface="+mn-cs"/>
-              </a:rPr>
-              <a:t>require TLS</a:t>
-            </a:r>
-            <a:r>
-              <a:rPr lang="en-US" sz="1200" b="0" kern="1200" baseline="0" dirty="0" smtClean="0">
-                <a:solidFill>
-                  <a:schemeClr val="tx1"/>
-                </a:solidFill>
-                <a:effectLst/>
-                <a:latin typeface="+mn-lt"/>
-                <a:ea typeface="+mn-ea"/>
-                <a:cs typeface="+mn-cs"/>
-              </a:rPr>
-              <a:t> on all requests, then OAuth 2 is better than 1. </a:t>
-            </a:r>
-          </a:p>
-          <a:p>
-            <a:endParaRPr lang="en-US" sz="1200" b="0" kern="1200" baseline="0" dirty="0" smtClean="0">
-              <a:solidFill>
-                <a:schemeClr val="tx1"/>
-              </a:solidFill>
-              <a:effectLst/>
-              <a:latin typeface="+mn-lt"/>
-              <a:ea typeface="+mn-ea"/>
-              <a:cs typeface="+mn-cs"/>
-            </a:endParaRPr>
-          </a:p>
-          <a:p>
-            <a:r>
-              <a:rPr lang="en-US" sz="1200" b="0" kern="1200" baseline="0" dirty="0" smtClean="0">
-                <a:solidFill>
-                  <a:schemeClr val="tx1"/>
-                </a:solidFill>
-                <a:effectLst/>
-                <a:latin typeface="+mn-lt"/>
-                <a:ea typeface="+mn-ea"/>
-                <a:cs typeface="+mn-cs"/>
-              </a:rPr>
-              <a:t>2.0 is also better if you want to support a wider set of devices and flows.</a:t>
+              <a:t>If you care more about flexibility and simplicity than operability and security, and you can require TLS on all requests, then OAuth 2.0 is a better fit than 1.0. 2.0 is also a better fit if you want to support a wider set of devices and authentication flows.</a:t>
             </a:r>
           </a:p>
           <a:p>
@@ -19896,21 +18522,17 @@
                 <a:ea typeface="+mn-ea"/>
                 <a:cs typeface="+mn-cs"/>
               </a:rPr>
-              <a:t>Just remember that code you</a:t>
-            </a:r>
-            <a:r>
-              <a:rPr lang="en-US" sz="1200" kern="1200" baseline="0" dirty="0" smtClean="0">
-                <a:solidFill>
-                  <a:schemeClr val="tx1"/>
-                </a:solidFill>
-                <a:effectLst/>
-                <a:latin typeface="+mn-lt"/>
-                <a:ea typeface="+mn-ea"/>
-                <a:cs typeface="+mn-cs"/>
-              </a:rPr>
-              <a:t> write for one OAuth 2 provider may require significant changes to support a different provider.</a:t>
-            </a:r>
-            <a:endParaRPr lang="en-US" dirty="0"/>
+              <a:t>The primary drawbacks to OAuth 2.0 are reduced security relative to 1.0, and less interoperability as a result of having greater flexibility. Writing a client that can interact with multiple authentication providers will be harder using 2.0 than with other options.</a:t>
+            </a:r>
+            <a:endParaRPr lang="en-US" sz="1200" kern="1200" dirty="0">
+              <a:solidFill>
+                <a:schemeClr val="tx1"/>
+              </a:solidFill>
+              <a:effectLst/>
+              <a:latin typeface="+mn-lt"/>
+              <a:ea typeface="+mn-ea"/>
+              <a:cs typeface="+mn-cs"/>
+            </a:endParaRPr>
           </a:p>
         </p:txBody>
       </p:sp>
@@ -20377,23 +18999,6 @@
           <a:bodyPr/>
           <a:lstStyle/>
           <a:p>
-            <a:pPr marL="0" marR="0" indent="0" algn="l" defTabSz="914400" rtl="0" eaLnBrk="1" fontAlgn="auto" latinLnBrk="0" hangingPunct="1">
-              <a:lnSpc>
-                <a:spcPct val="100000"/>
-              </a:lnSpc>
-              <a:spcBef>
-                <a:spcPts val="0"/>
-              </a:spcBef>
-              <a:spcAft>
-                <a:spcPts val="0"/>
-              </a:spcAft>
-              <a:buClrTx/>
-              <a:buSzTx/>
-              <a:buFontTx/>
-              <a:buNone/>
-              <a:tabLst/>
-              <a:defRPr/>
-            </a:pPr>
             <a:r>
               <a:rPr lang="en-US" sz="1200" kern="1200" dirty="0" smtClean="0">
                 <a:solidFill>
@@ -20404,27 +19009,34 @@
                 <a:ea typeface="+mn-ea"/>
                 <a:cs typeface="+mn-cs"/>
               </a:rPr>
-              <a:t>Lastly, you should use SAML or WS-Security if you literally have no other choice, and/or have a sick love affair with XML. </a:t>
-            </a:r>
-          </a:p>
-          <a:p>
-            <a:pPr marL="0" marR="0" indent="0" algn="l" defTabSz="914400" rtl="0" eaLnBrk="1" fontAlgn="auto" latinLnBrk="0" hangingPunct="1">
-              <a:lnSpc>
-                <a:spcPct val="100000"/>
-              </a:lnSpc>
-              <a:spcBef>
-                <a:spcPts val="0"/>
-              </a:spcBef>
-              <a:spcAft>
-                <a:spcPts val="0"/>
-              </a:spcAft>
-              <a:buClrTx/>
-              <a:buSzTx/>
-              <a:buFontTx/>
-              <a:buNone/>
-              <a:tabLst/>
-              <a:defRPr/>
-            </a:pPr>
+              <a:t>Lastly, you should use SAML or WS-Security if you have a sick love affair with XML, or if you have one of the very complex scenarios that </a:t>
+            </a:r>
+            <a:r>
+              <a:rPr lang="en-US" sz="1200" i="1" kern="1200" dirty="0" smtClean="0">
+                <a:solidFill>
+                  <a:schemeClr val="tx1"/>
+                </a:solidFill>
+                <a:effectLst/>
+                <a:latin typeface="+mn-lt"/>
+                <a:ea typeface="+mn-ea"/>
+                <a:cs typeface="+mn-cs"/>
+              </a:rPr>
+              <a:t>needs </a:t>
+            </a:r>
+            <a:r>
+              <a:rPr lang="en-US" sz="1200" kern="1200" dirty="0" smtClean="0">
+                <a:solidFill>
+                  <a:schemeClr val="tx1"/>
+                </a:solidFill>
+                <a:effectLst/>
+                <a:latin typeface="+mn-lt"/>
+                <a:ea typeface="+mn-ea"/>
+                <a:cs typeface="+mn-cs"/>
+              </a:rPr>
+              <a:t>the extra complexity they entail. </a:t>
+            </a:r>
+          </a:p>
+          <a:p>
             <a:endParaRPr lang="en-US" sz="1200" kern="1200" dirty="0" smtClean="0">
               <a:solidFill>
                 <a:schemeClr val="tx1"/>
@@ -20436,23 +19048,6 @@
             </a:endParaRPr>
           </a:p>
           <a:p>
-            <a:pPr marL="0" marR="0" indent="0" algn="l" defTabSz="914400" rtl="0" eaLnBrk="1" fontAlgn="auto" latinLnBrk="0" hangingPunct="1">
-              <a:lnSpc>
-                <a:spcPct val="100000"/>
-              </a:lnSpc>
-              <a:spcBef>
-                <a:spcPts val="0"/>
-              </a:spcBef>
-              <a:spcAft>
-                <a:spcPts val="0"/>
-              </a:spcAft>
-              <a:buClrTx/>
-              <a:buSzTx/>
-              <a:buFontTx/>
-              <a:buNone/>
-              <a:tabLst/>
-              <a:defRPr/>
-            </a:pPr>
             <a:r>
               <a:rPr lang="en-US" sz="1200" kern="1200" dirty="0" smtClean="0">
                 <a:solidFill>
@@ -20463,35 +19058,17 @@
                 <a:ea typeface="+mn-ea"/>
                 <a:cs typeface="+mn-cs"/>
               </a:rPr>
-              <a:t>If you choose either of these, good luck but</a:t>
-            </a:r>
-            <a:r>
-              <a:rPr lang="en-US" sz="1200" kern="1200" baseline="0" dirty="0" smtClean="0">
-                <a:solidFill>
-                  <a:schemeClr val="tx1"/>
-                </a:solidFill>
-                <a:effectLst/>
-                <a:latin typeface="+mn-lt"/>
-                <a:ea typeface="+mn-ea"/>
-                <a:cs typeface="+mn-cs"/>
-              </a:rPr>
-              <a:t> don’t ask me if you have questions</a:t>
-            </a:r>
-            <a:r>
-              <a:rPr lang="en-US" sz="1200" kern="1200" dirty="0" smtClean="0">
-                <a:solidFill>
-                  <a:schemeClr val="tx1"/>
-                </a:solidFill>
-                <a:effectLst/>
-                <a:latin typeface="+mn-lt"/>
-                <a:ea typeface="+mn-ea"/>
-                <a:cs typeface="+mn-cs"/>
-              </a:rPr>
-              <a:t>.</a:t>
-            </a:r>
-          </a:p>
-          <a:p>
-            <a:endParaRPr lang="en-US" dirty="0"/>
+              <a:t>If you’re creating an API for your own internal use, or for public use on the open internet, these things are overkill and you should stick to something simpler.</a:t>
+            </a:r>
+            <a:endParaRPr lang="en-US" sz="1200" kern="1200" dirty="0">
+              <a:solidFill>
+                <a:schemeClr val="tx1"/>
+              </a:solidFill>
+              <a:effectLst/>
+              <a:latin typeface="+mn-lt"/>
+              <a:ea typeface="+mn-ea"/>
+              <a:cs typeface="+mn-cs"/>
+            </a:endParaRPr>
           </a:p>
         </p:txBody>
       </p:sp>
@@ -20885,10 +19462,25 @@
                 <a:ea typeface="+mn-ea"/>
                 <a:cs typeface="+mn-cs"/>
               </a:rPr>
-              <a:t>Research shows that attendees of a talk such as this will generally remember only 3 things. That means that most of the information I just shared with you will vanish quickly if you don’t act on it.</a:t>
-            </a:r>
-          </a:p>
-          <a:p>
+              <a:t>Research shows that attendees of a talk such as this will only remember 3 things. That means that most of the information I just shared with you will vanish quickly if you don’t act on it.</a:t>
+            </a:r>
+          </a:p>
+          <a:p>
+            <a:r>
+              <a:rPr lang="en-US" sz="1200" kern="1200" dirty="0" smtClean="0">
+                <a:solidFill>
+                  <a:schemeClr val="tx1"/>
+                </a:solidFill>
+                <a:effectLst/>
+                <a:latin typeface="+mn-lt"/>
+                <a:ea typeface="+mn-ea"/>
+                <a:cs typeface="+mn-cs"/>
+              </a:rPr>
+              <a:t>So here are the 3 most important things I want you to remember:</a:t>
+            </a:r>
+          </a:p>
+          <a:p>
+            <a:pPr lvl="0"/>
             <a:endParaRPr lang="en-US" sz="1200" kern="1200" dirty="0" smtClean="0">
               <a:solidFill>
                 <a:schemeClr val="tx1"/>
@@ -20900,6 +19492,7 @@
             </a:endParaRPr>
           </a:p>
           <a:p>
+            <a:pPr lvl="0"/>
             <a:r>
               <a:rPr lang="en-US" sz="1200" kern="1200" dirty="0" smtClean="0">
                 <a:solidFill>
@@ -20910,14 +19503,9 @@
                 <a:ea typeface="+mn-ea"/>
                 <a:cs typeface="+mn-cs"/>
               </a:rPr>
-              <a:t>So here are the 3 most important things I want you to remember:</a:t>
-            </a:r>
-          </a:p>
-          <a:p>
-            <a:pPr marL="228600" indent="-228600">
-              <a:buAutoNum type="arabicParenR"/>
-            </a:pPr>
-            <a:r>
+              <a:t>You can use custom API keys as bearer tokens over TLS for a quick and easy approach, or you can use API Keys to sign request using HMAC if you need additional security.</a:t>
+            </a:r>
+            <a:br>
               <a:rPr lang="en-US" sz="1200" kern="1200" dirty="0" smtClean="0">
                 <a:solidFill>
                   <a:schemeClr val="tx1"/>
@@ -20927,20 +19515,7 @@
                 <a:ea typeface="+mn-ea"/>
                 <a:cs typeface="+mn-cs"/>
               </a:rPr>
-              <a:t>Requests must use EITHER TLS, OR be signed. If you’re passing sensitive data over the wire then use TLS. If you want to verify message integrity, </a:t>
-            </a:r>
-            <a:r>
-              <a:rPr lang="en-US" sz="1200" kern="1200" smtClean="0">
-                <a:solidFill>
-                  <a:schemeClr val="tx1"/>
-                </a:solidFill>
-                <a:effectLst/>
-                <a:latin typeface="+mn-lt"/>
-                <a:ea typeface="+mn-ea"/>
-                <a:cs typeface="+mn-cs"/>
-              </a:rPr>
-              <a:t>use signing</a:t>
-            </a:r>
+            </a:br>
             <a:endParaRPr lang="en-US" sz="1200" kern="1200" dirty="0" smtClean="0">
               <a:solidFill>
                 <a:schemeClr val="tx1"/>
@@ -20952,9 +19527,7 @@
             </a:endParaRPr>
           </a:p>
           <a:p>
-            <a:pPr marL="228600" indent="-228600">
-              <a:buAutoNum type="arabicParenR"/>
-            </a:pPr>
+            <a:pPr lvl="0"/>
             <a:r>
               <a:rPr lang="en-US" sz="1200" kern="1200" dirty="0" smtClean="0">
                 <a:solidFill>
@@ -20965,21 +19538,9 @@
                 <a:ea typeface="+mn-ea"/>
                 <a:cs typeface="+mn-cs"/>
               </a:rPr>
-              <a:t>For server-based clients, you can use Basic </a:t>
-            </a:r>
-            <a:r>
-              <a:rPr lang="en-US" sz="1200" kern="1200" dirty="0" err="1" smtClean="0">
-                <a:solidFill>
-                  <a:schemeClr val="tx1"/>
-                </a:solidFill>
-                <a:effectLst/>
-                <a:latin typeface="+mn-lt"/>
-                <a:ea typeface="+mn-ea"/>
-                <a:cs typeface="+mn-cs"/>
-              </a:rPr>
-              <a:t>Auth</a:t>
-            </a:r>
-            <a:r>
+              <a:t>JSON Web Tokens are a secure, stateless way to share non-sensitive data. Remember that by default tokens are encoded, not encrypted, so anything you put in them can be decoded by the client. You also need to make sure your tokens aren’t vulnerable to cross-site scripting or cross-site request forgery.</a:t>
+            </a:r>
+            <a:br>
               <a:rPr lang="en-US" sz="1200" kern="1200" dirty="0" smtClean="0">
                 <a:solidFill>
                   <a:schemeClr val="tx1"/>
@@ -20989,25 +19550,19 @@
                 <a:ea typeface="+mn-ea"/>
                 <a:cs typeface="+mn-cs"/>
               </a:rPr>
-              <a:t> or API Keys, depending</a:t>
-            </a:r>
-            <a:r>
-              <a:rPr lang="en-US" sz="1200" kern="1200" baseline="0" dirty="0" smtClean="0">
-                <a:solidFill>
-                  <a:schemeClr val="tx1"/>
-                </a:solidFill>
-                <a:effectLst/>
-                <a:latin typeface="+mn-lt"/>
-                <a:ea typeface="+mn-ea"/>
-                <a:cs typeface="+mn-cs"/>
-              </a:rPr>
-              <a:t> on how much flexibility you need. Use JWT for JS clients. </a:t>
-            </a:r>
-          </a:p>
-          <a:p>
-            <a:pPr marL="228600" indent="-228600">
-              <a:buAutoNum type="arabicParenR"/>
-            </a:pPr>
+            </a:br>
+            <a:endParaRPr lang="en-US" sz="1200" kern="1200" dirty="0" smtClean="0">
+              <a:solidFill>
+                <a:schemeClr val="tx1"/>
+              </a:solidFill>
+              <a:effectLst/>
+              <a:latin typeface="+mn-lt"/>
+              <a:ea typeface="+mn-ea"/>
+              <a:cs typeface="+mn-cs"/>
+            </a:endParaRPr>
+          </a:p>
+          <a:p>
+            <a:pPr lvl="0"/>
             <a:r>
               <a:rPr lang="en-US" sz="1200" kern="1200" dirty="0" smtClean="0">
                 <a:solidFill>
@@ -21018,11 +19573,17 @@
                 <a:ea typeface="+mn-ea"/>
                 <a:cs typeface="+mn-cs"/>
               </a:rPr>
-              <a:t>OAuth is for authorization, not authentication. Use OpenID Connect if you need both.</a:t>
-            </a:r>
-          </a:p>
-          <a:p>
-            <a:endParaRPr lang="en-US" dirty="0"/>
+              <a:t>Lastly, OAuth is for authorization, not authentication. Use OpenID Connect if you need both.</a:t>
+            </a:r>
+            <a:endParaRPr lang="en-US" sz="1200" kern="1200" dirty="0">
+              <a:solidFill>
+                <a:schemeClr val="tx1"/>
+              </a:solidFill>
+              <a:effectLst/>
+              <a:latin typeface="+mn-lt"/>
+              <a:ea typeface="+mn-ea"/>
+              <a:cs typeface="+mn-cs"/>
+            </a:endParaRPr>
           </a:p>
         </p:txBody>
       </p:sp>
@@ -21593,7 +20154,7 @@
           <a:p>
             <a:fld id="{75AA6396-395E-4ADA-8EE5-F328BC863A04}" type="datetimeFigureOut">
               <a:rPr lang="en-US" smtClean="0"/>
-              <a:t>12/16/2018</a:t>
+              <a:t>12/17/2018</a:t>
             </a:fld>
             <a:endParaRPr lang="en-US"/>
           </a:p>
@@ -21770,7 +20331,7 @@
           <a:p>
             <a:fld id="{75AA6396-395E-4ADA-8EE5-F328BC863A04}" type="datetimeFigureOut">
               <a:rPr lang="en-US" smtClean="0"/>
-              <a:t>12/16/2018</a:t>
+              <a:t>12/17/2018</a:t>
             </a:fld>
             <a:endParaRPr lang="en-US"/>
           </a:p>
@@ -21950,7 +20511,7 @@
           <a:p>
             <a:fld id="{75AA6396-395E-4ADA-8EE5-F328BC863A04}" type="datetimeFigureOut">
               <a:rPr lang="en-US" smtClean="0"/>
-              <a:t>12/16/2018</a:t>
+              <a:t>12/17/2018</a:t>
             </a:fld>
             <a:endParaRPr lang="en-US"/>
           </a:p>
@@ -22170,7 +20731,7 @@
           <a:p>
             <a:fld id="{75AA6396-395E-4ADA-8EE5-F328BC863A04}" type="datetimeFigureOut">
               <a:rPr lang="en-US" smtClean="0"/>
-              <a:t>12/16/2018</a:t>
+              <a:t>12/17/2018</a:t>
             </a:fld>
             <a:endParaRPr lang="en-US"/>
           </a:p>
@@ -22423,7 +20984,7 @@
           <a:p>
             <a:fld id="{75AA6396-395E-4ADA-8EE5-F328BC863A04}" type="datetimeFigureOut">
               <a:rPr lang="en-US" smtClean="0"/>
-              <a:t>12/16/2018</a:t>
+              <a:t>12/17/2018</a:t>
             </a:fld>
             <a:endParaRPr lang="en-US"/>
           </a:p>
@@ -22662,7 +21223,7 @@
           <a:p>
             <a:fld id="{75AA6396-395E-4ADA-8EE5-F328BC863A04}" type="datetimeFigureOut">
               <a:rPr lang="en-US" smtClean="0"/>
-              <a:t>12/16/2018</a:t>
+              <a:t>12/17/2018</a:t>
             </a:fld>
             <a:endParaRPr lang="en-US"/>
           </a:p>
@@ -23036,7 +21597,7 @@
           <a:p>
             <a:fld id="{75AA6396-395E-4ADA-8EE5-F328BC863A04}" type="datetimeFigureOut">
               <a:rPr lang="en-US" smtClean="0"/>
-              <a:t>12/16/2018</a:t>
+              <a:t>12/17/2018</a:t>
             </a:fld>
             <a:endParaRPr lang="en-US"/>
           </a:p>
@@ -23154,7 +21715,7 @@
           <a:p>
             <a:fld id="{75AA6396-395E-4ADA-8EE5-F328BC863A04}" type="datetimeFigureOut">
               <a:rPr lang="en-US" smtClean="0"/>
-              <a:t>12/16/2018</a:t>
+              <a:t>12/17/2018</a:t>
             </a:fld>
             <a:endParaRPr lang="en-US"/>
           </a:p>
@@ -23249,7 +21810,7 @@
           <a:p>
             <a:fld id="{75AA6396-395E-4ADA-8EE5-F328BC863A04}" type="datetimeFigureOut">
               <a:rPr lang="en-US" smtClean="0"/>
-              <a:t>12/16/2018</a:t>
+              <a:t>12/17/2018</a:t>
             </a:fld>
             <a:endParaRPr lang="en-US"/>
           </a:p>
@@ -23526,7 +22087,7 @@
           <a:p>
             <a:fld id="{75AA6396-395E-4ADA-8EE5-F328BC863A04}" type="datetimeFigureOut">
               <a:rPr lang="en-US" smtClean="0"/>
-              <a:t>12/16/2018</a:t>
+              <a:t>12/17/2018</a:t>
             </a:fld>
             <a:endParaRPr lang="en-US"/>
           </a:p>
@@ -23779,7 +22340,7 @@
           <a:p>
             <a:fld id="{75AA6396-395E-4ADA-8EE5-F328BC863A04}" type="datetimeFigureOut">
               <a:rPr lang="en-US" smtClean="0"/>
-              <a:t>12/16/2018</a:t>
+              <a:t>12/17/2018</a:t>
             </a:fld>
             <a:endParaRPr lang="en-US"/>
           </a:p>
@@ -23992,7 +22553,7 @@
           <a:p>
             <a:fld id="{75AA6396-395E-4ADA-8EE5-F328BC863A04}" type="datetimeFigureOut">
               <a:rPr lang="en-US" smtClean="0"/>
-              <a:t>12/16/2018</a:t>
+              <a:t>12/17/2018</a:t>
             </a:fld>
             <a:endParaRPr lang="en-US"/>
           </a:p>
@@ -34300,7 +32861,15 @@
           <a:p>
             <a:r>
               <a:rPr lang="en-US" sz="3600" dirty="0" smtClean="0"/>
-              <a:t>You’re using IIS + Active Directory (or equivalent) to secure a private API on trusted network, or</a:t>
+              <a:t>You’re using IIS + Active Directory </a:t>
+            </a:r>
+            <a:r>
+              <a:rPr lang="en-US" sz="3600" dirty="0" smtClean="0"/>
+              <a:t>to </a:t>
+            </a:r>
+            <a:r>
+              <a:rPr lang="en-US" sz="3600" dirty="0" smtClean="0"/>
+              <a:t>secure a private API on trusted network, or</a:t>
             </a:r>
           </a:p>
           <a:p>
@@ -34471,49 +33040,28 @@
           <a:p>
             <a:r>
               <a:rPr lang="en-US" sz="3600" dirty="0" smtClean="0"/>
-              <a:t>You </a:t>
+              <a:t>You're authenticating server-to-server API calls using a standard database, like </a:t>
+            </a:r>
+            <a:r>
+              <a:rPr lang="en-US" sz="3600" dirty="0" err="1" smtClean="0"/>
+              <a:t>ActiveDirectory</a:t>
+            </a:r>
+            <a:r>
+              <a:rPr lang="en-US" sz="3600" dirty="0" smtClean="0"/>
+              <a:t>, &amp; you want to </a:t>
             </a:r>
             <a:r>
               <a:rPr lang="en-US" sz="3600" dirty="0"/>
-              <a:t>want to write as little code as </a:t>
+              <a:t>write as little code as </a:t>
             </a:r>
             <a:r>
               <a:rPr lang="en-US" sz="3600" dirty="0" smtClean="0"/>
-              <a:t>possible, and</a:t>
-            </a:r>
-            <a:endParaRPr lang="en-US" sz="3200" dirty="0"/>
-          </a:p>
-          <a:p>
-            <a:r>
-              <a:rPr lang="en-US" sz="3600" dirty="0" smtClean="0"/>
-              <a:t>You </a:t>
-            </a:r>
-            <a:r>
-              <a:rPr lang="en-US" sz="3600" dirty="0"/>
-              <a:t>can tolerate </a:t>
-            </a:r>
-            <a:r>
-              <a:rPr lang="en-US" sz="3600" dirty="0" smtClean="0"/>
-              <a:t>TLS on </a:t>
-            </a:r>
-            <a:r>
-              <a:rPr lang="en-US" sz="3600" dirty="0"/>
-              <a:t>all </a:t>
-            </a:r>
-            <a:r>
-              <a:rPr lang="en-US" sz="3600" dirty="0" smtClean="0"/>
-              <a:t>requests</a:t>
+              <a:t>possible</a:t>
             </a:r>
             <a:endParaRPr lang="en-US" sz="3600" dirty="0"/>
           </a:p>
           <a:p>
             <a:endParaRPr lang="en-US" sz="3600" dirty="0"/>
-          </a:p>
-          <a:p>
-            <a:r>
-              <a:rPr lang="en-US" sz="4000" dirty="0" smtClean="0"/>
-              <a:t>Good for server-to-server API calls</a:t>
-            </a:r>
           </a:p>
           <a:p>
             <a:endParaRPr lang="en-US" sz="4000" dirty="0" smtClean="0"/>
@@ -34813,7 +33361,11 @@
             </a:r>
             <a:r>
               <a:rPr lang="en-US" sz="4000" b="1" dirty="0" smtClean="0"/>
-              <a:t>custom API Keys as </a:t>
+              <a:t>API </a:t>
+            </a:r>
+            <a:r>
+              <a:rPr lang="en-US" sz="4000" b="1" dirty="0" smtClean="0"/>
+              <a:t>Keys as </a:t>
             </a:r>
             <a:r>
               <a:rPr lang="en-US" sz="4000" b="1" u="sng" dirty="0" smtClean="0"/>
@@ -34830,31 +33382,26 @@
           <a:p>
             <a:r>
               <a:rPr lang="en-US" sz="3600" dirty="0" smtClean="0"/>
-              <a:t>You own the client AND the API, and</a:t>
-            </a:r>
-          </a:p>
-          <a:p>
+              <a:t>You value </a:t>
+            </a:r>
+            <a:r>
+              <a:rPr lang="en-US" sz="3600" dirty="0" smtClean="0"/>
+              <a:t>simplicity over </a:t>
+            </a:r>
+            <a:r>
+              <a:rPr lang="en-US" sz="3600" dirty="0" smtClean="0"/>
+              <a:t>security</a:t>
+            </a:r>
+          </a:p>
+          <a:p>
+            <a:endParaRPr lang="en-US" sz="3600" dirty="0"/>
+          </a:p>
+          <a:p>
+            <a:r>
+              <a:rPr lang="en-US" sz="3600" dirty="0" smtClean="0"/>
+              <a:t>You can use TLS for all requests</a:t>
+            </a:r>
             <a:endParaRPr lang="en-US" sz="3600" dirty="0" smtClean="0"/>
-          </a:p>
-          <a:p>
-            <a:r>
-              <a:rPr lang="en-US" sz="3600" dirty="0"/>
-              <a:t>You can require </a:t>
-            </a:r>
-            <a:r>
-              <a:rPr lang="en-US" sz="3600" dirty="0" smtClean="0"/>
-              <a:t>TLS, and</a:t>
-            </a:r>
-            <a:endParaRPr lang="en-US" sz="3600" dirty="0"/>
-          </a:p>
-          <a:p>
-            <a:endParaRPr lang="en-US" sz="3600" dirty="0" smtClean="0"/>
-          </a:p>
-          <a:p>
-            <a:r>
-              <a:rPr lang="en-US" sz="3600" dirty="0" smtClean="0"/>
-              <a:t>You value simplicity over security</a:t>
-            </a:r>
           </a:p>
           <a:p>
             <a:endParaRPr lang="en-US" sz="3600" dirty="0" smtClean="0"/>
@@ -35011,16 +33558,20 @@
               <a:t>Consider </a:t>
             </a:r>
             <a:r>
-              <a:rPr lang="en-US" sz="4000" b="1" dirty="0" smtClean="0"/>
-              <a:t>custom API Keys and </a:t>
-            </a:r>
-            <a:r>
               <a:rPr lang="en-US" sz="4000" b="1" u="sng" dirty="0" smtClean="0"/>
               <a:t>signed requests</a:t>
             </a:r>
             <a:r>
+              <a:rPr lang="en-US" sz="4000" b="1" dirty="0" smtClean="0"/>
+              <a:t> using API Keys</a:t>
+            </a:r>
+            <a:r>
               <a:rPr lang="en-US" sz="4000" dirty="0" smtClean="0"/>
-              <a:t> if…</a:t>
+              <a:t> </a:t>
+            </a:r>
+            <a:r>
+              <a:rPr lang="en-US" sz="4000" dirty="0" smtClean="0"/>
+              <a:t>if…</a:t>
             </a:r>
             <a:br>
               <a:rPr lang="en-US" sz="4000" dirty="0" smtClean="0"/>
@@ -35030,7 +33581,11 @@
           <a:p>
             <a:r>
               <a:rPr lang="en-US" sz="3600" dirty="0" smtClean="0"/>
-              <a:t>You own the client AND the API, and</a:t>
+              <a:t>You </a:t>
+            </a:r>
+            <a:r>
+              <a:rPr lang="en-US" sz="3600" dirty="0" smtClean="0"/>
+              <a:t>want extra security vs bearer tokens, and</a:t>
             </a:r>
             <a:br>
               <a:rPr lang="en-US" sz="3600" dirty="0" smtClean="0"/>
@@ -35040,8 +33595,13 @@
           <a:p>
             <a:r>
               <a:rPr lang="en-US" sz="3600" dirty="0" smtClean="0"/>
-              <a:t>You can’t/don’t want to rely on TLS</a:t>
-            </a:r>
+              <a:t>You </a:t>
+            </a:r>
+            <a:r>
+              <a:rPr lang="en-US" sz="3600" dirty="0" smtClean="0"/>
+              <a:t>can thoroughly document the signing process</a:t>
+            </a:r>
+            <a:endParaRPr lang="en-US" sz="3600" dirty="0" smtClean="0"/>
           </a:p>
           <a:p>
             <a:endParaRPr lang="en-US" sz="3600" dirty="0" smtClean="0"/>
@@ -35203,8 +33763,15 @@
           <a:p>
             <a:r>
               <a:rPr lang="en-US" sz="3600" dirty="0" smtClean="0"/>
-              <a:t>You’re writing a JS client for your own app (i.e. a SPA)</a:t>
-            </a:r>
+              <a:t>You're writing a JS client, or</a:t>
+            </a:r>
+          </a:p>
+          <a:p>
+            <a:r>
+              <a:rPr lang="en-US" sz="3600" dirty="0" smtClean="0"/>
+              <a:t>You want a standards-based, self-contained, stateless alternative to in-memory "sessions"</a:t>
+            </a:r>
+            <a:endParaRPr lang="en-US" sz="3600" dirty="0" smtClean="0"/>
           </a:p>
           <a:p>
             <a:endParaRPr lang="en-US" sz="3600" dirty="0" smtClean="0"/>
@@ -35377,34 +33944,35 @@
           <a:p>
             <a:r>
               <a:rPr lang="en-US" sz="3600" dirty="0" smtClean="0"/>
-              <a:t>You’re supporting 3</a:t>
-            </a:r>
-            <a:r>
-              <a:rPr lang="en-US" sz="3600" baseline="30000" dirty="0" smtClean="0"/>
-              <a:t>rd</a:t>
-            </a:r>
+              <a:t>You need to support delegated access to user data, and</a:t>
+            </a:r>
+            <a:endParaRPr lang="en-US" sz="3600" dirty="0" smtClean="0"/>
+          </a:p>
+          <a:p>
             <a:r>
               <a:rPr lang="en-US" sz="3600" dirty="0" smtClean="0"/>
-              <a:t> party clients, and</a:t>
-            </a:r>
-          </a:p>
-          <a:p>
+              <a:t>You </a:t>
+            </a:r>
             <a:r>
               <a:rPr lang="en-US" sz="3600" dirty="0" smtClean="0"/>
-              <a:t>You’re writing a web-based app, and</a:t>
-            </a:r>
-          </a:p>
-          <a:p>
+              <a:t>can’t/don’t want to require </a:t>
+            </a:r>
             <a:r>
               <a:rPr lang="en-US" sz="3600" dirty="0" smtClean="0"/>
-              <a:t>You can’t/don’t want to require TLS, and/or</a:t>
-            </a:r>
+              <a:t>TLS</a:t>
+            </a:r>
+          </a:p>
+          <a:p>
             <a:endParaRPr lang="en-US" sz="3600" dirty="0"/>
           </a:p>
           <a:p>
             <a:r>
               <a:rPr lang="en-US" sz="3600" dirty="0" smtClean="0"/>
-              <a:t>You care about client/provider interoperability</a:t>
+              <a:t>You </a:t>
+            </a:r>
+            <a:r>
+              <a:rPr lang="en-US" sz="3600" dirty="0" smtClean="0"/>
+              <a:t>care about client/provider interoperability</a:t>
             </a:r>
           </a:p>
           <a:p>
@@ -35568,19 +34136,40 @@
           <a:p>
             <a:r>
               <a:rPr lang="en-US" sz="3600" dirty="0" smtClean="0"/>
-              <a:t>You want to avoid complexity of signed requests, and</a:t>
+              <a:t>You need to support delegated access to user data, and</a:t>
             </a:r>
           </a:p>
           <a:p>
             <a:r>
               <a:rPr lang="en-US" sz="3600" dirty="0" smtClean="0"/>
-              <a:t>You can require TLS on all requests, or</a:t>
-            </a:r>
-          </a:p>
-          <a:p>
+              <a:t>You </a:t>
+            </a:r>
             <a:r>
               <a:rPr lang="en-US" sz="3600" dirty="0" smtClean="0"/>
-              <a:t>You need to support a wider set of devices and “flows”</a:t>
+              <a:t>want to avoid complexity of signed requests, and</a:t>
+            </a:r>
+          </a:p>
+          <a:p>
+            <a:r>
+              <a:rPr lang="en-US" sz="3600" dirty="0" smtClean="0"/>
+              <a:t>You can require TLS on all </a:t>
+            </a:r>
+            <a:r>
+              <a:rPr lang="en-US" sz="3600" dirty="0" smtClean="0"/>
+              <a:t>requests</a:t>
+            </a:r>
+          </a:p>
+          <a:p>
+            <a:endParaRPr lang="en-US" sz="3600" dirty="0"/>
+          </a:p>
+          <a:p>
+            <a:r>
+              <a:rPr lang="en-US" sz="3600" dirty="0" smtClean="0"/>
+              <a:t>You </a:t>
+            </a:r>
+            <a:r>
+              <a:rPr lang="en-US" sz="3600" dirty="0" smtClean="0"/>
+              <a:t>need to support a wider set of devices and “flows”</a:t>
             </a:r>
           </a:p>
           <a:p>
@@ -35936,18 +34525,26 @@
           <a:p>
             <a:r>
               <a:rPr lang="en-US" sz="3600" dirty="0" smtClean="0"/>
-              <a:t>You suffer endlessly in Enterprise Hell, or</a:t>
-            </a:r>
+              <a:t>You </a:t>
+            </a:r>
+            <a:r>
+              <a:rPr lang="en-US" sz="3600" dirty="0" smtClean="0"/>
+              <a:t>find XML to be life-affirming and </a:t>
+            </a:r>
+            <a:r>
+              <a:rPr lang="en-US" sz="3600" dirty="0" smtClean="0"/>
+              <a:t>joyful, or</a:t>
+            </a:r>
+          </a:p>
+          <a:p>
             <a:endParaRPr lang="en-US" sz="3600" dirty="0"/>
           </a:p>
           <a:p>
+            <a:r>
+              <a:rPr lang="en-US" sz="3600" dirty="0" smtClean="0"/>
+              <a:t>You have a Legit Reason To Do It The Hard Way ™</a:t>
+            </a:r>
             <a:endParaRPr lang="en-US" sz="3600" dirty="0" smtClean="0"/>
-          </a:p>
-          <a:p>
-            <a:r>
-              <a:rPr lang="en-US" sz="3600" dirty="0" smtClean="0"/>
-              <a:t>You find XML to be life-affirming and joyful</a:t>
-            </a:r>
           </a:p>
           <a:p>
             <a:endParaRPr lang="en-US" sz="3600" dirty="0"/>
@@ -36226,45 +34823,51 @@
           <a:p>
             <a:r>
               <a:rPr lang="en-US" sz="4000" dirty="0" smtClean="0"/>
-              <a:t>Requests must use TLS, or be signed</a:t>
-            </a:r>
-          </a:p>
-          <a:p>
+              <a:t>Use API Keys as </a:t>
+            </a:r>
+            <a:r>
+              <a:rPr lang="en-US" sz="4000" b="1" dirty="0" smtClean="0"/>
+              <a:t>b</a:t>
+            </a:r>
+            <a:r>
+              <a:rPr lang="en-US" sz="4000" b="1" dirty="0" smtClean="0"/>
+              <a:t>earer tokens</a:t>
+            </a:r>
+            <a:r>
+              <a:rPr lang="en-US" sz="4000" dirty="0" smtClean="0"/>
+              <a:t> or to </a:t>
+            </a:r>
+            <a:r>
+              <a:rPr lang="en-US" sz="4000" b="1" dirty="0" smtClean="0"/>
+              <a:t>sign requests</a:t>
+            </a:r>
+            <a:r>
+              <a:rPr lang="en-US" sz="4000" dirty="0" smtClean="0"/>
+              <a:t>, depending on security/convenience needs</a:t>
+            </a:r>
+            <a:br>
+              <a:rPr lang="en-US" sz="4000" dirty="0" smtClean="0"/>
+            </a:br>
             <a:endParaRPr lang="en-US" sz="4000" dirty="0"/>
           </a:p>
           <a:p>
             <a:r>
+              <a:rPr lang="en-US" sz="4000" b="1" dirty="0" smtClean="0"/>
+              <a:t>JSON Web Tokens</a:t>
+            </a:r>
+            <a:r>
               <a:rPr lang="en-US" sz="4000" dirty="0" smtClean="0"/>
-              <a:t>For server-based clients, use </a:t>
-            </a:r>
-            <a:r>
-              <a:rPr lang="en-US" sz="4000" b="1" dirty="0" smtClean="0"/>
-              <a:t>Basic </a:t>
-            </a:r>
-            <a:r>
-              <a:rPr lang="en-US" sz="4000" b="1" dirty="0" err="1" smtClean="0"/>
-              <a:t>Auth</a:t>
+              <a:t> are a secure, stateless way to share </a:t>
+            </a:r>
+            <a:r>
+              <a:rPr lang="en-US" sz="4000" i="1" dirty="0" smtClean="0"/>
+              <a:t>non-sensitive data</a:t>
             </a:r>
             <a:r>
               <a:rPr lang="en-US" sz="4000" dirty="0" smtClean="0"/>
-              <a:t> or </a:t>
-            </a:r>
-            <a:r>
-              <a:rPr lang="en-US" sz="4000" b="1" dirty="0" smtClean="0"/>
-              <a:t>API Keys</a:t>
-            </a:r>
-            <a:r>
-              <a:rPr lang="en-US" sz="4000" dirty="0" smtClean="0"/>
-              <a:t>. For JS clients, use </a:t>
-            </a:r>
-            <a:r>
-              <a:rPr lang="en-US" sz="4000" b="1" dirty="0" smtClean="0"/>
-              <a:t>JWT</a:t>
-            </a:r>
-            <a:r>
-              <a:rPr lang="en-US" sz="4000" dirty="0" smtClean="0"/>
-              <a:t>. </a:t>
-            </a:r>
+              <a:t>. Careful about XSS/CSRF!</a:t>
+            </a:r>
+            <a:endParaRPr lang="en-US" sz="4000" dirty="0" smtClean="0"/>
           </a:p>
           <a:p>
             <a:endParaRPr lang="en-US" sz="4000" dirty="0" smtClean="0"/>

</xml_diff>

<commit_message>
Narrative updates from rehearsing
</commit_message>
<xml_diff>
--- a/Securing Your API Endpoints.pptx
+++ b/Securing Your API Endpoints.pptx
@@ -32,9 +32,9 @@
     <p:sldId id="450" r:id="rId23"/>
     <p:sldId id="533" r:id="rId24"/>
     <p:sldId id="545" r:id="rId25"/>
-    <p:sldId id="544" r:id="rId26"/>
-    <p:sldId id="456" r:id="rId27"/>
-    <p:sldId id="453" r:id="rId28"/>
+    <p:sldId id="456" r:id="rId26"/>
+    <p:sldId id="453" r:id="rId27"/>
+    <p:sldId id="567" r:id="rId28"/>
     <p:sldId id="461" r:id="rId29"/>
     <p:sldId id="457" r:id="rId30"/>
     <p:sldId id="539" r:id="rId31"/>
@@ -288,7 +288,7 @@
           <a:p>
             <a:fld id="{C54A4886-B4AF-42F7-97BE-95CDF82A73E3}" type="datetimeFigureOut">
               <a:rPr lang="en-US" smtClean="0"/>
-              <a:t>12/17/2018</a:t>
+              <a:t>12/18/2018</a:t>
             </a:fld>
             <a:endParaRPr lang="en-US"/>
           </a:p>
@@ -1456,237 +1456,7 @@
             </a:endParaRPr>
           </a:p>
           <a:p>
-            <a:r>
-              <a:rPr lang="en-US" sz="1200" kern="1200" dirty="0" smtClean="0">
-                <a:solidFill>
-                  <a:schemeClr val="tx1"/>
-                </a:solidFill>
-                <a:effectLst/>
-                <a:latin typeface="+mn-lt"/>
-                <a:ea typeface="+mn-ea"/>
-                <a:cs typeface="+mn-cs"/>
-              </a:rPr>
-              <a:t>Client certs do the same thing, but in reverse. You install the certificate on your </a:t>
-            </a:r>
-            <a:r>
-              <a:rPr lang="en-US" sz="1200" i="1" kern="1200" dirty="0" smtClean="0">
-                <a:solidFill>
-                  <a:schemeClr val="tx1"/>
-                </a:solidFill>
-                <a:effectLst/>
-                <a:latin typeface="+mn-lt"/>
-                <a:ea typeface="+mn-ea"/>
-                <a:cs typeface="+mn-cs"/>
-              </a:rPr>
-              <a:t>browser</a:t>
-            </a:r>
-            <a:r>
-              <a:rPr lang="en-US" sz="1200" kern="1200" dirty="0" smtClean="0">
-                <a:solidFill>
-                  <a:schemeClr val="tx1"/>
-                </a:solidFill>
-                <a:effectLst/>
-                <a:latin typeface="+mn-lt"/>
-                <a:ea typeface="+mn-ea"/>
-                <a:cs typeface="+mn-cs"/>
-              </a:rPr>
-              <a:t>, and it proves </a:t>
-            </a:r>
-            <a:r>
-              <a:rPr lang="en-US" sz="1200" i="1" kern="1200" dirty="0" smtClean="0">
-                <a:solidFill>
-                  <a:schemeClr val="tx1"/>
-                </a:solidFill>
-                <a:effectLst/>
-                <a:latin typeface="+mn-lt"/>
-                <a:ea typeface="+mn-ea"/>
-                <a:cs typeface="+mn-cs"/>
-              </a:rPr>
-              <a:t>your </a:t>
-            </a:r>
-            <a:r>
-              <a:rPr lang="en-US" sz="1200" i="0" kern="1200" dirty="0" smtClean="0">
-                <a:solidFill>
-                  <a:schemeClr val="tx1"/>
-                </a:solidFill>
-                <a:effectLst/>
-                <a:latin typeface="+mn-lt"/>
-                <a:ea typeface="+mn-ea"/>
-                <a:cs typeface="+mn-cs"/>
-              </a:rPr>
-              <a:t>identity</a:t>
-            </a:r>
-            <a:r>
-              <a:rPr lang="en-US" sz="1200" i="0" kern="1200" baseline="0" dirty="0" smtClean="0">
-                <a:solidFill>
-                  <a:schemeClr val="tx1"/>
-                </a:solidFill>
-                <a:effectLst/>
-                <a:latin typeface="+mn-lt"/>
-                <a:ea typeface="+mn-ea"/>
-                <a:cs typeface="+mn-cs"/>
-              </a:rPr>
-              <a:t> to the server</a:t>
-            </a:r>
-            <a:endParaRPr lang="en-US" sz="1200" kern="1200" dirty="0" smtClean="0">
-              <a:solidFill>
-                <a:schemeClr val="tx1"/>
-              </a:solidFill>
-              <a:effectLst/>
-              <a:latin typeface="+mn-lt"/>
-              <a:ea typeface="+mn-ea"/>
-              <a:cs typeface="+mn-cs"/>
-            </a:endParaRPr>
-          </a:p>
-          <a:p>
-            <a:endParaRPr lang="en-US" sz="1200" kern="1200" dirty="0" smtClean="0">
-              <a:solidFill>
-                <a:schemeClr val="tx1"/>
-              </a:solidFill>
-              <a:effectLst/>
-              <a:latin typeface="+mn-lt"/>
-              <a:ea typeface="+mn-ea"/>
-              <a:cs typeface="+mn-cs"/>
-            </a:endParaRPr>
-          </a:p>
-          <a:p>
-            <a:r>
-              <a:rPr lang="en-US" sz="1200" kern="1200" dirty="0" smtClean="0">
-                <a:solidFill>
-                  <a:schemeClr val="tx1"/>
-                </a:solidFill>
-                <a:effectLst/>
-                <a:latin typeface="+mn-lt"/>
-                <a:ea typeface="+mn-ea"/>
-                <a:cs typeface="+mn-cs"/>
-              </a:rPr>
-              <a:t>No login screens, no redirects, every request instantly authenticated. </a:t>
-            </a:r>
-          </a:p>
-          <a:p>
-            <a:endParaRPr lang="en-US" sz="1200" kern="1200" dirty="0" smtClean="0">
-              <a:solidFill>
-                <a:schemeClr val="tx1"/>
-              </a:solidFill>
-              <a:effectLst/>
-              <a:latin typeface="+mn-lt"/>
-              <a:ea typeface="+mn-ea"/>
-              <a:cs typeface="+mn-cs"/>
-            </a:endParaRPr>
-          </a:p>
-          <a:p>
-            <a:r>
-              <a:rPr lang="en-US" sz="1200" kern="1200" dirty="0" smtClean="0">
-                <a:solidFill>
-                  <a:schemeClr val="tx1"/>
-                </a:solidFill>
-                <a:effectLst/>
-                <a:latin typeface="+mn-lt"/>
-                <a:ea typeface="+mn-ea"/>
-                <a:cs typeface="+mn-cs"/>
-              </a:rPr>
-              <a:t>Drawbacks: </a:t>
-            </a:r>
-          </a:p>
-          <a:p>
-            <a:r>
-              <a:rPr lang="en-US" sz="1200" kern="1200" dirty="0" smtClean="0">
-                <a:solidFill>
-                  <a:schemeClr val="tx1"/>
-                </a:solidFill>
-                <a:effectLst/>
-                <a:latin typeface="+mn-lt"/>
-                <a:ea typeface="+mn-ea"/>
-                <a:cs typeface="+mn-cs"/>
-              </a:rPr>
-              <a:t>1) all users have to install security certs. Doesn’t scale.</a:t>
-            </a:r>
-          </a:p>
-          <a:p>
-            <a:r>
-              <a:rPr lang="en-US" sz="1200" kern="1200" dirty="0" smtClean="0">
-                <a:solidFill>
-                  <a:schemeClr val="tx1"/>
-                </a:solidFill>
-                <a:effectLst/>
-                <a:latin typeface="+mn-lt"/>
-                <a:ea typeface="+mn-ea"/>
-                <a:cs typeface="+mn-cs"/>
-              </a:rPr>
-              <a:t>2) In Windows land, this is only “simple” when using Active Direct</a:t>
-            </a:r>
-          </a:p>
-          <a:p>
-            <a:endParaRPr lang="en-US" sz="1200" kern="1200" dirty="0" smtClean="0">
-              <a:solidFill>
-                <a:schemeClr val="tx1"/>
-              </a:solidFill>
-              <a:effectLst/>
-              <a:latin typeface="+mn-lt"/>
-              <a:ea typeface="+mn-ea"/>
-              <a:cs typeface="+mn-cs"/>
-            </a:endParaRPr>
-          </a:p>
-          <a:p>
-            <a:r>
-              <a:rPr lang="en-US" sz="1200" kern="1200" dirty="0" smtClean="0">
-                <a:solidFill>
-                  <a:schemeClr val="tx1"/>
-                </a:solidFill>
-                <a:effectLst/>
-                <a:latin typeface="+mn-lt"/>
-                <a:ea typeface="+mn-ea"/>
-                <a:cs typeface="+mn-cs"/>
-              </a:rPr>
-              <a:t>These drawbacks mean that client certs are best suited for </a:t>
-            </a:r>
-            <a:r>
-              <a:rPr lang="en-US" sz="1200" b="1" kern="1200" dirty="0" smtClean="0">
-                <a:solidFill>
-                  <a:schemeClr val="tx1"/>
-                </a:solidFill>
-                <a:effectLst/>
-                <a:latin typeface="+mn-lt"/>
-                <a:ea typeface="+mn-ea"/>
-                <a:cs typeface="+mn-cs"/>
-              </a:rPr>
-              <a:t>internal APIs</a:t>
-            </a:r>
-            <a:r>
-              <a:rPr lang="en-US" sz="1200" b="1" kern="1200" baseline="0" dirty="0" smtClean="0">
-                <a:solidFill>
-                  <a:schemeClr val="tx1"/>
-                </a:solidFill>
-                <a:effectLst/>
-                <a:latin typeface="+mn-lt"/>
-                <a:ea typeface="+mn-ea"/>
-                <a:cs typeface="+mn-cs"/>
-              </a:rPr>
-              <a:t> on a secure network</a:t>
-            </a:r>
-            <a:endParaRPr lang="en-US" sz="1200" kern="1200" dirty="0" smtClean="0">
-              <a:solidFill>
-                <a:schemeClr val="tx1"/>
-              </a:solidFill>
-              <a:effectLst/>
-              <a:latin typeface="+mn-lt"/>
-              <a:ea typeface="+mn-ea"/>
-              <a:cs typeface="+mn-cs"/>
-            </a:endParaRPr>
-          </a:p>
-          <a:p>
-            <a:endParaRPr lang="en-US" sz="1200" kern="1200" dirty="0" smtClean="0">
-              <a:solidFill>
-                <a:schemeClr val="tx1"/>
-              </a:solidFill>
-              <a:effectLst/>
-              <a:latin typeface="+mn-lt"/>
-              <a:ea typeface="+mn-ea"/>
-              <a:cs typeface="+mn-cs"/>
-            </a:endParaRPr>
-          </a:p>
-          <a:p>
-            <a:pPr marL="0" marR="0" indent="0" algn="l" defTabSz="914400" rtl="0" eaLnBrk="1" fontAlgn="auto" latinLnBrk="0" hangingPunct="1">
+            <a:pPr marL="0" marR="0" lvl="0" indent="0" algn="l" defTabSz="914400" rtl="0" eaLnBrk="1" fontAlgn="auto" latinLnBrk="0" hangingPunct="1">
               <a:lnSpc>
                 <a:spcPct val="100000"/>
               </a:lnSpc>
@@ -1704,18 +1474,252 @@
               <a:defRPr/>
             </a:pPr>
             <a:r>
-              <a:rPr lang="en-US" sz="1200" u="sng" kern="1200" dirty="0" smtClean="0">
-                <a:solidFill>
-                  <a:schemeClr val="tx1"/>
-                </a:solidFill>
-                <a:effectLst/>
-                <a:latin typeface="+mn-lt"/>
-                <a:ea typeface="+mn-ea"/>
-                <a:cs typeface="+mn-cs"/>
-                <a:hlinkClick r:id="rId3"/>
-              </a:rPr>
-              <a:t>http://www.networkworld.com/article/2226498/infrastructure-management/simply-put-how-does-certificate-based-authentication-work.html</a:t>
-            </a:r>
+              <a:rPr lang="en-US" sz="1200" kern="1200" dirty="0" smtClean="0">
+                <a:solidFill>
+                  <a:schemeClr val="tx1"/>
+                </a:solidFill>
+                <a:effectLst/>
+                <a:latin typeface="+mn-lt"/>
+                <a:ea typeface="+mn-ea"/>
+                <a:cs typeface="+mn-cs"/>
+              </a:rPr>
+              <a:t>Client certs do the same thing, but in reverse. You install the certificate on your </a:t>
+            </a:r>
+            <a:r>
+              <a:rPr lang="en-US" sz="1200" i="1" kern="1200" dirty="0" smtClean="0">
+                <a:solidFill>
+                  <a:schemeClr val="tx1"/>
+                </a:solidFill>
+                <a:effectLst/>
+                <a:latin typeface="+mn-lt"/>
+                <a:ea typeface="+mn-ea"/>
+                <a:cs typeface="+mn-cs"/>
+              </a:rPr>
+              <a:t>browser</a:t>
+            </a:r>
+            <a:r>
+              <a:rPr lang="en-US" sz="1200" kern="1200" dirty="0" smtClean="0">
+                <a:solidFill>
+                  <a:schemeClr val="tx1"/>
+                </a:solidFill>
+                <a:effectLst/>
+                <a:latin typeface="+mn-lt"/>
+                <a:ea typeface="+mn-ea"/>
+                <a:cs typeface="+mn-cs"/>
+              </a:rPr>
+              <a:t>, and it proves </a:t>
+            </a:r>
+            <a:r>
+              <a:rPr lang="en-US" sz="1200" i="1" kern="1200" dirty="0" smtClean="0">
+                <a:solidFill>
+                  <a:schemeClr val="tx1"/>
+                </a:solidFill>
+                <a:effectLst/>
+                <a:latin typeface="+mn-lt"/>
+                <a:ea typeface="+mn-ea"/>
+                <a:cs typeface="+mn-cs"/>
+              </a:rPr>
+              <a:t>your </a:t>
+            </a:r>
+            <a:r>
+              <a:rPr lang="en-US" sz="1200" i="0" kern="1200" dirty="0" smtClean="0">
+                <a:solidFill>
+                  <a:schemeClr val="tx1"/>
+                </a:solidFill>
+                <a:effectLst/>
+                <a:latin typeface="+mn-lt"/>
+                <a:ea typeface="+mn-ea"/>
+                <a:cs typeface="+mn-cs"/>
+              </a:rPr>
+              <a:t>identity</a:t>
+            </a:r>
+            <a:r>
+              <a:rPr lang="en-US" sz="1200" i="0" kern="1200" baseline="0" dirty="0" smtClean="0">
+                <a:solidFill>
+                  <a:schemeClr val="tx1"/>
+                </a:solidFill>
+                <a:effectLst/>
+                <a:latin typeface="+mn-lt"/>
+                <a:ea typeface="+mn-ea"/>
+                <a:cs typeface="+mn-cs"/>
+              </a:rPr>
+              <a:t> to the </a:t>
+            </a:r>
+            <a:r>
+              <a:rPr lang="en-US" sz="1200" i="0" kern="1200" baseline="0" dirty="0" smtClean="0">
+                <a:solidFill>
+                  <a:schemeClr val="tx1"/>
+                </a:solidFill>
+                <a:effectLst/>
+                <a:latin typeface="+mn-lt"/>
+                <a:ea typeface="+mn-ea"/>
+                <a:cs typeface="+mn-cs"/>
+              </a:rPr>
+              <a:t>server. </a:t>
+            </a:r>
+            <a:r>
+              <a:rPr lang="en-US" sz="1200" kern="1200" dirty="0" smtClean="0">
+                <a:solidFill>
+                  <a:schemeClr val="tx1"/>
+                </a:solidFill>
+                <a:effectLst/>
+                <a:latin typeface="+mn-lt"/>
+                <a:ea typeface="+mn-ea"/>
+                <a:cs typeface="+mn-cs"/>
+              </a:rPr>
+              <a:t>The same tech that tells you it’s safe to give your credit card data to an e-commerce site tells the server that a request is coming from a verified person and hasn’t been modified in transit.</a:t>
+            </a:r>
+          </a:p>
+          <a:p>
+            <a:endParaRPr lang="en-US" sz="1200" kern="1200" dirty="0" smtClean="0">
+              <a:solidFill>
+                <a:schemeClr val="tx1"/>
+              </a:solidFill>
+              <a:effectLst/>
+              <a:latin typeface="+mn-lt"/>
+              <a:ea typeface="+mn-ea"/>
+              <a:cs typeface="+mn-cs"/>
+            </a:endParaRPr>
+          </a:p>
+          <a:p>
+            <a:r>
+              <a:rPr lang="en-US" sz="1200" kern="1200" dirty="0" smtClean="0">
+                <a:solidFill>
+                  <a:schemeClr val="tx1"/>
+                </a:solidFill>
+                <a:effectLst/>
+                <a:latin typeface="+mn-lt"/>
+                <a:ea typeface="+mn-ea"/>
+                <a:cs typeface="+mn-cs"/>
+              </a:rPr>
+              <a:t>No login screens, no redirects, every request instantly authenticated. </a:t>
+            </a:r>
+          </a:p>
+          <a:p>
+            <a:endParaRPr lang="en-US" sz="1200" kern="1200" dirty="0" smtClean="0">
+              <a:solidFill>
+                <a:schemeClr val="tx1"/>
+              </a:solidFill>
+              <a:effectLst/>
+              <a:latin typeface="+mn-lt"/>
+              <a:ea typeface="+mn-ea"/>
+              <a:cs typeface="+mn-cs"/>
+            </a:endParaRPr>
+          </a:p>
+          <a:p>
+            <a:r>
+              <a:rPr lang="en-US" sz="1200" kern="1200" dirty="0" smtClean="0">
+                <a:solidFill>
+                  <a:schemeClr val="tx1"/>
+                </a:solidFill>
+                <a:effectLst/>
+                <a:latin typeface="+mn-lt"/>
+                <a:ea typeface="+mn-ea"/>
+                <a:cs typeface="+mn-cs"/>
+              </a:rPr>
+              <a:t>Drawbacks: </a:t>
+            </a:r>
+          </a:p>
+          <a:p>
+            <a:r>
+              <a:rPr lang="en-US" sz="1200" kern="1200" dirty="0" smtClean="0">
+                <a:solidFill>
+                  <a:schemeClr val="tx1"/>
+                </a:solidFill>
+                <a:effectLst/>
+                <a:latin typeface="+mn-lt"/>
+                <a:ea typeface="+mn-ea"/>
+                <a:cs typeface="+mn-cs"/>
+              </a:rPr>
+              <a:t>1) all users have to install security certs. Doesn’t scale.</a:t>
+            </a:r>
+          </a:p>
+          <a:p>
+            <a:pPr lvl="0"/>
+            <a:r>
+              <a:rPr lang="en-US" sz="1200" kern="1200" dirty="0" smtClean="0">
+                <a:solidFill>
+                  <a:schemeClr val="tx1"/>
+                </a:solidFill>
+                <a:effectLst/>
+                <a:latin typeface="+mn-lt"/>
+                <a:ea typeface="+mn-ea"/>
+                <a:cs typeface="+mn-cs"/>
+              </a:rPr>
+              <a:t>2) </a:t>
+            </a:r>
+            <a:r>
+              <a:rPr lang="en-US" sz="1200" kern="1200" dirty="0" smtClean="0">
+                <a:solidFill>
+                  <a:schemeClr val="tx1"/>
+                </a:solidFill>
+                <a:effectLst/>
+                <a:latin typeface="+mn-lt"/>
+                <a:ea typeface="+mn-ea"/>
+                <a:cs typeface="+mn-cs"/>
+              </a:rPr>
+              <a:t>Secondly, when using IIS, this is only a “simple” approach when authenticating against Active Directory because the tooling to link a client cert to a specific identity is built into Windows. If you want to authenticate against your custom user database it’s definitely possible, it just takes some more work.</a:t>
+            </a:r>
+          </a:p>
+          <a:p>
+            <a:endParaRPr lang="en-US" sz="1200" kern="1200" dirty="0" smtClean="0">
+              <a:solidFill>
+                <a:schemeClr val="tx1"/>
+              </a:solidFill>
+              <a:effectLst/>
+              <a:latin typeface="+mn-lt"/>
+              <a:ea typeface="+mn-ea"/>
+              <a:cs typeface="+mn-cs"/>
+            </a:endParaRPr>
+          </a:p>
+          <a:p>
+            <a:r>
+              <a:rPr lang="en-US" sz="1200" kern="1200" dirty="0" smtClean="0">
+                <a:solidFill>
+                  <a:schemeClr val="tx1"/>
+                </a:solidFill>
+                <a:effectLst/>
+                <a:latin typeface="+mn-lt"/>
+                <a:ea typeface="+mn-ea"/>
+                <a:cs typeface="+mn-cs"/>
+              </a:rPr>
+              <a:t>These drawbacks mean that client certs are best suited for </a:t>
+            </a:r>
+            <a:r>
+              <a:rPr lang="en-US" sz="1200" b="1" kern="1200" dirty="0" smtClean="0">
+                <a:solidFill>
+                  <a:schemeClr val="tx1"/>
+                </a:solidFill>
+                <a:effectLst/>
+                <a:latin typeface="+mn-lt"/>
+                <a:ea typeface="+mn-ea"/>
+                <a:cs typeface="+mn-cs"/>
+              </a:rPr>
+              <a:t>internal APIs</a:t>
+            </a:r>
+            <a:r>
+              <a:rPr lang="en-US" sz="1200" b="1" kern="1200" baseline="0" dirty="0" smtClean="0">
+                <a:solidFill>
+                  <a:schemeClr val="tx1"/>
+                </a:solidFill>
+                <a:effectLst/>
+                <a:latin typeface="+mn-lt"/>
+                <a:ea typeface="+mn-ea"/>
+                <a:cs typeface="+mn-cs"/>
+              </a:rPr>
+              <a:t> on a secure network</a:t>
+            </a:r>
+            <a:endParaRPr lang="en-US" sz="1200" kern="1200" dirty="0" smtClean="0">
+              <a:solidFill>
+                <a:schemeClr val="tx1"/>
+              </a:solidFill>
+              <a:effectLst/>
+              <a:latin typeface="+mn-lt"/>
+              <a:ea typeface="+mn-ea"/>
+              <a:cs typeface="+mn-cs"/>
+            </a:endParaRPr>
+          </a:p>
+          <a:p>
             <a:endParaRPr lang="en-US" sz="1200" kern="1200" dirty="0" smtClean="0">
               <a:solidFill>
                 <a:schemeClr val="tx1"/>
@@ -1872,46 +1876,19 @@
                 <a:ea typeface="+mn-ea"/>
                 <a:cs typeface="+mn-cs"/>
               </a:rPr>
-              <a:t>are Base64 encoded and sent with each request as a header</a:t>
-            </a:r>
-          </a:p>
-          <a:p>
-            <a:r>
-              <a:rPr lang="en-US" sz="1200" kern="1200" dirty="0" smtClean="0">
-                <a:solidFill>
-                  <a:schemeClr val="tx1"/>
-                </a:solidFill>
-                <a:effectLst/>
-                <a:latin typeface="+mn-lt"/>
-                <a:ea typeface="+mn-ea"/>
-                <a:cs typeface="+mn-cs"/>
-              </a:rPr>
-              <a:t>* Server decodes them and authenticates request</a:t>
-            </a:r>
-          </a:p>
-          <a:p>
-            <a:endParaRPr lang="en-US" sz="1200" kern="1200" dirty="0" smtClean="0">
-              <a:solidFill>
-                <a:schemeClr val="tx1"/>
-              </a:solidFill>
-              <a:effectLst/>
-              <a:latin typeface="+mn-lt"/>
-              <a:ea typeface="+mn-ea"/>
-              <a:cs typeface="+mn-cs"/>
-            </a:endParaRPr>
-          </a:p>
-          <a:p>
-            <a:r>
-              <a:rPr lang="en-US" sz="1200" kern="1200" dirty="0" smtClean="0">
-                <a:solidFill>
-                  <a:schemeClr val="tx1"/>
-                </a:solidFill>
-                <a:effectLst/>
-                <a:latin typeface="+mn-lt"/>
-                <a:ea typeface="+mn-ea"/>
-                <a:cs typeface="+mn-cs"/>
-              </a:rPr>
-              <a:t>The “Authorization” header is named poorly. Authentication, not authorization.</a:t>
+              <a:t>are concatenated together and </a:t>
+            </a:r>
+            <a:r>
+              <a:rPr lang="en-US" sz="1200" kern="1200" baseline="0" dirty="0" smtClean="0">
+                <a:solidFill>
+                  <a:schemeClr val="tx1"/>
+                </a:solidFill>
+                <a:effectLst/>
+                <a:latin typeface="+mn-lt"/>
+                <a:ea typeface="+mn-ea"/>
+                <a:cs typeface="+mn-cs"/>
+              </a:rPr>
+              <a:t>Base64 encoded and sent with each request as a header</a:t>
             </a:r>
           </a:p>
           <a:p>
@@ -2037,17 +2014,40 @@
             </a:r>
           </a:p>
           <a:p>
-            <a:r>
-              <a:rPr lang="en-US" sz="1200" kern="1200" dirty="0" smtClean="0">
-                <a:solidFill>
-                  <a:schemeClr val="tx1"/>
-                </a:solidFill>
-                <a:effectLst/>
-                <a:latin typeface="+mn-lt"/>
-                <a:ea typeface="+mn-ea"/>
-                <a:cs typeface="+mn-cs"/>
-              </a:rPr>
-              <a:t>Remember that Base64 encoding is </a:t>
+            <a:endParaRPr lang="en-US" sz="1200" kern="1200" dirty="0" smtClean="0">
+              <a:solidFill>
+                <a:schemeClr val="tx1"/>
+              </a:solidFill>
+              <a:effectLst/>
+              <a:latin typeface="+mn-lt"/>
+              <a:ea typeface="+mn-ea"/>
+              <a:cs typeface="+mn-cs"/>
+            </a:endParaRPr>
+          </a:p>
+          <a:p>
+            <a:r>
+              <a:rPr lang="en-US" sz="1200" kern="1200" dirty="0" smtClean="0">
+                <a:solidFill>
+                  <a:schemeClr val="tx1"/>
+                </a:solidFill>
+                <a:effectLst/>
+                <a:latin typeface="+mn-lt"/>
+                <a:ea typeface="+mn-ea"/>
+                <a:cs typeface="+mn-cs"/>
+              </a:rPr>
+              <a:t>Remember </a:t>
+            </a:r>
+            <a:r>
+              <a:rPr lang="en-US" sz="1200" kern="1200" dirty="0" smtClean="0">
+                <a:solidFill>
+                  <a:schemeClr val="tx1"/>
+                </a:solidFill>
+                <a:effectLst/>
+                <a:latin typeface="+mn-lt"/>
+                <a:ea typeface="+mn-ea"/>
+                <a:cs typeface="+mn-cs"/>
+              </a:rPr>
+              <a:t>that Base64 encoding is </a:t>
             </a:r>
             <a:r>
               <a:rPr lang="en-US" sz="1200" i="1" kern="1200" dirty="0" smtClean="0">
@@ -2095,8 +2095,64 @@
                 <a:ea typeface="+mn-ea"/>
                 <a:cs typeface="+mn-cs"/>
               </a:rPr>
-              <a:t>use TLS to secure every single connection when using Basic Auth. It also means you’re only as secure as the underlying TLS implementation; if TLS gets cracked, like SSL did before it, these credentials are at risk of being stolen.</a:t>
-            </a:r>
+              <a:t>use TLS to secure every single connection when using Basic Auth. It also means you’re only as secure as the underlying TLS implementation; if TLS gets cracked, like SSL did before it, these credentials are at risk of being stolen</a:t>
+            </a:r>
+            <a:r>
+              <a:rPr lang="en-US" sz="1200" kern="1200" dirty="0" smtClean="0">
+                <a:solidFill>
+                  <a:schemeClr val="tx1"/>
+                </a:solidFill>
+                <a:effectLst/>
+                <a:latin typeface="+mn-lt"/>
+                <a:ea typeface="+mn-ea"/>
+                <a:cs typeface="+mn-cs"/>
+              </a:rPr>
+              <a:t>.</a:t>
+            </a:r>
+          </a:p>
+          <a:p>
+            <a:endParaRPr lang="en-US" sz="1200" kern="1200" dirty="0" smtClean="0">
+              <a:solidFill>
+                <a:schemeClr val="tx1"/>
+              </a:solidFill>
+              <a:effectLst/>
+              <a:latin typeface="+mn-lt"/>
+              <a:ea typeface="+mn-ea"/>
+              <a:cs typeface="+mn-cs"/>
+            </a:endParaRPr>
+          </a:p>
+          <a:p>
+            <a:pPr marL="0" marR="0" lvl="0" indent="0" algn="l" defTabSz="914400" rtl="0" eaLnBrk="1" fontAlgn="auto" latinLnBrk="0" hangingPunct="1">
+              <a:lnSpc>
+                <a:spcPct val="100000"/>
+              </a:lnSpc>
+              <a:spcBef>
+                <a:spcPts val="0"/>
+              </a:spcBef>
+              <a:spcAft>
+                <a:spcPts val="0"/>
+              </a:spcAft>
+              <a:buClrTx/>
+              <a:buSzTx/>
+              <a:buFontTx/>
+              <a:buNone/>
+              <a:tabLst/>
+              <a:defRPr/>
+            </a:pPr>
+            <a:r>
+              <a:rPr lang="en-US" sz="1200" kern="1200" dirty="0" smtClean="0">
+                <a:solidFill>
+                  <a:schemeClr val="tx1"/>
+                </a:solidFill>
+                <a:effectLst/>
+                <a:latin typeface="+mn-lt"/>
+                <a:ea typeface="+mn-ea"/>
+                <a:cs typeface="+mn-cs"/>
+              </a:rPr>
+              <a:t>Note that the “Authorization” header is poorly named. This is authentication, not authorization.</a:t>
+            </a:r>
+          </a:p>
+          <a:p>
             <a:endParaRPr lang="en-US" sz="1200" kern="1200" dirty="0">
               <a:solidFill>
                 <a:schemeClr val="tx1"/>
@@ -3553,31 +3609,7 @@
                 <a:ea typeface="+mn-ea"/>
                 <a:cs typeface="+mn-cs"/>
               </a:rPr>
-              <a:t>I have a confession to make. Two</a:t>
-            </a:r>
-            <a:r>
-              <a:rPr lang="en-US" sz="1200" kern="1200" baseline="0" dirty="0" smtClean="0">
-                <a:solidFill>
-                  <a:schemeClr val="tx1"/>
-                </a:solidFill>
-                <a:effectLst/>
-                <a:latin typeface="+mn-lt"/>
-                <a:ea typeface="+mn-ea"/>
-                <a:cs typeface="+mn-cs"/>
-              </a:rPr>
-              <a:t> years </a:t>
-            </a:r>
-            <a:r>
-              <a:rPr lang="en-US" sz="1200" kern="1200" dirty="0" smtClean="0">
-                <a:solidFill>
-                  <a:schemeClr val="tx1"/>
-                </a:solidFill>
-                <a:effectLst/>
-                <a:latin typeface="+mn-lt"/>
-                <a:ea typeface="+mn-ea"/>
-                <a:cs typeface="+mn-cs"/>
-              </a:rPr>
-              <a:t>ago, I made a huge rookie mistake.</a:t>
+              <a:t>I have a confession to make. A few years ago, I made a huge rookie mistake.</a:t>
             </a:r>
           </a:p>
           <a:p>
@@ -3602,31 +3634,7 @@
                 <a:ea typeface="+mn-ea"/>
                 <a:cs typeface="+mn-cs"/>
               </a:rPr>
-              <a:t>My team develops a </a:t>
-            </a:r>
-            <a:r>
-              <a:rPr lang="en-US" sz="1200" b="1" kern="1200" dirty="0" smtClean="0">
-                <a:solidFill>
-                  <a:schemeClr val="tx1"/>
-                </a:solidFill>
-                <a:effectLst/>
-                <a:latin typeface="+mn-lt"/>
-                <a:ea typeface="+mn-ea"/>
-                <a:cs typeface="+mn-cs"/>
-              </a:rPr>
-              <a:t>fairly standard web app</a:t>
-            </a:r>
-            <a:r>
-              <a:rPr lang="en-US" sz="1200" kern="1200" dirty="0" smtClean="0">
-                <a:solidFill>
-                  <a:schemeClr val="tx1"/>
-                </a:solidFill>
-                <a:effectLst/>
-                <a:latin typeface="+mn-lt"/>
-                <a:ea typeface="+mn-ea"/>
-                <a:cs typeface="+mn-cs"/>
-              </a:rPr>
-              <a:t> with session state and server rendered HTML. We eventually want to build a mobile app…</a:t>
+              <a:t>I was writing a feature and I wanted a piece of JavaScript to make an API call back to my server. But since my team develops a fairly standard server-rendered web app, we didn’t have a lot of experience doing this, and one of the problems I encountered into is that I had no idea how to associate that API call with the current user.</a:t>
             </a:r>
           </a:p>
           <a:p>
@@ -3651,31 +3659,7 @@
                 <a:ea typeface="+mn-ea"/>
                 <a:cs typeface="+mn-cs"/>
               </a:rPr>
-              <a:t>RESTful APIs are normally </a:t>
-            </a:r>
-            <a:r>
-              <a:rPr lang="en-US" sz="1200" b="1" kern="1200" dirty="0" smtClean="0">
-                <a:solidFill>
-                  <a:schemeClr val="tx1"/>
-                </a:solidFill>
-                <a:effectLst/>
-                <a:latin typeface="+mn-lt"/>
-                <a:ea typeface="+mn-ea"/>
-                <a:cs typeface="+mn-cs"/>
-              </a:rPr>
-              <a:t>stateless</a:t>
-            </a:r>
-            <a:r>
-              <a:rPr lang="en-US" sz="1200" kern="1200" dirty="0" smtClean="0">
-                <a:solidFill>
-                  <a:schemeClr val="tx1"/>
-                </a:solidFill>
-                <a:effectLst/>
-                <a:latin typeface="+mn-lt"/>
-                <a:ea typeface="+mn-ea"/>
-                <a:cs typeface="+mn-cs"/>
-              </a:rPr>
-              <a:t>…. Need authentication.</a:t>
+              <a:t>The issue of course is that RESTful APIs are normally stateless, so unlike our other code, this API couldn’t just rely on the server automagically knowing who was currently logged in. We had to introduce some sort of API authentication scheme to do that.</a:t>
             </a:r>
           </a:p>
           <a:p>
@@ -3839,6 +3823,33 @@
                 <a:cs typeface="+mn-cs"/>
               </a:rPr>
               <a:t>Oauth</a:t>
+            </a:r>
+            <a:endParaRPr lang="en-US" sz="1200" b="0" kern="1200" baseline="0" dirty="0" smtClean="0">
+              <a:solidFill>
+                <a:schemeClr val="tx1"/>
+              </a:solidFill>
+              <a:effectLst/>
+              <a:latin typeface="+mn-lt"/>
+              <a:ea typeface="+mn-ea"/>
+              <a:cs typeface="+mn-cs"/>
+            </a:endParaRPr>
+          </a:p>
+          <a:p>
+            <a:pPr marL="171450" indent="-171450">
+              <a:buFont typeface="Arial" panose="020B0604020202020204" pitchFamily="34" charset="0"/>
+              <a:buChar char="•"/>
+            </a:pPr>
+            <a:r>
+              <a:rPr lang="en-US" sz="1200" b="0" kern="1200" baseline="0" dirty="0" smtClean="0">
+                <a:solidFill>
+                  <a:schemeClr val="tx1"/>
+                </a:solidFill>
+                <a:effectLst/>
+                <a:latin typeface="+mn-lt"/>
+                <a:ea typeface="+mn-ea"/>
+                <a:cs typeface="+mn-cs"/>
+              </a:rPr>
+              <a:t>Things called web tokens that some people say are God's gift to the internet, and other people call a scourge on all mankind</a:t>
             </a:r>
             <a:endParaRPr lang="en-US" sz="1200" b="0" kern="1200" baseline="0" dirty="0" smtClean="0">
               <a:solidFill>
@@ -4139,7 +4150,31 @@
                 <a:ea typeface="+mn-ea"/>
                 <a:cs typeface="+mn-cs"/>
               </a:rPr>
-              <a:t>And since the password itself is never sent over the wire, and hashes aren’t reversible like Base64 encoding is, you can safely use Digest </a:t>
+              <a:t>And since the password itself is never sent over the wire, </a:t>
+            </a:r>
+            <a:r>
+              <a:rPr lang="en-US" sz="1200" kern="1200" dirty="0" smtClean="0">
+                <a:solidFill>
+                  <a:schemeClr val="tx1"/>
+                </a:solidFill>
+                <a:effectLst/>
+                <a:latin typeface="+mn-lt"/>
+                <a:ea typeface="+mn-ea"/>
+                <a:cs typeface="+mn-cs"/>
+              </a:rPr>
+              <a:t>you </a:t>
+            </a:r>
+            <a:r>
+              <a:rPr lang="en-US" sz="1200" kern="1200" dirty="0" smtClean="0">
+                <a:solidFill>
+                  <a:schemeClr val="tx1"/>
+                </a:solidFill>
+                <a:effectLst/>
+                <a:latin typeface="+mn-lt"/>
+                <a:ea typeface="+mn-ea"/>
+                <a:cs typeface="+mn-cs"/>
+              </a:rPr>
+              <a:t>can safely use Digest </a:t>
             </a:r>
             <a:r>
               <a:rPr lang="en-US" sz="1200" kern="1200" dirty="0" err="1" smtClean="0">
@@ -4164,6 +4199,57 @@
                 <a:cs typeface="+mn-cs"/>
               </a:rPr>
               <a:t> without a secure connection. </a:t>
+            </a:r>
+            <a:endParaRPr lang="en-US" sz="1200" kern="1200" dirty="0" smtClean="0">
+              <a:solidFill>
+                <a:schemeClr val="tx1"/>
+              </a:solidFill>
+              <a:effectLst/>
+              <a:latin typeface="+mn-lt"/>
+              <a:ea typeface="+mn-ea"/>
+              <a:cs typeface="+mn-cs"/>
+            </a:endParaRPr>
+          </a:p>
+          <a:p>
+            <a:endParaRPr lang="en-US" sz="1200" kern="1200" dirty="0" smtClean="0">
+              <a:solidFill>
+                <a:schemeClr val="tx1"/>
+              </a:solidFill>
+              <a:effectLst/>
+              <a:latin typeface="+mn-lt"/>
+              <a:ea typeface="+mn-ea"/>
+              <a:cs typeface="+mn-cs"/>
+            </a:endParaRPr>
+          </a:p>
+          <a:p>
+            <a:pPr marL="0" marR="0" lvl="0" indent="0" algn="l" defTabSz="914400" rtl="0" eaLnBrk="1" fontAlgn="auto" latinLnBrk="0" hangingPunct="1">
+              <a:lnSpc>
+                <a:spcPct val="100000"/>
+              </a:lnSpc>
+              <a:spcBef>
+                <a:spcPts val="0"/>
+              </a:spcBef>
+              <a:spcAft>
+                <a:spcPts val="0"/>
+              </a:spcAft>
+              <a:buClrTx/>
+              <a:buSzTx/>
+              <a:buFontTx/>
+              <a:buNone/>
+              <a:tabLst/>
+              <a:defRPr/>
+            </a:pPr>
+            <a:r>
+              <a:rPr lang="en-US" sz="1200" kern="1200" dirty="0" smtClean="0">
+                <a:solidFill>
+                  <a:schemeClr val="tx1"/>
+                </a:solidFill>
+                <a:effectLst/>
+                <a:latin typeface="+mn-lt"/>
+                <a:ea typeface="+mn-ea"/>
+                <a:cs typeface="+mn-cs"/>
+              </a:rPr>
+              <a:t>In fact, The purpose of the nonce is to make sure that every request results in a different hash value, so that an attacker can’t brute force attack the hashes to reverse engineer the password.</a:t>
             </a:r>
           </a:p>
           <a:p>
@@ -4346,7 +4432,7 @@
                 <a:ea typeface="+mn-ea"/>
                 <a:cs typeface="+mn-cs"/>
               </a:rPr>
-              <a:t>The use of any one-way encryption method, such as salting and hashing passwords according to modern best practices, will prevent you from using Digest Authentication.</a:t>
+              <a:t>But the whole point of modern password security is to make this impossible! The use of any one-way encryption method, such as salting and hashing passwords, will prevent you from using Digest Authentication.</a:t>
             </a:r>
           </a:p>
           <a:p>
@@ -4834,7 +4920,31 @@
                 <a:ea typeface="+mn-ea"/>
                 <a:cs typeface="+mn-cs"/>
               </a:rPr>
-              <a:t>And since API Keys are generally unique, if an API Key does get compromised, the attacker can only use it to access </a:t>
+              <a:t>And since API Keys are generally </a:t>
+            </a:r>
+            <a:r>
+              <a:rPr lang="en-US" sz="1200" kern="1200" dirty="0" smtClean="0">
+                <a:solidFill>
+                  <a:schemeClr val="tx1"/>
+                </a:solidFill>
+                <a:effectLst/>
+                <a:latin typeface="+mn-lt"/>
+                <a:ea typeface="+mn-ea"/>
+                <a:cs typeface="+mn-cs"/>
+              </a:rPr>
+              <a:t>system-assigned, they tend to be unique for each site. If </a:t>
+            </a:r>
+            <a:r>
+              <a:rPr lang="en-US" sz="1200" kern="1200" dirty="0" smtClean="0">
+                <a:solidFill>
+                  <a:schemeClr val="tx1"/>
+                </a:solidFill>
+                <a:effectLst/>
+                <a:latin typeface="+mn-lt"/>
+                <a:ea typeface="+mn-ea"/>
+                <a:cs typeface="+mn-cs"/>
+              </a:rPr>
+              <a:t>an API Key does get compromised, the attacker can only use it to access </a:t>
             </a:r>
             <a:r>
               <a:rPr lang="en-US" sz="1200" i="1" kern="1200" dirty="0" smtClean="0">
@@ -4904,6 +5014,41 @@
             </a:r>
           </a:p>
           <a:p>
+            <a:endParaRPr lang="en-US" sz="1200" kern="1200" dirty="0" smtClean="0">
+              <a:solidFill>
+                <a:schemeClr val="tx1"/>
+              </a:solidFill>
+              <a:effectLst/>
+              <a:latin typeface="+mn-lt"/>
+              <a:ea typeface="+mn-ea"/>
+              <a:cs typeface="+mn-cs"/>
+            </a:endParaRPr>
+          </a:p>
+          <a:p>
+            <a:r>
+              <a:rPr lang="en-US" sz="1200" kern="1200" dirty="0" smtClean="0">
+                <a:solidFill>
+                  <a:schemeClr val="tx1"/>
+                </a:solidFill>
+                <a:effectLst/>
+                <a:latin typeface="+mn-lt"/>
+                <a:ea typeface="+mn-ea"/>
+                <a:cs typeface="+mn-cs"/>
+              </a:rPr>
+              <a:t>There are two different ways</a:t>
+            </a:r>
+            <a:r>
+              <a:rPr lang="en-US" sz="1200" kern="1200" baseline="0" dirty="0" smtClean="0">
+                <a:solidFill>
+                  <a:schemeClr val="tx1"/>
+                </a:solidFill>
+                <a:effectLst/>
+                <a:latin typeface="+mn-lt"/>
+                <a:ea typeface="+mn-ea"/>
+                <a:cs typeface="+mn-cs"/>
+              </a:rPr>
+              <a:t> to use API keys for authentication…</a:t>
+            </a:r>
             <a:endParaRPr lang="en-US" sz="1200" kern="1200" dirty="0">
               <a:solidFill>
                 <a:schemeClr val="tx1"/>
@@ -4996,7 +5141,88 @@
           <a:bodyPr/>
           <a:lstStyle/>
           <a:p>
-            <a:pPr lvl="0"/>
+            <a:r>
+              <a:rPr lang="en-US" sz="1200" kern="1200" dirty="0" smtClean="0">
+                <a:solidFill>
+                  <a:schemeClr val="tx1"/>
+                </a:solidFill>
+                <a:effectLst/>
+                <a:latin typeface="+mn-lt"/>
+                <a:ea typeface="+mn-ea"/>
+                <a:cs typeface="+mn-cs"/>
+              </a:rPr>
+              <a:t>The simplest approach is </a:t>
+            </a:r>
+            <a:r>
+              <a:rPr lang="en-US" sz="1200" kern="1200" dirty="0" smtClean="0">
+                <a:solidFill>
+                  <a:schemeClr val="tx1"/>
+                </a:solidFill>
+                <a:effectLst/>
+                <a:latin typeface="+mn-lt"/>
+                <a:ea typeface="+mn-ea"/>
+                <a:cs typeface="+mn-cs"/>
+              </a:rPr>
+              <a:t>to treat the key like a password</a:t>
+            </a:r>
+            <a:r>
+              <a:rPr lang="en-US" sz="1200" kern="1200" baseline="0" dirty="0" smtClean="0">
+                <a:solidFill>
+                  <a:schemeClr val="tx1"/>
+                </a:solidFill>
+                <a:effectLst/>
+                <a:latin typeface="+mn-lt"/>
+                <a:ea typeface="+mn-ea"/>
+                <a:cs typeface="+mn-cs"/>
+              </a:rPr>
+              <a:t> and pass it over the wire with every request. </a:t>
+            </a:r>
+            <a:endParaRPr lang="en-US" sz="1200" kern="1200" baseline="0" dirty="0" smtClean="0">
+              <a:solidFill>
+                <a:schemeClr val="tx1"/>
+              </a:solidFill>
+              <a:effectLst/>
+              <a:latin typeface="+mn-lt"/>
+              <a:ea typeface="+mn-ea"/>
+              <a:cs typeface="+mn-cs"/>
+            </a:endParaRPr>
+          </a:p>
+          <a:p>
+            <a:endParaRPr lang="en-US" sz="1200" kern="1200" baseline="0" dirty="0" smtClean="0">
+              <a:solidFill>
+                <a:schemeClr val="tx1"/>
+              </a:solidFill>
+              <a:effectLst/>
+              <a:latin typeface="+mn-lt"/>
+              <a:ea typeface="+mn-ea"/>
+              <a:cs typeface="+mn-cs"/>
+            </a:endParaRPr>
+          </a:p>
+          <a:p>
+            <a:r>
+              <a:rPr lang="en-US" sz="1200" kern="1200" baseline="0" dirty="0" smtClean="0">
+                <a:solidFill>
+                  <a:schemeClr val="tx1"/>
+                </a:solidFill>
+                <a:effectLst/>
+                <a:latin typeface="+mn-lt"/>
+                <a:ea typeface="+mn-ea"/>
+                <a:cs typeface="+mn-cs"/>
+              </a:rPr>
+              <a:t>This is called a "bearer token" because anyone that has that API Key may use it to authenticate as a specific </a:t>
+            </a:r>
+            <a:r>
+              <a:rPr lang="en-US" sz="1200" kern="1200" baseline="0" dirty="0" smtClean="0">
+                <a:solidFill>
+                  <a:schemeClr val="tx1"/>
+                </a:solidFill>
+                <a:effectLst/>
+                <a:latin typeface="+mn-lt"/>
+                <a:ea typeface="+mn-ea"/>
+                <a:cs typeface="+mn-cs"/>
+              </a:rPr>
+              <a:t>user; there's no additional security.</a:t>
+            </a:r>
             <a:endParaRPr lang="en-US" sz="1200" kern="1200" dirty="0" smtClean="0">
               <a:solidFill>
                 <a:schemeClr val="tx1"/>
@@ -5008,7 +5234,79 @@
             </a:endParaRPr>
           </a:p>
           <a:p>
-            <a:endParaRPr lang="en-US" dirty="0"/>
+            <a:endParaRPr lang="en-US" sz="1200" kern="1200" baseline="0" dirty="0" smtClean="0">
+              <a:solidFill>
+                <a:schemeClr val="tx1"/>
+              </a:solidFill>
+              <a:effectLst/>
+              <a:latin typeface="+mn-lt"/>
+              <a:ea typeface="+mn-ea"/>
+              <a:cs typeface="+mn-cs"/>
+            </a:endParaRPr>
+          </a:p>
+          <a:p>
+            <a:r>
+              <a:rPr lang="en-US" sz="1200" kern="1200" baseline="0" dirty="0" smtClean="0">
+                <a:solidFill>
+                  <a:schemeClr val="tx1"/>
+                </a:solidFill>
+                <a:effectLst/>
+                <a:latin typeface="+mn-lt"/>
+                <a:ea typeface="+mn-ea"/>
+                <a:cs typeface="+mn-cs"/>
+              </a:rPr>
+              <a:t>And since you're passing the raw account credential over the wire, you </a:t>
+            </a:r>
+            <a:r>
+              <a:rPr lang="en-US" sz="1200" b="1" kern="1200" baseline="0" dirty="0" smtClean="0">
+                <a:solidFill>
+                  <a:schemeClr val="tx1"/>
+                </a:solidFill>
+                <a:effectLst/>
+                <a:latin typeface="+mn-lt"/>
+                <a:ea typeface="+mn-ea"/>
+                <a:cs typeface="+mn-cs"/>
+              </a:rPr>
+              <a:t>MUST use TLS</a:t>
+            </a:r>
+            <a:r>
+              <a:rPr lang="en-US" sz="1200" kern="1200" baseline="0" dirty="0" smtClean="0">
+                <a:solidFill>
+                  <a:schemeClr val="tx1"/>
+                </a:solidFill>
+                <a:effectLst/>
+                <a:latin typeface="+mn-lt"/>
+                <a:ea typeface="+mn-ea"/>
+                <a:cs typeface="+mn-cs"/>
+              </a:rPr>
+              <a:t> on all requests </a:t>
+            </a:r>
+            <a:r>
+              <a:rPr lang="en-US" sz="1200" kern="1200" baseline="0" dirty="0" smtClean="0">
+                <a:solidFill>
+                  <a:schemeClr val="tx1"/>
+                </a:solidFill>
+                <a:effectLst/>
+                <a:latin typeface="+mn-lt"/>
+                <a:ea typeface="+mn-ea"/>
+                <a:cs typeface="+mn-cs"/>
+              </a:rPr>
+              <a:t>to keep it secure.</a:t>
+            </a:r>
+          </a:p>
+          <a:p>
+            <a:endParaRPr lang="en-US" sz="1200" kern="1200" baseline="0" dirty="0" smtClean="0">
+              <a:solidFill>
+                <a:schemeClr val="tx1"/>
+              </a:solidFill>
+              <a:effectLst/>
+              <a:latin typeface="+mn-lt"/>
+              <a:ea typeface="+mn-ea"/>
+              <a:cs typeface="+mn-cs"/>
+            </a:endParaRPr>
+          </a:p>
+          <a:p>
+            <a:endParaRPr lang="en-US" dirty="0" smtClean="0"/>
           </a:p>
         </p:txBody>
       </p:sp>
@@ -5038,7 +5336,7 @@
     </p:spTree>
     <p:extLst>
       <p:ext uri="{BB962C8B-B14F-4D97-AF65-F5344CB8AC3E}">
-        <p14:creationId xmlns:p14="http://schemas.microsoft.com/office/powerpoint/2010/main" val="2397978404"/>
+        <p14:creationId xmlns:p14="http://schemas.microsoft.com/office/powerpoint/2010/main" val="1638783605"/>
       </p:ext>
     </p:extLst>
   </p:cSld>
@@ -5102,45 +5400,14 @@
                 <a:ea typeface="+mn-ea"/>
                 <a:cs typeface="+mn-cs"/>
               </a:rPr>
-              <a:t>The simplest approach is essentially a custom implementation of Basic Authentication,</a:t>
-            </a:r>
-            <a:r>
-              <a:rPr lang="en-US" sz="1200" kern="1200" baseline="0" dirty="0" smtClean="0">
-                <a:solidFill>
-                  <a:schemeClr val="tx1"/>
-                </a:solidFill>
-                <a:effectLst/>
-                <a:latin typeface="+mn-lt"/>
-                <a:ea typeface="+mn-ea"/>
-                <a:cs typeface="+mn-cs"/>
-              </a:rPr>
-              <a:t> but instead of passing the username and password over the wire, you pass an API key instead. The server then uses that key to assign identity and perform authentication. </a:t>
-            </a:r>
-          </a:p>
-          <a:p>
-            <a:endParaRPr lang="en-US" sz="1200" kern="1200" baseline="0" dirty="0" smtClean="0">
-              <a:solidFill>
-                <a:schemeClr val="tx1"/>
-              </a:solidFill>
-              <a:effectLst/>
-              <a:latin typeface="+mn-lt"/>
-              <a:ea typeface="+mn-ea"/>
-              <a:cs typeface="+mn-cs"/>
-            </a:endParaRPr>
-          </a:p>
-          <a:p>
-            <a:r>
-              <a:rPr lang="en-US" sz="1200" kern="1200" baseline="0" dirty="0" smtClean="0">
-                <a:solidFill>
-                  <a:schemeClr val="tx1"/>
-                </a:solidFill>
-                <a:effectLst/>
-                <a:latin typeface="+mn-lt"/>
-                <a:ea typeface="+mn-ea"/>
-                <a:cs typeface="+mn-cs"/>
-              </a:rPr>
-              <a:t>This is called a "bearer token" because anyone that has that API Key may use it to authenticate as a specific user.</a:t>
-            </a:r>
+              <a:t>You can pass the API Key in either the querystring or an HTTP header. </a:t>
+            </a:r>
+          </a:p>
+          <a:p>
+            <a:pPr marL="0" indent="0">
+              <a:buFont typeface="Arial" panose="020B0604020202020204" pitchFamily="34" charset="0"/>
+              <a:buNone/>
+            </a:pPr>
             <a:endParaRPr lang="en-US" sz="1200" kern="1200" dirty="0" smtClean="0">
               <a:solidFill>
                 <a:schemeClr val="tx1"/>
@@ -5152,7 +5419,41 @@
             </a:endParaRPr>
           </a:p>
           <a:p>
-            <a:endParaRPr lang="en-US" sz="1200" kern="1200" baseline="0" dirty="0" smtClean="0">
+            <a:pPr marL="0" indent="0">
+              <a:buFont typeface="Arial" panose="020B0604020202020204" pitchFamily="34" charset="0"/>
+              <a:buNone/>
+            </a:pPr>
+            <a:r>
+              <a:rPr lang="en-US" sz="1200" kern="1200" dirty="0" err="1" smtClean="0">
+                <a:solidFill>
+                  <a:schemeClr val="tx1"/>
+                </a:solidFill>
+                <a:effectLst/>
+                <a:latin typeface="+mn-lt"/>
+                <a:ea typeface="+mn-ea"/>
+                <a:cs typeface="+mn-cs"/>
+              </a:rPr>
+              <a:t>Querystring</a:t>
+            </a:r>
+            <a:r>
+              <a:rPr lang="en-US" sz="1200" kern="1200" dirty="0" smtClean="0">
+                <a:solidFill>
+                  <a:schemeClr val="tx1"/>
+                </a:solidFill>
+                <a:effectLst/>
+                <a:latin typeface="+mn-lt"/>
+                <a:ea typeface="+mn-ea"/>
+                <a:cs typeface="+mn-cs"/>
+              </a:rPr>
+              <a:t> really easy to do - ideal for scripting scenarios.</a:t>
+            </a:r>
+          </a:p>
+          <a:p>
+            <a:pPr marL="0" indent="0">
+              <a:buFont typeface="Arial" panose="020B0604020202020204" pitchFamily="34" charset="0"/>
+              <a:buNone/>
+            </a:pPr>
+            <a:endParaRPr lang="en-US" sz="1200" kern="1200" dirty="0" smtClean="0">
               <a:solidFill>
                 <a:schemeClr val="tx1"/>
               </a:solidFill>
@@ -5163,6 +5464,22 @@
             </a:endParaRPr>
           </a:p>
           <a:p>
+            <a:pPr marL="0" indent="0">
+              <a:buFont typeface="Arial" panose="020B0604020202020204" pitchFamily="34" charset="0"/>
+              <a:buNone/>
+            </a:pPr>
+            <a:r>
+              <a:rPr lang="en-US" sz="1200" kern="1200" dirty="0" smtClean="0">
+                <a:solidFill>
+                  <a:schemeClr val="tx1"/>
+                </a:solidFill>
+                <a:effectLst/>
+                <a:latin typeface="+mn-lt"/>
+                <a:ea typeface="+mn-ea"/>
+                <a:cs typeface="+mn-cs"/>
+              </a:rPr>
+              <a:t>Generally</a:t>
+            </a:r>
             <a:r>
               <a:rPr lang="en-US" sz="1200" kern="1200" baseline="0" dirty="0" smtClean="0">
                 <a:solidFill>
@@ -5173,19 +5490,34 @@
                 <a:ea typeface="+mn-ea"/>
                 <a:cs typeface="+mn-cs"/>
               </a:rPr>
-              <a:t>Just like with Basic </a:t>
-            </a:r>
-            <a:r>
-              <a:rPr lang="en-US" sz="1200" kern="1200" baseline="0" dirty="0" err="1" smtClean="0">
-                <a:solidFill>
-                  <a:schemeClr val="tx1"/>
-                </a:solidFill>
-                <a:effectLst/>
-                <a:latin typeface="+mn-lt"/>
-                <a:ea typeface="+mn-ea"/>
-                <a:cs typeface="+mn-cs"/>
-              </a:rPr>
-              <a:t>Auth</a:t>
+              <a:t> headers are better</a:t>
+            </a:r>
+            <a:endParaRPr lang="en-US" sz="1200" kern="1200" dirty="0" smtClean="0">
+              <a:solidFill>
+                <a:schemeClr val="tx1"/>
+              </a:solidFill>
+              <a:effectLst/>
+              <a:latin typeface="+mn-lt"/>
+              <a:ea typeface="+mn-ea"/>
+              <a:cs typeface="+mn-cs"/>
+            </a:endParaRPr>
+          </a:p>
+          <a:p>
+            <a:pPr marL="171450" indent="-171450">
+              <a:buFont typeface="Arial" panose="020B0604020202020204" pitchFamily="34" charset="0"/>
+              <a:buChar char="•"/>
+            </a:pPr>
+            <a:r>
+              <a:rPr lang="en-US" sz="1200" kern="1200" dirty="0" smtClean="0">
+                <a:solidFill>
+                  <a:schemeClr val="tx1"/>
+                </a:solidFill>
+                <a:effectLst/>
+                <a:latin typeface="+mn-lt"/>
+                <a:ea typeface="+mn-ea"/>
+                <a:cs typeface="+mn-cs"/>
+              </a:rPr>
+              <a:t>Header</a:t>
             </a:r>
             <a:r>
               <a:rPr lang="en-US" sz="1200" kern="1200" baseline="0" dirty="0" smtClean="0">
@@ -5197,20 +5529,14 @@
                 <a:ea typeface="+mn-ea"/>
                 <a:cs typeface="+mn-cs"/>
               </a:rPr>
-              <a:t>, the API key is passed in plain text so you </a:t>
-            </a:r>
-            <a:r>
-              <a:rPr lang="en-US" sz="1200" b="1" kern="1200" baseline="0" dirty="0" smtClean="0">
-                <a:solidFill>
-                  <a:schemeClr val="tx1"/>
-                </a:solidFill>
-                <a:effectLst/>
-                <a:latin typeface="+mn-lt"/>
-                <a:ea typeface="+mn-ea"/>
-                <a:cs typeface="+mn-cs"/>
-              </a:rPr>
-              <a:t>MUST use TLS</a:t>
-            </a:r>
+              <a:t> is more secure – not in log files. Wouldn't want plain-text passwords to be stored in unencrypted log files</a:t>
+            </a:r>
+          </a:p>
+          <a:p>
+            <a:pPr marL="171450" indent="-171450">
+              <a:buFont typeface="Arial" panose="020B0604020202020204" pitchFamily="34" charset="0"/>
+              <a:buChar char="•"/>
+            </a:pPr>
             <a:r>
               <a:rPr lang="en-US" sz="1200" kern="1200" baseline="0" dirty="0" smtClean="0">
                 <a:solidFill>
@@ -5221,32 +5547,17 @@
                 <a:ea typeface="+mn-ea"/>
                 <a:cs typeface="+mn-cs"/>
               </a:rPr>
-              <a:t> on all requests &amp; only as secure as TLS </a:t>
-            </a:r>
-            <a:r>
-              <a:rPr lang="en-US" sz="1200" kern="1200" baseline="0" dirty="0" err="1" smtClean="0">
-                <a:solidFill>
-                  <a:schemeClr val="tx1"/>
-                </a:solidFill>
-                <a:effectLst/>
-                <a:latin typeface="+mn-lt"/>
-                <a:ea typeface="+mn-ea"/>
-                <a:cs typeface="+mn-cs"/>
-              </a:rPr>
-              <a:t>impl</a:t>
-            </a:r>
-            <a:r>
-              <a:rPr lang="en-US" sz="1200" kern="1200" baseline="0" dirty="0" smtClean="0">
-                <a:solidFill>
-                  <a:schemeClr val="tx1"/>
-                </a:solidFill>
-                <a:effectLst/>
-                <a:latin typeface="+mn-lt"/>
-                <a:ea typeface="+mn-ea"/>
-                <a:cs typeface="+mn-cs"/>
-              </a:rPr>
-              <a:t>.</a:t>
-            </a:r>
+              <a:t>Header can’t be leaked via copy/pasting a URL out of Fiddler or the browser's URL bar.</a:t>
+            </a:r>
+            <a:endParaRPr lang="en-US" sz="1200" kern="1200" dirty="0" smtClean="0">
+              <a:solidFill>
+                <a:schemeClr val="tx1"/>
+              </a:solidFill>
+              <a:effectLst/>
+              <a:latin typeface="+mn-lt"/>
+              <a:ea typeface="+mn-ea"/>
+              <a:cs typeface="+mn-cs"/>
+            </a:endParaRPr>
           </a:p>
           <a:p>
             <a:endParaRPr lang="en-US" dirty="0" smtClean="0"/>
@@ -5279,7 +5590,7 @@
     </p:spTree>
     <p:extLst>
       <p:ext uri="{BB962C8B-B14F-4D97-AF65-F5344CB8AC3E}">
-        <p14:creationId xmlns:p14="http://schemas.microsoft.com/office/powerpoint/2010/main" val="1638783605"/>
+        <p14:creationId xmlns:p14="http://schemas.microsoft.com/office/powerpoint/2010/main" val="455136538"/>
       </p:ext>
     </p:extLst>
   </p:cSld>
@@ -5343,14 +5654,68 @@
                 <a:ea typeface="+mn-ea"/>
                 <a:cs typeface="+mn-cs"/>
               </a:rPr>
-              <a:t>You can pass the API Key in either the querystring or an HTTP header. </a:t>
-            </a:r>
-          </a:p>
-          <a:p>
-            <a:pPr marL="0" indent="0">
-              <a:buFont typeface="Arial" panose="020B0604020202020204" pitchFamily="34" charset="0"/>
-              <a:buNone/>
-            </a:pPr>
+              <a:t>Using API Keys as bearer tokens is very easy, but there is one significant trade-off you need to think about. You can </a:t>
+            </a:r>
+            <a:r>
+              <a:rPr lang="en-US" sz="1200" i="1" kern="1200" dirty="0" smtClean="0">
+                <a:solidFill>
+                  <a:schemeClr val="tx1"/>
+                </a:solidFill>
+                <a:effectLst/>
+                <a:latin typeface="+mn-lt"/>
+                <a:ea typeface="+mn-ea"/>
+                <a:cs typeface="+mn-cs"/>
+              </a:rPr>
+              <a:t>either </a:t>
+            </a:r>
+            <a:r>
+              <a:rPr lang="en-US" sz="1200" i="0" kern="1200" dirty="0" smtClean="0">
+                <a:solidFill>
+                  <a:schemeClr val="tx1"/>
+                </a:solidFill>
+                <a:effectLst/>
+                <a:latin typeface="+mn-lt"/>
+                <a:ea typeface="+mn-ea"/>
+                <a:cs typeface="+mn-cs"/>
+              </a:rPr>
+              <a:t>have secure storage</a:t>
+            </a:r>
+            <a:r>
+              <a:rPr lang="en-US" sz="1200" i="0" kern="1200" baseline="0" dirty="0" smtClean="0">
+                <a:solidFill>
+                  <a:schemeClr val="tx1"/>
+                </a:solidFill>
+                <a:effectLst/>
+                <a:latin typeface="+mn-lt"/>
+                <a:ea typeface="+mn-ea"/>
+                <a:cs typeface="+mn-cs"/>
+              </a:rPr>
+              <a:t> of API Keys </a:t>
+            </a:r>
+            <a:r>
+              <a:rPr lang="en-US" sz="1200" i="1" kern="1200" baseline="0" dirty="0" smtClean="0">
+                <a:solidFill>
+                  <a:schemeClr val="tx1"/>
+                </a:solidFill>
+                <a:effectLst/>
+                <a:latin typeface="+mn-lt"/>
+                <a:ea typeface="+mn-ea"/>
+                <a:cs typeface="+mn-cs"/>
+              </a:rPr>
+              <a:t>or </a:t>
+            </a:r>
+            <a:r>
+              <a:rPr lang="en-US" sz="1200" i="0" kern="1200" baseline="0" dirty="0" smtClean="0">
+                <a:solidFill>
+                  <a:schemeClr val="tx1"/>
+                </a:solidFill>
+                <a:effectLst/>
+                <a:latin typeface="+mn-lt"/>
+                <a:ea typeface="+mn-ea"/>
+                <a:cs typeface="+mn-cs"/>
+              </a:rPr>
+              <a:t>the ability to show users a list of their keys. Not both.</a:t>
+            </a:r>
             <a:endParaRPr lang="en-US" sz="1200" kern="1200" dirty="0" smtClean="0">
               <a:solidFill>
                 <a:schemeClr val="tx1"/>
@@ -5362,40 +5727,6 @@
             </a:endParaRPr>
           </a:p>
           <a:p>
-            <a:pPr marL="0" indent="0">
-              <a:buFont typeface="Arial" panose="020B0604020202020204" pitchFamily="34" charset="0"/>
-              <a:buNone/>
-            </a:pPr>
-            <a:r>
-              <a:rPr lang="en-US" sz="1200" kern="1200" dirty="0" err="1" smtClean="0">
-                <a:solidFill>
-                  <a:schemeClr val="tx1"/>
-                </a:solidFill>
-                <a:effectLst/>
-                <a:latin typeface="+mn-lt"/>
-                <a:ea typeface="+mn-ea"/>
-                <a:cs typeface="+mn-cs"/>
-              </a:rPr>
-              <a:t>Querystring</a:t>
-            </a:r>
-            <a:r>
-              <a:rPr lang="en-US" sz="1200" kern="1200" dirty="0" smtClean="0">
-                <a:solidFill>
-                  <a:schemeClr val="tx1"/>
-                </a:solidFill>
-                <a:effectLst/>
-                <a:latin typeface="+mn-lt"/>
-                <a:ea typeface="+mn-ea"/>
-                <a:cs typeface="+mn-cs"/>
-              </a:rPr>
-              <a:t> really easy to do - ideal for scripting scenarios.</a:t>
-            </a:r>
-          </a:p>
-          <a:p>
-            <a:pPr marL="0" indent="0">
-              <a:buFont typeface="Arial" panose="020B0604020202020204" pitchFamily="34" charset="0"/>
-              <a:buNone/>
-            </a:pPr>
             <a:endParaRPr lang="en-US" sz="1200" kern="1200" dirty="0" smtClean="0">
               <a:solidFill>
                 <a:schemeClr val="tx1"/>
@@ -5407,34 +5738,20 @@
             </a:endParaRPr>
           </a:p>
           <a:p>
-            <a:pPr marL="0" indent="0">
-              <a:buFont typeface="Arial" panose="020B0604020202020204" pitchFamily="34" charset="0"/>
-              <a:buNone/>
-            </a:pPr>
-            <a:r>
-              <a:rPr lang="en-US" sz="1200" kern="1200" dirty="0" smtClean="0">
-                <a:solidFill>
-                  <a:schemeClr val="tx1"/>
-                </a:solidFill>
-                <a:effectLst/>
-                <a:latin typeface="+mn-lt"/>
-                <a:ea typeface="+mn-ea"/>
-                <a:cs typeface="+mn-cs"/>
-              </a:rPr>
-              <a:t>Generally</a:t>
-            </a:r>
-            <a:r>
-              <a:rPr lang="en-US" sz="1200" kern="1200" baseline="0" dirty="0" smtClean="0">
-                <a:solidFill>
-                  <a:schemeClr val="tx1"/>
-                </a:solidFill>
-                <a:effectLst/>
-                <a:latin typeface="+mn-lt"/>
-                <a:ea typeface="+mn-ea"/>
-                <a:cs typeface="+mn-cs"/>
-              </a:rPr>
-              <a:t> headers are better</a:t>
-            </a:r>
+            <a:r>
+              <a:rPr lang="en-US" sz="1200" kern="1200" dirty="0" smtClean="0">
+                <a:solidFill>
+                  <a:schemeClr val="tx1"/>
+                </a:solidFill>
+                <a:effectLst/>
+                <a:latin typeface="+mn-lt"/>
+                <a:ea typeface="+mn-ea"/>
+                <a:cs typeface="+mn-cs"/>
+              </a:rPr>
+              <a:t>Since API Keys are basically account passwords, you should consider salting and hashing them when you store them in the database. If you store them as text, and someone were to get access to your database, they would gain access to everything they need to impersonate every user in your system. </a:t>
+            </a:r>
+          </a:p>
+          <a:p>
             <a:endParaRPr lang="en-US" sz="1200" kern="1200" dirty="0" smtClean="0">
               <a:solidFill>
                 <a:schemeClr val="tx1"/>
@@ -5446,52 +5763,44 @@
             </a:endParaRPr>
           </a:p>
           <a:p>
-            <a:pPr marL="171450" indent="-171450">
-              <a:buFont typeface="Arial" panose="020B0604020202020204" pitchFamily="34" charset="0"/>
-              <a:buChar char="•"/>
-            </a:pPr>
-            <a:r>
-              <a:rPr lang="en-US" sz="1200" kern="1200" dirty="0" smtClean="0">
-                <a:solidFill>
-                  <a:schemeClr val="tx1"/>
-                </a:solidFill>
-                <a:effectLst/>
-                <a:latin typeface="+mn-lt"/>
-                <a:ea typeface="+mn-ea"/>
-                <a:cs typeface="+mn-cs"/>
-              </a:rPr>
-              <a:t>Header</a:t>
-            </a:r>
-            <a:r>
-              <a:rPr lang="en-US" sz="1200" kern="1200" baseline="0" dirty="0" smtClean="0">
-                <a:solidFill>
-                  <a:schemeClr val="tx1"/>
-                </a:solidFill>
-                <a:effectLst/>
-                <a:latin typeface="+mn-lt"/>
-                <a:ea typeface="+mn-ea"/>
-                <a:cs typeface="+mn-cs"/>
-              </a:rPr>
-              <a:t> is more secure – not in log files. Wouldn't want plain-text passwords to be stored in unencrypted log files</a:t>
-            </a:r>
-          </a:p>
-          <a:p>
-            <a:pPr marL="171450" indent="-171450">
-              <a:buFont typeface="Arial" panose="020B0604020202020204" pitchFamily="34" charset="0"/>
-              <a:buChar char="•"/>
-            </a:pPr>
-            <a:r>
-              <a:rPr lang="en-US" sz="1200" kern="1200" baseline="0" dirty="0" smtClean="0">
-                <a:solidFill>
-                  <a:schemeClr val="tx1"/>
-                </a:solidFill>
-                <a:effectLst/>
-                <a:latin typeface="+mn-lt"/>
-                <a:ea typeface="+mn-ea"/>
-                <a:cs typeface="+mn-cs"/>
-              </a:rPr>
-              <a:t>Header can’t be leaked via copy/pasting a URL out of Fiddler or the browser's URL bar.</a:t>
-            </a:r>
+            <a:r>
+              <a:rPr lang="en-US" sz="1200" kern="1200" dirty="0" smtClean="0">
+                <a:solidFill>
+                  <a:schemeClr val="tx1"/>
+                </a:solidFill>
+                <a:effectLst/>
+                <a:latin typeface="+mn-lt"/>
+                <a:ea typeface="+mn-ea"/>
+                <a:cs typeface="+mn-cs"/>
+              </a:rPr>
+              <a:t>But if you salt and hash the API Keys when you store them, it will prevent you from showing a user a list of their API Keys. That’s kind of the whole point; you want your system to be able to </a:t>
+            </a:r>
+            <a:r>
+              <a:rPr lang="en-US" sz="1200" i="1" kern="1200" dirty="0" smtClean="0">
+                <a:solidFill>
+                  <a:schemeClr val="tx1"/>
+                </a:solidFill>
+                <a:effectLst/>
+                <a:latin typeface="+mn-lt"/>
+                <a:ea typeface="+mn-ea"/>
+                <a:cs typeface="+mn-cs"/>
+              </a:rPr>
+              <a:t>verify </a:t>
+            </a:r>
+            <a:r>
+              <a:rPr lang="en-US" sz="1200" kern="1200" dirty="0" smtClean="0">
+                <a:solidFill>
+                  <a:schemeClr val="tx1"/>
+                </a:solidFill>
+                <a:effectLst/>
+                <a:latin typeface="+mn-lt"/>
+                <a:ea typeface="+mn-ea"/>
+                <a:cs typeface="+mn-cs"/>
+              </a:rPr>
+              <a:t>a bearer token API Key, but not decrypt it to plain text, just like with passwords.</a:t>
+            </a:r>
+          </a:p>
+          <a:p>
             <a:endParaRPr lang="en-US" sz="1200" kern="1200" dirty="0" smtClean="0">
               <a:solidFill>
                 <a:schemeClr val="tx1"/>
@@ -5503,6 +5812,44 @@
             </a:endParaRPr>
           </a:p>
           <a:p>
+            <a:r>
+              <a:rPr lang="en-US" sz="1200" kern="1200" dirty="0" smtClean="0">
+                <a:solidFill>
+                  <a:schemeClr val="tx1"/>
+                </a:solidFill>
+                <a:effectLst/>
+                <a:latin typeface="+mn-lt"/>
+                <a:ea typeface="+mn-ea"/>
+                <a:cs typeface="+mn-cs"/>
+              </a:rPr>
+              <a:t>If you decide to store these things as plain text, then you should at least implement an expiration policy to limit the vulnerability window if the database </a:t>
+            </a:r>
+            <a:r>
+              <a:rPr lang="en-US" sz="1200" i="1" kern="1200" dirty="0" smtClean="0">
+                <a:solidFill>
+                  <a:schemeClr val="tx1"/>
+                </a:solidFill>
+                <a:effectLst/>
+                <a:latin typeface="+mn-lt"/>
+                <a:ea typeface="+mn-ea"/>
+                <a:cs typeface="+mn-cs"/>
+              </a:rPr>
+              <a:t>is </a:t>
+            </a:r>
+            <a:r>
+              <a:rPr lang="en-US" sz="1200" kern="1200" dirty="0" smtClean="0">
+                <a:solidFill>
+                  <a:schemeClr val="tx1"/>
+                </a:solidFill>
+                <a:effectLst/>
+                <a:latin typeface="+mn-lt"/>
+                <a:ea typeface="+mn-ea"/>
+                <a:cs typeface="+mn-cs"/>
+              </a:rPr>
+              <a:t>compromised.</a:t>
+            </a:r>
+          </a:p>
+          <a:p>
             <a:endParaRPr lang="en-US" dirty="0" smtClean="0"/>
           </a:p>
         </p:txBody>
@@ -5533,7 +5880,7 @@
     </p:spTree>
     <p:extLst>
       <p:ext uri="{BB962C8B-B14F-4D97-AF65-F5344CB8AC3E}">
-        <p14:creationId xmlns:p14="http://schemas.microsoft.com/office/powerpoint/2010/main" val="455136538"/>
+        <p14:creationId xmlns:p14="http://schemas.microsoft.com/office/powerpoint/2010/main" val="2191961611"/>
       </p:ext>
     </p:extLst>
   </p:cSld>
@@ -7289,6 +7636,74 @@
               </a:rPr>
               <a:t>Identity indicator is required so server can look up the API Key that it needs to verify the signature. </a:t>
             </a:r>
+            <a:endParaRPr lang="en-US" sz="1200" b="0" kern="1200" baseline="0" dirty="0" smtClean="0">
+              <a:solidFill>
+                <a:schemeClr val="tx1"/>
+              </a:solidFill>
+              <a:effectLst/>
+              <a:latin typeface="+mn-lt"/>
+              <a:ea typeface="+mn-ea"/>
+              <a:cs typeface="+mn-cs"/>
+            </a:endParaRPr>
+          </a:p>
+          <a:p>
+            <a:pPr marL="0" marR="0" lvl="0" indent="0" algn="l" defTabSz="914400" rtl="0" eaLnBrk="1" fontAlgn="auto" latinLnBrk="0" hangingPunct="1">
+              <a:lnSpc>
+                <a:spcPct val="100000"/>
+              </a:lnSpc>
+              <a:spcBef>
+                <a:spcPts val="0"/>
+              </a:spcBef>
+              <a:spcAft>
+                <a:spcPts val="0"/>
+              </a:spcAft>
+              <a:buClrTx/>
+              <a:buSzTx/>
+              <a:buFont typeface="Arial" panose="020B0604020202020204" pitchFamily="34" charset="0"/>
+              <a:buNone/>
+              <a:tabLst/>
+              <a:defRPr/>
+            </a:pPr>
+            <a:endParaRPr lang="en-US" sz="1200" kern="1200" dirty="0" smtClean="0">
+              <a:solidFill>
+                <a:schemeClr val="tx1"/>
+              </a:solidFill>
+              <a:effectLst/>
+              <a:latin typeface="+mn-lt"/>
+              <a:ea typeface="+mn-ea"/>
+              <a:cs typeface="+mn-cs"/>
+            </a:endParaRPr>
+          </a:p>
+          <a:p>
+            <a:pPr marL="0" marR="0" lvl="0" indent="0" algn="l" defTabSz="914400" rtl="0" eaLnBrk="1" fontAlgn="auto" latinLnBrk="0" hangingPunct="1">
+              <a:lnSpc>
+                <a:spcPct val="100000"/>
+              </a:lnSpc>
+              <a:spcBef>
+                <a:spcPts val="0"/>
+              </a:spcBef>
+              <a:spcAft>
+                <a:spcPts val="0"/>
+              </a:spcAft>
+              <a:buClrTx/>
+              <a:buSzTx/>
+              <a:buFont typeface="Arial" panose="020B0604020202020204" pitchFamily="34" charset="0"/>
+              <a:buNone/>
+              <a:tabLst/>
+              <a:defRPr/>
+            </a:pPr>
+            <a:r>
+              <a:rPr lang="en-US" sz="1200" kern="1200" dirty="0" smtClean="0">
+                <a:solidFill>
+                  <a:schemeClr val="tx1"/>
+                </a:solidFill>
+                <a:effectLst/>
+                <a:latin typeface="+mn-lt"/>
+                <a:ea typeface="+mn-ea"/>
+                <a:cs typeface="+mn-cs"/>
+              </a:rPr>
+              <a:t>This means that if you build an HMAC system you’ll have to choose what to use as the identifier and what to use as the secret value.</a:t>
+            </a:r>
           </a:p>
           <a:p>
             <a:pPr marL="0" lvl="0" indent="0">
@@ -8652,7 +9067,19 @@
                 <a:ea typeface="+mn-ea"/>
                 <a:cs typeface="+mn-cs"/>
               </a:rPr>
-              <a:t>Once those claims are generated, the server cryptographically signs the claims just like we saw with HMAC and creates a token. It gives that token to the browser, and the browser resends the token back to the server with each request. The server then validates the token and then uses the claims as needed, for instance to perform authorization or whatever else is needed.</a:t>
+              <a:t>Once those claims are generated, the server cryptographically signs the claims just like we saw with HMAC and creates a token. It gives that token to the browser, and the browser resends the token back to the server with each request. The server then validates the token and then uses the claims as needed, for instance to perform </a:t>
+            </a:r>
+            <a:r>
+              <a:rPr lang="en-US" sz="1200" kern="1200" dirty="0" smtClean="0">
+                <a:solidFill>
+                  <a:schemeClr val="tx1"/>
+                </a:solidFill>
+                <a:effectLst/>
+                <a:latin typeface="+mn-lt"/>
+                <a:ea typeface="+mn-ea"/>
+                <a:cs typeface="+mn-cs"/>
+              </a:rPr>
+              <a:t>authorization.</a:t>
             </a:r>
             <a:endParaRPr lang="en-US" sz="1200" kern="1200" dirty="0">
               <a:solidFill>
@@ -9697,7 +10124,56 @@
                 <a:ea typeface="+mn-ea"/>
                 <a:cs typeface="+mn-cs"/>
               </a:rPr>
-              <a:t>First is a standard header that typically indicates the type of token and the hashing algorithm being used. In this example we’re using HMAC SHA256, but other options exist.</a:t>
+              <a:t>First is a standard header that typically indicates the type of token and the hashing algorithm being used. In this example we’re using HMAC SHA256, but other options exist</a:t>
+            </a:r>
+            <a:r>
+              <a:rPr lang="en-US" sz="1200" kern="1200" dirty="0" smtClean="0">
+                <a:solidFill>
+                  <a:schemeClr val="tx1"/>
+                </a:solidFill>
+                <a:effectLst/>
+                <a:latin typeface="+mn-lt"/>
+                <a:ea typeface="+mn-ea"/>
+                <a:cs typeface="+mn-cs"/>
+              </a:rPr>
+              <a:t>.</a:t>
+            </a:r>
+          </a:p>
+          <a:p>
+            <a:endParaRPr lang="en-US" sz="1200" kern="1200" dirty="0" smtClean="0">
+              <a:solidFill>
+                <a:schemeClr val="tx1"/>
+              </a:solidFill>
+              <a:effectLst/>
+              <a:latin typeface="+mn-lt"/>
+              <a:ea typeface="+mn-ea"/>
+              <a:cs typeface="+mn-cs"/>
+            </a:endParaRPr>
+          </a:p>
+          <a:p>
+            <a:r>
+              <a:rPr lang="en-US" sz="1200" kern="1200" dirty="0" smtClean="0">
+                <a:solidFill>
+                  <a:schemeClr val="tx1"/>
+                </a:solidFill>
+                <a:effectLst/>
+                <a:latin typeface="+mn-lt"/>
+                <a:ea typeface="+mn-ea"/>
+                <a:cs typeface="+mn-cs"/>
+              </a:rPr>
+              <a:t>In fact, the ability for the client to choose which hashing</a:t>
+            </a:r>
+            <a:r>
+              <a:rPr lang="en-US" sz="1200" kern="1200" baseline="0" dirty="0" smtClean="0">
+                <a:solidFill>
+                  <a:schemeClr val="tx1"/>
+                </a:solidFill>
+                <a:effectLst/>
+                <a:latin typeface="+mn-lt"/>
+                <a:ea typeface="+mn-ea"/>
+                <a:cs typeface="+mn-cs"/>
+              </a:rPr>
+              <a:t> algorithm should be used is a core piece of the JSON Web Token standard. It's also one of the reasons that some security experts don't like JWT, although a discussion of those concerns is out of scope for this talk.</a:t>
             </a:r>
             <a:endParaRPr lang="en-US" sz="1200" kern="1200" dirty="0">
               <a:solidFill>
@@ -10482,7 +10958,31 @@
                 <a:ea typeface="+mn-ea"/>
                 <a:cs typeface="+mn-cs"/>
               </a:rPr>
-              <a:t> is that your JS code can decode the token and access the claims. This is useful if the token contains data that you need for purposes other than API authentication and authorization, such as the user’s preferences or email address or something. The downside is that information stored in </a:t>
+              <a:t> is that your JS code can </a:t>
+            </a:r>
+            <a:r>
+              <a:rPr lang="en-US" sz="1200" kern="1200" dirty="0" smtClean="0">
+                <a:solidFill>
+                  <a:schemeClr val="tx1"/>
+                </a:solidFill>
+                <a:effectLst/>
+                <a:latin typeface="+mn-lt"/>
+                <a:ea typeface="+mn-ea"/>
+                <a:cs typeface="+mn-cs"/>
+              </a:rPr>
+              <a:t>access </a:t>
+            </a:r>
+            <a:r>
+              <a:rPr lang="en-US" sz="1200" kern="1200" dirty="0" smtClean="0">
+                <a:solidFill>
+                  <a:schemeClr val="tx1"/>
+                </a:solidFill>
+                <a:effectLst/>
+                <a:latin typeface="+mn-lt"/>
+                <a:ea typeface="+mn-ea"/>
+                <a:cs typeface="+mn-cs"/>
+              </a:rPr>
+              <a:t>the claims. This is useful if the token contains data that you need for purposes other than API authentication and authorization, such as the user’s preferences or email address or something. The downside is that information stored in </a:t>
             </a:r>
             <a:r>
               <a:rPr lang="en-US" sz="1200" kern="1200" dirty="0" err="1" smtClean="0">
@@ -10627,94 +11127,21 @@
                 <a:ea typeface="+mn-ea"/>
                 <a:cs typeface="+mn-cs"/>
               </a:rPr>
-              <a:t>be used for server-side authentication and authorization and you can’t use the token to make data available to your JS app.</a:t>
-            </a:r>
-          </a:p>
-          <a:p>
-            <a:endParaRPr lang="en-US" sz="1200" kern="1200" smtClean="0">
-              <a:solidFill>
-                <a:schemeClr val="tx1"/>
-              </a:solidFill>
-              <a:effectLst/>
-              <a:latin typeface="+mn-lt"/>
-              <a:ea typeface="+mn-ea"/>
-              <a:cs typeface="+mn-cs"/>
-            </a:endParaRPr>
-          </a:p>
-          <a:p>
-            <a:r>
-              <a:rPr lang="en-US" sz="1200" kern="1200" smtClean="0">
-                <a:solidFill>
-                  <a:schemeClr val="tx1"/>
-                </a:solidFill>
-                <a:effectLst/>
-                <a:latin typeface="+mn-lt"/>
-                <a:ea typeface="+mn-ea"/>
-                <a:cs typeface="+mn-cs"/>
-              </a:rPr>
-              <a:t>If </a:t>
-            </a:r>
-            <a:r>
-              <a:rPr lang="en-US" sz="1200" kern="1200" dirty="0" smtClean="0">
-                <a:solidFill>
-                  <a:schemeClr val="tx1"/>
-                </a:solidFill>
-                <a:effectLst/>
-                <a:latin typeface="+mn-lt"/>
-                <a:ea typeface="+mn-ea"/>
-                <a:cs typeface="+mn-cs"/>
-              </a:rPr>
-              <a:t>you’re writing a </a:t>
-            </a:r>
-            <a:r>
-              <a:rPr lang="en-US" sz="1200" i="1" kern="1200" dirty="0" smtClean="0">
-                <a:solidFill>
-                  <a:schemeClr val="tx1"/>
-                </a:solidFill>
-                <a:effectLst/>
-                <a:latin typeface="+mn-lt"/>
-                <a:ea typeface="+mn-ea"/>
-                <a:cs typeface="+mn-cs"/>
-              </a:rPr>
-              <a:t>server-based </a:t>
-            </a:r>
-            <a:r>
-              <a:rPr lang="en-US" sz="1200" kern="1200" dirty="0" smtClean="0">
-                <a:solidFill>
-                  <a:schemeClr val="tx1"/>
-                </a:solidFill>
-                <a:effectLst/>
-                <a:latin typeface="+mn-lt"/>
-                <a:ea typeface="+mn-ea"/>
-                <a:cs typeface="+mn-cs"/>
-              </a:rPr>
-              <a:t>client, rather than a JS client, then this isn’t an issue. As long as you use TLS to protect the tokens in transit, and as long as the server client is secure, then you could technically get away with putting sensitive data into the claims. But if you’re writing a server-based client then you could probably go ahead and encrypt the claims data themselves, so that even if the token </a:t>
-            </a:r>
-            <a:r>
-              <a:rPr lang="en-US" sz="1200" i="1" kern="1200" dirty="0" smtClean="0">
-                <a:solidFill>
-                  <a:schemeClr val="tx1"/>
-                </a:solidFill>
-                <a:effectLst/>
-                <a:latin typeface="+mn-lt"/>
-                <a:ea typeface="+mn-ea"/>
-                <a:cs typeface="+mn-cs"/>
-              </a:rPr>
-              <a:t>does </a:t>
-            </a:r>
-            <a:r>
-              <a:rPr lang="en-US" sz="1200" kern="1200" dirty="0" smtClean="0">
-                <a:solidFill>
-                  <a:schemeClr val="tx1"/>
-                </a:solidFill>
-                <a:effectLst/>
-                <a:latin typeface="+mn-lt"/>
-                <a:ea typeface="+mn-ea"/>
-                <a:cs typeface="+mn-cs"/>
-              </a:rPr>
-              <a:t>get captured in some way, the sensitive data itself would remain secure.</a:t>
-            </a:r>
-            <a:endParaRPr lang="en-US" sz="1200" kern="1200" dirty="0">
+              <a:t>be used for server-side authentication and authorization and you can’t use the token to make data available to your JS app</a:t>
+            </a:r>
+            <a:r>
+              <a:rPr lang="en-US" sz="1200" kern="1200" dirty="0" smtClean="0">
+                <a:solidFill>
+                  <a:schemeClr val="tx1"/>
+                </a:solidFill>
+                <a:effectLst/>
+                <a:latin typeface="+mn-lt"/>
+                <a:ea typeface="+mn-ea"/>
+                <a:cs typeface="+mn-cs"/>
+              </a:rPr>
+              <a:t>.</a:t>
+            </a:r>
+            <a:endParaRPr lang="en-US" sz="1200" kern="1200" dirty="0" smtClean="0">
               <a:solidFill>
                 <a:schemeClr val="tx1"/>
               </a:solidFill>
@@ -17465,7 +17892,55 @@
                 <a:ea typeface="+mn-ea"/>
                 <a:cs typeface="+mn-cs"/>
               </a:rPr>
-              <a:t>If you’re looking for the simplest possible thing you could do, then using Basic </a:t>
+              <a:t>If </a:t>
+            </a:r>
+            <a:r>
+              <a:rPr lang="en-US" sz="1200" kern="1200" dirty="0" smtClean="0">
+                <a:solidFill>
+                  <a:schemeClr val="tx1"/>
+                </a:solidFill>
+                <a:effectLst/>
+                <a:latin typeface="+mn-lt"/>
+                <a:ea typeface="+mn-ea"/>
+                <a:cs typeface="+mn-cs"/>
+              </a:rPr>
+              <a:t>you're</a:t>
+            </a:r>
+            <a:r>
+              <a:rPr lang="en-US" sz="1200" kern="1200" baseline="0" dirty="0" smtClean="0">
+                <a:solidFill>
+                  <a:schemeClr val="tx1"/>
+                </a:solidFill>
+                <a:effectLst/>
+                <a:latin typeface="+mn-lt"/>
+                <a:ea typeface="+mn-ea"/>
+                <a:cs typeface="+mn-cs"/>
+              </a:rPr>
+              <a:t> </a:t>
+            </a:r>
+            <a:r>
+              <a:rPr lang="en-US" sz="1200" kern="1200" dirty="0" smtClean="0">
+                <a:solidFill>
+                  <a:schemeClr val="tx1"/>
+                </a:solidFill>
+                <a:effectLst/>
+                <a:latin typeface="+mn-lt"/>
+                <a:ea typeface="+mn-ea"/>
+                <a:cs typeface="+mn-cs"/>
+              </a:rPr>
+              <a:t>authenticating server-to-server</a:t>
+            </a:r>
+            <a:r>
+              <a:rPr lang="en-US" sz="1200" kern="1200" baseline="0" dirty="0" smtClean="0">
+                <a:solidFill>
+                  <a:schemeClr val="tx1"/>
+                </a:solidFill>
+                <a:effectLst/>
+                <a:latin typeface="+mn-lt"/>
+                <a:ea typeface="+mn-ea"/>
+                <a:cs typeface="+mn-cs"/>
+              </a:rPr>
+              <a:t> API calls against a standard user database such as </a:t>
             </a:r>
             <a:r>
               <a:rPr lang="en-US" sz="1200" kern="1200" dirty="0" err="1" smtClean="0">
@@ -17477,6 +17952,30 @@
                 <a:ea typeface="+mn-ea"/>
                 <a:cs typeface="+mn-cs"/>
               </a:rPr>
+              <a:t>ActiveDirectory</a:t>
+            </a:r>
+            <a:r>
+              <a:rPr lang="en-US" sz="1200" kern="1200" dirty="0" smtClean="0">
+                <a:solidFill>
+                  <a:schemeClr val="tx1"/>
+                </a:solidFill>
+                <a:effectLst/>
+                <a:latin typeface="+mn-lt"/>
+                <a:ea typeface="+mn-ea"/>
+                <a:cs typeface="+mn-cs"/>
+              </a:rPr>
+              <a:t>, then Basic </a:t>
+            </a:r>
+            <a:r>
+              <a:rPr lang="en-US" sz="1200" kern="1200" dirty="0" err="1" smtClean="0">
+                <a:solidFill>
+                  <a:schemeClr val="tx1"/>
+                </a:solidFill>
+                <a:effectLst/>
+                <a:latin typeface="+mn-lt"/>
+                <a:ea typeface="+mn-ea"/>
+                <a:cs typeface="+mn-cs"/>
+              </a:rPr>
               <a:t>Auth</a:t>
             </a:r>
             <a:r>
@@ -17489,32 +17988,17 @@
                 <a:ea typeface="+mn-ea"/>
                 <a:cs typeface="+mn-cs"/>
               </a:rPr>
-              <a:t> to authenticate against a standard platform such as </a:t>
-            </a:r>
-            <a:r>
-              <a:rPr lang="en-US" sz="1200" kern="1200" dirty="0" err="1" smtClean="0">
-                <a:solidFill>
-                  <a:schemeClr val="tx1"/>
-                </a:solidFill>
-                <a:effectLst/>
-                <a:latin typeface="+mn-lt"/>
-                <a:ea typeface="+mn-ea"/>
-                <a:cs typeface="+mn-cs"/>
-              </a:rPr>
-              <a:t>ActiveDirectory</a:t>
-            </a:r>
-            <a:r>
-              <a:rPr lang="en-US" sz="1200" kern="1200" dirty="0" smtClean="0">
-                <a:solidFill>
-                  <a:schemeClr val="tx1"/>
-                </a:solidFill>
-                <a:effectLst/>
-                <a:latin typeface="+mn-lt"/>
-                <a:ea typeface="+mn-ea"/>
-                <a:cs typeface="+mn-cs"/>
-              </a:rPr>
-              <a:t> is worth a shot. You give up some flexibility, but will need to write very little code to make it work.</a:t>
-            </a:r>
+              <a:t> is worth considering. </a:t>
+            </a:r>
+            <a:endParaRPr lang="en-US" sz="1200" kern="1200" dirty="0" smtClean="0">
+              <a:solidFill>
+                <a:schemeClr val="tx1"/>
+              </a:solidFill>
+              <a:effectLst/>
+              <a:latin typeface="+mn-lt"/>
+              <a:ea typeface="+mn-ea"/>
+              <a:cs typeface="+mn-cs"/>
+            </a:endParaRPr>
           </a:p>
           <a:p>
             <a:endParaRPr lang="en-US" sz="1200" kern="1200" dirty="0" smtClean="0">
@@ -19283,8 +19767,41 @@
                 <a:ea typeface="+mn-ea"/>
                 <a:cs typeface="+mn-cs"/>
               </a:rPr>
-              <a:t> is process through which we securely associate identity w/ request (is it really Alice?)</a:t>
-            </a:r>
+              <a:t> is process through which we securely associate identity w/ request (is it really Alice</a:t>
+            </a:r>
+            <a:r>
+              <a:rPr lang="en-US" sz="1200" kern="1200" dirty="0" smtClean="0">
+                <a:solidFill>
+                  <a:schemeClr val="tx1"/>
+                </a:solidFill>
+                <a:effectLst/>
+                <a:latin typeface="+mn-lt"/>
+                <a:ea typeface="+mn-ea"/>
+                <a:cs typeface="+mn-cs"/>
+              </a:rPr>
+              <a:t>?</a:t>
+            </a:r>
+            <a:r>
+              <a:rPr lang="en-US" sz="1200" kern="1200" baseline="0" dirty="0" smtClean="0">
+                <a:solidFill>
+                  <a:schemeClr val="tx1"/>
+                </a:solidFill>
+                <a:effectLst/>
+                <a:latin typeface="+mn-lt"/>
+                <a:ea typeface="+mn-ea"/>
+                <a:cs typeface="+mn-cs"/>
+              </a:rPr>
+              <a:t> Someone working on her behalf?)</a:t>
+            </a:r>
+            <a:endParaRPr lang="en-US" sz="1200" kern="1200" dirty="0" smtClean="0">
+              <a:solidFill>
+                <a:schemeClr val="tx1"/>
+              </a:solidFill>
+              <a:effectLst/>
+              <a:latin typeface="+mn-lt"/>
+              <a:ea typeface="+mn-ea"/>
+              <a:cs typeface="+mn-cs"/>
+            </a:endParaRPr>
           </a:p>
           <a:p>
             <a:r>
@@ -19701,32 +20218,103 @@
                 <a:ea typeface="+mn-ea"/>
                 <a:cs typeface="+mn-cs"/>
               </a:rPr>
-              <a:t> thing, and that’s my website. From there you can get to my </a:t>
-            </a:r>
-            <a:r>
-              <a:rPr lang="en-US" sz="1200" kern="1200" dirty="0" err="1" smtClean="0">
-                <a:solidFill>
-                  <a:schemeClr val="tx1"/>
-                </a:solidFill>
-                <a:effectLst/>
-                <a:latin typeface="+mn-lt"/>
-                <a:ea typeface="+mn-ea"/>
-                <a:cs typeface="+mn-cs"/>
-              </a:rPr>
-              <a:t>Github</a:t>
-            </a:r>
-            <a:r>
-              <a:rPr lang="en-US" sz="1200" kern="1200" dirty="0" smtClean="0">
-                <a:solidFill>
-                  <a:schemeClr val="tx1"/>
-                </a:solidFill>
-                <a:effectLst/>
-                <a:latin typeface="+mn-lt"/>
-                <a:ea typeface="+mn-ea"/>
-                <a:cs typeface="+mn-cs"/>
-              </a:rPr>
-              <a:t> where these slides are kept and you can also get to my email, my Twitter, my LinkedIn, etc.</a:t>
-            </a:r>
+              <a:t> thing, and that’s my </a:t>
+            </a:r>
+            <a:r>
+              <a:rPr lang="en-US" sz="1200" kern="1200" dirty="0" smtClean="0">
+                <a:solidFill>
+                  <a:schemeClr val="tx1"/>
+                </a:solidFill>
+                <a:effectLst/>
+                <a:latin typeface="+mn-lt"/>
+                <a:ea typeface="+mn-ea"/>
+                <a:cs typeface="+mn-cs"/>
+              </a:rPr>
+              <a:t>GitHub</a:t>
+            </a:r>
+            <a:r>
+              <a:rPr lang="en-US" sz="1200" kern="1200" baseline="0" dirty="0" smtClean="0">
+                <a:solidFill>
+                  <a:schemeClr val="tx1"/>
+                </a:solidFill>
+                <a:effectLst/>
+                <a:latin typeface="+mn-lt"/>
+                <a:ea typeface="+mn-ea"/>
+                <a:cs typeface="+mn-cs"/>
+              </a:rPr>
+              <a:t> link</a:t>
+            </a:r>
+            <a:r>
+              <a:rPr lang="en-US" sz="1200" kern="1200" dirty="0" smtClean="0">
+                <a:solidFill>
+                  <a:schemeClr val="tx1"/>
+                </a:solidFill>
+                <a:effectLst/>
+                <a:latin typeface="+mn-lt"/>
+                <a:ea typeface="+mn-ea"/>
+                <a:cs typeface="+mn-cs"/>
+              </a:rPr>
+              <a:t>. That's where these </a:t>
+            </a:r>
+            <a:r>
+              <a:rPr lang="en-US" sz="1200" kern="1200" dirty="0" smtClean="0">
+                <a:solidFill>
+                  <a:schemeClr val="tx1"/>
+                </a:solidFill>
+                <a:effectLst/>
+                <a:latin typeface="+mn-lt"/>
+                <a:ea typeface="+mn-ea"/>
+                <a:cs typeface="+mn-cs"/>
+              </a:rPr>
+              <a:t>slides are </a:t>
+            </a:r>
+            <a:r>
+              <a:rPr lang="en-US" sz="1200" kern="1200" dirty="0" smtClean="0">
+                <a:solidFill>
+                  <a:schemeClr val="tx1"/>
+                </a:solidFill>
+                <a:effectLst/>
+                <a:latin typeface="+mn-lt"/>
+                <a:ea typeface="+mn-ea"/>
+                <a:cs typeface="+mn-cs"/>
+              </a:rPr>
+              <a:t>kept along</a:t>
+            </a:r>
+            <a:r>
+              <a:rPr lang="en-US" sz="1200" kern="1200" baseline="0" dirty="0" smtClean="0">
+                <a:solidFill>
+                  <a:schemeClr val="tx1"/>
+                </a:solidFill>
+                <a:effectLst/>
+                <a:latin typeface="+mn-lt"/>
+                <a:ea typeface="+mn-ea"/>
+                <a:cs typeface="+mn-cs"/>
+              </a:rPr>
+              <a:t> with all of my speaker notes</a:t>
+            </a:r>
+            <a:r>
+              <a:rPr lang="en-US" sz="1200" kern="1200" baseline="0" smtClean="0">
+                <a:solidFill>
+                  <a:schemeClr val="tx1"/>
+                </a:solidFill>
+                <a:effectLst/>
+                <a:latin typeface="+mn-lt"/>
+                <a:ea typeface="+mn-ea"/>
+                <a:cs typeface="+mn-cs"/>
+              </a:rPr>
+              <a:t>. </a:t>
+            </a:r>
+          </a:p>
+          <a:p>
+            <a:endParaRPr lang="en-US" sz="1200" kern="1200" dirty="0" smtClean="0">
+              <a:solidFill>
+                <a:schemeClr val="tx1"/>
+              </a:solidFill>
+              <a:effectLst/>
+              <a:latin typeface="+mn-lt"/>
+              <a:ea typeface="+mn-ea"/>
+              <a:cs typeface="+mn-cs"/>
+            </a:endParaRPr>
           </a:p>
           <a:p>
             <a:r>
@@ -20154,7 +20742,7 @@
           <a:p>
             <a:fld id="{75AA6396-395E-4ADA-8EE5-F328BC863A04}" type="datetimeFigureOut">
               <a:rPr lang="en-US" smtClean="0"/>
-              <a:t>12/17/2018</a:t>
+              <a:t>12/18/2018</a:t>
             </a:fld>
             <a:endParaRPr lang="en-US"/>
           </a:p>
@@ -20331,7 +20919,7 @@
           <a:p>
             <a:fld id="{75AA6396-395E-4ADA-8EE5-F328BC863A04}" type="datetimeFigureOut">
               <a:rPr lang="en-US" smtClean="0"/>
-              <a:t>12/17/2018</a:t>
+              <a:t>12/18/2018</a:t>
             </a:fld>
             <a:endParaRPr lang="en-US"/>
           </a:p>
@@ -20511,7 +21099,7 @@
           <a:p>
             <a:fld id="{75AA6396-395E-4ADA-8EE5-F328BC863A04}" type="datetimeFigureOut">
               <a:rPr lang="en-US" smtClean="0"/>
-              <a:t>12/17/2018</a:t>
+              <a:t>12/18/2018</a:t>
             </a:fld>
             <a:endParaRPr lang="en-US"/>
           </a:p>
@@ -20731,7 +21319,7 @@
           <a:p>
             <a:fld id="{75AA6396-395E-4ADA-8EE5-F328BC863A04}" type="datetimeFigureOut">
               <a:rPr lang="en-US" smtClean="0"/>
-              <a:t>12/17/2018</a:t>
+              <a:t>12/18/2018</a:t>
             </a:fld>
             <a:endParaRPr lang="en-US"/>
           </a:p>
@@ -20984,7 +21572,7 @@
           <a:p>
             <a:fld id="{75AA6396-395E-4ADA-8EE5-F328BC863A04}" type="datetimeFigureOut">
               <a:rPr lang="en-US" smtClean="0"/>
-              <a:t>12/17/2018</a:t>
+              <a:t>12/18/2018</a:t>
             </a:fld>
             <a:endParaRPr lang="en-US"/>
           </a:p>
@@ -21223,7 +21811,7 @@
           <a:p>
             <a:fld id="{75AA6396-395E-4ADA-8EE5-F328BC863A04}" type="datetimeFigureOut">
               <a:rPr lang="en-US" smtClean="0"/>
-              <a:t>12/17/2018</a:t>
+              <a:t>12/18/2018</a:t>
             </a:fld>
             <a:endParaRPr lang="en-US"/>
           </a:p>
@@ -21597,7 +22185,7 @@
           <a:p>
             <a:fld id="{75AA6396-395E-4ADA-8EE5-F328BC863A04}" type="datetimeFigureOut">
               <a:rPr lang="en-US" smtClean="0"/>
-              <a:t>12/17/2018</a:t>
+              <a:t>12/18/2018</a:t>
             </a:fld>
             <a:endParaRPr lang="en-US"/>
           </a:p>
@@ -21715,7 +22303,7 @@
           <a:p>
             <a:fld id="{75AA6396-395E-4ADA-8EE5-F328BC863A04}" type="datetimeFigureOut">
               <a:rPr lang="en-US" smtClean="0"/>
-              <a:t>12/17/2018</a:t>
+              <a:t>12/18/2018</a:t>
             </a:fld>
             <a:endParaRPr lang="en-US"/>
           </a:p>
@@ -21810,7 +22398,7 @@
           <a:p>
             <a:fld id="{75AA6396-395E-4ADA-8EE5-F328BC863A04}" type="datetimeFigureOut">
               <a:rPr lang="en-US" smtClean="0"/>
-              <a:t>12/17/2018</a:t>
+              <a:t>12/18/2018</a:t>
             </a:fld>
             <a:endParaRPr lang="en-US"/>
           </a:p>
@@ -22087,7 +22675,7 @@
           <a:p>
             <a:fld id="{75AA6396-395E-4ADA-8EE5-F328BC863A04}" type="datetimeFigureOut">
               <a:rPr lang="en-US" smtClean="0"/>
-              <a:t>12/17/2018</a:t>
+              <a:t>12/18/2018</a:t>
             </a:fld>
             <a:endParaRPr lang="en-US"/>
           </a:p>
@@ -22340,7 +22928,7 @@
           <a:p>
             <a:fld id="{75AA6396-395E-4ADA-8EE5-F328BC863A04}" type="datetimeFigureOut">
               <a:rPr lang="en-US" smtClean="0"/>
-              <a:t>12/17/2018</a:t>
+              <a:t>12/18/2018</a:t>
             </a:fld>
             <a:endParaRPr lang="en-US"/>
           </a:p>
@@ -22553,7 +23141,7 @@
           <a:p>
             <a:fld id="{75AA6396-395E-4ADA-8EE5-F328BC863A04}" type="datetimeFigureOut">
               <a:rPr lang="en-US" smtClean="0"/>
-              <a:t>12/17/2018</a:t>
+              <a:t>12/18/2018</a:t>
             </a:fld>
             <a:endParaRPr lang="en-US"/>
           </a:p>
@@ -24969,7 +25557,15 @@
           <a:p>
             <a:r>
               <a:rPr lang="en-US" sz="4800" dirty="0" smtClean="0"/>
-              <a:t>API Keys</a:t>
+              <a:t>API Keys as "</a:t>
+            </a:r>
+            <a:r>
+              <a:rPr lang="en-US" sz="4800" b="1" dirty="0" smtClean="0"/>
+              <a:t>bearer tokens</a:t>
+            </a:r>
+            <a:r>
+              <a:rPr lang="en-US" sz="4800" dirty="0" smtClean="0"/>
+              <a:t>“</a:t>
             </a:r>
             <a:endParaRPr lang="en-US" sz="4800" dirty="0"/>
           </a:p>
@@ -24999,7 +25595,15 @@
           <a:p>
             <a:r>
               <a:rPr lang="en-US" sz="4000" dirty="0" smtClean="0"/>
-              <a:t>Revocable</a:t>
+              <a:t>Pass the key in </a:t>
+            </a:r>
+            <a:r>
+              <a:rPr lang="en-US" sz="4000" b="1" dirty="0" smtClean="0"/>
+              <a:t>plain text</a:t>
+            </a:r>
+            <a:r>
+              <a:rPr lang="en-US" sz="4000" dirty="0" smtClean="0"/>
+              <a:t> with each request</a:t>
             </a:r>
             <a:br>
               <a:rPr lang="en-US" sz="4000" dirty="0" smtClean="0"/>
@@ -25008,162 +25612,18 @@
           </a:p>
           <a:p>
             <a:r>
-              <a:rPr lang="en-US" sz="4000" dirty="0" smtClean="0"/>
-              <a:t>Usually a GUID – hard to brute force</a:t>
-            </a:r>
-            <a:br>
-              <a:rPr lang="en-US" sz="4000" dirty="0" smtClean="0"/>
-            </a:br>
-            <a:endParaRPr lang="en-US" sz="4000" dirty="0"/>
-          </a:p>
-          <a:p>
-            <a:r>
-              <a:rPr lang="en-US" sz="4000" dirty="0" smtClean="0"/>
-              <a:t>2 options: "bearer tokens" or "request signing"</a:t>
-            </a:r>
-          </a:p>
-          <a:p>
-            <a:endParaRPr lang="en-US" sz="4000" dirty="0" smtClean="0"/>
-          </a:p>
-          <a:p>
-            <a:endParaRPr lang="en-US" sz="4000" u="sng" dirty="0" smtClean="0"/>
-          </a:p>
-          <a:p>
-            <a:endParaRPr lang="en-US" sz="4000" dirty="0" smtClean="0"/>
-          </a:p>
-          <a:p>
-            <a:endParaRPr lang="en-US" sz="4000" dirty="0"/>
-          </a:p>
-        </p:txBody>
-      </p:sp>
-    </p:spTree>
-    <p:extLst>
-      <p:ext uri="{BB962C8B-B14F-4D97-AF65-F5344CB8AC3E}">
-        <p14:creationId xmlns:p14="http://schemas.microsoft.com/office/powerpoint/2010/main" val="2373494129"/>
-      </p:ext>
-    </p:extLst>
-  </p:cSld>
-  <p:clrMapOvr>
-    <a:masterClrMapping/>
-  </p:clrMapOvr>
-  <p:timing>
-    <p:tnLst>
-      <p:par>
-        <p:cTn id="1" dur="indefinite" restart="never" nodeType="tmRoot"/>
-      </p:par>
-    </p:tnLst>
-  </p:timing>
-</p:sld>
-</file>
-
-<file path=ppt/slides/slide26.xml><?xml version="1.0" encoding="utf-8"?>
-<p:sld xmlns:a="http://schemas.openxmlformats.org/drawingml/2006/main" xmlns:r="http://schemas.openxmlformats.org/officeDocument/2006/relationships" xmlns:p="http://schemas.openxmlformats.org/presentationml/2006/main">
-  <p:cSld>
-    <p:spTree>
-      <p:nvGrpSpPr>
-        <p:cNvPr id="1" name=""/>
-        <p:cNvGrpSpPr/>
-        <p:nvPr/>
-      </p:nvGrpSpPr>
-      <p:grpSpPr>
-        <a:xfrm>
-          <a:off x="0" y="0"/>
-          <a:ext cx="0" cy="0"/>
-          <a:chOff x="0" y="0"/>
-          <a:chExt cx="0" cy="0"/>
-        </a:xfrm>
-      </p:grpSpPr>
-      <p:sp>
-        <p:nvSpPr>
-          <p:cNvPr id="2" name="Title 1"/>
-          <p:cNvSpPr>
-            <a:spLocks noGrp="1"/>
-          </p:cNvSpPr>
-          <p:nvPr>
-            <p:ph type="title"/>
-          </p:nvPr>
-        </p:nvSpPr>
-        <p:spPr/>
-        <p:txBody>
-          <a:bodyPr>
-            <a:normAutofit/>
-          </a:bodyPr>
-          <a:lstStyle/>
-          <a:p>
-            <a:r>
-              <a:rPr lang="en-US" sz="4800" dirty="0" smtClean="0"/>
-              <a:t>API Keys as "</a:t>
-            </a:r>
-            <a:r>
-              <a:rPr lang="en-US" sz="4800" b="1" dirty="0" smtClean="0"/>
-              <a:t>bearer tokens</a:t>
-            </a:r>
-            <a:r>
-              <a:rPr lang="en-US" sz="4800" dirty="0" smtClean="0"/>
-              <a:t>“</a:t>
-            </a:r>
-            <a:endParaRPr lang="en-US" sz="4800" dirty="0"/>
-          </a:p>
-        </p:txBody>
-      </p:sp>
-      <p:sp>
-        <p:nvSpPr>
-          <p:cNvPr id="3" name="Content Placeholder 2"/>
-          <p:cNvSpPr>
-            <a:spLocks noGrp="1"/>
-          </p:cNvSpPr>
-          <p:nvPr>
-            <p:ph idx="1"/>
-          </p:nvPr>
-        </p:nvSpPr>
-        <p:spPr>
-          <a:xfrm>
-            <a:off x="838200" y="1928553"/>
-            <a:ext cx="11215255" cy="4505498"/>
-          </a:xfrm>
-        </p:spPr>
-        <p:txBody>
-          <a:bodyPr>
-            <a:noAutofit/>
-          </a:bodyPr>
-          <a:lstStyle/>
-          <a:p>
-            <a:r>
-              <a:rPr lang="en-US" sz="4000" dirty="0" smtClean="0"/>
-              <a:t>Custom version of HTTP Basic </a:t>
-            </a:r>
-            <a:r>
-              <a:rPr lang="en-US" sz="4000" dirty="0" err="1" smtClean="0"/>
-              <a:t>Auth</a:t>
-            </a:r>
-            <a:r>
-              <a:rPr lang="en-US" sz="4000" dirty="0" smtClean="0"/>
-              <a:t>, with API Key instead of username + password</a:t>
-            </a:r>
-            <a:br>
-              <a:rPr lang="en-US" sz="4000" dirty="0" smtClean="0"/>
-            </a:br>
-            <a:endParaRPr lang="en-US" sz="4000" dirty="0" smtClean="0"/>
-          </a:p>
-          <a:p>
-            <a:r>
               <a:rPr lang="en-US" sz="4000" dirty="0"/>
               <a:t>Anyone that has the key, gets </a:t>
             </a:r>
             <a:r>
               <a:rPr lang="en-US" sz="4000" dirty="0" smtClean="0"/>
-              <a:t>access</a:t>
-            </a:r>
-          </a:p>
-          <a:p>
-            <a:endParaRPr lang="en-US" sz="4000" dirty="0"/>
-          </a:p>
-          <a:p>
-            <a:r>
-              <a:rPr lang="en-US" sz="4000" dirty="0" smtClean="0"/>
-              <a:t>Requires TLS</a:t>
-            </a:r>
-            <a:endParaRPr lang="en-US" sz="4000" dirty="0"/>
+              <a:t>access; </a:t>
+            </a:r>
+            <a:r>
+              <a:rPr lang="en-US" sz="4000" b="1" dirty="0" smtClean="0"/>
+              <a:t>requires TLS to keep safe!</a:t>
+            </a:r>
+            <a:endParaRPr lang="en-US" sz="4000" dirty="0" smtClean="0"/>
           </a:p>
           <a:p>
             <a:endParaRPr lang="en-US" sz="4000" dirty="0" smtClean="0"/>
@@ -25206,7 +25666,7 @@
 </p:sld>
 </file>
 
-<file path=ppt/slides/slide27.xml><?xml version="1.0" encoding="utf-8"?>
+<file path=ppt/slides/slide26.xml><?xml version="1.0" encoding="utf-8"?>
 <p:sld xmlns:a="http://schemas.openxmlformats.org/drawingml/2006/main" xmlns:r="http://schemas.openxmlformats.org/officeDocument/2006/relationships" xmlns:p="http://schemas.openxmlformats.org/presentationml/2006/main">
   <p:cSld>
     <p:spTree>
@@ -25378,6 +25838,161 @@
     <p:extLst>
       <p:ext uri="{BB962C8B-B14F-4D97-AF65-F5344CB8AC3E}">
         <p14:creationId xmlns:p14="http://schemas.microsoft.com/office/powerpoint/2010/main" val="3472286026"/>
+      </p:ext>
+    </p:extLst>
+  </p:cSld>
+  <p:clrMapOvr>
+    <a:masterClrMapping/>
+  </p:clrMapOvr>
+  <p:timing>
+    <p:tnLst>
+      <p:par>
+        <p:cTn id="1" dur="indefinite" restart="never" nodeType="tmRoot"/>
+      </p:par>
+    </p:tnLst>
+  </p:timing>
+</p:sld>
+</file>
+
+<file path=ppt/slides/slide27.xml><?xml version="1.0" encoding="utf-8"?>
+<p:sld xmlns:a="http://schemas.openxmlformats.org/drawingml/2006/main" xmlns:r="http://schemas.openxmlformats.org/officeDocument/2006/relationships" xmlns:p="http://schemas.openxmlformats.org/presentationml/2006/main">
+  <p:cSld>
+    <p:spTree>
+      <p:nvGrpSpPr>
+        <p:cNvPr id="1" name=""/>
+        <p:cNvGrpSpPr/>
+        <p:nvPr/>
+      </p:nvGrpSpPr>
+      <p:grpSpPr>
+        <a:xfrm>
+          <a:off x="0" y="0"/>
+          <a:ext cx="0" cy="0"/>
+          <a:chOff x="0" y="0"/>
+          <a:chExt cx="0" cy="0"/>
+        </a:xfrm>
+      </p:grpSpPr>
+      <p:sp>
+        <p:nvSpPr>
+          <p:cNvPr id="2" name="Title 1"/>
+          <p:cNvSpPr>
+            <a:spLocks noGrp="1"/>
+          </p:cNvSpPr>
+          <p:nvPr>
+            <p:ph type="title"/>
+          </p:nvPr>
+        </p:nvSpPr>
+        <p:spPr/>
+        <p:txBody>
+          <a:bodyPr>
+            <a:normAutofit/>
+          </a:bodyPr>
+          <a:lstStyle/>
+          <a:p>
+            <a:r>
+              <a:rPr lang="en-US" sz="4800" dirty="0" smtClean="0"/>
+              <a:t>Trade-offs when storing bearer tokens</a:t>
+            </a:r>
+            <a:endParaRPr lang="en-US" sz="4800" dirty="0"/>
+          </a:p>
+        </p:txBody>
+      </p:sp>
+      <p:sp>
+        <p:nvSpPr>
+          <p:cNvPr id="3" name="Content Placeholder 2"/>
+          <p:cNvSpPr>
+            <a:spLocks noGrp="1"/>
+          </p:cNvSpPr>
+          <p:nvPr>
+            <p:ph idx="1"/>
+          </p:nvPr>
+        </p:nvSpPr>
+        <p:spPr>
+          <a:xfrm>
+            <a:off x="838200" y="1928553"/>
+            <a:ext cx="11215255" cy="4505498"/>
+          </a:xfrm>
+        </p:spPr>
+        <p:txBody>
+          <a:bodyPr>
+            <a:noAutofit/>
+          </a:bodyPr>
+          <a:lstStyle/>
+          <a:p>
+            <a:pPr marL="0" indent="0">
+              <a:buNone/>
+            </a:pPr>
+            <a:r>
+              <a:rPr lang="en-US" sz="4000" dirty="0" smtClean="0"/>
+              <a:t>You can have secure storage of API Keys </a:t>
+            </a:r>
+          </a:p>
+          <a:p>
+            <a:pPr marL="0" indent="0">
+              <a:buNone/>
+            </a:pPr>
+            <a:r>
+              <a:rPr lang="en-US" sz="4000" i="1" dirty="0" smtClean="0"/>
+              <a:t>–or</a:t>
+            </a:r>
+            <a:r>
+              <a:rPr lang="en-US" sz="4000" i="1" dirty="0"/>
+              <a:t> –</a:t>
+            </a:r>
+            <a:r>
+              <a:rPr lang="en-US" sz="4000" i="1" dirty="0" smtClean="0"/>
+              <a:t> </a:t>
+            </a:r>
+          </a:p>
+          <a:p>
+            <a:pPr marL="0" indent="0">
+              <a:buNone/>
+            </a:pPr>
+            <a:r>
+              <a:rPr lang="en-US" sz="4000" dirty="0" smtClean="0"/>
+              <a:t>the ability to show users a list of their keys. </a:t>
+            </a:r>
+          </a:p>
+          <a:p>
+            <a:pPr marL="0" indent="0">
+              <a:buNone/>
+            </a:pPr>
+            <a:endParaRPr lang="en-US" sz="4000" b="1" dirty="0"/>
+          </a:p>
+          <a:p>
+            <a:pPr marL="0" indent="0">
+              <a:buNone/>
+            </a:pPr>
+            <a:r>
+              <a:rPr lang="en-US" sz="4000" b="1" dirty="0" smtClean="0"/>
+              <a:t>Not both!</a:t>
+            </a:r>
+            <a:endParaRPr lang="en-US" sz="4000" b="1" dirty="0" smtClean="0"/>
+          </a:p>
+          <a:p>
+            <a:endParaRPr lang="en-US" sz="4000" dirty="0" smtClean="0"/>
+          </a:p>
+          <a:p>
+            <a:endParaRPr lang="en-US" sz="4000" dirty="0"/>
+          </a:p>
+          <a:p>
+            <a:endParaRPr lang="en-US" sz="4000" dirty="0"/>
+          </a:p>
+          <a:p>
+            <a:endParaRPr lang="en-US" sz="4000" dirty="0" smtClean="0"/>
+          </a:p>
+          <a:p>
+            <a:pPr lvl="1"/>
+            <a:endParaRPr lang="en-US" sz="3600" dirty="0" smtClean="0"/>
+          </a:p>
+          <a:p>
+            <a:endParaRPr lang="en-US" sz="4000" dirty="0"/>
+          </a:p>
+        </p:txBody>
+      </p:sp>
+    </p:spTree>
+    <p:extLst>
+      <p:ext uri="{BB962C8B-B14F-4D97-AF65-F5344CB8AC3E}">
+        <p14:creationId xmlns:p14="http://schemas.microsoft.com/office/powerpoint/2010/main" val="3639229323"/>
       </p:ext>
     </p:extLst>
   </p:cSld>
@@ -32861,15 +33476,7 @@
           <a:p>
             <a:r>
               <a:rPr lang="en-US" sz="3600" dirty="0" smtClean="0"/>
-              <a:t>You’re using IIS + Active Directory </a:t>
-            </a:r>
-            <a:r>
-              <a:rPr lang="en-US" sz="3600" dirty="0" smtClean="0"/>
-              <a:t>to </a:t>
-            </a:r>
-            <a:r>
-              <a:rPr lang="en-US" sz="3600" dirty="0" smtClean="0"/>
-              <a:t>secure a private API on trusted network, or</a:t>
+              <a:t>You’re using IIS + Active Directory to secure a private API on trusted network, or</a:t>
             </a:r>
           </a:p>
           <a:p>
@@ -33361,11 +33968,7 @@
             </a:r>
             <a:r>
               <a:rPr lang="en-US" sz="4000" b="1" dirty="0" smtClean="0"/>
-              <a:t>API </a:t>
-            </a:r>
-            <a:r>
-              <a:rPr lang="en-US" sz="4000" b="1" dirty="0" smtClean="0"/>
-              <a:t>Keys as </a:t>
+              <a:t>API Keys as </a:t>
             </a:r>
             <a:r>
               <a:rPr lang="en-US" sz="4000" b="1" u="sng" dirty="0" smtClean="0"/>
@@ -33382,15 +33985,7 @@
           <a:p>
             <a:r>
               <a:rPr lang="en-US" sz="3600" dirty="0" smtClean="0"/>
-              <a:t>You value </a:t>
-            </a:r>
-            <a:r>
-              <a:rPr lang="en-US" sz="3600" dirty="0" smtClean="0"/>
-              <a:t>simplicity over </a:t>
-            </a:r>
-            <a:r>
-              <a:rPr lang="en-US" sz="3600" dirty="0" smtClean="0"/>
-              <a:t>security</a:t>
+              <a:t>You value simplicity over security</a:t>
             </a:r>
           </a:p>
           <a:p>
@@ -33401,7 +33996,6 @@
               <a:rPr lang="en-US" sz="3600" dirty="0" smtClean="0"/>
               <a:t>You can use TLS for all requests</a:t>
             </a:r>
-            <a:endParaRPr lang="en-US" sz="3600" dirty="0" smtClean="0"/>
           </a:p>
           <a:p>
             <a:endParaRPr lang="en-US" sz="3600" dirty="0" smtClean="0"/>
@@ -33567,11 +34161,7 @@
             </a:r>
             <a:r>
               <a:rPr lang="en-US" sz="4000" dirty="0" smtClean="0"/>
-              <a:t> </a:t>
-            </a:r>
-            <a:r>
-              <a:rPr lang="en-US" sz="4000" dirty="0" smtClean="0"/>
-              <a:t>if…</a:t>
+              <a:t> if…</a:t>
             </a:r>
             <a:br>
               <a:rPr lang="en-US" sz="4000" dirty="0" smtClean="0"/>
@@ -33581,11 +34171,7 @@
           <a:p>
             <a:r>
               <a:rPr lang="en-US" sz="3600" dirty="0" smtClean="0"/>
-              <a:t>You </a:t>
-            </a:r>
-            <a:r>
-              <a:rPr lang="en-US" sz="3600" dirty="0" smtClean="0"/>
-              <a:t>want extra security vs bearer tokens, and</a:t>
+              <a:t>You want extra security vs bearer tokens, and</a:t>
             </a:r>
             <a:br>
               <a:rPr lang="en-US" sz="3600" dirty="0" smtClean="0"/>
@@ -33595,13 +34181,8 @@
           <a:p>
             <a:r>
               <a:rPr lang="en-US" sz="3600" dirty="0" smtClean="0"/>
-              <a:t>You </a:t>
-            </a:r>
-            <a:r>
-              <a:rPr lang="en-US" sz="3600" dirty="0" smtClean="0"/>
-              <a:t>can thoroughly document the signing process</a:t>
-            </a:r>
-            <a:endParaRPr lang="en-US" sz="3600" dirty="0" smtClean="0"/>
+              <a:t>You can thoroughly document the signing process</a:t>
+            </a:r>
           </a:p>
           <a:p>
             <a:endParaRPr lang="en-US" sz="3600" dirty="0" smtClean="0"/>
@@ -33771,7 +34352,6 @@
               <a:rPr lang="en-US" sz="3600" dirty="0" smtClean="0"/>
               <a:t>You want a standards-based, self-contained, stateless alternative to in-memory "sessions"</a:t>
             </a:r>
-            <a:endParaRPr lang="en-US" sz="3600" dirty="0" smtClean="0"/>
           </a:p>
           <a:p>
             <a:endParaRPr lang="en-US" sz="3600" dirty="0" smtClean="0"/>
@@ -33946,33 +34526,20 @@
               <a:rPr lang="en-US" sz="3600" dirty="0" smtClean="0"/>
               <a:t>You need to support delegated access to user data, and</a:t>
             </a:r>
-            <a:endParaRPr lang="en-US" sz="3600" dirty="0" smtClean="0"/>
           </a:p>
           <a:p>
             <a:r>
               <a:rPr lang="en-US" sz="3600" dirty="0" smtClean="0"/>
-              <a:t>You </a:t>
-            </a:r>
+              <a:t>You can’t/don’t want to require TLS</a:t>
+            </a:r>
+          </a:p>
+          <a:p>
+            <a:endParaRPr lang="en-US" sz="3600" dirty="0"/>
+          </a:p>
+          <a:p>
             <a:r>
               <a:rPr lang="en-US" sz="3600" dirty="0" smtClean="0"/>
-              <a:t>can’t/don’t want to require </a:t>
-            </a:r>
-            <a:r>
-              <a:rPr lang="en-US" sz="3600" dirty="0" smtClean="0"/>
-              <a:t>TLS</a:t>
-            </a:r>
-          </a:p>
-          <a:p>
-            <a:endParaRPr lang="en-US" sz="3600" dirty="0"/>
-          </a:p>
-          <a:p>
-            <a:r>
-              <a:rPr lang="en-US" sz="3600" dirty="0" smtClean="0"/>
-              <a:t>You </a:t>
-            </a:r>
-            <a:r>
-              <a:rPr lang="en-US" sz="3600" dirty="0" smtClean="0"/>
-              <a:t>care about client/provider interoperability</a:t>
+              <a:t>You care about client/provider interoperability</a:t>
             </a:r>
           </a:p>
           <a:p>
@@ -34142,34 +34709,22 @@
           <a:p>
             <a:r>
               <a:rPr lang="en-US" sz="3600" dirty="0" smtClean="0"/>
-              <a:t>You </a:t>
-            </a:r>
+              <a:t>You want to avoid complexity of signed requests, and</a:t>
+            </a:r>
+          </a:p>
+          <a:p>
             <a:r>
               <a:rPr lang="en-US" sz="3600" dirty="0" smtClean="0"/>
-              <a:t>want to avoid complexity of signed requests, and</a:t>
-            </a:r>
+              <a:t>You can require TLS on all requests</a:t>
+            </a:r>
+          </a:p>
+          <a:p>
+            <a:endParaRPr lang="en-US" sz="3600" dirty="0"/>
           </a:p>
           <a:p>
             <a:r>
               <a:rPr lang="en-US" sz="3600" dirty="0" smtClean="0"/>
-              <a:t>You can require TLS on all </a:t>
-            </a:r>
-            <a:r>
-              <a:rPr lang="en-US" sz="3600" dirty="0" smtClean="0"/>
-              <a:t>requests</a:t>
-            </a:r>
-          </a:p>
-          <a:p>
-            <a:endParaRPr lang="en-US" sz="3600" dirty="0"/>
-          </a:p>
-          <a:p>
-            <a:r>
-              <a:rPr lang="en-US" sz="3600" dirty="0" smtClean="0"/>
-              <a:t>You </a:t>
-            </a:r>
-            <a:r>
-              <a:rPr lang="en-US" sz="3600" dirty="0" smtClean="0"/>
-              <a:t>need to support a wider set of devices and “flows”</a:t>
+              <a:t>You need to support a wider set of devices and “flows”</a:t>
             </a:r>
           </a:p>
           <a:p>
@@ -34525,15 +35080,7 @@
           <a:p>
             <a:r>
               <a:rPr lang="en-US" sz="3600" dirty="0" smtClean="0"/>
-              <a:t>You </a:t>
-            </a:r>
-            <a:r>
-              <a:rPr lang="en-US" sz="3600" dirty="0" smtClean="0"/>
-              <a:t>find XML to be life-affirming and </a:t>
-            </a:r>
-            <a:r>
-              <a:rPr lang="en-US" sz="3600" dirty="0" smtClean="0"/>
-              <a:t>joyful, or</a:t>
+              <a:t>You find XML to be life-affirming and joyful, or</a:t>
             </a:r>
           </a:p>
           <a:p>
@@ -34544,7 +35091,6 @@
               <a:rPr lang="en-US" sz="3600" dirty="0" smtClean="0"/>
               <a:t>You have a Legit Reason To Do It The Hard Way ™</a:t>
             </a:r>
-            <a:endParaRPr lang="en-US" sz="3600" dirty="0" smtClean="0"/>
           </a:p>
           <a:p>
             <a:endParaRPr lang="en-US" sz="3600" dirty="0"/>
@@ -34827,11 +35373,7 @@
             </a:r>
             <a:r>
               <a:rPr lang="en-US" sz="4000" b="1" dirty="0" smtClean="0"/>
-              <a:t>b</a:t>
-            </a:r>
-            <a:r>
-              <a:rPr lang="en-US" sz="4000" b="1" dirty="0" smtClean="0"/>
-              <a:t>earer tokens</a:t>
+              <a:t>bearer tokens</a:t>
             </a:r>
             <a:r>
               <a:rPr lang="en-US" sz="4000" dirty="0" smtClean="0"/>
@@ -34867,7 +35409,6 @@
               <a:rPr lang="en-US" sz="4000" dirty="0" smtClean="0"/>
               <a:t>. Careful about XSS/CSRF!</a:t>
             </a:r>
-            <a:endParaRPr lang="en-US" sz="4000" dirty="0" smtClean="0"/>
           </a:p>
           <a:p>
             <a:endParaRPr lang="en-US" sz="4000" dirty="0" smtClean="0"/>

</xml_diff>

<commit_message>
Cosmetic and narrative tweaks around OAuth
</commit_message>
<xml_diff>
--- a/Securing Your API Endpoints.pptx
+++ b/Securing Your API Endpoints.pptx
@@ -64,7 +64,7 @@
     <p:sldId id="475" r:id="rId55"/>
     <p:sldId id="490" r:id="rId56"/>
     <p:sldId id="486" r:id="rId57"/>
-    <p:sldId id="482" r:id="rId58"/>
+    <p:sldId id="576" r:id="rId58"/>
     <p:sldId id="527" r:id="rId59"/>
     <p:sldId id="487" r:id="rId60"/>
     <p:sldId id="488" r:id="rId61"/>
@@ -73,9 +73,9 @@
     <p:sldId id="494" r:id="rId64"/>
     <p:sldId id="521" r:id="rId65"/>
     <p:sldId id="498" r:id="rId66"/>
-    <p:sldId id="499" r:id="rId67"/>
-    <p:sldId id="497" r:id="rId68"/>
-    <p:sldId id="500" r:id="rId69"/>
+    <p:sldId id="577" r:id="rId67"/>
+    <p:sldId id="578" r:id="rId68"/>
+    <p:sldId id="579" r:id="rId69"/>
     <p:sldId id="501" r:id="rId70"/>
     <p:sldId id="502" r:id="rId71"/>
     <p:sldId id="538" r:id="rId72"/>
@@ -10204,6 +10204,52 @@
             </a:r>
           </a:p>
           <a:p>
+            <a:endParaRPr lang="en-US" sz="1200" kern="1200" dirty="0" smtClean="0">
+              <a:solidFill>
+                <a:schemeClr val="tx1"/>
+              </a:solidFill>
+              <a:effectLst/>
+              <a:latin typeface="+mn-lt"/>
+              <a:ea typeface="+mn-ea"/>
+              <a:cs typeface="+mn-cs"/>
+            </a:endParaRPr>
+          </a:p>
+          <a:p>
+            <a:r>
+              <a:rPr lang="en-US" sz="1200" kern="1200" dirty="0" smtClean="0">
+                <a:solidFill>
+                  <a:schemeClr val="tx1"/>
+                </a:solidFill>
+                <a:effectLst/>
+                <a:latin typeface="+mn-lt"/>
+                <a:ea typeface="+mn-ea"/>
+                <a:cs typeface="+mn-cs"/>
+              </a:rPr>
+              <a:t>And if the token passes validation, the server knows it can trust</a:t>
+            </a:r>
+            <a:r>
+              <a:rPr lang="en-US" sz="1200" kern="1200" baseline="0" dirty="0" smtClean="0">
+                <a:solidFill>
+                  <a:schemeClr val="tx1"/>
+                </a:solidFill>
+                <a:effectLst/>
+                <a:latin typeface="+mn-lt"/>
+                <a:ea typeface="+mn-ea"/>
+                <a:cs typeface="+mn-cs"/>
+              </a:rPr>
+              <a:t> the claims.</a:t>
+            </a:r>
+            <a:endParaRPr lang="en-US" sz="1200" kern="1200" dirty="0" smtClean="0">
+              <a:solidFill>
+                <a:schemeClr val="tx1"/>
+              </a:solidFill>
+              <a:effectLst/>
+              <a:latin typeface="+mn-lt"/>
+              <a:ea typeface="+mn-ea"/>
+              <a:cs typeface="+mn-cs"/>
+            </a:endParaRPr>
+          </a:p>
+          <a:p>
             <a:endParaRPr lang="en-US" sz="1200" kern="1200" dirty="0">
               <a:solidFill>
                 <a:schemeClr val="tx1"/>
@@ -13546,7 +13592,7 @@
     </p:spTree>
     <p:extLst>
       <p:ext uri="{BB962C8B-B14F-4D97-AF65-F5344CB8AC3E}">
-        <p14:creationId xmlns:p14="http://schemas.microsoft.com/office/powerpoint/2010/main" val="1119205057"/>
+        <p14:creationId xmlns:p14="http://schemas.microsoft.com/office/powerpoint/2010/main" val="2089552448"/>
       </p:ext>
     </p:extLst>
   </p:cSld>
@@ -15563,19 +15609,19 @@
                 <a:ea typeface="+mn-ea"/>
                 <a:cs typeface="+mn-cs"/>
               </a:rPr>
-              <a:t>securely assign an identity to a request</a:t>
-            </a:r>
-            <a:r>
-              <a:rPr lang="en-US" sz="1200" kern="1200" baseline="0" dirty="0">
-                <a:solidFill>
-                  <a:schemeClr val="tx1"/>
-                </a:solidFill>
-                <a:effectLst/>
-                <a:latin typeface="+mn-lt"/>
-                <a:ea typeface="+mn-ea"/>
-                <a:cs typeface="+mn-cs"/>
-              </a:rPr>
-              <a:t>. </a:t>
+              <a:t>securely </a:t>
+            </a:r>
+            <a:r>
+              <a:rPr lang="en-US" sz="1200" b="1" kern="1200" baseline="0" dirty="0" smtClean="0">
+                <a:solidFill>
+                  <a:schemeClr val="tx1"/>
+                </a:solidFill>
+                <a:effectLst/>
+                <a:latin typeface="+mn-lt"/>
+                <a:ea typeface="+mn-ea"/>
+                <a:cs typeface="+mn-cs"/>
+              </a:rPr>
+              <a:t>associate a request to an identity</a:t>
             </a:r>
           </a:p>
           <a:p>
@@ -15963,19 +16009,19 @@
           </a:p>
           <a:p>
             <a:r>
-              <a:rPr lang="en-US" sz="1200" kern="1200" baseline="0" dirty="0">
-                <a:solidFill>
-                  <a:schemeClr val="tx1"/>
-                </a:solidFill>
-                <a:effectLst/>
-                <a:latin typeface="+mn-lt"/>
-                <a:ea typeface="+mn-ea"/>
-                <a:cs typeface="+mn-cs"/>
-              </a:rPr>
-              <a:t>If you have a token, &amp; token authorized to obtain identity information, is </a:t>
-            </a:r>
-            <a:r>
-              <a:rPr lang="en-US" sz="1200" i="1" kern="1200" baseline="0" dirty="0">
+              <a:rPr lang="en-US" sz="1200" kern="1200" baseline="0" dirty="0" smtClean="0">
+                <a:solidFill>
+                  <a:schemeClr val="tx1"/>
+                </a:solidFill>
+                <a:effectLst/>
+                <a:latin typeface="+mn-lt"/>
+                <a:ea typeface="+mn-ea"/>
+                <a:cs typeface="+mn-cs"/>
+              </a:rPr>
+              <a:t>Let's say you call the authorization server and you get a token. And that token lets you call an API, which will return the email address associated with that token. Is </a:t>
+            </a:r>
+            <a:r>
+              <a:rPr lang="en-US" sz="1200" i="1" kern="1200" baseline="0" dirty="0" smtClean="0">
                 <a:solidFill>
                   <a:schemeClr val="tx1"/>
                 </a:solidFill>
@@ -16182,7 +16228,7 @@
     </p:spTree>
     <p:extLst>
       <p:ext uri="{BB962C8B-B14F-4D97-AF65-F5344CB8AC3E}">
-        <p14:creationId xmlns:p14="http://schemas.microsoft.com/office/powerpoint/2010/main" val="3673203546"/>
+        <p14:creationId xmlns:p14="http://schemas.microsoft.com/office/powerpoint/2010/main" val="3326098829"/>
       </p:ext>
     </p:extLst>
   </p:cSld>
@@ -16246,7 +16292,55 @@
                 <a:ea typeface="+mn-ea"/>
                 <a:cs typeface="+mn-cs"/>
               </a:rPr>
-              <a:t>Let’s say there is a website that lets people “log in with Facebook”. </a:t>
+              <a:t>Let’s say there is a website </a:t>
+            </a:r>
+            <a:r>
+              <a:rPr lang="en-US" sz="1200" kern="1200" dirty="0" smtClean="0">
+                <a:solidFill>
+                  <a:schemeClr val="tx1"/>
+                </a:solidFill>
+                <a:effectLst/>
+                <a:latin typeface="+mn-lt"/>
+                <a:ea typeface="+mn-ea"/>
+                <a:cs typeface="+mn-cs"/>
+              </a:rPr>
+              <a:t>called BadGuy.com</a:t>
+            </a:r>
+            <a:r>
+              <a:rPr lang="en-US" sz="1200" kern="1200" baseline="0" dirty="0" smtClean="0">
+                <a:solidFill>
+                  <a:schemeClr val="tx1"/>
+                </a:solidFill>
+                <a:effectLst/>
+                <a:latin typeface="+mn-lt"/>
+                <a:ea typeface="+mn-ea"/>
+                <a:cs typeface="+mn-cs"/>
+              </a:rPr>
+              <a:t> </a:t>
+            </a:r>
+            <a:r>
+              <a:rPr lang="en-US" sz="1200" kern="1200" dirty="0" smtClean="0">
+                <a:solidFill>
+                  <a:schemeClr val="tx1"/>
+                </a:solidFill>
+                <a:effectLst/>
+                <a:latin typeface="+mn-lt"/>
+                <a:ea typeface="+mn-ea"/>
+                <a:cs typeface="+mn-cs"/>
+              </a:rPr>
+              <a:t>that </a:t>
+            </a:r>
+            <a:r>
+              <a:rPr lang="en-US" sz="1200" kern="1200" dirty="0">
+                <a:solidFill>
+                  <a:schemeClr val="tx1"/>
+                </a:solidFill>
+                <a:effectLst/>
+                <a:latin typeface="+mn-lt"/>
+                <a:ea typeface="+mn-ea"/>
+                <a:cs typeface="+mn-cs"/>
+              </a:rPr>
+              <a:t>lets people “log in with Facebook”. </a:t>
             </a:r>
           </a:p>
           <a:p>
@@ -16275,7 +16369,43 @@
                 <a:ea typeface="+mn-ea"/>
                 <a:cs typeface="+mn-cs"/>
               </a:rPr>
-              <a:t>I go to Foo.com and follow normal OAuth flow and </a:t>
+              <a:t>I go to </a:t>
+            </a:r>
+            <a:r>
+              <a:rPr lang="en-US" sz="1200" kern="1200" dirty="0" smtClean="0">
+                <a:solidFill>
+                  <a:schemeClr val="tx1"/>
+                </a:solidFill>
+                <a:effectLst/>
+                <a:latin typeface="+mn-lt"/>
+                <a:ea typeface="+mn-ea"/>
+                <a:cs typeface="+mn-cs"/>
+              </a:rPr>
+              <a:t>BadGuy.com and, using the normal OAuth</a:t>
+            </a:r>
+            <a:r>
+              <a:rPr lang="en-US" sz="1200" kern="1200" baseline="0" dirty="0" smtClean="0">
+                <a:solidFill>
+                  <a:schemeClr val="tx1"/>
+                </a:solidFill>
+                <a:effectLst/>
+                <a:latin typeface="+mn-lt"/>
+                <a:ea typeface="+mn-ea"/>
+                <a:cs typeface="+mn-cs"/>
+              </a:rPr>
+              <a:t> flow, I </a:t>
+            </a:r>
+            <a:r>
+              <a:rPr lang="en-US" sz="1200" b="1" kern="1200" dirty="0" smtClean="0">
+                <a:solidFill>
+                  <a:schemeClr val="tx1"/>
+                </a:solidFill>
+                <a:effectLst/>
+                <a:latin typeface="+mn-lt"/>
+                <a:ea typeface="+mn-ea"/>
+                <a:cs typeface="+mn-cs"/>
+              </a:rPr>
+              <a:t>authenticate </a:t>
             </a:r>
             <a:r>
               <a:rPr lang="en-US" sz="1200" b="1" kern="1200" dirty="0">
@@ -16287,91 +16417,55 @@
                 <a:ea typeface="+mn-ea"/>
                 <a:cs typeface="+mn-cs"/>
               </a:rPr>
-              <a:t>authenticate against Facebook</a:t>
-            </a:r>
-            <a:r>
-              <a:rPr lang="en-US" sz="1200" kern="1200" dirty="0">
-                <a:solidFill>
-                  <a:schemeClr val="tx1"/>
-                </a:solidFill>
-                <a:effectLst/>
-                <a:latin typeface="+mn-lt"/>
-                <a:ea typeface="+mn-ea"/>
-                <a:cs typeface="+mn-cs"/>
-              </a:rPr>
-              <a:t>, </a:t>
-            </a:r>
-          </a:p>
-          <a:p>
-            <a:pPr marL="171450" indent="-171450">
-              <a:buFont typeface="Arial" panose="020B0604020202020204" pitchFamily="34" charset="0"/>
-              <a:buChar char="•"/>
-            </a:pPr>
-            <a:r>
-              <a:rPr lang="en-US" sz="1200" kern="1200" dirty="0">
-                <a:solidFill>
-                  <a:schemeClr val="tx1"/>
-                </a:solidFill>
-                <a:effectLst/>
-                <a:latin typeface="+mn-lt"/>
-                <a:ea typeface="+mn-ea"/>
-                <a:cs typeface="+mn-cs"/>
-              </a:rPr>
-              <a:t>I authorize Foo.com to access my data and get redirected back to Foo.com with an access token. </a:t>
-            </a:r>
-          </a:p>
-          <a:p>
-            <a:pPr marL="171450" indent="-171450">
-              <a:buFont typeface="Arial" panose="020B0604020202020204" pitchFamily="34" charset="0"/>
-              <a:buChar char="•"/>
-            </a:pPr>
-            <a:r>
-              <a:rPr lang="en-US" sz="1200" kern="1200" dirty="0">
-                <a:solidFill>
-                  <a:schemeClr val="tx1"/>
-                </a:solidFill>
-                <a:effectLst/>
-                <a:latin typeface="+mn-lt"/>
-                <a:ea typeface="+mn-ea"/>
-                <a:cs typeface="+mn-cs"/>
-              </a:rPr>
-              <a:t>Foo.com </a:t>
-            </a:r>
-            <a:r>
-              <a:rPr lang="en-US" sz="1200" b="1" kern="1200" dirty="0">
-                <a:solidFill>
-                  <a:schemeClr val="tx1"/>
-                </a:solidFill>
-                <a:effectLst/>
-                <a:latin typeface="+mn-lt"/>
-                <a:ea typeface="+mn-ea"/>
-                <a:cs typeface="+mn-cs"/>
-              </a:rPr>
-              <a:t>uses token</a:t>
-            </a:r>
-            <a:r>
-              <a:rPr lang="en-US" sz="1200" kern="1200" dirty="0">
-                <a:solidFill>
-                  <a:schemeClr val="tx1"/>
-                </a:solidFill>
-                <a:effectLst/>
-                <a:latin typeface="+mn-lt"/>
-                <a:ea typeface="+mn-ea"/>
-                <a:cs typeface="+mn-cs"/>
-              </a:rPr>
-              <a:t> to call Facebook’s API, gets my email address, and considers me </a:t>
-            </a:r>
-            <a:r>
-              <a:rPr lang="en-US" sz="1200" b="1" kern="1200" dirty="0">
-                <a:solidFill>
-                  <a:schemeClr val="tx1"/>
-                </a:solidFill>
-                <a:effectLst/>
-                <a:latin typeface="+mn-lt"/>
-                <a:ea typeface="+mn-ea"/>
-                <a:cs typeface="+mn-cs"/>
-              </a:rPr>
-              <a:t>logged in to FOO</a:t>
+              <a:t>against </a:t>
+            </a:r>
+            <a:r>
+              <a:rPr lang="en-US" sz="1200" b="1" kern="1200" dirty="0" smtClean="0">
+                <a:solidFill>
+                  <a:schemeClr val="tx1"/>
+                </a:solidFill>
+                <a:effectLst/>
+                <a:latin typeface="+mn-lt"/>
+                <a:ea typeface="+mn-ea"/>
+                <a:cs typeface="+mn-cs"/>
+              </a:rPr>
+              <a:t>Facebook</a:t>
+            </a:r>
+            <a:r>
+              <a:rPr lang="en-US" sz="1200" b="0" kern="1200" baseline="0" dirty="0" smtClean="0">
+                <a:solidFill>
+                  <a:schemeClr val="tx1"/>
+                </a:solidFill>
+                <a:effectLst/>
+                <a:latin typeface="+mn-lt"/>
+                <a:ea typeface="+mn-ea"/>
+                <a:cs typeface="+mn-cs"/>
+              </a:rPr>
+              <a:t> and then </a:t>
+            </a:r>
+            <a:r>
+              <a:rPr lang="en-US" sz="1200" b="1" kern="1200" baseline="0" dirty="0" smtClean="0">
+                <a:solidFill>
+                  <a:schemeClr val="tx1"/>
+                </a:solidFill>
+                <a:effectLst/>
+                <a:latin typeface="+mn-lt"/>
+                <a:ea typeface="+mn-ea"/>
+                <a:cs typeface="+mn-cs"/>
+              </a:rPr>
+              <a:t>authorize Facebook</a:t>
+            </a:r>
+            <a:r>
+              <a:rPr lang="en-US" sz="1200" b="0" kern="1200" baseline="0" dirty="0" smtClean="0">
+                <a:solidFill>
+                  <a:schemeClr val="tx1"/>
+                </a:solidFill>
+                <a:effectLst/>
+                <a:latin typeface="+mn-lt"/>
+                <a:ea typeface="+mn-ea"/>
+                <a:cs typeface="+mn-cs"/>
+              </a:rPr>
+              <a:t> to give my profile data to BadGuy.com</a:t>
             </a:r>
             <a:endParaRPr lang="en-US" sz="1200" kern="1200" dirty="0">
               <a:solidFill>
@@ -16389,6 +16483,54 @@
               <a:buChar char="•"/>
             </a:pPr>
             <a:r>
+              <a:rPr lang="en-US" sz="1200" kern="1200" dirty="0" smtClean="0">
+                <a:solidFill>
+                  <a:schemeClr val="tx1"/>
+                </a:solidFill>
+                <a:effectLst/>
+                <a:latin typeface="+mn-lt"/>
+                <a:ea typeface="+mn-ea"/>
+                <a:cs typeface="+mn-cs"/>
+              </a:rPr>
+              <a:t>BadGuy.com</a:t>
+            </a:r>
+            <a:r>
+              <a:rPr lang="en-US" sz="1200" kern="1200" baseline="0" dirty="0" smtClean="0">
+                <a:solidFill>
+                  <a:schemeClr val="tx1"/>
+                </a:solidFill>
+                <a:effectLst/>
+                <a:latin typeface="+mn-lt"/>
+                <a:ea typeface="+mn-ea"/>
+                <a:cs typeface="+mn-cs"/>
+              </a:rPr>
+              <a:t> </a:t>
+            </a:r>
+            <a:r>
+              <a:rPr lang="en-US" sz="1200" b="1" kern="1200" dirty="0" smtClean="0">
+                <a:solidFill>
+                  <a:schemeClr val="tx1"/>
+                </a:solidFill>
+                <a:effectLst/>
+                <a:latin typeface="+mn-lt"/>
+                <a:ea typeface="+mn-ea"/>
+                <a:cs typeface="+mn-cs"/>
+              </a:rPr>
+              <a:t>uses </a:t>
+            </a:r>
+            <a:r>
+              <a:rPr lang="en-US" sz="1200" b="1" kern="1200" dirty="0">
+                <a:solidFill>
+                  <a:schemeClr val="tx1"/>
+                </a:solidFill>
+                <a:effectLst/>
+                <a:latin typeface="+mn-lt"/>
+                <a:ea typeface="+mn-ea"/>
+                <a:cs typeface="+mn-cs"/>
+              </a:rPr>
+              <a:t>token</a:t>
+            </a:r>
+            <a:r>
               <a:rPr lang="en-US" sz="1200" kern="1200" dirty="0">
                 <a:solidFill>
                   <a:schemeClr val="tx1"/>
@@ -16398,7 +16540,31 @@
                 <a:ea typeface="+mn-ea"/>
                 <a:cs typeface="+mn-cs"/>
               </a:rPr>
-              <a:t>I have </a:t>
+              <a:t> to call Facebook’s API, gets my email address, and </a:t>
+            </a:r>
+            <a:r>
+              <a:rPr lang="en-US" sz="1200" kern="1200" dirty="0" smtClean="0">
+                <a:solidFill>
+                  <a:schemeClr val="tx1"/>
+                </a:solidFill>
+                <a:effectLst/>
+                <a:latin typeface="+mn-lt"/>
+                <a:ea typeface="+mn-ea"/>
+                <a:cs typeface="+mn-cs"/>
+              </a:rPr>
+              <a:t>now considers </a:t>
+            </a:r>
+            <a:r>
+              <a:rPr lang="en-US" sz="1200" kern="1200" dirty="0">
+                <a:solidFill>
+                  <a:schemeClr val="tx1"/>
+                </a:solidFill>
+                <a:effectLst/>
+                <a:latin typeface="+mn-lt"/>
+                <a:ea typeface="+mn-ea"/>
+                <a:cs typeface="+mn-cs"/>
+              </a:rPr>
+              <a:t>me </a:t>
             </a:r>
             <a:r>
               <a:rPr lang="en-US" sz="1200" b="1" kern="1200" dirty="0">
@@ -16410,92 +16576,57 @@
                 <a:ea typeface="+mn-ea"/>
                 <a:cs typeface="+mn-cs"/>
               </a:rPr>
-              <a:t>given Foo</a:t>
-            </a:r>
-            <a:r>
-              <a:rPr lang="en-US" sz="1200" b="1" kern="1200" baseline="0" dirty="0">
-                <a:solidFill>
-                  <a:schemeClr val="tx1"/>
-                </a:solidFill>
-                <a:effectLst/>
-                <a:latin typeface="+mn-lt"/>
-                <a:ea typeface="+mn-ea"/>
-                <a:cs typeface="+mn-cs"/>
-              </a:rPr>
-              <a:t> access to my profile</a:t>
-            </a:r>
-            <a:r>
-              <a:rPr lang="en-US" sz="1200" b="0" kern="1200" baseline="0" dirty="0">
-                <a:solidFill>
-                  <a:schemeClr val="tx1"/>
-                </a:solidFill>
-                <a:effectLst/>
-                <a:latin typeface="+mn-lt"/>
-                <a:ea typeface="+mn-ea"/>
-                <a:cs typeface="+mn-cs"/>
-              </a:rPr>
-              <a:t> and in exchange, </a:t>
-            </a:r>
-            <a:r>
-              <a:rPr lang="en-US" sz="1200" b="1" kern="1200" baseline="0" dirty="0">
-                <a:solidFill>
-                  <a:schemeClr val="tx1"/>
-                </a:solidFill>
-                <a:effectLst/>
-                <a:latin typeface="+mn-lt"/>
-                <a:ea typeface="+mn-ea"/>
-                <a:cs typeface="+mn-cs"/>
-              </a:rPr>
-              <a:t>Foo gives me access to my account</a:t>
-            </a:r>
-            <a:r>
-              <a:rPr lang="en-US" sz="1200" b="0" kern="1200" baseline="0" dirty="0">
-                <a:solidFill>
-                  <a:schemeClr val="tx1"/>
-                </a:solidFill>
-                <a:effectLst/>
-                <a:latin typeface="+mn-lt"/>
-                <a:ea typeface="+mn-ea"/>
-                <a:cs typeface="+mn-cs"/>
-              </a:rPr>
-              <a:t> on FOO</a:t>
-            </a:r>
-            <a:endParaRPr lang="en-US" sz="1200" kern="1200" dirty="0">
-              <a:solidFill>
-                <a:schemeClr val="tx1"/>
-              </a:solidFill>
-              <a:effectLst/>
-              <a:latin typeface="+mn-lt"/>
-              <a:ea typeface="+mn-ea"/>
-              <a:cs typeface="+mn-cs"/>
-            </a:endParaRPr>
-          </a:p>
-          <a:p>
-            <a:pPr marL="0" indent="0">
-              <a:buFont typeface="Arial" panose="020B0604020202020204" pitchFamily="34" charset="0"/>
-              <a:buNone/>
-            </a:pPr>
-            <a:r>
-              <a:rPr lang="en-US" sz="1200" kern="1200" dirty="0">
-                <a:solidFill>
-                  <a:schemeClr val="tx1"/>
-                </a:solidFill>
-                <a:effectLst/>
-                <a:latin typeface="+mn-lt"/>
-                <a:ea typeface="+mn-ea"/>
-                <a:cs typeface="+mn-cs"/>
-              </a:rPr>
-              <a:t> </a:t>
-            </a:r>
-          </a:p>
-          <a:p>
+              <a:t>logged </a:t>
+            </a:r>
+            <a:r>
+              <a:rPr lang="en-US" sz="1200" b="1" kern="1200" dirty="0" smtClean="0">
+                <a:solidFill>
+                  <a:schemeClr val="tx1"/>
+                </a:solidFill>
+                <a:effectLst/>
+                <a:latin typeface="+mn-lt"/>
+                <a:ea typeface="+mn-ea"/>
+                <a:cs typeface="+mn-cs"/>
+              </a:rPr>
+              <a:t>in</a:t>
+            </a:r>
+          </a:p>
+          <a:p>
+            <a:endParaRPr lang="en-US" dirty="0" smtClean="0"/>
+          </a:p>
+          <a:p>
+            <a:r>
+              <a:rPr lang="en-US" dirty="0" smtClean="0"/>
+              <a:t>At </a:t>
+            </a:r>
             <a:r>
               <a:rPr lang="en-US" dirty="0"/>
-              <a:t>At this point, I have</a:t>
-            </a:r>
-            <a:r>
-              <a:rPr lang="en-US" baseline="0" dirty="0"/>
-              <a:t> access to my full FOO account</a:t>
+              <a:t>this point, </a:t>
+            </a:r>
+            <a:r>
+              <a:rPr lang="en-US" baseline="0" dirty="0" err="1" smtClean="0"/>
+              <a:t>BadGuy</a:t>
+            </a:r>
+            <a:r>
+              <a:rPr lang="en-US" baseline="0" dirty="0" smtClean="0"/>
+              <a:t> has access to the email address associated with my FB account, and I have full access to my account at </a:t>
+            </a:r>
+            <a:r>
+              <a:rPr lang="en-US" baseline="0" dirty="0" err="1" smtClean="0"/>
+              <a:t>BadGuy</a:t>
+            </a:r>
+            <a:r>
+              <a:rPr lang="en-US" baseline="0" dirty="0" smtClean="0"/>
+              <a:t>.</a:t>
+            </a:r>
+          </a:p>
+          <a:p>
+            <a:endParaRPr lang="en-US" baseline="0" dirty="0" smtClean="0"/>
+          </a:p>
+          <a:p>
+            <a:r>
+              <a:rPr lang="en-US" baseline="0" dirty="0" smtClean="0"/>
+              <a:t>So far, so good.</a:t>
             </a:r>
             <a:endParaRPr lang="en-US" dirty="0"/>
           </a:p>
@@ -16527,7 +16658,7 @@
     </p:spTree>
     <p:extLst>
       <p:ext uri="{BB962C8B-B14F-4D97-AF65-F5344CB8AC3E}">
-        <p14:creationId xmlns:p14="http://schemas.microsoft.com/office/powerpoint/2010/main" val="1154539823"/>
+        <p14:creationId xmlns:p14="http://schemas.microsoft.com/office/powerpoint/2010/main" val="1833771112"/>
       </p:ext>
     </p:extLst>
   </p:cSld>
@@ -16582,6 +16713,42 @@
           <a:lstStyle/>
           <a:p>
             <a:r>
+              <a:rPr lang="en-US" sz="1200" kern="1200" dirty="0" smtClean="0">
+                <a:solidFill>
+                  <a:schemeClr val="tx1"/>
+                </a:solidFill>
+                <a:effectLst/>
+                <a:latin typeface="+mn-lt"/>
+                <a:ea typeface="+mn-ea"/>
+                <a:cs typeface="+mn-cs"/>
+              </a:rPr>
+              <a:t>Now, shocker, it</a:t>
+            </a:r>
+            <a:r>
+              <a:rPr lang="en-US" sz="1200" kern="1200" baseline="0" dirty="0" smtClean="0">
+                <a:solidFill>
+                  <a:schemeClr val="tx1"/>
+                </a:solidFill>
+                <a:effectLst/>
+                <a:latin typeface="+mn-lt"/>
+                <a:ea typeface="+mn-ea"/>
+                <a:cs typeface="+mn-cs"/>
+              </a:rPr>
+              <a:t> turns out that BadGuy.com isn't trustworthy. </a:t>
+            </a:r>
+            <a:r>
+              <a:rPr lang="en-US" sz="1200" kern="1200" dirty="0" smtClean="0">
+                <a:solidFill>
+                  <a:schemeClr val="tx1"/>
+                </a:solidFill>
+                <a:effectLst/>
+                <a:latin typeface="+mn-lt"/>
+                <a:ea typeface="+mn-ea"/>
+                <a:cs typeface="+mn-cs"/>
+              </a:rPr>
+              <a:t>It </a:t>
+            </a:r>
+            <a:r>
               <a:rPr lang="en-US" sz="1200" kern="1200" dirty="0">
                 <a:solidFill>
                   <a:schemeClr val="tx1"/>
@@ -16591,11 +16758,59 @@
                 <a:ea typeface="+mn-ea"/>
                 <a:cs typeface="+mn-cs"/>
               </a:rPr>
-              <a:t>Let’s say Foo.com isn’t trustworthy. It turns around and makes a login request against Bar.com, which also allows Facebook logins. </a:t>
-            </a:r>
-          </a:p>
-          <a:p>
-            <a:endParaRPr lang="en-US" sz="1200" kern="1200" dirty="0">
+              <a:t>turns around and </a:t>
+            </a:r>
+            <a:r>
+              <a:rPr lang="en-US" sz="1200" kern="1200" dirty="0" smtClean="0">
+                <a:solidFill>
+                  <a:schemeClr val="tx1"/>
+                </a:solidFill>
+                <a:effectLst/>
+                <a:latin typeface="+mn-lt"/>
+                <a:ea typeface="+mn-ea"/>
+                <a:cs typeface="+mn-cs"/>
+              </a:rPr>
+              <a:t>tries to log in </a:t>
+            </a:r>
+            <a:r>
+              <a:rPr lang="en-US" sz="1200" u="sng" kern="1200" dirty="0" smtClean="0">
+                <a:solidFill>
+                  <a:schemeClr val="tx1"/>
+                </a:solidFill>
+                <a:effectLst/>
+                <a:latin typeface="+mn-lt"/>
+                <a:ea typeface="+mn-ea"/>
+                <a:cs typeface="+mn-cs"/>
+              </a:rPr>
+              <a:t>as me</a:t>
+            </a:r>
+            <a:r>
+              <a:rPr lang="en-US" sz="1200" kern="1200" dirty="0" smtClean="0">
+                <a:solidFill>
+                  <a:schemeClr val="tx1"/>
+                </a:solidFill>
+                <a:effectLst/>
+                <a:latin typeface="+mn-lt"/>
+                <a:ea typeface="+mn-ea"/>
+                <a:cs typeface="+mn-cs"/>
+              </a:rPr>
+              <a:t> to Victim.com, </a:t>
+            </a:r>
+            <a:r>
+              <a:rPr lang="en-US" sz="1200" kern="1200" dirty="0">
+                <a:solidFill>
+                  <a:schemeClr val="tx1"/>
+                </a:solidFill>
+                <a:effectLst/>
+                <a:latin typeface="+mn-lt"/>
+                <a:ea typeface="+mn-ea"/>
+                <a:cs typeface="+mn-cs"/>
+              </a:rPr>
+              <a:t>which also allows Facebook logins. </a:t>
+            </a:r>
+          </a:p>
+          <a:p>
+            <a:endParaRPr lang="en-US" sz="1200" kern="1200" dirty="0" smtClean="0">
               <a:solidFill>
                 <a:schemeClr val="tx1"/>
               </a:solidFill>
@@ -16606,57 +16821,53 @@
             </a:endParaRPr>
           </a:p>
           <a:p>
-            <a:pPr marL="171450" indent="-171450">
-              <a:buFont typeface="Arial" panose="020B0604020202020204" pitchFamily="34" charset="0"/>
-              <a:buChar char="•"/>
-            </a:pPr>
-            <a:r>
-              <a:rPr lang="en-US" sz="1200" kern="1200" dirty="0">
-                <a:solidFill>
-                  <a:schemeClr val="tx1"/>
-                </a:solidFill>
-                <a:effectLst/>
-                <a:latin typeface="+mn-lt"/>
-                <a:ea typeface="+mn-ea"/>
-                <a:cs typeface="+mn-cs"/>
-              </a:rPr>
-              <a:t>Instead of going</a:t>
-            </a:r>
-            <a:r>
-              <a:rPr lang="en-US" sz="1200" kern="1200" baseline="0" dirty="0">
-                <a:solidFill>
-                  <a:schemeClr val="tx1"/>
-                </a:solidFill>
-                <a:effectLst/>
-                <a:latin typeface="+mn-lt"/>
-                <a:ea typeface="+mn-ea"/>
-                <a:cs typeface="+mn-cs"/>
-              </a:rPr>
-              <a:t> through </a:t>
-            </a:r>
-            <a:r>
-              <a:rPr lang="en-US" sz="1200" kern="1200" baseline="0" dirty="0" err="1">
-                <a:solidFill>
-                  <a:schemeClr val="tx1"/>
-                </a:solidFill>
-                <a:effectLst/>
-                <a:latin typeface="+mn-lt"/>
-                <a:ea typeface="+mn-ea"/>
-                <a:cs typeface="+mn-cs"/>
-              </a:rPr>
-              <a:t>Auth</a:t>
-            </a:r>
-            <a:r>
-              <a:rPr lang="en-US" sz="1200" kern="1200" baseline="0" dirty="0">
-                <a:solidFill>
-                  <a:schemeClr val="tx1"/>
-                </a:solidFill>
-                <a:effectLst/>
-                <a:latin typeface="+mn-lt"/>
-                <a:ea typeface="+mn-ea"/>
-                <a:cs typeface="+mn-cs"/>
-              </a:rPr>
-              <a:t> process, Foo </a:t>
+            <a:r>
+              <a:rPr lang="en-US" sz="1200" kern="1200" dirty="0" smtClean="0">
+                <a:solidFill>
+                  <a:schemeClr val="tx1"/>
+                </a:solidFill>
+                <a:effectLst/>
+                <a:latin typeface="+mn-lt"/>
+                <a:ea typeface="+mn-ea"/>
+                <a:cs typeface="+mn-cs"/>
+              </a:rPr>
+              <a:t>But instead of going through the </a:t>
+            </a:r>
+            <a:r>
+              <a:rPr lang="en-US" sz="1200" kern="1200" dirty="0" err="1" smtClean="0">
+                <a:solidFill>
+                  <a:schemeClr val="tx1"/>
+                </a:solidFill>
+                <a:effectLst/>
+                <a:latin typeface="+mn-lt"/>
+                <a:ea typeface="+mn-ea"/>
+                <a:cs typeface="+mn-cs"/>
+              </a:rPr>
+              <a:t>auth</a:t>
+            </a:r>
+            <a:r>
+              <a:rPr lang="en-US" sz="1200" kern="1200" baseline="0" dirty="0" smtClean="0">
+                <a:solidFill>
+                  <a:schemeClr val="tx1"/>
+                </a:solidFill>
+                <a:effectLst/>
+                <a:latin typeface="+mn-lt"/>
+                <a:ea typeface="+mn-ea"/>
+                <a:cs typeface="+mn-cs"/>
+              </a:rPr>
+              <a:t> process, BadGuy.com </a:t>
+            </a:r>
+            <a:r>
+              <a:rPr lang="en-US" sz="1200" b="1" kern="1200" baseline="0" dirty="0" smtClean="0">
+                <a:solidFill>
+                  <a:schemeClr val="tx1"/>
+                </a:solidFill>
+                <a:effectLst/>
+                <a:latin typeface="+mn-lt"/>
+                <a:ea typeface="+mn-ea"/>
+                <a:cs typeface="+mn-cs"/>
+              </a:rPr>
+              <a:t>reuses the </a:t>
             </a:r>
             <a:r>
               <a:rPr lang="en-US" sz="1200" b="1" kern="1200" baseline="0" dirty="0">
@@ -16668,7 +16879,7 @@
                 <a:ea typeface="+mn-ea"/>
                 <a:cs typeface="+mn-cs"/>
               </a:rPr>
-              <a:t>resubmits the access token </a:t>
+              <a:t>access token </a:t>
             </a:r>
             <a:r>
               <a:rPr lang="en-US" sz="1200" b="0" kern="1200" baseline="0" dirty="0">
@@ -16680,141 +16891,23 @@
                 <a:ea typeface="+mn-ea"/>
                 <a:cs typeface="+mn-cs"/>
               </a:rPr>
-              <a:t>they obtained from my authorization</a:t>
-            </a:r>
-          </a:p>
-          <a:p>
-            <a:pPr marL="171450" indent="-171450">
-              <a:buFont typeface="Arial" panose="020B0604020202020204" pitchFamily="34" charset="0"/>
-              <a:buChar char="•"/>
-            </a:pPr>
-            <a:r>
-              <a:rPr lang="en-US" sz="1200" b="0" kern="1200" baseline="0" dirty="0">
-                <a:solidFill>
-                  <a:schemeClr val="tx1"/>
-                </a:solidFill>
-                <a:effectLst/>
-                <a:latin typeface="+mn-lt"/>
-                <a:ea typeface="+mn-ea"/>
-                <a:cs typeface="+mn-cs"/>
-              </a:rPr>
-              <a:t>B</a:t>
-            </a:r>
-            <a:r>
-              <a:rPr lang="en-US" sz="1200" kern="1200" dirty="0">
-                <a:solidFill>
-                  <a:schemeClr val="tx1"/>
-                </a:solidFill>
-                <a:effectLst/>
-                <a:latin typeface="+mn-lt"/>
-                <a:ea typeface="+mn-ea"/>
-                <a:cs typeface="+mn-cs"/>
-              </a:rPr>
-              <a:t>ar </a:t>
-            </a:r>
-            <a:r>
-              <a:rPr lang="en-US" sz="1200" b="1" kern="1200" dirty="0">
-                <a:solidFill>
-                  <a:schemeClr val="tx1"/>
-                </a:solidFill>
-                <a:effectLst/>
-                <a:latin typeface="+mn-lt"/>
-                <a:ea typeface="+mn-ea"/>
-                <a:cs typeface="+mn-cs"/>
-              </a:rPr>
-              <a:t>uses that access token</a:t>
-            </a:r>
-            <a:r>
-              <a:rPr lang="en-US" sz="1200" kern="1200" dirty="0">
-                <a:solidFill>
-                  <a:schemeClr val="tx1"/>
-                </a:solidFill>
-                <a:effectLst/>
-                <a:latin typeface="+mn-lt"/>
-                <a:ea typeface="+mn-ea"/>
-                <a:cs typeface="+mn-cs"/>
-              </a:rPr>
-              <a:t> to call Facebook’s API and is given </a:t>
-            </a:r>
-            <a:r>
-              <a:rPr lang="en-US" sz="1200" b="1" kern="1200" dirty="0">
-                <a:solidFill>
-                  <a:schemeClr val="tx1"/>
-                </a:solidFill>
-                <a:effectLst/>
-                <a:latin typeface="+mn-lt"/>
-                <a:ea typeface="+mn-ea"/>
-                <a:cs typeface="+mn-cs"/>
-              </a:rPr>
-              <a:t>my data</a:t>
-            </a:r>
-          </a:p>
-          <a:p>
-            <a:pPr marL="171450" indent="-171450">
-              <a:buFont typeface="Arial" panose="020B0604020202020204" pitchFamily="34" charset="0"/>
-              <a:buChar char="•"/>
-            </a:pPr>
-            <a:r>
-              <a:rPr lang="en-US" sz="1200" b="0" kern="1200" dirty="0">
-                <a:solidFill>
-                  <a:schemeClr val="tx1"/>
-                </a:solidFill>
-                <a:effectLst/>
-                <a:latin typeface="+mn-lt"/>
-                <a:ea typeface="+mn-ea"/>
-                <a:cs typeface="+mn-cs"/>
-              </a:rPr>
-              <a:t>Bar then</a:t>
-            </a:r>
-            <a:r>
-              <a:rPr lang="en-US" sz="1200" b="0" kern="1200" baseline="0" dirty="0">
-                <a:solidFill>
-                  <a:schemeClr val="tx1"/>
-                </a:solidFill>
-                <a:effectLst/>
-                <a:latin typeface="+mn-lt"/>
-                <a:ea typeface="+mn-ea"/>
-                <a:cs typeface="+mn-cs"/>
-              </a:rPr>
-              <a:t> assumes that </a:t>
-            </a:r>
-            <a:r>
-              <a:rPr lang="en-US" sz="1200" b="1" kern="1200" baseline="0" dirty="0">
-                <a:solidFill>
-                  <a:schemeClr val="tx1"/>
-                </a:solidFill>
-                <a:effectLst/>
-                <a:latin typeface="+mn-lt"/>
-                <a:ea typeface="+mn-ea"/>
-                <a:cs typeface="+mn-cs"/>
-              </a:rPr>
-              <a:t>Foo has authenticated as me</a:t>
-            </a:r>
-            <a:r>
-              <a:rPr lang="en-US" sz="1200" kern="1200" baseline="0" dirty="0">
-                <a:solidFill>
-                  <a:schemeClr val="tx1"/>
-                </a:solidFill>
-                <a:effectLst/>
-                <a:latin typeface="+mn-lt"/>
-                <a:ea typeface="+mn-ea"/>
-                <a:cs typeface="+mn-cs"/>
-              </a:rPr>
-              <a:t>, so Foo is logged in and given access to </a:t>
-            </a:r>
-            <a:r>
-              <a:rPr lang="en-US" sz="1200" b="1" kern="1200" baseline="0" dirty="0">
-                <a:solidFill>
-                  <a:schemeClr val="tx1"/>
-                </a:solidFill>
-                <a:effectLst/>
-                <a:latin typeface="+mn-lt"/>
-                <a:ea typeface="+mn-ea"/>
-                <a:cs typeface="+mn-cs"/>
-              </a:rPr>
-              <a:t>my account with BAR</a:t>
-            </a:r>
-            <a:endParaRPr lang="en-US" sz="1200" kern="1200" dirty="0">
+              <a:t>they obtained </a:t>
+            </a:r>
+            <a:r>
+              <a:rPr lang="en-US" sz="1200" b="0" kern="1200" baseline="0" dirty="0" smtClean="0">
+                <a:solidFill>
+                  <a:schemeClr val="tx1"/>
+                </a:solidFill>
+                <a:effectLst/>
+                <a:latin typeface="+mn-lt"/>
+                <a:ea typeface="+mn-ea"/>
+                <a:cs typeface="+mn-cs"/>
+              </a:rPr>
+              <a:t>earlier, when I logged in.</a:t>
+            </a:r>
+          </a:p>
+          <a:p>
+            <a:endParaRPr lang="en-US" sz="1200" b="0" kern="1200" baseline="0" dirty="0" smtClean="0">
               <a:solidFill>
                 <a:schemeClr val="tx1"/>
               </a:solidFill>
@@ -16825,7 +16918,45 @@
             </a:endParaRPr>
           </a:p>
           <a:p>
-            <a:endParaRPr lang="en-US" sz="1200" kern="1200" dirty="0">
+            <a:r>
+              <a:rPr lang="en-US" sz="1200" b="0" kern="1200" baseline="0" dirty="0" smtClean="0">
+                <a:solidFill>
+                  <a:schemeClr val="tx1"/>
+                </a:solidFill>
+                <a:effectLst/>
+                <a:latin typeface="+mn-lt"/>
+                <a:ea typeface="+mn-ea"/>
+                <a:cs typeface="+mn-cs"/>
+              </a:rPr>
+              <a:t>So now, when Victim.com calls the API to get the related user data, they </a:t>
+            </a:r>
+            <a:r>
+              <a:rPr lang="en-US" sz="1200" b="0" i="1" kern="1200" baseline="0" dirty="0" smtClean="0">
+                <a:solidFill>
+                  <a:schemeClr val="tx1"/>
+                </a:solidFill>
+                <a:effectLst/>
+                <a:latin typeface="+mn-lt"/>
+                <a:ea typeface="+mn-ea"/>
+                <a:cs typeface="+mn-cs"/>
+              </a:rPr>
+              <a:t>also </a:t>
+            </a:r>
+            <a:r>
+              <a:rPr lang="en-US" sz="1200" b="0" i="0" kern="1200" baseline="0" dirty="0" smtClean="0">
+                <a:solidFill>
+                  <a:schemeClr val="tx1"/>
+                </a:solidFill>
+                <a:effectLst/>
+                <a:latin typeface="+mn-lt"/>
+                <a:ea typeface="+mn-ea"/>
+                <a:cs typeface="+mn-cs"/>
+              </a:rPr>
+              <a:t>get my email address back.</a:t>
+            </a:r>
+          </a:p>
+          <a:p>
+            <a:endParaRPr lang="en-US" sz="1200" b="0" i="0" kern="1200" baseline="0" dirty="0" smtClean="0">
               <a:solidFill>
                 <a:schemeClr val="tx1"/>
               </a:solidFill>
@@ -16836,7 +16967,56 @@
             </a:endParaRPr>
           </a:p>
           <a:p>
-            <a:pPr marL="171450" marR="0" indent="-171450" algn="l" defTabSz="914400" rtl="0" eaLnBrk="1" fontAlgn="auto" latinLnBrk="0" hangingPunct="1">
+            <a:r>
+              <a:rPr lang="en-US" sz="1200" b="0" i="0" kern="1200" baseline="0" dirty="0" smtClean="0">
+                <a:solidFill>
+                  <a:schemeClr val="tx1"/>
+                </a:solidFill>
+                <a:effectLst/>
+                <a:latin typeface="+mn-lt"/>
+                <a:ea typeface="+mn-ea"/>
+                <a:cs typeface="+mn-cs"/>
+              </a:rPr>
+              <a:t>If Victim uses that as proof of authentication, then it will now have allowed </a:t>
+            </a:r>
+            <a:r>
+              <a:rPr lang="en-US" sz="1200" b="0" i="0" kern="1200" baseline="0" dirty="0" err="1" smtClean="0">
+                <a:solidFill>
+                  <a:schemeClr val="tx1"/>
+                </a:solidFill>
+                <a:effectLst/>
+                <a:latin typeface="+mn-lt"/>
+                <a:ea typeface="+mn-ea"/>
+                <a:cs typeface="+mn-cs"/>
+              </a:rPr>
+              <a:t>BadGuy</a:t>
+            </a:r>
+            <a:r>
+              <a:rPr lang="en-US" sz="1200" b="0" i="0" kern="1200" baseline="0" dirty="0" smtClean="0">
+                <a:solidFill>
+                  <a:schemeClr val="tx1"/>
+                </a:solidFill>
+                <a:effectLst/>
+                <a:latin typeface="+mn-lt"/>
+                <a:ea typeface="+mn-ea"/>
+                <a:cs typeface="+mn-cs"/>
+              </a:rPr>
+              <a:t> to log into my account. </a:t>
+            </a:r>
+          </a:p>
+          <a:p>
+            <a:endParaRPr lang="en-US" sz="1200" b="0" kern="1200" baseline="0" dirty="0" smtClean="0">
+              <a:solidFill>
+                <a:schemeClr val="tx1"/>
+              </a:solidFill>
+              <a:effectLst/>
+              <a:latin typeface="+mn-lt"/>
+              <a:ea typeface="+mn-ea"/>
+              <a:cs typeface="+mn-cs"/>
+            </a:endParaRPr>
+          </a:p>
+          <a:p>
+            <a:pPr marL="0" marR="0" indent="0" algn="l" defTabSz="914400" rtl="0" eaLnBrk="1" fontAlgn="auto" latinLnBrk="0" hangingPunct="1">
               <a:lnSpc>
                 <a:spcPct val="100000"/>
               </a:lnSpc>
@@ -16849,12 +17029,12 @@
               <a:buClrTx/>
               <a:buSzTx/>
               <a:buFont typeface="Arial" panose="020B0604020202020204" pitchFamily="34" charset="0"/>
-              <a:buChar char="•"/>
+              <a:buNone/>
               <a:tabLst/>
               <a:defRPr/>
             </a:pPr>
             <a:r>
-              <a:rPr lang="en-US" sz="1200" kern="1200" dirty="0">
+              <a:rPr lang="en-US" sz="1200" kern="1200" dirty="0" smtClean="0">
                 <a:solidFill>
                   <a:schemeClr val="tx1"/>
                 </a:solidFill>
@@ -16866,6 +17046,42 @@
               <a:t>Neither</a:t>
             </a:r>
             <a:r>
+              <a:rPr lang="en-US" sz="1200" kern="1200" baseline="0" dirty="0" smtClean="0">
+                <a:solidFill>
+                  <a:schemeClr val="tx1"/>
+                </a:solidFill>
+                <a:effectLst/>
+                <a:latin typeface="+mn-lt"/>
+                <a:ea typeface="+mn-ea"/>
+                <a:cs typeface="+mn-cs"/>
+              </a:rPr>
+              <a:t> </a:t>
+            </a:r>
+            <a:r>
+              <a:rPr lang="en-US" sz="1200" kern="1200" baseline="0" dirty="0" err="1" smtClean="0">
+                <a:solidFill>
+                  <a:schemeClr val="tx1"/>
+                </a:solidFill>
+                <a:effectLst/>
+                <a:latin typeface="+mn-lt"/>
+                <a:ea typeface="+mn-ea"/>
+                <a:cs typeface="+mn-cs"/>
+              </a:rPr>
+              <a:t>BadGuy</a:t>
+            </a:r>
+            <a:r>
+              <a:rPr lang="en-US" sz="1200" kern="1200" baseline="0" dirty="0" smtClean="0">
+                <a:solidFill>
+                  <a:schemeClr val="tx1"/>
+                </a:solidFill>
+                <a:effectLst/>
+                <a:latin typeface="+mn-lt"/>
+                <a:ea typeface="+mn-ea"/>
+                <a:cs typeface="+mn-cs"/>
+              </a:rPr>
+              <a:t> nor Victim have </a:t>
+            </a:r>
+            <a:r>
               <a:rPr lang="en-US" sz="1200" kern="1200" baseline="0" dirty="0">
                 <a:solidFill>
                   <a:schemeClr val="tx1"/>
@@ -16875,7 +17091,7 @@
                 <a:ea typeface="+mn-ea"/>
                 <a:cs typeface="+mn-cs"/>
               </a:rPr>
-              <a:t> Foo nor Bar have more access to </a:t>
+              <a:t>more access to </a:t>
             </a:r>
             <a:r>
               <a:rPr lang="en-US" sz="1200" b="1" kern="1200" baseline="0" dirty="0">
@@ -16899,63 +17115,79 @@
                 <a:ea typeface="+mn-ea"/>
                 <a:cs typeface="+mn-cs"/>
               </a:rPr>
-              <a:t>than was authorized</a:t>
-            </a:r>
-          </a:p>
-          <a:p>
-            <a:pPr marL="171450" marR="0" indent="-171450" algn="l" defTabSz="914400" rtl="0" eaLnBrk="1" fontAlgn="auto" latinLnBrk="0" hangingPunct="1">
-              <a:lnSpc>
-                <a:spcPct val="100000"/>
-              </a:lnSpc>
-              <a:spcBef>
-                <a:spcPts val="0"/>
-              </a:spcBef>
-              <a:spcAft>
-                <a:spcPts val="0"/>
-              </a:spcAft>
-              <a:buClrTx/>
-              <a:buSzTx/>
-              <a:buFont typeface="Arial" panose="020B0604020202020204" pitchFamily="34" charset="0"/>
-              <a:buChar char="•"/>
-              <a:tabLst/>
-              <a:defRPr/>
-            </a:pPr>
-            <a:r>
-              <a:rPr lang="en-US" sz="1200" b="0" kern="1200" baseline="0" dirty="0">
-                <a:solidFill>
-                  <a:schemeClr val="tx1"/>
-                </a:solidFill>
-                <a:effectLst/>
-                <a:latin typeface="+mn-lt"/>
-                <a:ea typeface="+mn-ea"/>
-                <a:cs typeface="+mn-cs"/>
-              </a:rPr>
-              <a:t>Foo has </a:t>
-            </a:r>
-            <a:r>
-              <a:rPr lang="en-US" sz="1200" b="1" kern="1200" baseline="0" dirty="0">
-                <a:solidFill>
-                  <a:schemeClr val="tx1"/>
-                </a:solidFill>
-                <a:effectLst/>
-                <a:latin typeface="+mn-lt"/>
-                <a:ea typeface="+mn-ea"/>
-                <a:cs typeface="+mn-cs"/>
-              </a:rPr>
-              <a:t>impersonated me</a:t>
-            </a:r>
-            <a:r>
-              <a:rPr lang="en-US" sz="1200" b="0" kern="1200" baseline="0" dirty="0">
-                <a:solidFill>
-                  <a:schemeClr val="tx1"/>
-                </a:solidFill>
-                <a:effectLst/>
-                <a:latin typeface="+mn-lt"/>
-                <a:ea typeface="+mn-ea"/>
-                <a:cs typeface="+mn-cs"/>
-              </a:rPr>
-              <a:t> at BAR and can access Bar’s data associated with my account</a:t>
-            </a:r>
+              <a:t>than was </a:t>
+            </a:r>
+            <a:r>
+              <a:rPr lang="en-US" sz="1200" b="0" kern="1200" baseline="0" dirty="0" smtClean="0">
+                <a:solidFill>
+                  <a:schemeClr val="tx1"/>
+                </a:solidFill>
+                <a:effectLst/>
+                <a:latin typeface="+mn-lt"/>
+                <a:ea typeface="+mn-ea"/>
+                <a:cs typeface="+mn-cs"/>
+              </a:rPr>
+              <a:t>authorized, but </a:t>
+            </a:r>
+            <a:r>
+              <a:rPr lang="en-US" sz="1200" b="0" kern="1200" baseline="0" dirty="0" err="1" smtClean="0">
+                <a:solidFill>
+                  <a:schemeClr val="tx1"/>
+                </a:solidFill>
+                <a:effectLst/>
+                <a:latin typeface="+mn-lt"/>
+                <a:ea typeface="+mn-ea"/>
+                <a:cs typeface="+mn-cs"/>
+              </a:rPr>
+              <a:t>BadGuy</a:t>
+            </a:r>
+            <a:r>
+              <a:rPr lang="en-US" sz="1200" b="0" kern="1200" baseline="0" dirty="0" smtClean="0">
+                <a:solidFill>
+                  <a:schemeClr val="tx1"/>
+                </a:solidFill>
+                <a:effectLst/>
+                <a:latin typeface="+mn-lt"/>
+                <a:ea typeface="+mn-ea"/>
+                <a:cs typeface="+mn-cs"/>
+              </a:rPr>
+              <a:t> now </a:t>
+            </a:r>
+            <a:r>
+              <a:rPr lang="en-US" sz="1200" b="0" i="1" kern="1200" baseline="0" dirty="0" smtClean="0">
+                <a:solidFill>
+                  <a:schemeClr val="tx1"/>
+                </a:solidFill>
+                <a:effectLst/>
+                <a:latin typeface="+mn-lt"/>
+                <a:ea typeface="+mn-ea"/>
+                <a:cs typeface="+mn-cs"/>
+              </a:rPr>
+              <a:t>also </a:t>
+            </a:r>
+            <a:r>
+              <a:rPr lang="en-US" sz="1200" b="0" i="0" kern="1200" baseline="0" dirty="0" smtClean="0">
+                <a:solidFill>
+                  <a:schemeClr val="tx1"/>
+                </a:solidFill>
+                <a:effectLst/>
+                <a:latin typeface="+mn-lt"/>
+                <a:ea typeface="+mn-ea"/>
+                <a:cs typeface="+mn-cs"/>
+              </a:rPr>
+              <a:t>has access to my data at Victim.</a:t>
+            </a:r>
+            <a:endParaRPr lang="en-US" sz="1200" b="0" kern="1200" baseline="0" dirty="0">
+              <a:solidFill>
+                <a:schemeClr val="tx1"/>
+              </a:solidFill>
+              <a:effectLst/>
+              <a:latin typeface="+mn-lt"/>
+              <a:ea typeface="+mn-ea"/>
+              <a:cs typeface="+mn-cs"/>
+            </a:endParaRPr>
+          </a:p>
+          <a:p>
             <a:endParaRPr lang="en-US" sz="1200" kern="1200" dirty="0">
               <a:solidFill>
                 <a:schemeClr val="tx1"/>
@@ -16967,6 +17199,77 @@
             </a:endParaRPr>
           </a:p>
           <a:p>
+            <a:r>
+              <a:rPr lang="en-US" sz="1200" kern="1200" dirty="0">
+                <a:solidFill>
+                  <a:schemeClr val="tx1"/>
+                </a:solidFill>
+                <a:effectLst/>
+                <a:latin typeface="+mn-lt"/>
+                <a:ea typeface="+mn-ea"/>
+                <a:cs typeface="+mn-cs"/>
+              </a:rPr>
+              <a:t>P</a:t>
+            </a:r>
+            <a:r>
+              <a:rPr lang="en-US" sz="1200" kern="1200" baseline="0" dirty="0">
+                <a:solidFill>
+                  <a:schemeClr val="tx1"/>
+                </a:solidFill>
+                <a:effectLst/>
+                <a:latin typeface="+mn-lt"/>
+                <a:ea typeface="+mn-ea"/>
+                <a:cs typeface="+mn-cs"/>
+              </a:rPr>
+              <a:t>ossible because OAuth access tokens do not have </a:t>
+            </a:r>
+            <a:r>
+              <a:rPr lang="en-US" sz="1200" b="1" kern="1200" baseline="0" dirty="0">
+                <a:solidFill>
+                  <a:schemeClr val="tx1"/>
+                </a:solidFill>
+                <a:effectLst/>
+                <a:latin typeface="+mn-lt"/>
+                <a:ea typeface="+mn-ea"/>
+                <a:cs typeface="+mn-cs"/>
+              </a:rPr>
+              <a:t>audience restriction</a:t>
+            </a:r>
+            <a:r>
+              <a:rPr lang="en-US" sz="1200" kern="1200" baseline="0" dirty="0">
+                <a:solidFill>
+                  <a:schemeClr val="tx1"/>
+                </a:solidFill>
+                <a:effectLst/>
+                <a:latin typeface="+mn-lt"/>
+                <a:ea typeface="+mn-ea"/>
+                <a:cs typeface="+mn-cs"/>
+              </a:rPr>
+              <a:t>. This is a problem with bearer </a:t>
+            </a:r>
+            <a:r>
+              <a:rPr lang="en-US" sz="1200" kern="1200" baseline="0" dirty="0" smtClean="0">
+                <a:solidFill>
+                  <a:schemeClr val="tx1"/>
+                </a:solidFill>
+                <a:effectLst/>
+                <a:latin typeface="+mn-lt"/>
+                <a:ea typeface="+mn-ea"/>
+                <a:cs typeface="+mn-cs"/>
+              </a:rPr>
+              <a:t>tokens in general; Victim has no way to know that it's being compromised.</a:t>
+            </a:r>
+            <a:endParaRPr lang="en-US" sz="1200" kern="1200" baseline="0" dirty="0">
+              <a:solidFill>
+                <a:schemeClr val="tx1"/>
+              </a:solidFill>
+              <a:effectLst/>
+              <a:latin typeface="+mn-lt"/>
+              <a:ea typeface="+mn-ea"/>
+              <a:cs typeface="+mn-cs"/>
+            </a:endParaRPr>
+          </a:p>
+          <a:p>
             <a:endParaRPr lang="en-US" sz="1200" kern="1200" dirty="0">
               <a:solidFill>
                 <a:schemeClr val="tx1"/>
@@ -16978,67 +17281,6 @@
             </a:endParaRPr>
           </a:p>
           <a:p>
-            <a:r>
-              <a:rPr lang="en-US" sz="1200" kern="1200" dirty="0">
-                <a:solidFill>
-                  <a:schemeClr val="tx1"/>
-                </a:solidFill>
-                <a:effectLst/>
-                <a:latin typeface="+mn-lt"/>
-                <a:ea typeface="+mn-ea"/>
-                <a:cs typeface="+mn-cs"/>
-              </a:rPr>
-              <a:t>P</a:t>
-            </a:r>
-            <a:r>
-              <a:rPr lang="en-US" sz="1200" kern="1200" baseline="0" dirty="0">
-                <a:solidFill>
-                  <a:schemeClr val="tx1"/>
-                </a:solidFill>
-                <a:effectLst/>
-                <a:latin typeface="+mn-lt"/>
-                <a:ea typeface="+mn-ea"/>
-                <a:cs typeface="+mn-cs"/>
-              </a:rPr>
-              <a:t>ossible because OAuth access tokens do not have </a:t>
-            </a:r>
-            <a:r>
-              <a:rPr lang="en-US" sz="1200" b="1" kern="1200" baseline="0" dirty="0">
-                <a:solidFill>
-                  <a:schemeClr val="tx1"/>
-                </a:solidFill>
-                <a:effectLst/>
-                <a:latin typeface="+mn-lt"/>
-                <a:ea typeface="+mn-ea"/>
-                <a:cs typeface="+mn-cs"/>
-              </a:rPr>
-              <a:t>audience restriction</a:t>
-            </a:r>
-            <a:r>
-              <a:rPr lang="en-US" sz="1200" kern="1200" baseline="0" dirty="0">
-                <a:solidFill>
-                  <a:schemeClr val="tx1"/>
-                </a:solidFill>
-                <a:effectLst/>
-                <a:latin typeface="+mn-lt"/>
-                <a:ea typeface="+mn-ea"/>
-                <a:cs typeface="+mn-cs"/>
-              </a:rPr>
-              <a:t>. This is a problem with bearer tokens, Bar doesn’t know that the access token is being misused.</a:t>
-            </a:r>
-          </a:p>
-          <a:p>
-            <a:endParaRPr lang="en-US" sz="1200" kern="1200" dirty="0">
-              <a:solidFill>
-                <a:schemeClr val="tx1"/>
-              </a:solidFill>
-              <a:effectLst/>
-              <a:latin typeface="+mn-lt"/>
-              <a:ea typeface="+mn-ea"/>
-              <a:cs typeface="+mn-cs"/>
-            </a:endParaRPr>
-          </a:p>
-          <a:p>
             <a:endParaRPr lang="en-US" dirty="0"/>
           </a:p>
         </p:txBody>
@@ -17069,7 +17311,7 @@
     </p:spTree>
     <p:extLst>
       <p:ext uri="{BB962C8B-B14F-4D97-AF65-F5344CB8AC3E}">
-        <p14:creationId xmlns:p14="http://schemas.microsoft.com/office/powerpoint/2010/main" val="1850142803"/>
+        <p14:creationId xmlns:p14="http://schemas.microsoft.com/office/powerpoint/2010/main" val="3998374396"/>
       </p:ext>
     </p:extLst>
   </p:cSld>
@@ -17209,6 +17451,27 @@
               </a:rPr>
               <a:t> need to </a:t>
             </a:r>
+            <a:r>
+              <a:rPr lang="en-US" sz="1200" kern="1200" baseline="0" dirty="0" smtClean="0">
+                <a:solidFill>
+                  <a:schemeClr val="tx1"/>
+                </a:solidFill>
+                <a:effectLst/>
+                <a:latin typeface="+mn-lt"/>
+                <a:ea typeface="+mn-ea"/>
+                <a:cs typeface="+mn-cs"/>
+              </a:rPr>
+              <a:t>include some additional stuff:</a:t>
+            </a:r>
+            <a:endParaRPr lang="en-US" sz="1200" kern="1200" baseline="0" dirty="0">
+              <a:solidFill>
+                <a:schemeClr val="tx1"/>
+              </a:solidFill>
+              <a:effectLst/>
+              <a:latin typeface="+mn-lt"/>
+              <a:ea typeface="+mn-ea"/>
+              <a:cs typeface="+mn-cs"/>
+            </a:endParaRPr>
           </a:p>
           <a:p>
             <a:pPr marL="171450" indent="-171450">
@@ -17336,19 +17599,55 @@
                 <a:ea typeface="+mn-ea"/>
                 <a:cs typeface="+mn-cs"/>
               </a:rPr>
-              <a:t>That way, only that one authorized client would be able to use the token, and the token itself would be</a:t>
-            </a:r>
-            <a:r>
-              <a:rPr lang="en-US" sz="1200" kern="1200" baseline="0" dirty="0">
-                <a:solidFill>
-                  <a:schemeClr val="tx1"/>
-                </a:solidFill>
-                <a:effectLst/>
-                <a:latin typeface="+mn-lt"/>
-                <a:ea typeface="+mn-ea"/>
-                <a:cs typeface="+mn-cs"/>
-              </a:rPr>
-              <a:t> proof of identity</a:t>
+              <a:t>That way, </a:t>
+            </a:r>
+            <a:r>
+              <a:rPr lang="en-US" sz="1200" kern="1200" dirty="0" smtClean="0">
+                <a:solidFill>
+                  <a:schemeClr val="tx1"/>
+                </a:solidFill>
+                <a:effectLst/>
+                <a:latin typeface="+mn-lt"/>
+                <a:ea typeface="+mn-ea"/>
+                <a:cs typeface="+mn-cs"/>
+              </a:rPr>
+              <a:t>only </a:t>
+            </a:r>
+            <a:r>
+              <a:rPr lang="en-US" sz="1200" kern="1200" dirty="0" err="1" smtClean="0">
+                <a:solidFill>
+                  <a:schemeClr val="tx1"/>
+                </a:solidFill>
+                <a:effectLst/>
+                <a:latin typeface="+mn-lt"/>
+                <a:ea typeface="+mn-ea"/>
+                <a:cs typeface="+mn-cs"/>
+              </a:rPr>
+              <a:t>BadGuy</a:t>
+            </a:r>
+            <a:r>
+              <a:rPr lang="en-US" sz="1200" kern="1200" dirty="0" smtClean="0">
+                <a:solidFill>
+                  <a:schemeClr val="tx1"/>
+                </a:solidFill>
+                <a:effectLst/>
+                <a:latin typeface="+mn-lt"/>
+                <a:ea typeface="+mn-ea"/>
+                <a:cs typeface="+mn-cs"/>
+              </a:rPr>
+              <a:t> would be able to use the token that I authorized, and the</a:t>
+            </a:r>
+            <a:r>
+              <a:rPr lang="en-US" sz="1200" kern="1200" baseline="0" dirty="0" smtClean="0">
+                <a:solidFill>
+                  <a:schemeClr val="tx1"/>
+                </a:solidFill>
+                <a:effectLst/>
+                <a:latin typeface="+mn-lt"/>
+                <a:ea typeface="+mn-ea"/>
+                <a:cs typeface="+mn-cs"/>
+              </a:rPr>
+              <a:t> token could also serve as proof of identity to that authorized client only.</a:t>
             </a:r>
             <a:endParaRPr lang="en-US" sz="1200" kern="1200" dirty="0">
               <a:solidFill>
@@ -18593,16 +18892,76 @@
           <a:lstStyle/>
           <a:p>
             <a:r>
-              <a:rPr lang="en-US" sz="1200" kern="1200" dirty="0">
-                <a:solidFill>
-                  <a:schemeClr val="tx1"/>
-                </a:solidFill>
-                <a:effectLst/>
-                <a:latin typeface="+mn-lt"/>
-                <a:ea typeface="+mn-ea"/>
-                <a:cs typeface="+mn-cs"/>
-              </a:rPr>
-              <a:t>If you're</a:t>
+              <a:rPr lang="en-US" sz="1200" kern="1200" dirty="0" smtClean="0">
+                <a:solidFill>
+                  <a:schemeClr val="tx1"/>
+                </a:solidFill>
+                <a:effectLst/>
+                <a:latin typeface="+mn-lt"/>
+                <a:ea typeface="+mn-ea"/>
+                <a:cs typeface="+mn-cs"/>
+              </a:rPr>
+              <a:t>Basic </a:t>
+            </a:r>
+            <a:r>
+              <a:rPr lang="en-US" sz="1200" kern="1200" dirty="0" err="1" smtClean="0">
+                <a:solidFill>
+                  <a:schemeClr val="tx1"/>
+                </a:solidFill>
+                <a:effectLst/>
+                <a:latin typeface="+mn-lt"/>
+                <a:ea typeface="+mn-ea"/>
+                <a:cs typeface="+mn-cs"/>
+              </a:rPr>
+              <a:t>Auth</a:t>
+            </a:r>
+            <a:r>
+              <a:rPr lang="en-US" sz="1200" kern="1200" dirty="0" smtClean="0">
+                <a:solidFill>
+                  <a:schemeClr val="tx1"/>
+                </a:solidFill>
+                <a:effectLst/>
+                <a:latin typeface="+mn-lt"/>
+                <a:ea typeface="+mn-ea"/>
+                <a:cs typeface="+mn-cs"/>
+              </a:rPr>
+              <a:t> might</a:t>
+            </a:r>
+            <a:r>
+              <a:rPr lang="en-US" sz="1200" kern="1200" baseline="0" dirty="0" smtClean="0">
+                <a:solidFill>
+                  <a:schemeClr val="tx1"/>
+                </a:solidFill>
+                <a:effectLst/>
+                <a:latin typeface="+mn-lt"/>
+                <a:ea typeface="+mn-ea"/>
+                <a:cs typeface="+mn-cs"/>
+              </a:rPr>
+              <a:t> be a good fit for </a:t>
+            </a:r>
+            <a:r>
+              <a:rPr lang="en-US" sz="1200" kern="1200" dirty="0" smtClean="0">
+                <a:solidFill>
+                  <a:schemeClr val="tx1"/>
+                </a:solidFill>
+                <a:effectLst/>
+                <a:latin typeface="+mn-lt"/>
+                <a:ea typeface="+mn-ea"/>
+                <a:cs typeface="+mn-cs"/>
+              </a:rPr>
+              <a:t>server-to-server</a:t>
+            </a:r>
+            <a:r>
+              <a:rPr lang="en-US" sz="1200" kern="1200" baseline="0" dirty="0" smtClean="0">
+                <a:solidFill>
+                  <a:schemeClr val="tx1"/>
+                </a:solidFill>
+                <a:effectLst/>
+                <a:latin typeface="+mn-lt"/>
+                <a:ea typeface="+mn-ea"/>
+                <a:cs typeface="+mn-cs"/>
+              </a:rPr>
+              <a:t> </a:t>
             </a:r>
             <a:r>
               <a:rPr lang="en-US" sz="1200" kern="1200" baseline="0" dirty="0">
@@ -18614,34 +18973,10 @@
                 <a:ea typeface="+mn-ea"/>
                 <a:cs typeface="+mn-cs"/>
               </a:rPr>
-              <a:t> </a:t>
-            </a:r>
-            <a:r>
-              <a:rPr lang="en-US" sz="1200" kern="1200" dirty="0">
-                <a:solidFill>
-                  <a:schemeClr val="tx1"/>
-                </a:solidFill>
-                <a:effectLst/>
-                <a:latin typeface="+mn-lt"/>
-                <a:ea typeface="+mn-ea"/>
-                <a:cs typeface="+mn-cs"/>
-              </a:rPr>
-              <a:t>authenticating server-to-server</a:t>
-            </a:r>
-            <a:r>
-              <a:rPr lang="en-US" sz="1200" kern="1200" baseline="0" dirty="0">
-                <a:solidFill>
-                  <a:schemeClr val="tx1"/>
-                </a:solidFill>
-                <a:effectLst/>
-                <a:latin typeface="+mn-lt"/>
-                <a:ea typeface="+mn-ea"/>
-                <a:cs typeface="+mn-cs"/>
-              </a:rPr>
-              <a:t> API calls against a standard user database such as </a:t>
-            </a:r>
-            <a:r>
-              <a:rPr lang="en-US" sz="1200" kern="1200" dirty="0" err="1">
+              <a:t>API calls against a standard user database such as </a:t>
+            </a:r>
+            <a:r>
+              <a:rPr lang="en-US" sz="1200" kern="1200" dirty="0" err="1" smtClean="0">
                 <a:solidFill>
                   <a:schemeClr val="tx1"/>
                 </a:solidFill>
@@ -18653,43 +18988,29 @@
               <a:t>ActiveDirectory</a:t>
             </a:r>
             <a:r>
-              <a:rPr lang="en-US" sz="1200" kern="1200" dirty="0">
-                <a:solidFill>
-                  <a:schemeClr val="tx1"/>
-                </a:solidFill>
-                <a:effectLst/>
-                <a:latin typeface="+mn-lt"/>
-                <a:ea typeface="+mn-ea"/>
-                <a:cs typeface="+mn-cs"/>
-              </a:rPr>
-              <a:t>, then Basic </a:t>
-            </a:r>
-            <a:r>
-              <a:rPr lang="en-US" sz="1200" kern="1200" dirty="0" err="1">
-                <a:solidFill>
-                  <a:schemeClr val="tx1"/>
-                </a:solidFill>
-                <a:effectLst/>
-                <a:latin typeface="+mn-lt"/>
-                <a:ea typeface="+mn-ea"/>
-                <a:cs typeface="+mn-cs"/>
-              </a:rPr>
-              <a:t>Auth</a:t>
-            </a:r>
-            <a:r>
-              <a:rPr lang="en-US" sz="1200" kern="1200" dirty="0">
-                <a:solidFill>
-                  <a:schemeClr val="tx1"/>
-                </a:solidFill>
-                <a:effectLst/>
-                <a:latin typeface="+mn-lt"/>
-                <a:ea typeface="+mn-ea"/>
-                <a:cs typeface="+mn-cs"/>
-              </a:rPr>
-              <a:t> is worth considering. </a:t>
-            </a:r>
-          </a:p>
-          <a:p>
+              <a:rPr lang="en-US" sz="1200" kern="1200" dirty="0" smtClean="0">
+                <a:solidFill>
+                  <a:schemeClr val="tx1"/>
+                </a:solidFill>
+                <a:effectLst/>
+                <a:latin typeface="+mn-lt"/>
+                <a:ea typeface="+mn-ea"/>
+                <a:cs typeface="+mn-cs"/>
+              </a:rPr>
+              <a:t>. Just remember that you're passing the primary</a:t>
+            </a:r>
+            <a:r>
+              <a:rPr lang="en-US" sz="1200" kern="1200" baseline="0" dirty="0" smtClean="0">
+                <a:solidFill>
+                  <a:schemeClr val="tx1"/>
+                </a:solidFill>
+                <a:effectLst/>
+                <a:latin typeface="+mn-lt"/>
+                <a:ea typeface="+mn-ea"/>
+                <a:cs typeface="+mn-cs"/>
+              </a:rPr>
+              <a:t> account credentials over the wire in plain text.</a:t>
+            </a:r>
             <a:endParaRPr lang="en-US" sz="1200" kern="1200" dirty="0">
               <a:solidFill>
                 <a:schemeClr val="tx1"/>
@@ -18701,66 +19022,15 @@
             </a:endParaRPr>
           </a:p>
           <a:p>
-            <a:r>
-              <a:rPr lang="en-US" sz="1200" kern="1200" dirty="0">
-                <a:solidFill>
-                  <a:schemeClr val="tx1"/>
-                </a:solidFill>
-                <a:effectLst/>
-                <a:latin typeface="+mn-lt"/>
-                <a:ea typeface="+mn-ea"/>
-                <a:cs typeface="+mn-cs"/>
-              </a:rPr>
-              <a:t>Basic </a:t>
-            </a:r>
-            <a:r>
-              <a:rPr lang="en-US" sz="1200" kern="1200" dirty="0" err="1">
-                <a:solidFill>
-                  <a:schemeClr val="tx1"/>
-                </a:solidFill>
-                <a:effectLst/>
-                <a:latin typeface="+mn-lt"/>
-                <a:ea typeface="+mn-ea"/>
-                <a:cs typeface="+mn-cs"/>
-              </a:rPr>
-              <a:t>Auth</a:t>
-            </a:r>
-            <a:r>
-              <a:rPr lang="en-US" sz="1200" kern="1200" dirty="0">
-                <a:solidFill>
-                  <a:schemeClr val="tx1"/>
-                </a:solidFill>
-                <a:effectLst/>
-                <a:latin typeface="+mn-lt"/>
-                <a:ea typeface="+mn-ea"/>
-                <a:cs typeface="+mn-cs"/>
-              </a:rPr>
-              <a:t> is </a:t>
-            </a:r>
-            <a:r>
-              <a:rPr lang="en-US" sz="1200" i="1" kern="1200" dirty="0">
-                <a:solidFill>
-                  <a:schemeClr val="tx1"/>
-                </a:solidFill>
-                <a:effectLst/>
-                <a:latin typeface="+mn-lt"/>
-                <a:ea typeface="+mn-ea"/>
-                <a:cs typeface="+mn-cs"/>
-              </a:rPr>
-              <a:t>not </a:t>
-            </a:r>
-            <a:r>
-              <a:rPr lang="en-US" sz="1200" kern="1200" dirty="0">
-                <a:solidFill>
-                  <a:schemeClr val="tx1"/>
-                </a:solidFill>
-                <a:effectLst/>
-                <a:latin typeface="+mn-lt"/>
-                <a:ea typeface="+mn-ea"/>
-                <a:cs typeface="+mn-cs"/>
-              </a:rPr>
-              <a:t>a good idea for a pure JS client because it requires storing the credentials somewhere in browser memory, which is generally a bad idea.</a:t>
-            </a:r>
+            <a:endParaRPr lang="en-US" sz="1200" kern="1200" dirty="0">
+              <a:solidFill>
+                <a:schemeClr val="tx1"/>
+              </a:solidFill>
+              <a:effectLst/>
+              <a:latin typeface="+mn-lt"/>
+              <a:ea typeface="+mn-ea"/>
+              <a:cs typeface="+mn-cs"/>
+            </a:endParaRPr>
           </a:p>
         </p:txBody>
       </p:sp>
@@ -20461,9 +20731,9 @@
                 <a:ea typeface="+mn-ea"/>
                 <a:cs typeface="+mn-cs"/>
               </a:rPr>
-              <a:t> Connect on top of OAuth 2.0. This will let your users authenticate to your API with their Google accounts, for example.</a:t>
-            </a:r>
-            <a:endParaRPr lang="en-US" sz="1200" kern="1200" dirty="0">
+              <a:t> Connect on top of OAuth 2.0. </a:t>
+            </a:r>
+            <a:endParaRPr lang="en-US" sz="1200" b="0" kern="1200" baseline="0" dirty="0" smtClean="0">
               <a:solidFill>
                 <a:schemeClr val="tx1"/>
               </a:solidFill>
@@ -20845,7 +21115,55 @@
                 <a:ea typeface="+mn-ea"/>
                 <a:cs typeface="+mn-cs"/>
               </a:rPr>
-              <a:t>You can use custom API keys as bearer tokens over TLS for a quick and easy approach, or you can use API Keys to sign request using HMAC if you need additional security.</a:t>
+              <a:t>You can use custom API keys as bearer tokens </a:t>
+            </a:r>
+            <a:r>
+              <a:rPr lang="en-US" sz="1200" kern="1200" dirty="0" smtClean="0">
+                <a:solidFill>
+                  <a:schemeClr val="tx1"/>
+                </a:solidFill>
+                <a:effectLst/>
+                <a:latin typeface="+mn-lt"/>
+                <a:ea typeface="+mn-ea"/>
+                <a:cs typeface="+mn-cs"/>
+              </a:rPr>
+              <a:t>for </a:t>
+            </a:r>
+            <a:r>
+              <a:rPr lang="en-US" sz="1200" kern="1200" dirty="0">
+                <a:solidFill>
+                  <a:schemeClr val="tx1"/>
+                </a:solidFill>
+                <a:effectLst/>
+                <a:latin typeface="+mn-lt"/>
+                <a:ea typeface="+mn-ea"/>
+                <a:cs typeface="+mn-cs"/>
+              </a:rPr>
+              <a:t>a quick and easy approach, or you can use API Keys to sign request using HMAC </a:t>
+            </a:r>
+            <a:r>
+              <a:rPr lang="en-US" sz="1200" kern="1200" dirty="0" smtClean="0">
+                <a:solidFill>
+                  <a:schemeClr val="tx1"/>
+                </a:solidFill>
+                <a:effectLst/>
+                <a:latin typeface="+mn-lt"/>
+                <a:ea typeface="+mn-ea"/>
+                <a:cs typeface="+mn-cs"/>
+              </a:rPr>
+              <a:t>for additional </a:t>
+            </a:r>
+            <a:r>
+              <a:rPr lang="en-US" sz="1200" kern="1200" dirty="0">
+                <a:solidFill>
+                  <a:schemeClr val="tx1"/>
+                </a:solidFill>
+                <a:effectLst/>
+                <a:latin typeface="+mn-lt"/>
+                <a:ea typeface="+mn-ea"/>
+                <a:cs typeface="+mn-cs"/>
+              </a:rPr>
+              <a:t>security.</a:t>
             </a:r>
             <a:br>
               <a:rPr lang="en-US" sz="1200" kern="1200" dirty="0">
@@ -31703,6 +32021,95 @@
           </a:prstGeom>
         </p:spPr>
       </p:pic>
+      <p:pic>
+        <p:nvPicPr>
+          <p:cNvPr id="2" name="Picture 1"/>
+          <p:cNvPicPr>
+            <a:picLocks noChangeAspect="1"/>
+          </p:cNvPicPr>
+          <p:nvPr/>
+        </p:nvPicPr>
+        <p:blipFill>
+          <a:blip r:embed="rId5"/>
+          <a:stretch>
+            <a:fillRect/>
+          </a:stretch>
+        </p:blipFill>
+        <p:spPr>
+          <a:xfrm>
+            <a:off x="1314450" y="2811514"/>
+            <a:ext cx="10338785" cy="4046486"/>
+          </a:xfrm>
+          <a:prstGeom prst="rect">
+            <a:avLst/>
+          </a:prstGeom>
+        </p:spPr>
+      </p:pic>
+      <p:pic>
+        <p:nvPicPr>
+          <p:cNvPr id="4" name="Picture 3"/>
+          <p:cNvPicPr>
+            <a:picLocks noChangeAspect="1"/>
+          </p:cNvPicPr>
+          <p:nvPr/>
+        </p:nvPicPr>
+        <p:blipFill>
+          <a:blip r:embed="rId5"/>
+          <a:stretch>
+            <a:fillRect/>
+          </a:stretch>
+        </p:blipFill>
+        <p:spPr>
+          <a:xfrm>
+            <a:off x="7585482" y="2678943"/>
+            <a:ext cx="855663" cy="228600"/>
+          </a:xfrm>
+          <a:prstGeom prst="rect">
+            <a:avLst/>
+          </a:prstGeom>
+        </p:spPr>
+      </p:pic>
+      <p:pic>
+        <p:nvPicPr>
+          <p:cNvPr id="8" name="Picture 2" descr="Image result for facebook oauth"/>
+          <p:cNvPicPr>
+            <a:picLocks noChangeAspect="1" noChangeArrowheads="1"/>
+          </p:cNvPicPr>
+          <p:nvPr/>
+        </p:nvPicPr>
+        <p:blipFill>
+          <a:blip r:embed="rId6">
+            <a:extLst>
+              <a:ext uri="{28A0092B-C50C-407E-A947-70E740481C1C}">
+                <a14:useLocalDpi xmlns:a14="http://schemas.microsoft.com/office/drawing/2010/main" val="0"/>
+              </a:ext>
+            </a:extLst>
+          </a:blip>
+          <a:srcRect/>
+          <a:stretch>
+            <a:fillRect/>
+          </a:stretch>
+        </p:blipFill>
+        <p:spPr bwMode="auto">
+          <a:xfrm>
+            <a:off x="7585482" y="3003572"/>
+            <a:ext cx="3619500" cy="2355459"/>
+          </a:xfrm>
+          <a:prstGeom prst="rect">
+            <a:avLst/>
+          </a:prstGeom>
+          <a:noFill/>
+          <a:extLst>
+            <a:ext uri="{909E8E84-426E-40DD-AFC4-6F175D3DCCD1}">
+              <a14:hiddenFill xmlns:a14="http://schemas.microsoft.com/office/drawing/2010/main">
+                <a:solidFill>
+                  <a:srgbClr val="FFFFFF"/>
+                </a:solidFill>
+              </a14:hiddenFill>
+            </a:ext>
+          </a:extLst>
+        </p:spPr>
+      </p:pic>
     </p:spTree>
     <p:extLst>
       <p:ext uri="{BB962C8B-B14F-4D97-AF65-F5344CB8AC3E}">
@@ -31776,32 +32183,49 @@
       </p:sp>
       <p:pic>
         <p:nvPicPr>
-          <p:cNvPr id="4" name="Picture 3"/>
+          <p:cNvPr id="1026" name="Picture 2" descr="Image result for facebook oauth"/>
           <p:cNvPicPr>
-            <a:picLocks noChangeAspect="1"/>
+            <a:picLocks noChangeAspect="1" noChangeArrowheads="1"/>
           </p:cNvPicPr>
           <p:nvPr/>
         </p:nvPicPr>
         <p:blipFill>
-          <a:blip r:embed="rId3"/>
+          <a:blip r:embed="rId3">
+            <a:extLst>
+              <a:ext uri="{28A0092B-C50C-407E-A947-70E740481C1C}">
+                <a14:useLocalDpi xmlns:a14="http://schemas.microsoft.com/office/drawing/2010/main" val="0"/>
+              </a:ext>
+            </a:extLst>
+          </a:blip>
+          <a:srcRect/>
           <a:stretch>
             <a:fillRect/>
           </a:stretch>
         </p:blipFill>
-        <p:spPr>
+        <p:spPr bwMode="auto">
           <a:xfrm>
-            <a:off x="0" y="199495"/>
-            <a:ext cx="11591767" cy="6489171"/>
+            <a:off x="838200" y="152227"/>
+            <a:ext cx="10304379" cy="6705773"/>
           </a:xfrm>
           <a:prstGeom prst="rect">
             <a:avLst/>
           </a:prstGeom>
+          <a:noFill/>
+          <a:extLst>
+            <a:ext uri="{909E8E84-426E-40DD-AFC4-6F175D3DCCD1}">
+              <a14:hiddenFill xmlns:a14="http://schemas.microsoft.com/office/drawing/2010/main">
+                <a:solidFill>
+                  <a:srgbClr val="FFFFFF"/>
+                </a:solidFill>
+              </a14:hiddenFill>
+            </a:ext>
+          </a:extLst>
         </p:spPr>
       </p:pic>
     </p:spTree>
     <p:extLst>
       <p:ext uri="{BB962C8B-B14F-4D97-AF65-F5344CB8AC3E}">
-        <p14:creationId xmlns:p14="http://schemas.microsoft.com/office/powerpoint/2010/main" val="325513960"/>
+        <p14:creationId xmlns:p14="http://schemas.microsoft.com/office/powerpoint/2010/main" val="3951009632"/>
       </p:ext>
     </p:extLst>
   </p:cSld>
@@ -33233,7 +33657,7 @@
       </p:sp>
       <p:pic>
         <p:nvPicPr>
-          <p:cNvPr id="6" name="Picture 5"/>
+          <p:cNvPr id="4" name="Picture 3"/>
           <p:cNvPicPr>
             <a:picLocks noChangeAspect="1"/>
           </p:cNvPicPr>
@@ -33247,8 +33671,8 @@
         </p:blipFill>
         <p:spPr>
           <a:xfrm>
-            <a:off x="838200" y="2501765"/>
-            <a:ext cx="10804367" cy="2845150"/>
+            <a:off x="2776320" y="1544588"/>
+            <a:ext cx="6920130" cy="4872530"/>
           </a:xfrm>
           <a:prstGeom prst="rect">
             <a:avLst/>
@@ -33258,7 +33682,7 @@
     </p:spTree>
     <p:extLst>
       <p:ext uri="{BB962C8B-B14F-4D97-AF65-F5344CB8AC3E}">
-        <p14:creationId xmlns:p14="http://schemas.microsoft.com/office/powerpoint/2010/main" val="2795867134"/>
+        <p14:creationId xmlns:p14="http://schemas.microsoft.com/office/powerpoint/2010/main" val="3069347928"/>
       </p:ext>
     </p:extLst>
   </p:cSld>
@@ -33311,8 +33735,9 @@
           <a:p>
             <a:r>
               <a:rPr lang="en-US" sz="4800" dirty="0"/>
-              <a:t>Access tokens lack audience restrictions</a:t>
-            </a:r>
+              <a:t>Access to identity API != authentication</a:t>
+            </a:r>
+            <a:endParaRPr lang="en-US" sz="4800" dirty="0"/>
           </a:p>
         </p:txBody>
       </p:sp>
@@ -33384,7 +33809,7 @@
       </p:sp>
       <p:pic>
         <p:nvPicPr>
-          <p:cNvPr id="4" name="Picture 3"/>
+          <p:cNvPr id="5" name="Picture 4"/>
           <p:cNvPicPr>
             <a:picLocks noChangeAspect="1"/>
           </p:cNvPicPr>
@@ -33398,8 +33823,32 @@
         </p:blipFill>
         <p:spPr>
           <a:xfrm>
-            <a:off x="2487783" y="1591296"/>
-            <a:ext cx="7216433" cy="5146145"/>
+            <a:off x="2095500" y="1911620"/>
+            <a:ext cx="8420100" cy="4904750"/>
+          </a:xfrm>
+          <a:prstGeom prst="rect">
+            <a:avLst/>
+          </a:prstGeom>
+        </p:spPr>
+      </p:pic>
+      <p:pic>
+        <p:nvPicPr>
+          <p:cNvPr id="6" name="Picture 5"/>
+          <p:cNvPicPr>
+            <a:picLocks noChangeAspect="1"/>
+          </p:cNvPicPr>
+          <p:nvPr/>
+        </p:nvPicPr>
+        <p:blipFill>
+          <a:blip r:embed="rId4"/>
+          <a:stretch>
+            <a:fillRect/>
+          </a:stretch>
+        </p:blipFill>
+        <p:spPr>
+          <a:xfrm>
+            <a:off x="3390900" y="5950393"/>
+            <a:ext cx="5407938" cy="865977"/>
           </a:xfrm>
           <a:prstGeom prst="rect">
             <a:avLst/>
@@ -33409,7 +33858,7 @@
     </p:spTree>
     <p:extLst>
       <p:ext uri="{BB962C8B-B14F-4D97-AF65-F5344CB8AC3E}">
-        <p14:creationId xmlns:p14="http://schemas.microsoft.com/office/powerpoint/2010/main" val="3713413243"/>
+        <p14:creationId xmlns:p14="http://schemas.microsoft.com/office/powerpoint/2010/main" val="3565656703"/>
       </p:ext>
     </p:extLst>
   </p:cSld>
@@ -33462,8 +33911,9 @@
           <a:p>
             <a:r>
               <a:rPr lang="en-US" sz="4800" dirty="0"/>
-              <a:t>Access tokens lack audience restrictions</a:t>
-            </a:r>
+              <a:t>Access to identity API != authentication</a:t>
+            </a:r>
+            <a:endParaRPr lang="en-US" sz="4800" dirty="0"/>
           </a:p>
         </p:txBody>
       </p:sp>
@@ -33535,7 +33985,7 @@
       </p:sp>
       <p:pic>
         <p:nvPicPr>
-          <p:cNvPr id="5" name="Picture 4"/>
+          <p:cNvPr id="6" name="Picture 5"/>
           <p:cNvPicPr>
             <a:picLocks noChangeAspect="1"/>
           </p:cNvPicPr>
@@ -33549,8 +33999,32 @@
         </p:blipFill>
         <p:spPr>
           <a:xfrm>
-            <a:off x="2015065" y="1404276"/>
-            <a:ext cx="8212667" cy="5453724"/>
+            <a:off x="2081212" y="1551676"/>
+            <a:ext cx="8396288" cy="5306324"/>
+          </a:xfrm>
+          <a:prstGeom prst="rect">
+            <a:avLst/>
+          </a:prstGeom>
+        </p:spPr>
+      </p:pic>
+      <p:pic>
+        <p:nvPicPr>
+          <p:cNvPr id="8" name="Picture 7"/>
+          <p:cNvPicPr>
+            <a:picLocks noChangeAspect="1"/>
+          </p:cNvPicPr>
+          <p:nvPr/>
+        </p:nvPicPr>
+        <p:blipFill>
+          <a:blip r:embed="rId4"/>
+          <a:stretch>
+            <a:fillRect/>
+          </a:stretch>
+        </p:blipFill>
+        <p:spPr>
+          <a:xfrm>
+            <a:off x="5910262" y="5124450"/>
+            <a:ext cx="433388" cy="979834"/>
           </a:xfrm>
           <a:prstGeom prst="rect">
             <a:avLst/>
@@ -33560,7 +34034,7 @@
     </p:spTree>
     <p:extLst>
       <p:ext uri="{BB962C8B-B14F-4D97-AF65-F5344CB8AC3E}">
-        <p14:creationId xmlns:p14="http://schemas.microsoft.com/office/powerpoint/2010/main" val="3067198004"/>
+        <p14:creationId xmlns:p14="http://schemas.microsoft.com/office/powerpoint/2010/main" val="2766265650"/>
       </p:ext>
     </p:extLst>
   </p:cSld>
@@ -36432,6 +36906,13 @@
   <p:clrMapOvr>
     <a:masterClrMapping/>
   </p:clrMapOvr>
+  <p:timing>
+    <p:tnLst>
+      <p:par>
+        <p:cTn id="1" dur="indefinite" restart="never" nodeType="tmRoot"/>
+      </p:par>
+    </p:tnLst>
+  </p:timing>
 </p:sld>
 </file>
 

</xml_diff>

<commit_message>
Tweaks to OAuth stuff
</commit_message>
<xml_diff>
--- a/Securing Your API Endpoints.pptx
+++ b/Securing Your API Endpoints.pptx
@@ -75,7 +75,7 @@
     <p:sldId id="498" r:id="rId66"/>
     <p:sldId id="577" r:id="rId67"/>
     <p:sldId id="578" r:id="rId68"/>
-    <p:sldId id="579" r:id="rId69"/>
+    <p:sldId id="580" r:id="rId69"/>
     <p:sldId id="501" r:id="rId70"/>
     <p:sldId id="502" r:id="rId71"/>
     <p:sldId id="538" r:id="rId72"/>
@@ -14633,16 +14633,11 @@
                 <a:ea typeface="+mn-ea"/>
                 <a:cs typeface="+mn-cs"/>
               </a:rPr>
-              <a:t> and should not be used as one, for two reasons.</a:t>
-            </a:r>
-          </a:p>
-          <a:p>
-            <a:endParaRPr lang="en-US" dirty="0"/>
-          </a:p>
-          <a:p>
+              <a:t> and </a:t>
+            </a:r>
             <a:r>
               <a:rPr lang="en-US" b="1" dirty="0"/>
-              <a:t>You should not be using </a:t>
+              <a:t>you should not be using </a:t>
             </a:r>
             <a:r>
               <a:rPr lang="en-US" b="1" dirty="0" err="1"/>
@@ -14652,11 +14647,6 @@
               <a:rPr lang="en-US" b="1" dirty="0"/>
               <a:t> to figure out WHO is making the request</a:t>
             </a:r>
-            <a:r>
-              <a:rPr lang="en-US" b="0" dirty="0"/>
-              <a:t>.</a:t>
-            </a:r>
-            <a:endParaRPr lang="en-US" b="1" dirty="0"/>
           </a:p>
         </p:txBody>
       </p:sp>
@@ -15056,7 +15046,7 @@
                 <a:ea typeface="+mn-ea"/>
                 <a:cs typeface="+mn-cs"/>
               </a:rPr>
-              <a:t> that will provide user </a:t>
+              <a:t> that will provide the “who” associated </a:t>
             </a:r>
             <a:r>
               <a:rPr lang="en-US" sz="1200" kern="1200" baseline="0" dirty="0">
@@ -15068,7 +15058,7 @@
                 <a:ea typeface="+mn-ea"/>
                 <a:cs typeface="+mn-cs"/>
               </a:rPr>
-              <a:t>information associated with that token? </a:t>
+              <a:t>with that token? </a:t>
             </a:r>
           </a:p>
           <a:p>
@@ -15093,7 +15083,31 @@
                 <a:ea typeface="+mn-ea"/>
                 <a:cs typeface="+mn-cs"/>
               </a:rPr>
-              <a:t>Let's say you call the authorization server and you get a token. And that token lets you call an API, which will return the email address associated with that token. Is </a:t>
+              <a:t>For instance, let’s say the token lets you call this “</a:t>
+            </a:r>
+            <a:r>
+              <a:rPr lang="en-US" sz="1200" kern="1200" baseline="0" dirty="0" err="1">
+                <a:solidFill>
+                  <a:schemeClr val="tx1"/>
+                </a:solidFill>
+                <a:effectLst/>
+                <a:latin typeface="+mn-lt"/>
+                <a:ea typeface="+mn-ea"/>
+                <a:cs typeface="+mn-cs"/>
+              </a:rPr>
+              <a:t>getEmail</a:t>
+            </a:r>
+            <a:r>
+              <a:rPr lang="en-US" sz="1200" kern="1200" baseline="0" dirty="0">
+                <a:solidFill>
+                  <a:schemeClr val="tx1"/>
+                </a:solidFill>
+                <a:effectLst/>
+                <a:latin typeface="+mn-lt"/>
+                <a:ea typeface="+mn-ea"/>
+                <a:cs typeface="+mn-cs"/>
+              </a:rPr>
+              <a:t>” API, which then returns the email address that owns the data that access has been granted to. Is </a:t>
             </a:r>
             <a:r>
               <a:rPr lang="en-US" sz="1200" i="1" kern="1200" baseline="0" dirty="0">
@@ -15480,7 +15494,55 @@
                 <a:ea typeface="+mn-ea"/>
                 <a:cs typeface="+mn-cs"/>
               </a:rPr>
-              <a:t> to give my profile data to BadGuy.com</a:t>
+              <a:t> to give my profile data to BadGuy.com. This results in </a:t>
+            </a:r>
+            <a:r>
+              <a:rPr lang="en-US" sz="1200" b="0" kern="1200" baseline="0" dirty="0" err="1">
+                <a:solidFill>
+                  <a:schemeClr val="tx1"/>
+                </a:solidFill>
+                <a:effectLst/>
+                <a:latin typeface="+mn-lt"/>
+                <a:ea typeface="+mn-ea"/>
+                <a:cs typeface="+mn-cs"/>
+              </a:rPr>
+              <a:t>BadGuy</a:t>
+            </a:r>
+            <a:r>
+              <a:rPr lang="en-US" sz="1200" b="0" kern="1200" baseline="0" dirty="0">
+                <a:solidFill>
+                  <a:schemeClr val="tx1"/>
+                </a:solidFill>
+                <a:effectLst/>
+                <a:latin typeface="+mn-lt"/>
+                <a:ea typeface="+mn-ea"/>
+                <a:cs typeface="+mn-cs"/>
+              </a:rPr>
+              <a:t> getting an </a:t>
+            </a:r>
+            <a:r>
+              <a:rPr lang="en-US" sz="1200" b="0" kern="1200" baseline="0" dirty="0" err="1">
+                <a:solidFill>
+                  <a:schemeClr val="tx1"/>
+                </a:solidFill>
+                <a:effectLst/>
+                <a:latin typeface="+mn-lt"/>
+                <a:ea typeface="+mn-ea"/>
+                <a:cs typeface="+mn-cs"/>
+              </a:rPr>
+              <a:t>Oauth</a:t>
+            </a:r>
+            <a:r>
+              <a:rPr lang="en-US" sz="1200" b="0" kern="1200" baseline="0" dirty="0">
+                <a:solidFill>
+                  <a:schemeClr val="tx1"/>
+                </a:solidFill>
+                <a:effectLst/>
+                <a:latin typeface="+mn-lt"/>
+                <a:ea typeface="+mn-ea"/>
+                <a:cs typeface="+mn-cs"/>
+              </a:rPr>
+              <a:t> token that can access my data.</a:t>
             </a:r>
             <a:endParaRPr lang="en-US" sz="1200" kern="1200" dirty="0">
               <a:solidFill>
@@ -15543,7 +15605,64 @@
                 <a:ea typeface="+mn-ea"/>
                 <a:cs typeface="+mn-cs"/>
               </a:rPr>
-              <a:t> to call Facebook’s API, gets my email address, and now considers me </a:t>
+              <a:t> to call Facebook’s API and gets my email address, so they now know that the token grants access to my data</a:t>
+            </a:r>
+          </a:p>
+          <a:p>
+            <a:pPr marL="171450" indent="-171450">
+              <a:buFont typeface="Arial" panose="020B0604020202020204" pitchFamily="34" charset="0"/>
+              <a:buChar char="•"/>
+            </a:pPr>
+            <a:endParaRPr lang="en-US" sz="1200" kern="1200" dirty="0">
+              <a:solidFill>
+                <a:schemeClr val="tx1"/>
+              </a:solidFill>
+              <a:effectLst/>
+              <a:latin typeface="+mn-lt"/>
+              <a:ea typeface="+mn-ea"/>
+              <a:cs typeface="+mn-cs"/>
+            </a:endParaRPr>
+          </a:p>
+          <a:p>
+            <a:pPr marL="0" indent="0">
+              <a:buFont typeface="Arial" panose="020B0604020202020204" pitchFamily="34" charset="0"/>
+              <a:buNone/>
+            </a:pPr>
+            <a:r>
+              <a:rPr lang="en-US" sz="1200" kern="1200" dirty="0">
+                <a:solidFill>
+                  <a:schemeClr val="tx1"/>
+                </a:solidFill>
+                <a:effectLst/>
+                <a:latin typeface="+mn-lt"/>
+                <a:ea typeface="+mn-ea"/>
+                <a:cs typeface="+mn-cs"/>
+              </a:rPr>
+              <a:t>If I already have an account at </a:t>
+            </a:r>
+            <a:r>
+              <a:rPr lang="en-US" sz="1200" kern="1200" dirty="0" err="1">
+                <a:solidFill>
+                  <a:schemeClr val="tx1"/>
+                </a:solidFill>
+                <a:effectLst/>
+                <a:latin typeface="+mn-lt"/>
+                <a:ea typeface="+mn-ea"/>
+                <a:cs typeface="+mn-cs"/>
+              </a:rPr>
+              <a:t>BadGuy</a:t>
+            </a:r>
+            <a:r>
+              <a:rPr lang="en-US" sz="1200" kern="1200" dirty="0">
+                <a:solidFill>
+                  <a:schemeClr val="tx1"/>
+                </a:solidFill>
+                <a:effectLst/>
+                <a:latin typeface="+mn-lt"/>
+                <a:ea typeface="+mn-ea"/>
+                <a:cs typeface="+mn-cs"/>
+              </a:rPr>
+              <a:t>, they might go ahead and consider me </a:t>
             </a:r>
             <a:r>
               <a:rPr lang="en-US" sz="1200" b="1" kern="1200" dirty="0">
@@ -15555,7 +15674,7 @@
                 <a:ea typeface="+mn-ea"/>
                 <a:cs typeface="+mn-cs"/>
               </a:rPr>
-              <a:t>logged in</a:t>
+              <a:t>logged in.</a:t>
             </a:r>
           </a:p>
           <a:p>
@@ -15709,68 +15828,7 @@
                 <a:ea typeface="+mn-ea"/>
                 <a:cs typeface="+mn-cs"/>
               </a:rPr>
-              <a:t>It turns around and tries to log in </a:t>
-            </a:r>
-            <a:r>
-              <a:rPr lang="en-US" sz="1200" u="sng" kern="1200" dirty="0">
-                <a:solidFill>
-                  <a:schemeClr val="tx1"/>
-                </a:solidFill>
-                <a:effectLst/>
-                <a:latin typeface="+mn-lt"/>
-                <a:ea typeface="+mn-ea"/>
-                <a:cs typeface="+mn-cs"/>
-              </a:rPr>
-              <a:t>as me</a:t>
-            </a:r>
-            <a:r>
-              <a:rPr lang="en-US" sz="1200" kern="1200" dirty="0">
-                <a:solidFill>
-                  <a:schemeClr val="tx1"/>
-                </a:solidFill>
-                <a:effectLst/>
-                <a:latin typeface="+mn-lt"/>
-                <a:ea typeface="+mn-ea"/>
-                <a:cs typeface="+mn-cs"/>
-              </a:rPr>
-              <a:t> to Victim.com, which also allows Facebook logins. </a:t>
-            </a:r>
-          </a:p>
-          <a:p>
-            <a:endParaRPr lang="en-US" sz="1200" kern="1200" dirty="0">
-              <a:solidFill>
-                <a:schemeClr val="tx1"/>
-              </a:solidFill>
-              <a:effectLst/>
-              <a:latin typeface="+mn-lt"/>
-              <a:ea typeface="+mn-ea"/>
-              <a:cs typeface="+mn-cs"/>
-            </a:endParaRPr>
-          </a:p>
-          <a:p>
-            <a:r>
-              <a:rPr lang="en-US" sz="1200" kern="1200" dirty="0">
-                <a:solidFill>
-                  <a:schemeClr val="tx1"/>
-                </a:solidFill>
-                <a:effectLst/>
-                <a:latin typeface="+mn-lt"/>
-                <a:ea typeface="+mn-ea"/>
-                <a:cs typeface="+mn-cs"/>
-              </a:rPr>
-              <a:t>But instead of going through the </a:t>
-            </a:r>
-            <a:r>
-              <a:rPr lang="en-US" sz="1200" kern="1200" dirty="0" err="1">
-                <a:solidFill>
-                  <a:schemeClr val="tx1"/>
-                </a:solidFill>
-                <a:effectLst/>
-                <a:latin typeface="+mn-lt"/>
-                <a:ea typeface="+mn-ea"/>
-                <a:cs typeface="+mn-cs"/>
-              </a:rPr>
-              <a:t>auth</a:t>
+              <a:t>They go over to Victim.com, which also allows FB logins, but instead of going through the auth</a:t>
             </a:r>
             <a:r>
               <a:rPr lang="en-US" sz="1200" kern="1200" baseline="0" dirty="0">
@@ -15785,6 +15843,30 @@
               <a:t> process, BadGuy.com </a:t>
             </a:r>
             <a:r>
+              <a:rPr lang="en-US" sz="1200" i="1" kern="1200" baseline="0" dirty="0">
+                <a:solidFill>
+                  <a:schemeClr val="tx1"/>
+                </a:solidFill>
+                <a:effectLst/>
+                <a:latin typeface="+mn-lt"/>
+                <a:ea typeface="+mn-ea"/>
+                <a:cs typeface="+mn-cs"/>
+              </a:rPr>
+              <a:t>pretends</a:t>
+            </a:r>
+            <a:r>
+              <a:rPr lang="en-US" sz="1200" kern="1200" baseline="0" dirty="0">
+                <a:solidFill>
+                  <a:schemeClr val="tx1"/>
+                </a:solidFill>
+                <a:effectLst/>
+                <a:latin typeface="+mn-lt"/>
+                <a:ea typeface="+mn-ea"/>
+                <a:cs typeface="+mn-cs"/>
+              </a:rPr>
+              <a:t> that they are being redirected back from FB and they </a:t>
+            </a:r>
+            <a:r>
               <a:rPr lang="en-US" sz="1200" b="1" kern="1200" baseline="0" dirty="0">
                 <a:solidFill>
                   <a:schemeClr val="tx1"/>
@@ -15794,7 +15876,7 @@
                 <a:ea typeface="+mn-ea"/>
                 <a:cs typeface="+mn-cs"/>
               </a:rPr>
-              <a:t>reuses the access token </a:t>
+              <a:t>reuse the access token </a:t>
             </a:r>
             <a:r>
               <a:rPr lang="en-US" sz="1200" b="0" kern="1200" baseline="0" dirty="0">
@@ -15806,7 +15888,7 @@
                 <a:ea typeface="+mn-ea"/>
                 <a:cs typeface="+mn-cs"/>
               </a:rPr>
-              <a:t>they obtained earlier, when I logged in.</a:t>
+              <a:t>they obtained earlier, when I authorized it.</a:t>
             </a:r>
           </a:p>
           <a:p>
@@ -15880,7 +15962,7 @@
                 <a:ea typeface="+mn-ea"/>
                 <a:cs typeface="+mn-cs"/>
               </a:rPr>
-              <a:t>If Victim uses that as proof of authentication, then it will now have allowed </a:t>
+              <a:t>If Victim uses the ability to call that API as proof that it is ME on the line, then it will now have allowed </a:t>
             </a:r>
             <a:r>
               <a:rPr lang="en-US" sz="1200" b="0" i="0" kern="1200" baseline="0" dirty="0" err="1">
@@ -16169,7 +16251,7 @@
     </p:spTree>
     <p:extLst>
       <p:ext uri="{BB962C8B-B14F-4D97-AF65-F5344CB8AC3E}">
-        <p14:creationId xmlns:p14="http://schemas.microsoft.com/office/powerpoint/2010/main" val="3998374396"/>
+        <p14:creationId xmlns:p14="http://schemas.microsoft.com/office/powerpoint/2010/main" val="2453094483"/>
       </p:ext>
     </p:extLst>
   </p:cSld>
@@ -16436,7 +16518,7 @@
                 <a:ea typeface="+mn-ea"/>
                 <a:cs typeface="+mn-cs"/>
               </a:rPr>
-              <a:t>That way, only </a:t>
+              <a:t>IF the access token contained those things, then Victim would be able to identify when </a:t>
             </a:r>
             <a:r>
               <a:rPr lang="en-US" sz="1200" kern="1200" dirty="0" err="1">
@@ -16460,19 +16542,19 @@
                 <a:ea typeface="+mn-ea"/>
                 <a:cs typeface="+mn-cs"/>
               </a:rPr>
-              <a:t> would be able to use the token that I authorized, and the</a:t>
-            </a:r>
-            <a:r>
-              <a:rPr lang="en-US" sz="1200" kern="1200" baseline="0" dirty="0">
-                <a:solidFill>
-                  <a:schemeClr val="tx1"/>
-                </a:solidFill>
-                <a:effectLst/>
-                <a:latin typeface="+mn-lt"/>
-                <a:ea typeface="+mn-ea"/>
-                <a:cs typeface="+mn-cs"/>
-              </a:rPr>
-              <a:t> token could also serve as proof of identity to that authorized client only.</a:t>
+              <a:t> was trying to hack it, and it would be able to use the access token as proof of identity as well as proof </a:t>
+            </a:r>
+            <a:r>
+              <a:rPr lang="en-US" sz="1200" kern="1200">
+                <a:solidFill>
+                  <a:schemeClr val="tx1"/>
+                </a:solidFill>
+                <a:effectLst/>
+                <a:latin typeface="+mn-lt"/>
+                <a:ea typeface="+mn-ea"/>
+                <a:cs typeface="+mn-cs"/>
+              </a:rPr>
+              <a:t>of authorization,</a:t>
             </a:r>
             <a:endParaRPr lang="en-US" sz="1200" kern="1200" dirty="0">
               <a:solidFill>
@@ -31624,7 +31706,13 @@
       </p:sp>
       <p:pic>
         <p:nvPicPr>
-          <p:cNvPr id="5" name="Picture 4"/>
+          <p:cNvPr id="8" name="Picture 7">
+            <a:extLst>
+              <a:ext uri="{FF2B5EF4-FFF2-40B4-BE49-F238E27FC236}">
+                <a16:creationId xmlns:a16="http://schemas.microsoft.com/office/drawing/2014/main" id="{9187D1EF-8FD0-4858-8B59-A846070B676A}"/>
+              </a:ext>
+            </a:extLst>
+          </p:cNvPr>
           <p:cNvPicPr>
             <a:picLocks noChangeAspect="1"/>
           </p:cNvPicPr>
@@ -31638,32 +31726,8 @@
         </p:blipFill>
         <p:spPr>
           <a:xfrm>
-            <a:off x="2095500" y="1911620"/>
-            <a:ext cx="8420100" cy="4904750"/>
-          </a:xfrm>
-          <a:prstGeom prst="rect">
-            <a:avLst/>
-          </a:prstGeom>
-        </p:spPr>
-      </p:pic>
-      <p:pic>
-        <p:nvPicPr>
-          <p:cNvPr id="6" name="Picture 5"/>
-          <p:cNvPicPr>
-            <a:picLocks noChangeAspect="1"/>
-          </p:cNvPicPr>
-          <p:nvPr/>
-        </p:nvPicPr>
-        <p:blipFill>
-          <a:blip r:embed="rId4"/>
-          <a:stretch>
-            <a:fillRect/>
-          </a:stretch>
-        </p:blipFill>
-        <p:spPr>
-          <a:xfrm>
-            <a:off x="3390900" y="5950393"/>
-            <a:ext cx="5407938" cy="865977"/>
+            <a:off x="1713120" y="1690688"/>
+            <a:ext cx="8765759" cy="5117734"/>
           </a:xfrm>
           <a:prstGeom prst="rect">
             <a:avLst/>
@@ -31792,7 +31856,7 @@
       </p:sp>
       <p:pic>
         <p:nvPicPr>
-          <p:cNvPr id="6" name="Picture 5"/>
+          <p:cNvPr id="5" name="Picture 4"/>
           <p:cNvPicPr>
             <a:picLocks noChangeAspect="1"/>
           </p:cNvPicPr>
@@ -31806,8 +31870,8 @@
         </p:blipFill>
         <p:spPr>
           <a:xfrm>
-            <a:off x="2081212" y="1551676"/>
-            <a:ext cx="8396288" cy="5306324"/>
+            <a:off x="2095500" y="1937258"/>
+            <a:ext cx="8420100" cy="4904750"/>
           </a:xfrm>
           <a:prstGeom prst="rect">
             <a:avLst/>
@@ -31816,7 +31880,7 @@
       </p:pic>
       <p:pic>
         <p:nvPicPr>
-          <p:cNvPr id="8" name="Picture 7"/>
+          <p:cNvPr id="6" name="Picture 5"/>
           <p:cNvPicPr>
             <a:picLocks noChangeAspect="1"/>
           </p:cNvPicPr>
@@ -31830,8 +31894,38 @@
         </p:blipFill>
         <p:spPr>
           <a:xfrm>
-            <a:off x="5910262" y="5124450"/>
-            <a:ext cx="433388" cy="979834"/>
+            <a:off x="3390900" y="5950393"/>
+            <a:ext cx="5407938" cy="865977"/>
+          </a:xfrm>
+          <a:prstGeom prst="rect">
+            <a:avLst/>
+          </a:prstGeom>
+        </p:spPr>
+      </p:pic>
+      <p:pic>
+        <p:nvPicPr>
+          <p:cNvPr id="4" name="Picture 3">
+            <a:extLst>
+              <a:ext uri="{FF2B5EF4-FFF2-40B4-BE49-F238E27FC236}">
+                <a16:creationId xmlns:a16="http://schemas.microsoft.com/office/drawing/2014/main" id="{D58E6808-238A-498E-8989-E656F81821DB}"/>
+              </a:ext>
+            </a:extLst>
+          </p:cNvPr>
+          <p:cNvPicPr>
+            <a:picLocks noChangeAspect="1"/>
+          </p:cNvPicPr>
+          <p:nvPr/>
+        </p:nvPicPr>
+        <p:blipFill>
+          <a:blip r:embed="rId5"/>
+          <a:stretch>
+            <a:fillRect/>
+          </a:stretch>
+        </p:blipFill>
+        <p:spPr>
+          <a:xfrm>
+            <a:off x="1573834" y="1647209"/>
+            <a:ext cx="9231238" cy="5194799"/>
           </a:xfrm>
           <a:prstGeom prst="rect">
             <a:avLst/>
@@ -31841,7 +31935,7 @@
     </p:spTree>
     <p:extLst>
       <p:ext uri="{BB962C8B-B14F-4D97-AF65-F5344CB8AC3E}">
-        <p14:creationId xmlns:p14="http://schemas.microsoft.com/office/powerpoint/2010/main" val="2766265650"/>
+        <p14:creationId xmlns:p14="http://schemas.microsoft.com/office/powerpoint/2010/main" val="4139404127"/>
       </p:ext>
     </p:extLst>
   </p:cSld>

</xml_diff>

<commit_message>
Added intro, minor narrative tweaks
</commit_message>
<xml_diff>
--- a/Securing Your API Endpoints.pptx
+++ b/Securing Your API Endpoints.pptx
@@ -60,8 +60,8 @@
     <p:sldId id="534" r:id="rId51"/>
     <p:sldId id="536" r:id="rId52"/>
     <p:sldId id="476" r:id="rId53"/>
-    <p:sldId id="472" r:id="rId54"/>
-    <p:sldId id="475" r:id="rId55"/>
+    <p:sldId id="475" r:id="rId54"/>
+    <p:sldId id="581" r:id="rId55"/>
     <p:sldId id="490" r:id="rId56"/>
     <p:sldId id="486" r:id="rId57"/>
     <p:sldId id="576" r:id="rId58"/>
@@ -290,7 +290,7 @@
           <a:p>
             <a:fld id="{C54A4886-B4AF-42F7-97BE-95CDF82A73E3}" type="datetimeFigureOut">
               <a:rPr lang="en-US" smtClean="0"/>
-              <a:t>1/8/2019</a:t>
+              <a:t>1/10/2019</a:t>
             </a:fld>
             <a:endParaRPr lang="en-US"/>
           </a:p>
@@ -612,7 +612,16 @@
           <a:p>
             <a:r>
               <a:rPr lang="en-US" dirty="0"/>
-              <a:t>This is one of my favorite talks to give and I'm excited to share it with you. Over the next hour I'm going to take you on a journey of discovery, at the conclusion of which you'll leave this room a bit wiser and a bit more knowledgeable than you are right now.</a:t>
+              <a:t>This is one of my favorite talks to give and I'm excited to share it with you. </a:t>
+            </a:r>
+          </a:p>
+          <a:p>
+            <a:endParaRPr lang="en-US" dirty="0"/>
+          </a:p>
+          <a:p>
+            <a:r>
+              <a:rPr lang="en-US" dirty="0"/>
+              <a:t>Over the next hour I'm going to take you on a journey of knowledge and discovery, at the conclusion of which you'll leave this room a bit wiser and more prepared to handle API authentication than you are today. </a:t>
             </a:r>
           </a:p>
         </p:txBody>
@@ -3190,7 +3199,7 @@
                 <a:ea typeface="+mn-ea"/>
                 <a:cs typeface="+mn-cs"/>
               </a:rPr>
-              <a:t>Our journey begins with a confession. A few years ago, I made a huge rookie mistake.</a:t>
+              <a:t>Our journey begins with a confession. A few years ago, I was not educated about this stuff and I made a huge rookie mistake.</a:t>
             </a:r>
           </a:p>
           <a:p>
@@ -11289,31 +11298,7 @@
                 <a:ea typeface="+mn-ea"/>
                 <a:cs typeface="+mn-cs"/>
               </a:rPr>
-              <a:t>At this point we’ve discussed some simple</a:t>
-            </a:r>
-            <a:r>
-              <a:rPr lang="en-US" sz="1200" kern="1200" baseline="0" dirty="0">
-                <a:solidFill>
-                  <a:schemeClr val="tx1"/>
-                </a:solidFill>
-                <a:effectLst/>
-                <a:latin typeface="+mn-lt"/>
-                <a:ea typeface="+mn-ea"/>
-                <a:cs typeface="+mn-cs"/>
-              </a:rPr>
-              <a:t> </a:t>
-            </a:r>
-            <a:r>
-              <a:rPr lang="en-US" sz="1200" kern="1200" dirty="0">
-                <a:solidFill>
-                  <a:schemeClr val="tx1"/>
-                </a:solidFill>
-                <a:effectLst/>
-                <a:latin typeface="+mn-lt"/>
-                <a:ea typeface="+mn-ea"/>
-                <a:cs typeface="+mn-cs"/>
-              </a:rPr>
-              <a:t>authentication schemes supported natively by the web server itself and we’ve discussed custom systems based around API Keys and web tokens. Next on the agenda is </a:t>
+              <a:t>Moving on! Next on the agenda is </a:t>
             </a:r>
             <a:r>
               <a:rPr lang="en-US" sz="1200" kern="1200" dirty="0" err="1">
@@ -11385,55 +11370,6 @@
               <a:ea typeface="+mn-ea"/>
               <a:cs typeface="+mn-cs"/>
             </a:endParaRPr>
-          </a:p>
-          <a:p>
-            <a:endParaRPr lang="en-US" sz="1200" kern="1200" dirty="0">
-              <a:solidFill>
-                <a:schemeClr val="tx1"/>
-              </a:solidFill>
-              <a:effectLst/>
-              <a:latin typeface="+mn-lt"/>
-              <a:ea typeface="+mn-ea"/>
-              <a:cs typeface="+mn-cs"/>
-            </a:endParaRPr>
-          </a:p>
-          <a:p>
-            <a:r>
-              <a:rPr lang="en-US" sz="1200" kern="1200" dirty="0">
-                <a:solidFill>
-                  <a:schemeClr val="tx1"/>
-                </a:solidFill>
-                <a:effectLst/>
-                <a:latin typeface="+mn-lt"/>
-                <a:ea typeface="+mn-ea"/>
-                <a:cs typeface="+mn-cs"/>
-              </a:rPr>
-              <a:t>We’re going to discuss a few different things: the difference between 2- and 3-party authorization, the differences between OAuth versions 1.0 and 2.0, and what it means for OAuth to be an </a:t>
-            </a:r>
-            <a:r>
-              <a:rPr lang="en-US" sz="1200" u="sng" kern="1200" dirty="0">
-                <a:solidFill>
-                  <a:schemeClr val="tx1"/>
-                </a:solidFill>
-                <a:effectLst/>
-                <a:latin typeface="+mn-lt"/>
-                <a:ea typeface="+mn-ea"/>
-                <a:cs typeface="+mn-cs"/>
-              </a:rPr>
-              <a:t>authorization</a:t>
-            </a:r>
-            <a:r>
-              <a:rPr lang="en-US" sz="1200" kern="1200" dirty="0">
-                <a:solidFill>
-                  <a:schemeClr val="tx1"/>
-                </a:solidFill>
-                <a:effectLst/>
-                <a:latin typeface="+mn-lt"/>
-                <a:ea typeface="+mn-ea"/>
-                <a:cs typeface="+mn-cs"/>
-              </a:rPr>
-              <a:t> framework, not an authentication one.</a:t>
-            </a:r>
           </a:p>
         </p:txBody>
       </p:sp>
@@ -11841,7 +11777,7 @@
     </p:spTree>
     <p:extLst>
       <p:ext uri="{BB962C8B-B14F-4D97-AF65-F5344CB8AC3E}">
-        <p14:creationId xmlns:p14="http://schemas.microsoft.com/office/powerpoint/2010/main" val="2080529362"/>
+        <p14:creationId xmlns:p14="http://schemas.microsoft.com/office/powerpoint/2010/main" val="434420155"/>
       </p:ext>
     </p:extLst>
   </p:cSld>
@@ -12215,7 +12151,7 @@
     </p:spTree>
     <p:extLst>
       <p:ext uri="{BB962C8B-B14F-4D97-AF65-F5344CB8AC3E}">
-        <p14:creationId xmlns:p14="http://schemas.microsoft.com/office/powerpoint/2010/main" val="434420155"/>
+        <p14:creationId xmlns:p14="http://schemas.microsoft.com/office/powerpoint/2010/main" val="308401887"/>
       </p:ext>
     </p:extLst>
   </p:cSld>
@@ -16315,7 +16251,7 @@
                 <a:ea typeface="+mn-ea"/>
                 <a:cs typeface="+mn-cs"/>
               </a:rPr>
-              <a:t>To avoid that problem, ONLY use access tokens</a:t>
+              <a:t>To avoid that problem, DO NOT use any data that you obtain from an authorized API call as proof of identity for the request</a:t>
             </a:r>
             <a:r>
               <a:rPr lang="en-US" sz="1200" kern="1200" baseline="0" dirty="0">
@@ -16327,32 +16263,7 @@
                 <a:ea typeface="+mn-ea"/>
                 <a:cs typeface="+mn-cs"/>
               </a:rPr>
-              <a:t> to access the authorized resource. </a:t>
-            </a:r>
-          </a:p>
-          <a:p>
-            <a:endParaRPr lang="en-US" sz="1200" kern="1200" baseline="0" dirty="0">
-              <a:solidFill>
-                <a:schemeClr val="tx1"/>
-              </a:solidFill>
-              <a:effectLst/>
-              <a:latin typeface="+mn-lt"/>
-              <a:ea typeface="+mn-ea"/>
-              <a:cs typeface="+mn-cs"/>
-            </a:endParaRPr>
-          </a:p>
-          <a:p>
-            <a:r>
-              <a:rPr lang="en-US" sz="1200" kern="1200" dirty="0">
-                <a:solidFill>
-                  <a:schemeClr val="tx1"/>
-                </a:solidFill>
-                <a:effectLst/>
-                <a:latin typeface="+mn-lt"/>
-                <a:ea typeface="+mn-ea"/>
-                <a:cs typeface="+mn-cs"/>
-              </a:rPr>
-              <a:t>If you use possession of an access token as proof of authentication, you are vulnerable.</a:t>
+              <a:t>. </a:t>
             </a:r>
           </a:p>
           <a:p>
@@ -16542,29 +16453,8 @@
                 <a:ea typeface="+mn-ea"/>
                 <a:cs typeface="+mn-cs"/>
               </a:rPr>
-              <a:t> was trying to hack it, and it would be able to use the access token as proof of identity as well as proof </a:t>
-            </a:r>
-            <a:r>
-              <a:rPr lang="en-US" sz="1200" kern="1200">
-                <a:solidFill>
-                  <a:schemeClr val="tx1"/>
-                </a:solidFill>
-                <a:effectLst/>
-                <a:latin typeface="+mn-lt"/>
-                <a:ea typeface="+mn-ea"/>
-                <a:cs typeface="+mn-cs"/>
-              </a:rPr>
-              <a:t>of authorization,</a:t>
-            </a:r>
-            <a:endParaRPr lang="en-US" sz="1200" kern="1200" dirty="0">
-              <a:solidFill>
-                <a:schemeClr val="tx1"/>
-              </a:solidFill>
-              <a:effectLst/>
-              <a:latin typeface="+mn-lt"/>
-              <a:ea typeface="+mn-ea"/>
-              <a:cs typeface="+mn-cs"/>
-            </a:endParaRPr>
+              <a:t> was trying to hack it, and it would be able to use the access token as proof of identity as well as proof of authorization,</a:t>
+            </a:r>
           </a:p>
           <a:p>
             <a:endParaRPr lang="en-US" dirty="0"/>
@@ -18919,6 +18809,40 @@
                 <a:cs typeface="+mn-cs"/>
               </a:rPr>
               <a:t>oAuth</a:t>
+            </a:r>
+            <a:endParaRPr lang="en-US" sz="1200" kern="1200" baseline="0" dirty="0">
+              <a:solidFill>
+                <a:schemeClr val="tx1"/>
+              </a:solidFill>
+              <a:effectLst/>
+              <a:latin typeface="+mn-lt"/>
+              <a:ea typeface="+mn-ea"/>
+              <a:cs typeface="+mn-cs"/>
+            </a:endParaRPr>
+          </a:p>
+          <a:p>
+            <a:endParaRPr lang="en-US" sz="1200" kern="1200" baseline="0" dirty="0">
+              <a:solidFill>
+                <a:schemeClr val="tx1"/>
+              </a:solidFill>
+              <a:effectLst/>
+              <a:latin typeface="+mn-lt"/>
+              <a:ea typeface="+mn-ea"/>
+              <a:cs typeface="+mn-cs"/>
+            </a:endParaRPr>
+          </a:p>
+          <a:p>
+            <a:r>
+              <a:rPr lang="en-US" sz="1200" kern="1200" baseline="0" dirty="0">
+                <a:solidFill>
+                  <a:schemeClr val="tx1"/>
+                </a:solidFill>
+                <a:effectLst/>
+                <a:latin typeface="+mn-lt"/>
+                <a:ea typeface="+mn-ea"/>
+                <a:cs typeface="+mn-cs"/>
+              </a:rPr>
+              <a:t>Most of this session is about AUTHENTICATION, which is determining WHO is making the request. I’m assuming that once you have a WHO, your custom app logic will handle authorization</a:t>
             </a:r>
             <a:endParaRPr lang="en-US" sz="1200" kern="1200" dirty="0">
               <a:solidFill>
@@ -20148,7 +20072,7 @@
           <a:p>
             <a:fld id="{75AA6396-395E-4ADA-8EE5-F328BC863A04}" type="datetimeFigureOut">
               <a:rPr lang="en-US" smtClean="0"/>
-              <a:t>1/8/2019</a:t>
+              <a:t>1/10/2019</a:t>
             </a:fld>
             <a:endParaRPr lang="en-US"/>
           </a:p>
@@ -20316,7 +20240,7 @@
           <a:p>
             <a:fld id="{75AA6396-395E-4ADA-8EE5-F328BC863A04}" type="datetimeFigureOut">
               <a:rPr lang="en-US" smtClean="0"/>
-              <a:t>1/8/2019</a:t>
+              <a:t>1/10/2019</a:t>
             </a:fld>
             <a:endParaRPr lang="en-US"/>
           </a:p>
@@ -20494,7 +20418,7 @@
           <a:p>
             <a:fld id="{75AA6396-395E-4ADA-8EE5-F328BC863A04}" type="datetimeFigureOut">
               <a:rPr lang="en-US" smtClean="0"/>
-              <a:t>1/8/2019</a:t>
+              <a:t>1/10/2019</a:t>
             </a:fld>
             <a:endParaRPr lang="en-US"/>
           </a:p>
@@ -20712,7 +20636,7 @@
           <a:p>
             <a:fld id="{75AA6396-395E-4ADA-8EE5-F328BC863A04}" type="datetimeFigureOut">
               <a:rPr lang="en-US" smtClean="0"/>
-              <a:t>1/8/2019</a:t>
+              <a:t>1/10/2019</a:t>
             </a:fld>
             <a:endParaRPr lang="en-US"/>
           </a:p>
@@ -20957,7 +20881,7 @@
           <a:p>
             <a:fld id="{75AA6396-395E-4ADA-8EE5-F328BC863A04}" type="datetimeFigureOut">
               <a:rPr lang="en-US" smtClean="0"/>
-              <a:t>1/8/2019</a:t>
+              <a:t>1/10/2019</a:t>
             </a:fld>
             <a:endParaRPr lang="en-US"/>
           </a:p>
@@ -21186,7 +21110,7 @@
           <a:p>
             <a:fld id="{75AA6396-395E-4ADA-8EE5-F328BC863A04}" type="datetimeFigureOut">
               <a:rPr lang="en-US" smtClean="0"/>
-              <a:t>1/8/2019</a:t>
+              <a:t>1/10/2019</a:t>
             </a:fld>
             <a:endParaRPr lang="en-US"/>
           </a:p>
@@ -21550,7 +21474,7 @@
           <a:p>
             <a:fld id="{75AA6396-395E-4ADA-8EE5-F328BC863A04}" type="datetimeFigureOut">
               <a:rPr lang="en-US" smtClean="0"/>
-              <a:t>1/8/2019</a:t>
+              <a:t>1/10/2019</a:t>
             </a:fld>
             <a:endParaRPr lang="en-US"/>
           </a:p>
@@ -21667,7 +21591,7 @@
           <a:p>
             <a:fld id="{75AA6396-395E-4ADA-8EE5-F328BC863A04}" type="datetimeFigureOut">
               <a:rPr lang="en-US" smtClean="0"/>
-              <a:t>1/8/2019</a:t>
+              <a:t>1/10/2019</a:t>
             </a:fld>
             <a:endParaRPr lang="en-US"/>
           </a:p>
@@ -21762,7 +21686,7 @@
           <a:p>
             <a:fld id="{75AA6396-395E-4ADA-8EE5-F328BC863A04}" type="datetimeFigureOut">
               <a:rPr lang="en-US" smtClean="0"/>
-              <a:t>1/8/2019</a:t>
+              <a:t>1/10/2019</a:t>
             </a:fld>
             <a:endParaRPr lang="en-US"/>
           </a:p>
@@ -22037,7 +21961,7 @@
           <a:p>
             <a:fld id="{75AA6396-395E-4ADA-8EE5-F328BC863A04}" type="datetimeFigureOut">
               <a:rPr lang="en-US" smtClean="0"/>
-              <a:t>1/8/2019</a:t>
+              <a:t>1/10/2019</a:t>
             </a:fld>
             <a:endParaRPr lang="en-US"/>
           </a:p>
@@ -22289,7 +22213,7 @@
           <a:p>
             <a:fld id="{75AA6396-395E-4ADA-8EE5-F328BC863A04}" type="datetimeFigureOut">
               <a:rPr lang="en-US" smtClean="0"/>
-              <a:t>1/8/2019</a:t>
+              <a:t>1/10/2019</a:t>
             </a:fld>
             <a:endParaRPr lang="en-US"/>
           </a:p>
@@ -22500,7 +22424,7 @@
           <a:p>
             <a:fld id="{75AA6396-395E-4ADA-8EE5-F328BC863A04}" type="datetimeFigureOut">
               <a:rPr lang="en-US" smtClean="0"/>
-              <a:t>1/8/2019</a:t>
+              <a:t>1/10/2019</a:t>
             </a:fld>
             <a:endParaRPr lang="en-US"/>
           </a:p>
@@ -29529,20 +29453,6 @@
           </a:bodyPr>
           <a:lstStyle/>
           <a:p>
-            <a:r>
-              <a:rPr lang="en-US" sz="4000" dirty="0"/>
-              <a:t>Client acts </a:t>
-            </a:r>
-            <a:r>
-              <a:rPr lang="en-US" sz="4000" b="1" dirty="0"/>
-              <a:t>on behalf of</a:t>
-            </a:r>
-            <a:r>
-              <a:rPr lang="en-US" sz="4000" dirty="0"/>
-              <a:t> the resource owner</a:t>
-            </a:r>
-          </a:p>
-          <a:p>
             <a:pPr lvl="1"/>
             <a:endParaRPr lang="en-US" sz="3600" dirty="0"/>
           </a:p>
@@ -29555,56 +29465,32 @@
             <a:endParaRPr lang="en-US" sz="3600" dirty="0"/>
           </a:p>
           <a:p>
+            <a:endParaRPr lang="en-US" sz="4000" dirty="0"/>
+          </a:p>
+          <a:p>
+            <a:endParaRPr lang="en-US" sz="4000" dirty="0"/>
+          </a:p>
+          <a:p>
+            <a:endParaRPr lang="en-US" sz="4000" dirty="0"/>
+          </a:p>
+          <a:p>
+            <a:endParaRPr lang="en-US" sz="4000" dirty="0"/>
+          </a:p>
+          <a:p>
+            <a:endParaRPr lang="en-US" sz="4000" dirty="0"/>
+          </a:p>
+          <a:p>
             <a:pPr lvl="1"/>
             <a:endParaRPr lang="en-US" sz="3600" dirty="0"/>
           </a:p>
           <a:p>
-            <a:pPr lvl="1"/>
-            <a:endParaRPr lang="en-US" sz="3600" dirty="0"/>
-          </a:p>
-          <a:p>
-            <a:pPr lvl="1"/>
-            <a:endParaRPr lang="en-US" sz="3600" dirty="0"/>
-          </a:p>
-          <a:p>
-            <a:pPr lvl="1"/>
-            <a:endParaRPr lang="en-US" sz="3600" dirty="0"/>
-          </a:p>
-          <a:p>
-            <a:pPr lvl="1"/>
-            <a:endParaRPr lang="en-US" sz="3600" dirty="0"/>
-          </a:p>
-          <a:p>
-            <a:pPr lvl="1"/>
-            <a:endParaRPr lang="en-US" sz="3600" dirty="0"/>
-          </a:p>
-          <a:p>
-            <a:endParaRPr lang="en-US" sz="4000" dirty="0"/>
-          </a:p>
-          <a:p>
-            <a:endParaRPr lang="en-US" sz="4000" dirty="0"/>
-          </a:p>
-          <a:p>
-            <a:endParaRPr lang="en-US" sz="4000" dirty="0"/>
-          </a:p>
-          <a:p>
-            <a:endParaRPr lang="en-US" sz="4000" dirty="0"/>
-          </a:p>
-          <a:p>
-            <a:endParaRPr lang="en-US" sz="4000" dirty="0"/>
-          </a:p>
-          <a:p>
-            <a:pPr lvl="1"/>
-            <a:endParaRPr lang="en-US" sz="3600" dirty="0"/>
-          </a:p>
-          <a:p>
             <a:endParaRPr lang="en-US" sz="4000" dirty="0"/>
           </a:p>
         </p:txBody>
       </p:sp>
       <p:pic>
         <p:nvPicPr>
-          <p:cNvPr id="7" name="Picture 6"/>
+          <p:cNvPr id="4" name="Picture 3"/>
           <p:cNvPicPr>
             <a:picLocks noChangeAspect="1"/>
           </p:cNvPicPr>
@@ -29618,8 +29504,38 @@
         </p:blipFill>
         <p:spPr>
           <a:xfrm>
-            <a:off x="1694756" y="3198928"/>
-            <a:ext cx="8401719" cy="3472988"/>
+            <a:off x="1354667" y="1577923"/>
+            <a:ext cx="8882871" cy="5221688"/>
+          </a:xfrm>
+          <a:prstGeom prst="rect">
+            <a:avLst/>
+          </a:prstGeom>
+        </p:spPr>
+      </p:pic>
+      <p:pic>
+        <p:nvPicPr>
+          <p:cNvPr id="5" name="Picture 4">
+            <a:extLst>
+              <a:ext uri="{FF2B5EF4-FFF2-40B4-BE49-F238E27FC236}">
+                <a16:creationId xmlns:a16="http://schemas.microsoft.com/office/drawing/2014/main" id="{8BBAEC6E-071A-49C8-8594-3226E031D827}"/>
+              </a:ext>
+            </a:extLst>
+          </p:cNvPr>
+          <p:cNvPicPr>
+            <a:picLocks noChangeAspect="1"/>
+          </p:cNvPicPr>
+          <p:nvPr/>
+        </p:nvPicPr>
+        <p:blipFill>
+          <a:blip r:embed="rId4"/>
+          <a:stretch>
+            <a:fillRect/>
+          </a:stretch>
+        </p:blipFill>
+        <p:spPr>
+          <a:xfrm>
+            <a:off x="6274348" y="4605251"/>
+            <a:ext cx="4057517" cy="1828800"/>
           </a:xfrm>
           <a:prstGeom prst="rect">
             <a:avLst/>
@@ -29629,7 +29545,7 @@
     </p:spTree>
     <p:extLst>
       <p:ext uri="{BB962C8B-B14F-4D97-AF65-F5344CB8AC3E}">
-        <p14:creationId xmlns:p14="http://schemas.microsoft.com/office/powerpoint/2010/main" val="99670264"/>
+        <p14:creationId xmlns:p14="http://schemas.microsoft.com/office/powerpoint/2010/main" val="1887857253"/>
       </p:ext>
     </p:extLst>
   </p:cSld>
@@ -29764,7 +29680,7 @@
     </p:spTree>
     <p:extLst>
       <p:ext uri="{BB962C8B-B14F-4D97-AF65-F5344CB8AC3E}">
-        <p14:creationId xmlns:p14="http://schemas.microsoft.com/office/powerpoint/2010/main" val="1887857253"/>
+        <p14:creationId xmlns:p14="http://schemas.microsoft.com/office/powerpoint/2010/main" val="323648048"/>
       </p:ext>
     </p:extLst>
   </p:cSld>
@@ -32010,7 +31926,7 @@
           <a:p>
             <a:r>
               <a:rPr lang="en-US" sz="4000" dirty="0"/>
-              <a:t>DO NOT use resource authorization as proof of authentication</a:t>
+              <a:t>DO NOT use data from an authorized API call as proof of identity</a:t>
             </a:r>
           </a:p>
           <a:p>

</xml_diff>